<commit_message>
Added more tests Tweaked report a bit
</commit_message>
<xml_diff>
--- a/docs/presentation.pptx
+++ b/docs/presentation.pptx
@@ -224,7 +224,7 @@
           <a:p>
             <a:fld id="{7BC6DE02-9070-4391-A9E5-20FBA5D71A5D}" type="datetimeFigureOut">
               <a:rPr lang="ru-RU" smtClean="0"/>
-              <a:t>17.05.2025</a:t>
+              <a:t>23.05.2025</a:t>
             </a:fld>
             <a:endParaRPr lang="ru-RU"/>
           </a:p>
@@ -998,7 +998,7 @@
           <a:p>
             <a:fld id="{A1439A60-659B-42DB-BB0F-7ED87733A23E}" type="datetime1">
               <a:rPr lang="ru-RU" smtClean="0"/>
-              <a:t>17.05.2025</a:t>
+              <a:t>23.05.2025</a:t>
             </a:fld>
             <a:endParaRPr lang="ru-RU"/>
           </a:p>
@@ -1196,7 +1196,7 @@
           <a:p>
             <a:fld id="{D61B71B4-54FB-40B8-90DD-279781B0C38D}" type="datetime1">
               <a:rPr lang="ru-RU" smtClean="0"/>
-              <a:t>17.05.2025</a:t>
+              <a:t>23.05.2025</a:t>
             </a:fld>
             <a:endParaRPr lang="ru-RU"/>
           </a:p>
@@ -1404,7 +1404,7 @@
           <a:p>
             <a:fld id="{2D090295-5DD3-4456-8BDB-FA7FF8949F97}" type="datetime1">
               <a:rPr lang="ru-RU" smtClean="0"/>
-              <a:t>17.05.2025</a:t>
+              <a:t>23.05.2025</a:t>
             </a:fld>
             <a:endParaRPr lang="ru-RU"/>
           </a:p>
@@ -1602,7 +1602,7 @@
           <a:p>
             <a:fld id="{D7B5F5C0-A8AD-4E24-BFA5-3353364AFE30}" type="datetime1">
               <a:rPr lang="ru-RU" smtClean="0"/>
-              <a:t>17.05.2025</a:t>
+              <a:t>23.05.2025</a:t>
             </a:fld>
             <a:endParaRPr lang="ru-RU"/>
           </a:p>
@@ -1885,7 +1885,7 @@
           <a:p>
             <a:fld id="{6A2AEECD-1031-4CBC-A778-E91CBA3F92A4}" type="datetime1">
               <a:rPr lang="ru-RU" smtClean="0"/>
-              <a:t>17.05.2025</a:t>
+              <a:t>23.05.2025</a:t>
             </a:fld>
             <a:endParaRPr lang="ru-RU"/>
           </a:p>
@@ -2150,7 +2150,7 @@
           <a:p>
             <a:fld id="{8E5B82EB-9FE1-42D5-8640-685632266EB2}" type="datetime1">
               <a:rPr lang="ru-RU" smtClean="0"/>
-              <a:t>17.05.2025</a:t>
+              <a:t>23.05.2025</a:t>
             </a:fld>
             <a:endParaRPr lang="ru-RU"/>
           </a:p>
@@ -2562,7 +2562,7 @@
           <a:p>
             <a:fld id="{A33273D1-BF9D-4402-A07A-C11263F81ACA}" type="datetime1">
               <a:rPr lang="ru-RU" smtClean="0"/>
-              <a:t>17.05.2025</a:t>
+              <a:t>23.05.2025</a:t>
             </a:fld>
             <a:endParaRPr lang="ru-RU"/>
           </a:p>
@@ -2703,7 +2703,7 @@
           <a:p>
             <a:fld id="{C10D7C68-AD43-4338-B6C7-4798ABAED37C}" type="datetime1">
               <a:rPr lang="ru-RU" smtClean="0"/>
-              <a:t>17.05.2025</a:t>
+              <a:t>23.05.2025</a:t>
             </a:fld>
             <a:endParaRPr lang="ru-RU"/>
           </a:p>
@@ -2816,7 +2816,7 @@
           <a:p>
             <a:fld id="{04A09544-4DCC-4E50-BBA1-0EB924E42FB5}" type="datetime1">
               <a:rPr lang="ru-RU" smtClean="0"/>
-              <a:t>17.05.2025</a:t>
+              <a:t>23.05.2025</a:t>
             </a:fld>
             <a:endParaRPr lang="ru-RU"/>
           </a:p>
@@ -3127,7 +3127,7 @@
           <a:p>
             <a:fld id="{B44A15D2-7284-412E-B86C-C8BE76838BC3}" type="datetime1">
               <a:rPr lang="ru-RU" smtClean="0"/>
-              <a:t>17.05.2025</a:t>
+              <a:t>23.05.2025</a:t>
             </a:fld>
             <a:endParaRPr lang="ru-RU"/>
           </a:p>
@@ -3415,7 +3415,7 @@
           <a:p>
             <a:fld id="{4A4A6565-B229-48CB-B9AB-84026305D07B}" type="datetime1">
               <a:rPr lang="ru-RU" smtClean="0"/>
-              <a:t>17.05.2025</a:t>
+              <a:t>23.05.2025</a:t>
             </a:fld>
             <a:endParaRPr lang="ru-RU"/>
           </a:p>
@@ -3656,7 +3656,7 @@
           <a:p>
             <a:fld id="{BBCA45A3-F3B4-42F8-B88D-1485C0862389}" type="datetime1">
               <a:rPr lang="ru-RU" smtClean="0"/>
-              <a:t>17.05.2025</a:t>
+              <a:t>23.05.2025</a:t>
             </a:fld>
             <a:endParaRPr lang="ru-RU"/>
           </a:p>
@@ -4822,10 +4822,10 @@
       </p:sp>
       <p:pic>
         <p:nvPicPr>
-          <p:cNvPr id="4" name="Рисунок 3">
-            <a:extLst>
-              <a:ext uri="{FF2B5EF4-FFF2-40B4-BE49-F238E27FC236}">
-                <a16:creationId xmlns:a16="http://schemas.microsoft.com/office/drawing/2014/main" id="{A3DEA37F-5409-9B7C-0C4D-363FB9920D48}"/>
+          <p:cNvPr id="6" name="Рисунок 5">
+            <a:extLst>
+              <a:ext uri="{FF2B5EF4-FFF2-40B4-BE49-F238E27FC236}">
+                <a16:creationId xmlns:a16="http://schemas.microsoft.com/office/drawing/2014/main" id="{4F1D96E0-587D-1F17-3706-2C1ABCC289EC}"/>
               </a:ext>
             </a:extLst>
           </p:cNvPr>
@@ -4842,8 +4842,8 @@
         </p:blipFill>
         <p:spPr>
           <a:xfrm>
-            <a:off x="2642126" y="1312980"/>
-            <a:ext cx="7073374" cy="4922719"/>
+            <a:off x="2415884" y="1333992"/>
+            <a:ext cx="7360232" cy="5158883"/>
           </a:xfrm>
           <a:prstGeom prst="rect">
             <a:avLst/>
@@ -6039,13 +6039,10 @@
               </a:rPr>
               <a:t>По данным исследования методом наименьших квадратов построены полиномы 3 степени</a:t>
             </a:r>
-            <a:r>
-              <a:rPr lang="en-US" sz="2300" dirty="0">
-                <a:latin typeface="Times New Roman" panose="02020603050405020304" pitchFamily="18" charset="0"/>
-                <a:cs typeface="Times New Roman" panose="02020603050405020304" pitchFamily="18" charset="0"/>
-              </a:rPr>
-              <a:t>:</a:t>
-            </a:r>
+            <a:endParaRPr lang="en-US" sz="2300" dirty="0">
+              <a:latin typeface="Times New Roman" panose="02020603050405020304" pitchFamily="18" charset="0"/>
+              <a:cs typeface="Times New Roman" panose="02020603050405020304" pitchFamily="18" charset="0"/>
+            </a:endParaRPr>
           </a:p>
           <a:p>
             <a:pPr marL="0" indent="0" algn="just">
@@ -7271,8 +7268,8 @@
         </p:blipFill>
         <p:spPr>
           <a:xfrm>
-            <a:off x="753291" y="1165177"/>
-            <a:ext cx="10685417" cy="5373735"/>
+            <a:off x="1007292" y="1289579"/>
+            <a:ext cx="10346508" cy="5203296"/>
           </a:xfrm>
           <a:prstGeom prst="rect">
             <a:avLst/>
@@ -7301,21 +7298,26 @@
           <a:lstStyle/>
           <a:p>
             <a:r>
+              <a:rPr lang="ru-RU" dirty="0">
+                <a:latin typeface="Times New Roman" panose="02020603050405020304" pitchFamily="18" charset="0"/>
+                <a:ea typeface="+mn-ea"/>
+                <a:cs typeface="Times New Roman" panose="02020603050405020304" pitchFamily="18" charset="0"/>
+              </a:rPr>
+              <a:t>Диаграмма "сущность-связь</a:t>
+            </a:r>
+            <a:r>
               <a:rPr lang="en-US" dirty="0">
                 <a:latin typeface="Times New Roman" panose="02020603050405020304" pitchFamily="18" charset="0"/>
                 <a:ea typeface="+mn-ea"/>
                 <a:cs typeface="Times New Roman" panose="02020603050405020304" pitchFamily="18" charset="0"/>
               </a:rPr>
-              <a:t>ER-</a:t>
-            </a:r>
-            <a:r>
-              <a:rPr lang="ru-RU" dirty="0">
-                <a:latin typeface="Times New Roman" panose="02020603050405020304" pitchFamily="18" charset="0"/>
-                <a:ea typeface="+mn-ea"/>
-                <a:cs typeface="Times New Roman" panose="02020603050405020304" pitchFamily="18" charset="0"/>
-              </a:rPr>
-              <a:t>модель</a:t>
-            </a:r>
+              <a:t>"</a:t>
+            </a:r>
+            <a:endParaRPr lang="ru-RU" dirty="0">
+              <a:latin typeface="Times New Roman" panose="02020603050405020304" pitchFamily="18" charset="0"/>
+              <a:ea typeface="+mn-ea"/>
+              <a:cs typeface="Times New Roman" panose="02020603050405020304" pitchFamily="18" charset="0"/>
+            </a:endParaRPr>
           </a:p>
         </p:txBody>
       </p:sp>
@@ -7460,14 +7462,14 @@
           <p:nvPr>
             <p:extLst>
               <p:ext uri="{D42A27DB-BD31-4B8C-83A1-F6EECF244321}">
-                <p14:modId xmlns:p14="http://schemas.microsoft.com/office/powerpoint/2010/main" val="548970914"/>
+                <p14:modId xmlns:p14="http://schemas.microsoft.com/office/powerpoint/2010/main" val="617381201"/>
               </p:ext>
             </p:extLst>
           </p:nvPr>
         </p:nvGraphicFramePr>
         <p:xfrm>
           <a:off x="1339850" y="1516740"/>
-          <a:ext cx="9347200" cy="4452322"/>
+          <a:ext cx="9379522" cy="4452322"/>
         </p:xfrm>
         <a:graphic>
           <a:graphicData uri="http://schemas.openxmlformats.org/drawingml/2006/table">
@@ -7476,7 +7478,7 @@
                 <a:tableStyleId>{5940675A-B579-460E-94D1-54222C63F5DA}</a:tableStyleId>
               </a:tblPr>
               <a:tblGrid>
-                <a:gridCol w="1739900">
+                <a:gridCol w="1772222">
                   <a:extLst>
                     <a:ext uri="{9D8B030D-6E8A-4147-A177-3AD203B41FA5}">
                       <a16:colId xmlns:a16="http://schemas.microsoft.com/office/drawing/2014/main" val="3263402578"/>
@@ -7553,7 +7555,7 @@
                           <a:ea typeface="+mn-ea"/>
                           <a:cs typeface="Times New Roman" panose="02020603050405020304" pitchFamily="18" charset="0"/>
                         </a:rPr>
-                        <a:t>Все</a:t>
+                        <a:t>Все пользователи</a:t>
                       </a:r>
                     </a:p>
                   </a:txBody>
@@ -7788,69 +7790,6 @@
           <a:chExt cx="0" cy="0"/>
         </a:xfrm>
       </p:grpSpPr>
-      <p:sp>
-        <p:nvSpPr>
-          <p:cNvPr id="2" name="Заголовок 1">
-            <a:extLst>
-              <a:ext uri="{FF2B5EF4-FFF2-40B4-BE49-F238E27FC236}">
-                <a16:creationId xmlns:a16="http://schemas.microsoft.com/office/drawing/2014/main" id="{954E512C-01F0-A9BE-567C-F9835F7BEA47}"/>
-              </a:ext>
-            </a:extLst>
-          </p:cNvPr>
-          <p:cNvSpPr>
-            <a:spLocks noGrp="1"/>
-          </p:cNvSpPr>
-          <p:nvPr>
-            <p:ph type="title"/>
-          </p:nvPr>
-        </p:nvSpPr>
-        <p:spPr/>
-        <p:txBody>
-          <a:bodyPr>
-            <a:normAutofit/>
-          </a:bodyPr>
-          <a:lstStyle/>
-          <a:p>
-            <a:r>
-              <a:rPr lang="ru-RU" dirty="0">
-                <a:latin typeface="Times New Roman" panose="02020603050405020304" pitchFamily="18" charset="0"/>
-                <a:ea typeface="+mn-ea"/>
-                <a:cs typeface="Times New Roman" panose="02020603050405020304" pitchFamily="18" charset="0"/>
-              </a:rPr>
-              <a:t>Диаграмма вариантов использования</a:t>
-            </a:r>
-          </a:p>
-        </p:txBody>
-      </p:sp>
-      <p:sp>
-        <p:nvSpPr>
-          <p:cNvPr id="5" name="Номер слайда 4">
-            <a:extLst>
-              <a:ext uri="{FF2B5EF4-FFF2-40B4-BE49-F238E27FC236}">
-                <a16:creationId xmlns:a16="http://schemas.microsoft.com/office/drawing/2014/main" id="{D7B7C799-BEDA-6123-DDA1-82D0CA067A7A}"/>
-              </a:ext>
-            </a:extLst>
-          </p:cNvPr>
-          <p:cNvSpPr>
-            <a:spLocks noGrp="1"/>
-          </p:cNvSpPr>
-          <p:nvPr>
-            <p:ph type="sldNum" sz="quarter" idx="12"/>
-          </p:nvPr>
-        </p:nvSpPr>
-        <p:spPr/>
-        <p:txBody>
-          <a:bodyPr/>
-          <a:lstStyle/>
-          <a:p>
-            <a:fld id="{9F75ED48-FB93-4D27-9D40-6DF4DFA3F996}" type="slidenum">
-              <a:rPr lang="ru-RU" smtClean="0"/>
-              <a:t>6</a:t>
-            </a:fld>
-            <a:endParaRPr lang="ru-RU"/>
-          </a:p>
-        </p:txBody>
-      </p:sp>
       <p:pic>
         <p:nvPicPr>
           <p:cNvPr id="6" name="Рисунок 5">
@@ -7873,14 +7812,77 @@
         </p:blipFill>
         <p:spPr>
           <a:xfrm>
-            <a:off x="2183310" y="1327889"/>
-            <a:ext cx="7798890" cy="5211023"/>
+            <a:off x="1821820" y="1097741"/>
+            <a:ext cx="8320924" cy="5559833"/>
           </a:xfrm>
           <a:prstGeom prst="rect">
             <a:avLst/>
           </a:prstGeom>
         </p:spPr>
       </p:pic>
+      <p:sp>
+        <p:nvSpPr>
+          <p:cNvPr id="2" name="Заголовок 1">
+            <a:extLst>
+              <a:ext uri="{FF2B5EF4-FFF2-40B4-BE49-F238E27FC236}">
+                <a16:creationId xmlns:a16="http://schemas.microsoft.com/office/drawing/2014/main" id="{954E512C-01F0-A9BE-567C-F9835F7BEA47}"/>
+              </a:ext>
+            </a:extLst>
+          </p:cNvPr>
+          <p:cNvSpPr>
+            <a:spLocks noGrp="1"/>
+          </p:cNvSpPr>
+          <p:nvPr>
+            <p:ph type="title"/>
+          </p:nvPr>
+        </p:nvSpPr>
+        <p:spPr/>
+        <p:txBody>
+          <a:bodyPr>
+            <a:normAutofit/>
+          </a:bodyPr>
+          <a:lstStyle/>
+          <a:p>
+            <a:r>
+              <a:rPr lang="ru-RU" dirty="0">
+                <a:latin typeface="Times New Roman" panose="02020603050405020304" pitchFamily="18" charset="0"/>
+                <a:ea typeface="+mn-ea"/>
+                <a:cs typeface="Times New Roman" panose="02020603050405020304" pitchFamily="18" charset="0"/>
+              </a:rPr>
+              <a:t>Диаграмма вариантов использования</a:t>
+            </a:r>
+          </a:p>
+        </p:txBody>
+      </p:sp>
+      <p:sp>
+        <p:nvSpPr>
+          <p:cNvPr id="5" name="Номер слайда 4">
+            <a:extLst>
+              <a:ext uri="{FF2B5EF4-FFF2-40B4-BE49-F238E27FC236}">
+                <a16:creationId xmlns:a16="http://schemas.microsoft.com/office/drawing/2014/main" id="{D7B7C799-BEDA-6123-DDA1-82D0CA067A7A}"/>
+              </a:ext>
+            </a:extLst>
+          </p:cNvPr>
+          <p:cNvSpPr>
+            <a:spLocks noGrp="1"/>
+          </p:cNvSpPr>
+          <p:nvPr>
+            <p:ph type="sldNum" sz="quarter" idx="12"/>
+          </p:nvPr>
+        </p:nvSpPr>
+        <p:spPr/>
+        <p:txBody>
+          <a:bodyPr/>
+          <a:lstStyle/>
+          <a:p>
+            <a:fld id="{9F75ED48-FB93-4D27-9D40-6DF4DFA3F996}" type="slidenum">
+              <a:rPr lang="ru-RU" smtClean="0"/>
+              <a:t>6</a:t>
+            </a:fld>
+            <a:endParaRPr lang="ru-RU"/>
+          </a:p>
+        </p:txBody>
+      </p:sp>
     </p:spTree>
     <p:extLst>
       <p:ext uri="{BB962C8B-B14F-4D97-AF65-F5344CB8AC3E}">
@@ -7966,7 +7968,7 @@
           <a:bodyPr/>
           <a:lstStyle/>
           <a:p>
-            <a:endParaRPr lang="ru-RU"/>
+            <a:endParaRPr lang="ru-RU" dirty="0"/>
           </a:p>
         </p:txBody>
       </p:sp>
@@ -8001,10 +8003,10 @@
       </p:sp>
       <p:pic>
         <p:nvPicPr>
-          <p:cNvPr id="7" name="Рисунок 6">
-            <a:extLst>
-              <a:ext uri="{FF2B5EF4-FFF2-40B4-BE49-F238E27FC236}">
-                <a16:creationId xmlns:a16="http://schemas.microsoft.com/office/drawing/2014/main" id="{5E5D84F1-17A5-7EA9-4CDC-C60C6C75CB6E}"/>
+          <p:cNvPr id="9" name="Рисунок 8">
+            <a:extLst>
+              <a:ext uri="{FF2B5EF4-FFF2-40B4-BE49-F238E27FC236}">
+                <a16:creationId xmlns:a16="http://schemas.microsoft.com/office/drawing/2014/main" id="{F742F01F-3A08-9B38-B67C-175A56538154}"/>
               </a:ext>
             </a:extLst>
           </p:cNvPr>
@@ -8021,8 +8023,8 @@
         </p:blipFill>
         <p:spPr>
           <a:xfrm>
-            <a:off x="2091702" y="1370535"/>
-            <a:ext cx="7890498" cy="4985815"/>
+            <a:off x="2702040" y="1448302"/>
+            <a:ext cx="6567603" cy="5044573"/>
           </a:xfrm>
           <a:prstGeom prst="rect">
             <a:avLst/>

</xml_diff>

<commit_message>
Tweaked the ImageProcessor. Tweaked REPORT so IT IS 96% DONE IDK I SHOULD REREAD IT AND THEN PUSH AND FORGET
</commit_message>
<xml_diff>
--- a/docs/presentation.pptx
+++ b/docs/presentation.pptx
@@ -5,7 +5,7 @@
     <p:sldMasterId id="2147483648" r:id="rId1"/>
   </p:sldMasterIdLst>
   <p:notesMasterIdLst>
-    <p:notesMasterId r:id="rId18"/>
+    <p:notesMasterId r:id="rId19"/>
   </p:notesMasterIdLst>
   <p:sldIdLst>
     <p:sldId id="256" r:id="rId2"/>
@@ -16,14 +16,15 @@
     <p:sldId id="277" r:id="rId7"/>
     <p:sldId id="274" r:id="rId8"/>
     <p:sldId id="276" r:id="rId9"/>
-    <p:sldId id="273" r:id="rId10"/>
-    <p:sldId id="283" r:id="rId11"/>
-    <p:sldId id="281" r:id="rId12"/>
-    <p:sldId id="263" r:id="rId13"/>
-    <p:sldId id="268" r:id="rId14"/>
-    <p:sldId id="265" r:id="rId15"/>
-    <p:sldId id="259" r:id="rId16"/>
-    <p:sldId id="279" r:id="rId17"/>
+    <p:sldId id="284" r:id="rId10"/>
+    <p:sldId id="273" r:id="rId11"/>
+    <p:sldId id="283" r:id="rId12"/>
+    <p:sldId id="281" r:id="rId13"/>
+    <p:sldId id="263" r:id="rId14"/>
+    <p:sldId id="268" r:id="rId15"/>
+    <p:sldId id="265" r:id="rId16"/>
+    <p:sldId id="259" r:id="rId17"/>
+    <p:sldId id="279" r:id="rId18"/>
   </p:sldIdLst>
   <p:sldSz cx="12192000" cy="6858000"/>
   <p:notesSz cx="6858000" cy="9144000"/>
@@ -224,7 +225,7 @@
           <a:p>
             <a:fld id="{7BC6DE02-9070-4391-A9E5-20FBA5D71A5D}" type="datetimeFigureOut">
               <a:rPr lang="ru-RU" smtClean="0"/>
-              <a:t>23.05.2025</a:t>
+              <a:t>24.05.2025</a:t>
             </a:fld>
             <a:endParaRPr lang="ru-RU"/>
           </a:p>
@@ -556,7 +557,7 @@
           <a:p>
             <a:fld id="{BC0E1A58-9EB9-4B1E-BEA5-AC525CF5DADF}" type="slidenum">
               <a:rPr lang="ru-RU" smtClean="0"/>
-              <a:t>12</a:t>
+              <a:t>13</a:t>
             </a:fld>
             <a:endParaRPr lang="ru-RU"/>
           </a:p>
@@ -640,7 +641,7 @@
           <a:p>
             <a:fld id="{BC0E1A58-9EB9-4B1E-BEA5-AC525CF5DADF}" type="slidenum">
               <a:rPr lang="ru-RU" smtClean="0"/>
-              <a:t>13</a:t>
+              <a:t>14</a:t>
             </a:fld>
             <a:endParaRPr lang="ru-RU"/>
           </a:p>
@@ -724,7 +725,7 @@
           <a:p>
             <a:fld id="{BC0E1A58-9EB9-4B1E-BEA5-AC525CF5DADF}" type="slidenum">
               <a:rPr lang="ru-RU" smtClean="0"/>
-              <a:t>14</a:t>
+              <a:t>15</a:t>
             </a:fld>
             <a:endParaRPr lang="ru-RU"/>
           </a:p>
@@ -832,7 +833,7 @@
           <a:p>
             <a:fld id="{BC0E1A58-9EB9-4B1E-BEA5-AC525CF5DADF}" type="slidenum">
               <a:rPr lang="ru-RU" smtClean="0"/>
-              <a:t>16</a:t>
+              <a:t>17</a:t>
             </a:fld>
             <a:endParaRPr lang="ru-RU"/>
           </a:p>
@@ -998,7 +999,7 @@
           <a:p>
             <a:fld id="{A1439A60-659B-42DB-BB0F-7ED87733A23E}" type="datetime1">
               <a:rPr lang="ru-RU" smtClean="0"/>
-              <a:t>23.05.2025</a:t>
+              <a:t>24.05.2025</a:t>
             </a:fld>
             <a:endParaRPr lang="ru-RU"/>
           </a:p>
@@ -1196,7 +1197,7 @@
           <a:p>
             <a:fld id="{D61B71B4-54FB-40B8-90DD-279781B0C38D}" type="datetime1">
               <a:rPr lang="ru-RU" smtClean="0"/>
-              <a:t>23.05.2025</a:t>
+              <a:t>24.05.2025</a:t>
             </a:fld>
             <a:endParaRPr lang="ru-RU"/>
           </a:p>
@@ -1404,7 +1405,7 @@
           <a:p>
             <a:fld id="{2D090295-5DD3-4456-8BDB-FA7FF8949F97}" type="datetime1">
               <a:rPr lang="ru-RU" smtClean="0"/>
-              <a:t>23.05.2025</a:t>
+              <a:t>24.05.2025</a:t>
             </a:fld>
             <a:endParaRPr lang="ru-RU"/>
           </a:p>
@@ -1602,7 +1603,7 @@
           <a:p>
             <a:fld id="{D7B5F5C0-A8AD-4E24-BFA5-3353364AFE30}" type="datetime1">
               <a:rPr lang="ru-RU" smtClean="0"/>
-              <a:t>23.05.2025</a:t>
+              <a:t>24.05.2025</a:t>
             </a:fld>
             <a:endParaRPr lang="ru-RU"/>
           </a:p>
@@ -1885,7 +1886,7 @@
           <a:p>
             <a:fld id="{6A2AEECD-1031-4CBC-A778-E91CBA3F92A4}" type="datetime1">
               <a:rPr lang="ru-RU" smtClean="0"/>
-              <a:t>23.05.2025</a:t>
+              <a:t>24.05.2025</a:t>
             </a:fld>
             <a:endParaRPr lang="ru-RU"/>
           </a:p>
@@ -2150,7 +2151,7 @@
           <a:p>
             <a:fld id="{8E5B82EB-9FE1-42D5-8640-685632266EB2}" type="datetime1">
               <a:rPr lang="ru-RU" smtClean="0"/>
-              <a:t>23.05.2025</a:t>
+              <a:t>24.05.2025</a:t>
             </a:fld>
             <a:endParaRPr lang="ru-RU"/>
           </a:p>
@@ -2562,7 +2563,7 @@
           <a:p>
             <a:fld id="{A33273D1-BF9D-4402-A07A-C11263F81ACA}" type="datetime1">
               <a:rPr lang="ru-RU" smtClean="0"/>
-              <a:t>23.05.2025</a:t>
+              <a:t>24.05.2025</a:t>
             </a:fld>
             <a:endParaRPr lang="ru-RU"/>
           </a:p>
@@ -2703,7 +2704,7 @@
           <a:p>
             <a:fld id="{C10D7C68-AD43-4338-B6C7-4798ABAED37C}" type="datetime1">
               <a:rPr lang="ru-RU" smtClean="0"/>
-              <a:t>23.05.2025</a:t>
+              <a:t>24.05.2025</a:t>
             </a:fld>
             <a:endParaRPr lang="ru-RU"/>
           </a:p>
@@ -2816,7 +2817,7 @@
           <a:p>
             <a:fld id="{04A09544-4DCC-4E50-BBA1-0EB924E42FB5}" type="datetime1">
               <a:rPr lang="ru-RU" smtClean="0"/>
-              <a:t>23.05.2025</a:t>
+              <a:t>24.05.2025</a:t>
             </a:fld>
             <a:endParaRPr lang="ru-RU"/>
           </a:p>
@@ -3127,7 +3128,7 @@
           <a:p>
             <a:fld id="{B44A15D2-7284-412E-B86C-C8BE76838BC3}" type="datetime1">
               <a:rPr lang="ru-RU" smtClean="0"/>
-              <a:t>23.05.2025</a:t>
+              <a:t>24.05.2025</a:t>
             </a:fld>
             <a:endParaRPr lang="ru-RU"/>
           </a:p>
@@ -3415,7 +3416,7 @@
           <a:p>
             <a:fld id="{4A4A6565-B229-48CB-B9AB-84026305D07B}" type="datetime1">
               <a:rPr lang="ru-RU" smtClean="0"/>
-              <a:t>23.05.2025</a:t>
+              <a:t>24.05.2025</a:t>
             </a:fld>
             <a:endParaRPr lang="ru-RU"/>
           </a:p>
@@ -3656,7 +3657,7 @@
           <a:p>
             <a:fld id="{BBCA45A3-F3B4-42F8-B88D-1485C0862389}" type="datetime1">
               <a:rPr lang="ru-RU" smtClean="0"/>
-              <a:t>23.05.2025</a:t>
+              <a:t>24.05.2025</a:t>
             </a:fld>
             <a:endParaRPr lang="ru-RU"/>
           </a:p>
@@ -4739,6 +4740,331 @@
   <p:cSld>
     <p:spTree>
       <p:nvGrpSpPr>
+        <p:cNvPr id="1" name=""/>
+        <p:cNvGrpSpPr/>
+        <p:nvPr/>
+      </p:nvGrpSpPr>
+      <p:grpSpPr>
+        <a:xfrm>
+          <a:off x="0" y="0"/>
+          <a:ext cx="0" cy="0"/>
+          <a:chOff x="0" y="0"/>
+          <a:chExt cx="0" cy="0"/>
+        </a:xfrm>
+      </p:grpSpPr>
+      <p:sp>
+        <p:nvSpPr>
+          <p:cNvPr id="2" name="Заголовок 1">
+            <a:extLst>
+              <a:ext uri="{FF2B5EF4-FFF2-40B4-BE49-F238E27FC236}">
+                <a16:creationId xmlns:a16="http://schemas.microsoft.com/office/drawing/2014/main" id="{1294129D-F169-D152-03DD-9227D0701403}"/>
+              </a:ext>
+            </a:extLst>
+          </p:cNvPr>
+          <p:cNvSpPr>
+            <a:spLocks noGrp="1"/>
+          </p:cNvSpPr>
+          <p:nvPr>
+            <p:ph type="title"/>
+          </p:nvPr>
+        </p:nvSpPr>
+        <p:spPr/>
+        <p:txBody>
+          <a:bodyPr/>
+          <a:lstStyle/>
+          <a:p>
+            <a:r>
+              <a:rPr lang="ru-RU" sz="4400" dirty="0">
+                <a:latin typeface="Times New Roman" panose="02020603050405020304" pitchFamily="18" charset="0"/>
+                <a:cs typeface="Times New Roman" panose="02020603050405020304" pitchFamily="18" charset="0"/>
+              </a:rPr>
+              <a:t>Средства реализации</a:t>
+            </a:r>
+            <a:endParaRPr lang="ru-RU" dirty="0"/>
+          </a:p>
+        </p:txBody>
+      </p:sp>
+      <p:sp>
+        <p:nvSpPr>
+          <p:cNvPr id="3" name="Объект 2">
+            <a:extLst>
+              <a:ext uri="{FF2B5EF4-FFF2-40B4-BE49-F238E27FC236}">
+                <a16:creationId xmlns:a16="http://schemas.microsoft.com/office/drawing/2014/main" id="{4286BC96-A488-534F-7EB9-5599428C14FE}"/>
+              </a:ext>
+            </a:extLst>
+          </p:cNvPr>
+          <p:cNvSpPr>
+            <a:spLocks noGrp="1"/>
+          </p:cNvSpPr>
+          <p:nvPr>
+            <p:ph idx="1"/>
+          </p:nvPr>
+        </p:nvSpPr>
+        <p:spPr/>
+        <p:txBody>
+          <a:bodyPr/>
+          <a:lstStyle/>
+          <a:p>
+            <a:pPr marL="457200" indent="-457200">
+              <a:buFont typeface="Liberation Sans" panose="020B0604020202020204" pitchFamily="34" charset="0"/>
+              <a:buChar char="−"/>
+            </a:pPr>
+            <a:r>
+              <a:rPr lang="ru-RU" sz="2800" dirty="0">
+                <a:latin typeface="Times New Roman" panose="02020603050405020304" pitchFamily="18" charset="0"/>
+                <a:cs typeface="Times New Roman" panose="02020603050405020304" pitchFamily="18" charset="0"/>
+              </a:rPr>
+              <a:t>СУБД</a:t>
+            </a:r>
+            <a:r>
+              <a:rPr lang="en-US" sz="2800" dirty="0">
+                <a:latin typeface="Times New Roman" panose="02020603050405020304" pitchFamily="18" charset="0"/>
+                <a:cs typeface="Times New Roman" panose="02020603050405020304" pitchFamily="18" charset="0"/>
+              </a:rPr>
+              <a:t>: PostgreSQL</a:t>
+            </a:r>
+            <a:endParaRPr lang="ru-RU" sz="2800" dirty="0">
+              <a:latin typeface="Times New Roman" panose="02020603050405020304" pitchFamily="18" charset="0"/>
+              <a:cs typeface="Times New Roman" panose="02020603050405020304" pitchFamily="18" charset="0"/>
+            </a:endParaRPr>
+          </a:p>
+          <a:p>
+            <a:pPr marL="457200" indent="-457200">
+              <a:buFont typeface="Liberation Sans" panose="020B0604020202020204" pitchFamily="34" charset="0"/>
+              <a:buChar char="−"/>
+            </a:pPr>
+            <a:r>
+              <a:rPr lang="ru-RU" sz="2800" dirty="0">
+                <a:latin typeface="Times New Roman" panose="02020603050405020304" pitchFamily="18" charset="0"/>
+                <a:cs typeface="Times New Roman" panose="02020603050405020304" pitchFamily="18" charset="0"/>
+              </a:rPr>
+              <a:t>Язык: C</a:t>
+            </a:r>
+            <a:r>
+              <a:rPr lang="en-US" sz="2800" dirty="0">
+                <a:latin typeface="Times New Roman" panose="02020603050405020304" pitchFamily="18" charset="0"/>
+                <a:cs typeface="Times New Roman" panose="02020603050405020304" pitchFamily="18" charset="0"/>
+              </a:rPr>
+              <a:t>#;</a:t>
+            </a:r>
+            <a:endParaRPr lang="ru-RU" dirty="0">
+              <a:latin typeface="Times New Roman" panose="02020603050405020304" pitchFamily="18" charset="0"/>
+              <a:cs typeface="Times New Roman" panose="02020603050405020304" pitchFamily="18" charset="0"/>
+            </a:endParaRPr>
+          </a:p>
+          <a:p>
+            <a:pPr marL="457200" indent="-457200">
+              <a:buFont typeface="Liberation Sans" panose="020B0604020202020204" pitchFamily="34" charset="0"/>
+              <a:buChar char="−"/>
+            </a:pPr>
+            <a:r>
+              <a:rPr lang="ru-RU" dirty="0">
+                <a:latin typeface="Times New Roman" panose="02020603050405020304" pitchFamily="18" charset="0"/>
+                <a:cs typeface="Times New Roman" panose="02020603050405020304" pitchFamily="18" charset="0"/>
+              </a:rPr>
+              <a:t>Фреймворк</a:t>
+            </a:r>
+            <a:r>
+              <a:rPr lang="en-US" dirty="0">
+                <a:latin typeface="Times New Roman" panose="02020603050405020304" pitchFamily="18" charset="0"/>
+                <a:cs typeface="Times New Roman" panose="02020603050405020304" pitchFamily="18" charset="0"/>
+              </a:rPr>
+              <a:t>: ASP.NET </a:t>
+            </a:r>
+            <a:r>
+              <a:rPr lang="ru-RU" dirty="0">
+                <a:latin typeface="Times New Roman" panose="02020603050405020304" pitchFamily="18" charset="0"/>
+                <a:cs typeface="Times New Roman" panose="02020603050405020304" pitchFamily="18" charset="0"/>
+              </a:rPr>
+              <a:t>8</a:t>
+            </a:r>
+            <a:r>
+              <a:rPr lang="en-US" dirty="0">
+                <a:latin typeface="Times New Roman" panose="02020603050405020304" pitchFamily="18" charset="0"/>
+                <a:cs typeface="Times New Roman" panose="02020603050405020304" pitchFamily="18" charset="0"/>
+              </a:rPr>
+              <a:t>.0</a:t>
+            </a:r>
+          </a:p>
+          <a:p>
+            <a:pPr marL="457200" indent="-457200">
+              <a:buFont typeface="Liberation Sans" panose="020B0604020202020204" pitchFamily="34" charset="0"/>
+              <a:buChar char="−"/>
+            </a:pPr>
+            <a:r>
+              <a:rPr lang="ru-RU" dirty="0">
+                <a:latin typeface="Times New Roman" panose="02020603050405020304" pitchFamily="18" charset="0"/>
+                <a:cs typeface="Times New Roman" panose="02020603050405020304" pitchFamily="18" charset="0"/>
+              </a:rPr>
+              <a:t>Сторонние библиотеки</a:t>
+            </a:r>
+            <a:r>
+              <a:rPr lang="en-US" dirty="0">
+                <a:latin typeface="Times New Roman" panose="02020603050405020304" pitchFamily="18" charset="0"/>
+                <a:cs typeface="Times New Roman" panose="02020603050405020304" pitchFamily="18" charset="0"/>
+              </a:rPr>
+              <a:t>:</a:t>
+            </a:r>
+            <a:endParaRPr lang="ru-RU" dirty="0">
+              <a:latin typeface="Times New Roman" panose="02020603050405020304" pitchFamily="18" charset="0"/>
+              <a:cs typeface="Times New Roman" panose="02020603050405020304" pitchFamily="18" charset="0"/>
+            </a:endParaRPr>
+          </a:p>
+          <a:p>
+            <a:pPr marL="914400" lvl="1" indent="-457200">
+              <a:buFont typeface="Liberation Sans" panose="020B0604020202020204" pitchFamily="34" charset="0"/>
+              <a:buChar char="−"/>
+            </a:pPr>
+            <a:r>
+              <a:rPr lang="en-US" dirty="0">
+                <a:latin typeface="Times New Roman" panose="02020603050405020304" pitchFamily="18" charset="0"/>
+                <a:cs typeface="Times New Roman" panose="02020603050405020304" pitchFamily="18" charset="0"/>
+              </a:rPr>
+              <a:t>Quartz.NET</a:t>
+            </a:r>
+            <a:r>
+              <a:rPr lang="ru-RU" dirty="0">
+                <a:latin typeface="Times New Roman" panose="02020603050405020304" pitchFamily="18" charset="0"/>
+                <a:cs typeface="Times New Roman" panose="02020603050405020304" pitchFamily="18" charset="0"/>
+              </a:rPr>
+              <a:t> для хранения и выполнения отложенных задач </a:t>
+            </a:r>
+          </a:p>
+          <a:p>
+            <a:pPr marL="914400" lvl="1" indent="-457200">
+              <a:buFont typeface="Liberation Sans" panose="020B0604020202020204" pitchFamily="34" charset="0"/>
+              <a:buChar char="−"/>
+            </a:pPr>
+            <a:r>
+              <a:rPr lang="en-US" dirty="0">
+                <a:latin typeface="Times New Roman" panose="02020603050405020304" pitchFamily="18" charset="0"/>
+                <a:cs typeface="Times New Roman" panose="02020603050405020304" pitchFamily="18" charset="0"/>
+              </a:rPr>
+              <a:t>Magick.NET</a:t>
+            </a:r>
+            <a:r>
+              <a:rPr lang="ru-RU" dirty="0">
+                <a:latin typeface="Times New Roman" panose="02020603050405020304" pitchFamily="18" charset="0"/>
+                <a:cs typeface="Times New Roman" panose="02020603050405020304" pitchFamily="18" charset="0"/>
+              </a:rPr>
+              <a:t> для обработки изображений</a:t>
+            </a:r>
+            <a:endParaRPr lang="en-US" dirty="0">
+              <a:latin typeface="Times New Roman" panose="02020603050405020304" pitchFamily="18" charset="0"/>
+              <a:cs typeface="Times New Roman" panose="02020603050405020304" pitchFamily="18" charset="0"/>
+            </a:endParaRPr>
+          </a:p>
+          <a:p>
+            <a:pPr marL="914400" lvl="1" indent="-457200">
+              <a:buFont typeface="Liberation Sans" panose="020B0604020202020204" pitchFamily="34" charset="0"/>
+              <a:buChar char="−"/>
+            </a:pPr>
+            <a:r>
+              <a:rPr lang="en-US" dirty="0">
+                <a:latin typeface="Times New Roman" panose="02020603050405020304" pitchFamily="18" charset="0"/>
+                <a:cs typeface="Times New Roman" panose="02020603050405020304" pitchFamily="18" charset="0"/>
+              </a:rPr>
+              <a:t>Entity Framework Core</a:t>
+            </a:r>
+            <a:r>
+              <a:rPr lang="ru-RU" dirty="0">
+                <a:latin typeface="Times New Roman" panose="02020603050405020304" pitchFamily="18" charset="0"/>
+                <a:cs typeface="Times New Roman" panose="02020603050405020304" pitchFamily="18" charset="0"/>
+              </a:rPr>
+              <a:t> в качестве </a:t>
+            </a:r>
+            <a:r>
+              <a:rPr lang="en-US" dirty="0">
+                <a:latin typeface="Times New Roman" panose="02020603050405020304" pitchFamily="18" charset="0"/>
+                <a:cs typeface="Times New Roman" panose="02020603050405020304" pitchFamily="18" charset="0"/>
+              </a:rPr>
+              <a:t>ORM</a:t>
+            </a:r>
+            <a:endParaRPr lang="ru-RU" dirty="0">
+              <a:latin typeface="Times New Roman" panose="02020603050405020304" pitchFamily="18" charset="0"/>
+              <a:cs typeface="Times New Roman" panose="02020603050405020304" pitchFamily="18" charset="0"/>
+            </a:endParaRPr>
+          </a:p>
+          <a:p>
+            <a:pPr marL="457200" indent="-457200">
+              <a:buFont typeface="Liberation Sans" panose="020B0604020202020204" pitchFamily="34" charset="0"/>
+              <a:buChar char="−"/>
+            </a:pPr>
+            <a:r>
+              <a:rPr lang="ru-RU" sz="2800" dirty="0">
+                <a:latin typeface="Times New Roman" panose="02020603050405020304" pitchFamily="18" charset="0"/>
+                <a:cs typeface="Times New Roman" panose="02020603050405020304" pitchFamily="18" charset="0"/>
+              </a:rPr>
+              <a:t>Среда разработки: </a:t>
+            </a:r>
+            <a:r>
+              <a:rPr lang="en-US" sz="2800" dirty="0">
+                <a:latin typeface="Times New Roman" panose="02020603050405020304" pitchFamily="18" charset="0"/>
+                <a:cs typeface="Times New Roman" panose="02020603050405020304" pitchFamily="18" charset="0"/>
+              </a:rPr>
+              <a:t>Microsoft Visual Studio</a:t>
+            </a:r>
+            <a:r>
+              <a:rPr lang="en-US" dirty="0">
+                <a:latin typeface="Times New Roman" panose="02020603050405020304" pitchFamily="18" charset="0"/>
+                <a:cs typeface="Times New Roman" panose="02020603050405020304" pitchFamily="18" charset="0"/>
+              </a:rPr>
+              <a:t>.</a:t>
+            </a:r>
+            <a:endParaRPr lang="ru-RU" sz="2800" dirty="0">
+              <a:latin typeface="Times New Roman" panose="02020603050405020304" pitchFamily="18" charset="0"/>
+              <a:cs typeface="Times New Roman" panose="02020603050405020304" pitchFamily="18" charset="0"/>
+            </a:endParaRPr>
+          </a:p>
+        </p:txBody>
+      </p:sp>
+      <p:sp>
+        <p:nvSpPr>
+          <p:cNvPr id="4" name="Номер слайда 3">
+            <a:extLst>
+              <a:ext uri="{FF2B5EF4-FFF2-40B4-BE49-F238E27FC236}">
+                <a16:creationId xmlns:a16="http://schemas.microsoft.com/office/drawing/2014/main" id="{DB845D22-575F-FAA2-4894-3A79966D1551}"/>
+              </a:ext>
+            </a:extLst>
+          </p:cNvPr>
+          <p:cNvSpPr>
+            <a:spLocks noGrp="1"/>
+          </p:cNvSpPr>
+          <p:nvPr>
+            <p:ph type="sldNum" sz="quarter" idx="12"/>
+          </p:nvPr>
+        </p:nvSpPr>
+        <p:spPr/>
+        <p:txBody>
+          <a:bodyPr/>
+          <a:lstStyle/>
+          <a:p>
+            <a:fld id="{9F75ED48-FB93-4D27-9D40-6DF4DFA3F996}" type="slidenum">
+              <a:rPr lang="ru-RU" smtClean="0"/>
+              <a:t>10</a:t>
+            </a:fld>
+            <a:endParaRPr lang="ru-RU"/>
+          </a:p>
+        </p:txBody>
+      </p:sp>
+    </p:spTree>
+    <p:extLst>
+      <p:ext uri="{BB962C8B-B14F-4D97-AF65-F5344CB8AC3E}">
+        <p14:creationId xmlns:p14="http://schemas.microsoft.com/office/powerpoint/2010/main" val="2359330613"/>
+      </p:ext>
+    </p:extLst>
+  </p:cSld>
+  <p:clrMapOvr>
+    <a:masterClrMapping/>
+  </p:clrMapOvr>
+</p:sld>
+</file>
+
+<file path=ppt/slides/slide11.xml><?xml version="1.0" encoding="utf-8"?>
+<p:sld xmlns:a="http://schemas.openxmlformats.org/drawingml/2006/main" xmlns:r="http://schemas.openxmlformats.org/officeDocument/2006/relationships" xmlns:p="http://schemas.openxmlformats.org/presentationml/2006/main">
+  <p:cSld>
+    <p:spTree>
+      <p:nvGrpSpPr>
         <p:cNvPr id="1" name="">
           <a:extLst>
             <a:ext uri="{FF2B5EF4-FFF2-40B4-BE49-F238E27FC236}">
@@ -4757,69 +5083,6 @@
           <a:chExt cx="0" cy="0"/>
         </a:xfrm>
       </p:grpSpPr>
-      <p:sp>
-        <p:nvSpPr>
-          <p:cNvPr id="2" name="Заголовок 1">
-            <a:extLst>
-              <a:ext uri="{FF2B5EF4-FFF2-40B4-BE49-F238E27FC236}">
-                <a16:creationId xmlns:a16="http://schemas.microsoft.com/office/drawing/2014/main" id="{71A3DF50-0291-B8A1-7821-0AB8A0D9CB5B}"/>
-              </a:ext>
-            </a:extLst>
-          </p:cNvPr>
-          <p:cNvSpPr>
-            <a:spLocks noGrp="1"/>
-          </p:cNvSpPr>
-          <p:nvPr>
-            <p:ph type="title"/>
-          </p:nvPr>
-        </p:nvSpPr>
-        <p:spPr/>
-        <p:txBody>
-          <a:bodyPr>
-            <a:normAutofit/>
-          </a:bodyPr>
-          <a:lstStyle/>
-          <a:p>
-            <a:r>
-              <a:rPr lang="ru-RU" dirty="0">
-                <a:latin typeface="Times New Roman" panose="02020603050405020304" pitchFamily="18" charset="0"/>
-                <a:ea typeface="+mn-ea"/>
-                <a:cs typeface="Times New Roman" panose="02020603050405020304" pitchFamily="18" charset="0"/>
-              </a:rPr>
-              <a:t>Диаграмма компонентов</a:t>
-            </a:r>
-          </a:p>
-        </p:txBody>
-      </p:sp>
-      <p:sp>
-        <p:nvSpPr>
-          <p:cNvPr id="5" name="Номер слайда 4">
-            <a:extLst>
-              <a:ext uri="{FF2B5EF4-FFF2-40B4-BE49-F238E27FC236}">
-                <a16:creationId xmlns:a16="http://schemas.microsoft.com/office/drawing/2014/main" id="{4228778A-BF7B-8B43-4B26-B2E98E367ADD}"/>
-              </a:ext>
-            </a:extLst>
-          </p:cNvPr>
-          <p:cNvSpPr>
-            <a:spLocks noGrp="1"/>
-          </p:cNvSpPr>
-          <p:nvPr>
-            <p:ph type="sldNum" sz="quarter" idx="12"/>
-          </p:nvPr>
-        </p:nvSpPr>
-        <p:spPr/>
-        <p:txBody>
-          <a:bodyPr/>
-          <a:lstStyle/>
-          <a:p>
-            <a:fld id="{9F75ED48-FB93-4D27-9D40-6DF4DFA3F996}" type="slidenum">
-              <a:rPr lang="ru-RU" smtClean="0"/>
-              <a:t>10</a:t>
-            </a:fld>
-            <a:endParaRPr lang="ru-RU"/>
-          </a:p>
-        </p:txBody>
-      </p:sp>
       <p:pic>
         <p:nvPicPr>
           <p:cNvPr id="6" name="Рисунок 5">
@@ -4842,14 +5105,77 @@
         </p:blipFill>
         <p:spPr>
           <a:xfrm>
-            <a:off x="2415884" y="1333992"/>
-            <a:ext cx="7360232" cy="5158883"/>
+            <a:off x="2446113" y="1027906"/>
+            <a:ext cx="7536087" cy="5282142"/>
           </a:xfrm>
           <a:prstGeom prst="rect">
             <a:avLst/>
           </a:prstGeom>
         </p:spPr>
       </p:pic>
+      <p:sp>
+        <p:nvSpPr>
+          <p:cNvPr id="2" name="Заголовок 1">
+            <a:extLst>
+              <a:ext uri="{FF2B5EF4-FFF2-40B4-BE49-F238E27FC236}">
+                <a16:creationId xmlns:a16="http://schemas.microsoft.com/office/drawing/2014/main" id="{71A3DF50-0291-B8A1-7821-0AB8A0D9CB5B}"/>
+              </a:ext>
+            </a:extLst>
+          </p:cNvPr>
+          <p:cNvSpPr>
+            <a:spLocks noGrp="1"/>
+          </p:cNvSpPr>
+          <p:nvPr>
+            <p:ph type="title"/>
+          </p:nvPr>
+        </p:nvSpPr>
+        <p:spPr/>
+        <p:txBody>
+          <a:bodyPr>
+            <a:normAutofit/>
+          </a:bodyPr>
+          <a:lstStyle/>
+          <a:p>
+            <a:r>
+              <a:rPr lang="ru-RU" dirty="0">
+                <a:latin typeface="Times New Roman" panose="02020603050405020304" pitchFamily="18" charset="0"/>
+                <a:ea typeface="+mn-ea"/>
+                <a:cs typeface="Times New Roman" panose="02020603050405020304" pitchFamily="18" charset="0"/>
+              </a:rPr>
+              <a:t>Диаграмма компонентов</a:t>
+            </a:r>
+          </a:p>
+        </p:txBody>
+      </p:sp>
+      <p:sp>
+        <p:nvSpPr>
+          <p:cNvPr id="5" name="Номер слайда 4">
+            <a:extLst>
+              <a:ext uri="{FF2B5EF4-FFF2-40B4-BE49-F238E27FC236}">
+                <a16:creationId xmlns:a16="http://schemas.microsoft.com/office/drawing/2014/main" id="{4228778A-BF7B-8B43-4B26-B2E98E367ADD}"/>
+              </a:ext>
+            </a:extLst>
+          </p:cNvPr>
+          <p:cNvSpPr>
+            <a:spLocks noGrp="1"/>
+          </p:cNvSpPr>
+          <p:nvPr>
+            <p:ph type="sldNum" sz="quarter" idx="12"/>
+          </p:nvPr>
+        </p:nvSpPr>
+        <p:spPr/>
+        <p:txBody>
+          <a:bodyPr/>
+          <a:lstStyle/>
+          <a:p>
+            <a:fld id="{9F75ED48-FB93-4D27-9D40-6DF4DFA3F996}" type="slidenum">
+              <a:rPr lang="ru-RU" smtClean="0"/>
+              <a:t>11</a:t>
+            </a:fld>
+            <a:endParaRPr lang="ru-RU"/>
+          </a:p>
+        </p:txBody>
+      </p:sp>
     </p:spTree>
     <p:extLst>
       <p:ext uri="{BB962C8B-B14F-4D97-AF65-F5344CB8AC3E}">
@@ -4863,7 +5189,7 @@
 </p:sld>
 </file>
 
-<file path=ppt/slides/slide11.xml><?xml version="1.0" encoding="utf-8"?>
+<file path=ppt/slides/slide12.xml><?xml version="1.0" encoding="utf-8"?>
 <p:sld xmlns:a="http://schemas.openxmlformats.org/drawingml/2006/main" xmlns:r="http://schemas.openxmlformats.org/officeDocument/2006/relationships" xmlns:p="http://schemas.openxmlformats.org/presentationml/2006/main">
   <p:cSld>
     <p:spTree>
@@ -4943,7 +5269,7 @@
           <a:p>
             <a:fld id="{9F75ED48-FB93-4D27-9D40-6DF4DFA3F996}" type="slidenum">
               <a:rPr lang="ru-RU" smtClean="0"/>
-              <a:t>11</a:t>
+              <a:t>12</a:t>
             </a:fld>
             <a:endParaRPr lang="ru-RU"/>
           </a:p>
@@ -4984,7 +5310,21 @@
                 <a:latin typeface="Times New Roman" panose="02020603050405020304" pitchFamily="18" charset="0"/>
                 <a:cs typeface="Times New Roman" panose="02020603050405020304" pitchFamily="18" charset="0"/>
               </a:rPr>
-              <a:t>108 интеграционных тестов для слоя базы данных</a:t>
+              <a:t>1</a:t>
+            </a:r>
+            <a:r>
+              <a:rPr lang="en-US" sz="2300" dirty="0">
+                <a:latin typeface="Times New Roman" panose="02020603050405020304" pitchFamily="18" charset="0"/>
+                <a:cs typeface="Times New Roman" panose="02020603050405020304" pitchFamily="18" charset="0"/>
+              </a:rPr>
+              <a:t>24</a:t>
+            </a:r>
+            <a:r>
+              <a:rPr lang="ru-RU" sz="2300" dirty="0">
+                <a:latin typeface="Times New Roman" panose="02020603050405020304" pitchFamily="18" charset="0"/>
+                <a:cs typeface="Times New Roman" panose="02020603050405020304" pitchFamily="18" charset="0"/>
+              </a:rPr>
+              <a:t> интеграционных теста для слоя базы данных</a:t>
             </a:r>
             <a:r>
               <a:rPr lang="en-US" sz="2300" dirty="0">
@@ -5076,7 +5416,14 @@
                 <a:latin typeface="Times New Roman" panose="02020603050405020304" pitchFamily="18" charset="0"/>
                 <a:cs typeface="Times New Roman" panose="02020603050405020304" pitchFamily="18" charset="0"/>
               </a:rPr>
-              <a:t> 82.8%</a:t>
+              <a:t> </a:t>
+            </a:r>
+            <a:r>
+              <a:rPr lang="en-US" sz="2300" dirty="0">
+                <a:latin typeface="Times New Roman" panose="02020603050405020304" pitchFamily="18" charset="0"/>
+                <a:cs typeface="Times New Roman" panose="02020603050405020304" pitchFamily="18" charset="0"/>
+              </a:rPr>
+              <a:t>82.8%</a:t>
             </a:r>
           </a:p>
           <a:p>
@@ -5183,7 +5530,7 @@
 </p:sld>
 </file>
 
-<file path=ppt/slides/slide12.xml><?xml version="1.0" encoding="utf-8"?>
+<file path=ppt/slides/slide13.xml><?xml version="1.0" encoding="utf-8"?>
 <p:sld xmlns:a="http://schemas.openxmlformats.org/drawingml/2006/main" xmlns:r="http://schemas.openxmlformats.org/officeDocument/2006/relationships" xmlns:p="http://schemas.openxmlformats.org/presentationml/2006/main">
   <p:cSld>
     <p:spTree>
@@ -5257,7 +5604,7 @@
           <a:p>
             <a:fld id="{9F75ED48-FB93-4D27-9D40-6DF4DFA3F996}" type="slidenum">
               <a:rPr lang="ru-RU" smtClean="0"/>
-              <a:t>12</a:t>
+              <a:t>13</a:t>
             </a:fld>
             <a:endParaRPr lang="ru-RU"/>
           </a:p>
@@ -5337,7 +5684,7 @@
         </p:nvSpPr>
         <p:spPr>
           <a:xfrm>
-            <a:off x="5621792" y="4167437"/>
+            <a:off x="5482660" y="4167436"/>
             <a:ext cx="954199" cy="673395"/>
           </a:xfrm>
           <a:prstGeom prst="rightArrow">
@@ -5419,10 +5766,10 @@
       </p:pic>
       <p:pic>
         <p:nvPicPr>
-          <p:cNvPr id="15" name="Рисунок 14">
-            <a:extLst>
-              <a:ext uri="{FF2B5EF4-FFF2-40B4-BE49-F238E27FC236}">
-                <a16:creationId xmlns:a16="http://schemas.microsoft.com/office/drawing/2014/main" id="{DCE75328-AF4A-2D28-0000-3261C21BB068}"/>
+          <p:cNvPr id="6" name="Рисунок 5">
+            <a:extLst>
+              <a:ext uri="{FF2B5EF4-FFF2-40B4-BE49-F238E27FC236}">
+                <a16:creationId xmlns:a16="http://schemas.microsoft.com/office/drawing/2014/main" id="{4F75444F-B96A-63CE-25A2-ACAD58AD717F}"/>
               </a:ext>
             </a:extLst>
           </p:cNvPr>
@@ -5439,8 +5786,8 @@
         </p:blipFill>
         <p:spPr>
           <a:xfrm>
-            <a:off x="6848472" y="3483110"/>
-            <a:ext cx="4435934" cy="2332689"/>
+            <a:off x="6570209" y="3277434"/>
+            <a:ext cx="4992384" cy="2453400"/>
           </a:xfrm>
           <a:prstGeom prst="rect">
             <a:avLst/>
@@ -5474,7 +5821,7 @@
 </p:sld>
 </file>
 
-<file path=ppt/slides/slide13.xml><?xml version="1.0" encoding="utf-8"?>
+<file path=ppt/slides/slide14.xml><?xml version="1.0" encoding="utf-8"?>
 <p:sld xmlns:a="http://schemas.openxmlformats.org/drawingml/2006/main" xmlns:r="http://schemas.openxmlformats.org/officeDocument/2006/relationships" xmlns:p="http://schemas.openxmlformats.org/presentationml/2006/main">
   <p:cSld>
     <p:spTree>
@@ -5856,21 +6203,7 @@
                 <a:latin typeface="Times New Roman" panose="02020603050405020304" pitchFamily="18" charset="0"/>
                 <a:cs typeface="Times New Roman" panose="02020603050405020304" pitchFamily="18" charset="0"/>
               </a:rPr>
-              <a:t>Усреднение на </a:t>
-            </a:r>
-            <a:r>
-              <a:rPr lang="en-US" sz="2400" dirty="0">
-                <a:latin typeface="Times New Roman" panose="02020603050405020304" pitchFamily="18" charset="0"/>
-                <a:cs typeface="Times New Roman" panose="02020603050405020304" pitchFamily="18" charset="0"/>
-              </a:rPr>
-              <a:t>3</a:t>
-            </a:r>
-            <a:r>
-              <a:rPr lang="ru-RU" sz="2400" dirty="0">
-                <a:latin typeface="Times New Roman" panose="02020603050405020304" pitchFamily="18" charset="0"/>
-                <a:cs typeface="Times New Roman" panose="02020603050405020304" pitchFamily="18" charset="0"/>
-              </a:rPr>
-              <a:t>0 повторениях</a:t>
+              <a:t>Усреднение по 300 значениям</a:t>
             </a:r>
             <a:endParaRPr lang="ru-RU" sz="1900" dirty="0">
               <a:latin typeface="Times New Roman" panose="02020603050405020304" pitchFamily="18" charset="0"/>
@@ -5931,7 +6264,7 @@
           <a:p>
             <a:fld id="{9F75ED48-FB93-4D27-9D40-6DF4DFA3F996}" type="slidenum">
               <a:rPr lang="ru-RU" smtClean="0"/>
-              <a:t>13</a:t>
+              <a:t>14</a:t>
             </a:fld>
             <a:endParaRPr lang="ru-RU"/>
           </a:p>
@@ -5941,256 +6274,6 @@
     <p:extLst>
       <p:ext uri="{BB962C8B-B14F-4D97-AF65-F5344CB8AC3E}">
         <p14:creationId xmlns:p14="http://schemas.microsoft.com/office/powerpoint/2010/main" val="4216723403"/>
-      </p:ext>
-    </p:extLst>
-  </p:cSld>
-  <p:clrMapOvr>
-    <a:masterClrMapping/>
-  </p:clrMapOvr>
-</p:sld>
-</file>
-
-<file path=ppt/slides/slide14.xml><?xml version="1.0" encoding="utf-8"?>
-<p:sld xmlns:a="http://schemas.openxmlformats.org/drawingml/2006/main" xmlns:r="http://schemas.openxmlformats.org/officeDocument/2006/relationships" xmlns:p="http://schemas.openxmlformats.org/presentationml/2006/main">
-  <p:cSld>
-    <p:spTree>
-      <p:nvGrpSpPr>
-        <p:cNvPr id="1" name=""/>
-        <p:cNvGrpSpPr/>
-        <p:nvPr/>
-      </p:nvGrpSpPr>
-      <p:grpSpPr>
-        <a:xfrm>
-          <a:off x="0" y="0"/>
-          <a:ext cx="0" cy="0"/>
-          <a:chOff x="0" y="0"/>
-          <a:chExt cx="0" cy="0"/>
-        </a:xfrm>
-      </p:grpSpPr>
-      <p:sp>
-        <p:nvSpPr>
-          <p:cNvPr id="2" name="Заголовок 1">
-            <a:extLst>
-              <a:ext uri="{FF2B5EF4-FFF2-40B4-BE49-F238E27FC236}">
-                <a16:creationId xmlns:a16="http://schemas.microsoft.com/office/drawing/2014/main" id="{C29B1144-9F95-1A34-8FF4-9711A320F874}"/>
-              </a:ext>
-            </a:extLst>
-          </p:cNvPr>
-          <p:cNvSpPr>
-            <a:spLocks noGrp="1"/>
-          </p:cNvSpPr>
-          <p:nvPr>
-            <p:ph type="title"/>
-          </p:nvPr>
-        </p:nvSpPr>
-        <p:spPr/>
-        <p:txBody>
-          <a:bodyPr>
-            <a:normAutofit/>
-          </a:bodyPr>
-          <a:lstStyle/>
-          <a:p>
-            <a:r>
-              <a:rPr lang="ru-RU" dirty="0">
-                <a:latin typeface="Times New Roman" panose="02020603050405020304" pitchFamily="18" charset="0"/>
-                <a:ea typeface="+mn-ea"/>
-                <a:cs typeface="Times New Roman" panose="02020603050405020304" pitchFamily="18" charset="0"/>
-              </a:rPr>
-              <a:t>Исследование</a:t>
-            </a:r>
-          </a:p>
-        </p:txBody>
-      </p:sp>
-      <p:sp>
-        <p:nvSpPr>
-          <p:cNvPr id="3" name="Объект 2">
-            <a:extLst>
-              <a:ext uri="{FF2B5EF4-FFF2-40B4-BE49-F238E27FC236}">
-                <a16:creationId xmlns:a16="http://schemas.microsoft.com/office/drawing/2014/main" id="{5345FD2F-91EB-E6ED-989E-A332A8B92DAD}"/>
-              </a:ext>
-            </a:extLst>
-          </p:cNvPr>
-          <p:cNvSpPr>
-            <a:spLocks noGrp="1"/>
-          </p:cNvSpPr>
-          <p:nvPr>
-            <p:ph idx="1"/>
-          </p:nvPr>
-        </p:nvSpPr>
-        <p:spPr>
-          <a:xfrm>
-            <a:off x="838199" y="1747025"/>
-            <a:ext cx="4298795" cy="4215548"/>
-          </a:xfrm>
-        </p:spPr>
-        <p:txBody>
-          <a:bodyPr>
-            <a:normAutofit/>
-          </a:bodyPr>
-          <a:lstStyle/>
-          <a:p>
-            <a:pPr marL="0" indent="0" algn="just">
-              <a:buNone/>
-            </a:pPr>
-            <a:r>
-              <a:rPr lang="ru-RU" sz="2300" dirty="0">
-                <a:latin typeface="Times New Roman" panose="02020603050405020304" pitchFamily="18" charset="0"/>
-                <a:cs typeface="Times New Roman" panose="02020603050405020304" pitchFamily="18" charset="0"/>
-              </a:rPr>
-              <a:t>По данным исследования методом наименьших квадратов построены полиномы 3 степени</a:t>
-            </a:r>
-            <a:endParaRPr lang="en-US" sz="2300" dirty="0">
-              <a:latin typeface="Times New Roman" panose="02020603050405020304" pitchFamily="18" charset="0"/>
-              <a:cs typeface="Times New Roman" panose="02020603050405020304" pitchFamily="18" charset="0"/>
-            </a:endParaRPr>
-          </a:p>
-          <a:p>
-            <a:pPr marL="0" indent="0" algn="just">
-              <a:buNone/>
-            </a:pPr>
-            <a:r>
-              <a:rPr lang="ru-RU" sz="2300" dirty="0">
-                <a:latin typeface="Times New Roman" panose="02020603050405020304" pitchFamily="18" charset="0"/>
-                <a:cs typeface="Times New Roman" panose="02020603050405020304" pitchFamily="18" charset="0"/>
-              </a:rPr>
-              <a:t>По результатам исследования, время работы на стороне СУБД меньше, чем время работы на стороне приложения. </a:t>
-            </a:r>
-          </a:p>
-          <a:p>
-            <a:pPr marL="0" indent="0" algn="just">
-              <a:buNone/>
-            </a:pPr>
-            <a:r>
-              <a:rPr lang="ru-RU" sz="2300" dirty="0">
-                <a:latin typeface="Times New Roman" panose="02020603050405020304" pitchFamily="18" charset="0"/>
-                <a:cs typeface="Times New Roman" panose="02020603050405020304" pitchFamily="18" charset="0"/>
-              </a:rPr>
-              <a:t>При этом, линейный </a:t>
-            </a:r>
-            <a:r>
-              <a:rPr lang="ru-RU" sz="2300" dirty="0" err="1">
-                <a:latin typeface="Times New Roman" panose="02020603050405020304" pitchFamily="18" charset="0"/>
-                <a:cs typeface="Times New Roman" panose="02020603050405020304" pitchFamily="18" charset="0"/>
-              </a:rPr>
-              <a:t>коэфф-ициент</a:t>
-            </a:r>
-            <a:r>
-              <a:rPr lang="ru-RU" sz="2300" dirty="0">
-                <a:latin typeface="Times New Roman" panose="02020603050405020304" pitchFamily="18" charset="0"/>
-                <a:cs typeface="Times New Roman" panose="02020603050405020304" pitchFamily="18" charset="0"/>
-              </a:rPr>
-              <a:t> роста времени на сто-</a:t>
-            </a:r>
-            <a:r>
-              <a:rPr lang="ru-RU" sz="2300" dirty="0" err="1">
-                <a:latin typeface="Times New Roman" panose="02020603050405020304" pitchFamily="18" charset="0"/>
-                <a:cs typeface="Times New Roman" panose="02020603050405020304" pitchFamily="18" charset="0"/>
-              </a:rPr>
-              <a:t>роне</a:t>
-            </a:r>
-            <a:r>
-              <a:rPr lang="ru-RU" sz="2300" dirty="0">
-                <a:latin typeface="Times New Roman" panose="02020603050405020304" pitchFamily="18" charset="0"/>
-                <a:cs typeface="Times New Roman" panose="02020603050405020304" pitchFamily="18" charset="0"/>
-              </a:rPr>
-              <a:t> приложения в 2.427 раза больше, чем на стороне сервера.</a:t>
-            </a:r>
-          </a:p>
-        </p:txBody>
-      </p:sp>
-      <p:pic>
-        <p:nvPicPr>
-          <p:cNvPr id="6" name="Рисунок 5">
-            <a:extLst>
-              <a:ext uri="{FF2B5EF4-FFF2-40B4-BE49-F238E27FC236}">
-                <a16:creationId xmlns:a16="http://schemas.microsoft.com/office/drawing/2014/main" id="{162D7227-AA95-114F-31BE-F64037C750F6}"/>
-              </a:ext>
-            </a:extLst>
-          </p:cNvPr>
-          <p:cNvPicPr>
-            <a:picLocks noChangeAspect="1"/>
-          </p:cNvPicPr>
-          <p:nvPr/>
-        </p:nvPicPr>
-        <p:blipFill>
-          <a:blip r:embed="rId3"/>
-          <a:stretch>
-            <a:fillRect/>
-          </a:stretch>
-        </p:blipFill>
-        <p:spPr>
-          <a:xfrm>
-            <a:off x="5255229" y="1423781"/>
-            <a:ext cx="6773220" cy="3238952"/>
-          </a:xfrm>
-          <a:prstGeom prst="rect">
-            <a:avLst/>
-          </a:prstGeom>
-        </p:spPr>
-      </p:pic>
-      <p:pic>
-        <p:nvPicPr>
-          <p:cNvPr id="8" name="Рисунок 7">
-            <a:extLst>
-              <a:ext uri="{FF2B5EF4-FFF2-40B4-BE49-F238E27FC236}">
-                <a16:creationId xmlns:a16="http://schemas.microsoft.com/office/drawing/2014/main" id="{95D87B05-35E8-51AB-CFAA-46F36C5033A8}"/>
-              </a:ext>
-            </a:extLst>
-          </p:cNvPr>
-          <p:cNvPicPr>
-            <a:picLocks noChangeAspect="1"/>
-          </p:cNvPicPr>
-          <p:nvPr/>
-        </p:nvPicPr>
-        <p:blipFill>
-          <a:blip r:embed="rId4"/>
-          <a:stretch>
-            <a:fillRect/>
-          </a:stretch>
-        </p:blipFill>
-        <p:spPr>
-          <a:xfrm>
-            <a:off x="5301271" y="4750418"/>
-            <a:ext cx="6762117" cy="1070520"/>
-          </a:xfrm>
-          <a:prstGeom prst="rect">
-            <a:avLst/>
-          </a:prstGeom>
-        </p:spPr>
-      </p:pic>
-      <p:sp>
-        <p:nvSpPr>
-          <p:cNvPr id="9" name="Номер слайда 8">
-            <a:extLst>
-              <a:ext uri="{FF2B5EF4-FFF2-40B4-BE49-F238E27FC236}">
-                <a16:creationId xmlns:a16="http://schemas.microsoft.com/office/drawing/2014/main" id="{241A0365-4C7F-3DEE-7AFD-2F51AF8D63C4}"/>
-              </a:ext>
-            </a:extLst>
-          </p:cNvPr>
-          <p:cNvSpPr>
-            <a:spLocks noGrp="1"/>
-          </p:cNvSpPr>
-          <p:nvPr>
-            <p:ph type="sldNum" sz="quarter" idx="12"/>
-          </p:nvPr>
-        </p:nvSpPr>
-        <p:spPr/>
-        <p:txBody>
-          <a:bodyPr/>
-          <a:lstStyle/>
-          <a:p>
-            <a:fld id="{9F75ED48-FB93-4D27-9D40-6DF4DFA3F996}" type="slidenum">
-              <a:rPr lang="ru-RU" smtClean="0"/>
-              <a:t>14</a:t>
-            </a:fld>
-            <a:endParaRPr lang="ru-RU"/>
-          </a:p>
-        </p:txBody>
-      </p:sp>
-    </p:spTree>
-    <p:extLst>
-      <p:ext uri="{BB962C8B-B14F-4D97-AF65-F5344CB8AC3E}">
-        <p14:creationId xmlns:p14="http://schemas.microsoft.com/office/powerpoint/2010/main" val="3120709960"/>
       </p:ext>
     </p:extLst>
   </p:cSld>
@@ -6222,7 +6305,7 @@
           <p:cNvPr id="2" name="Заголовок 1">
             <a:extLst>
               <a:ext uri="{FF2B5EF4-FFF2-40B4-BE49-F238E27FC236}">
-                <a16:creationId xmlns:a16="http://schemas.microsoft.com/office/drawing/2014/main" id="{60150C86-AC50-9758-34D5-04EBE207519F}"/>
+                <a16:creationId xmlns:a16="http://schemas.microsoft.com/office/drawing/2014/main" id="{C29B1144-9F95-1A34-8FF4-9711A320F874}"/>
               </a:ext>
             </a:extLst>
           </p:cNvPr>
@@ -6231,6 +6314,385 @@
           </p:cNvSpPr>
           <p:nvPr>
             <p:ph type="title"/>
+          </p:nvPr>
+        </p:nvSpPr>
+        <p:spPr/>
+        <p:txBody>
+          <a:bodyPr>
+            <a:normAutofit/>
+          </a:bodyPr>
+          <a:lstStyle/>
+          <a:p>
+            <a:r>
+              <a:rPr lang="ru-RU" dirty="0">
+                <a:latin typeface="Times New Roman" panose="02020603050405020304" pitchFamily="18" charset="0"/>
+                <a:ea typeface="+mn-ea"/>
+                <a:cs typeface="Times New Roman" panose="02020603050405020304" pitchFamily="18" charset="0"/>
+              </a:rPr>
+              <a:t>Исследование</a:t>
+            </a:r>
+          </a:p>
+        </p:txBody>
+      </p:sp>
+      <mc:AlternateContent xmlns:mc="http://schemas.openxmlformats.org/markup-compatibility/2006" xmlns:a14="http://schemas.microsoft.com/office/drawing/2010/main">
+        <mc:Choice Requires="a14">
+          <p:sp>
+            <p:nvSpPr>
+              <p:cNvPr id="3" name="Объект 2">
+                <a:extLst>
+                  <a:ext uri="{FF2B5EF4-FFF2-40B4-BE49-F238E27FC236}">
+                    <a16:creationId xmlns:a16="http://schemas.microsoft.com/office/drawing/2014/main" id="{5345FD2F-91EB-E6ED-989E-A332A8B92DAD}"/>
+                  </a:ext>
+                </a:extLst>
+              </p:cNvPr>
+              <p:cNvSpPr>
+                <a:spLocks noGrp="1"/>
+              </p:cNvSpPr>
+              <p:nvPr>
+                <p:ph idx="1"/>
+              </p:nvPr>
+            </p:nvSpPr>
+            <p:spPr>
+              <a:xfrm>
+                <a:off x="838199" y="1747025"/>
+                <a:ext cx="4298795" cy="4215548"/>
+              </a:xfrm>
+            </p:spPr>
+            <p:txBody>
+              <a:bodyPr>
+                <a:normAutofit/>
+              </a:bodyPr>
+              <a:lstStyle/>
+              <a:p>
+                <a:pPr marL="0" indent="0" algn="just">
+                  <a:buNone/>
+                </a:pPr>
+                <a:r>
+                  <a:rPr lang="ru-RU" sz="2300" dirty="0">
+                    <a:latin typeface="Times New Roman" panose="02020603050405020304" pitchFamily="18" charset="0"/>
+                    <a:cs typeface="Times New Roman" panose="02020603050405020304" pitchFamily="18" charset="0"/>
+                  </a:rPr>
+                  <a:t>По данным исследования методом наименьших квадратов построены полиномы 3 степени</a:t>
+                </a:r>
+                <a:r>
+                  <a:rPr lang="en-US" sz="2300" dirty="0">
+                    <a:latin typeface="Times New Roman" panose="02020603050405020304" pitchFamily="18" charset="0"/>
+                    <a:cs typeface="Times New Roman" panose="02020603050405020304" pitchFamily="18" charset="0"/>
+                  </a:rPr>
+                  <a:t> </a:t>
+                </a:r>
+                <a14:m>
+                  <m:oMath xmlns:m="http://schemas.openxmlformats.org/officeDocument/2006/math">
+                    <m:sSub>
+                      <m:sSubPr>
+                        <m:ctrlPr>
+                          <a:rPr lang="en-US" sz="2300" i="1" dirty="0" smtClean="0">
+                            <a:latin typeface="Cambria Math" panose="02040503050406030204" pitchFamily="18" charset="0"/>
+                            <a:cs typeface="Times New Roman" panose="02020603050405020304" pitchFamily="18" charset="0"/>
+                          </a:rPr>
+                        </m:ctrlPr>
+                      </m:sSubPr>
+                      <m:e>
+                        <m:r>
+                          <a:rPr lang="en-US" sz="2300" b="0" i="1" dirty="0" smtClean="0">
+                            <a:latin typeface="Cambria Math" panose="02040503050406030204" pitchFamily="18" charset="0"/>
+                            <a:cs typeface="Times New Roman" panose="02020603050405020304" pitchFamily="18" charset="0"/>
+                          </a:rPr>
+                          <m:t>𝑡</m:t>
+                        </m:r>
+                      </m:e>
+                      <m:sub>
+                        <m:r>
+                          <a:rPr lang="en-US" sz="2300" b="0" i="1" dirty="0" smtClean="0">
+                            <a:latin typeface="Cambria Math" panose="02040503050406030204" pitchFamily="18" charset="0"/>
+                            <a:cs typeface="Times New Roman" panose="02020603050405020304" pitchFamily="18" charset="0"/>
+                          </a:rPr>
+                          <m:t>1</m:t>
+                        </m:r>
+                      </m:sub>
+                    </m:sSub>
+                    <m:r>
+                      <a:rPr lang="en-US" sz="2300" i="1" dirty="0" smtClean="0">
+                        <a:latin typeface="Cambria Math" panose="02040503050406030204" pitchFamily="18" charset="0"/>
+                        <a:cs typeface="Times New Roman" panose="02020603050405020304" pitchFamily="18" charset="0"/>
+                      </a:rPr>
+                      <m:t>(</m:t>
+                    </m:r>
+                    <m:r>
+                      <a:rPr lang="en-US" sz="2300" i="1" dirty="0" smtClean="0">
+                        <a:latin typeface="Cambria Math" panose="02040503050406030204" pitchFamily="18" charset="0"/>
+                        <a:cs typeface="Times New Roman" panose="02020603050405020304" pitchFamily="18" charset="0"/>
+                      </a:rPr>
+                      <m:t>𝑁</m:t>
+                    </m:r>
+                    <m:r>
+                      <a:rPr lang="en-US" sz="2300" i="1" dirty="0" smtClean="0">
+                        <a:latin typeface="Cambria Math" panose="02040503050406030204" pitchFamily="18" charset="0"/>
+                        <a:cs typeface="Times New Roman" panose="02020603050405020304" pitchFamily="18" charset="0"/>
+                      </a:rPr>
+                      <m:t>) </m:t>
+                    </m:r>
+                  </m:oMath>
+                </a14:m>
+                <a:r>
+                  <a:rPr lang="ru-RU" sz="2300" dirty="0">
+                    <a:latin typeface="Times New Roman" panose="02020603050405020304" pitchFamily="18" charset="0"/>
+                    <a:cs typeface="Times New Roman" panose="02020603050405020304" pitchFamily="18" charset="0"/>
+                  </a:rPr>
+                  <a:t>и</a:t>
+                </a:r>
+                <a14:m>
+                  <m:oMath xmlns:m="http://schemas.openxmlformats.org/officeDocument/2006/math">
+                    <m:r>
+                      <a:rPr lang="en-US" sz="2300" b="0" i="0" dirty="0" smtClean="0">
+                        <a:latin typeface="Cambria Math" panose="02040503050406030204" pitchFamily="18" charset="0"/>
+                        <a:cs typeface="Times New Roman" panose="02020603050405020304" pitchFamily="18" charset="0"/>
+                      </a:rPr>
+                      <m:t> </m:t>
+                    </m:r>
+                    <m:sSub>
+                      <m:sSubPr>
+                        <m:ctrlPr>
+                          <a:rPr lang="en-US" sz="2300" i="1" dirty="0">
+                            <a:latin typeface="Cambria Math" panose="02040503050406030204" pitchFamily="18" charset="0"/>
+                            <a:cs typeface="Times New Roman" panose="02020603050405020304" pitchFamily="18" charset="0"/>
+                          </a:rPr>
+                        </m:ctrlPr>
+                      </m:sSubPr>
+                      <m:e>
+                        <m:r>
+                          <a:rPr lang="en-US" sz="2300" i="1" dirty="0">
+                            <a:latin typeface="Cambria Math" panose="02040503050406030204" pitchFamily="18" charset="0"/>
+                            <a:cs typeface="Times New Roman" panose="02020603050405020304" pitchFamily="18" charset="0"/>
+                          </a:rPr>
+                          <m:t>𝑡</m:t>
+                        </m:r>
+                      </m:e>
+                      <m:sub>
+                        <m:r>
+                          <a:rPr lang="en-US" sz="2300" b="0" i="1" dirty="0" smtClean="0">
+                            <a:latin typeface="Cambria Math" panose="02040503050406030204" pitchFamily="18" charset="0"/>
+                            <a:cs typeface="Times New Roman" panose="02020603050405020304" pitchFamily="18" charset="0"/>
+                          </a:rPr>
+                          <m:t>2</m:t>
+                        </m:r>
+                      </m:sub>
+                    </m:sSub>
+                    <m:r>
+                      <a:rPr lang="en-US" sz="2300" i="1" dirty="0" smtClean="0">
+                        <a:latin typeface="Cambria Math" panose="02040503050406030204" pitchFamily="18" charset="0"/>
+                        <a:cs typeface="Times New Roman" panose="02020603050405020304" pitchFamily="18" charset="0"/>
+                      </a:rPr>
+                      <m:t>(</m:t>
+                    </m:r>
+                    <m:r>
+                      <a:rPr lang="en-US" sz="2300" i="1" dirty="0" smtClean="0">
+                        <a:latin typeface="Cambria Math" panose="02040503050406030204" pitchFamily="18" charset="0"/>
+                        <a:cs typeface="Times New Roman" panose="02020603050405020304" pitchFamily="18" charset="0"/>
+                      </a:rPr>
+                      <m:t>𝑁</m:t>
+                    </m:r>
+                    <m:r>
+                      <a:rPr lang="en-US" sz="2300" i="1" dirty="0" smtClean="0">
+                        <a:latin typeface="Cambria Math" panose="02040503050406030204" pitchFamily="18" charset="0"/>
+                        <a:cs typeface="Times New Roman" panose="02020603050405020304" pitchFamily="18" charset="0"/>
+                      </a:rPr>
+                      <m:t>)</m:t>
+                    </m:r>
+                  </m:oMath>
+                </a14:m>
+                <a:r>
+                  <a:rPr lang="en-US" sz="2300" dirty="0">
+                    <a:latin typeface="Times New Roman" panose="02020603050405020304" pitchFamily="18" charset="0"/>
+                    <a:cs typeface="Times New Roman" panose="02020603050405020304" pitchFamily="18" charset="0"/>
+                  </a:rPr>
+                  <a:t> </a:t>
+                </a:r>
+                <a:r>
+                  <a:rPr lang="ru-RU" sz="2300" dirty="0">
+                    <a:latin typeface="Times New Roman" panose="02020603050405020304" pitchFamily="18" charset="0"/>
+                    <a:cs typeface="Times New Roman" panose="02020603050405020304" pitchFamily="18" charset="0"/>
+                  </a:rPr>
+                  <a:t>соответственно</a:t>
+                </a:r>
+                <a:endParaRPr lang="en-US" sz="2300" dirty="0">
+                  <a:latin typeface="Times New Roman" panose="02020603050405020304" pitchFamily="18" charset="0"/>
+                  <a:cs typeface="Times New Roman" panose="02020603050405020304" pitchFamily="18" charset="0"/>
+                </a:endParaRPr>
+              </a:p>
+              <a:p>
+                <a:pPr marL="0" indent="0" algn="just">
+                  <a:buNone/>
+                </a:pPr>
+                <a:r>
+                  <a:rPr lang="ru-RU" sz="2300" dirty="0">
+                    <a:latin typeface="Times New Roman" panose="02020603050405020304" pitchFamily="18" charset="0"/>
+                    <a:cs typeface="Times New Roman" panose="02020603050405020304" pitchFamily="18" charset="0"/>
+                  </a:rPr>
+                  <a:t>По результатам исследования, время работы на стороне СУБД меньше, чем время работы на стороне приложения. </a:t>
+                </a:r>
+              </a:p>
+              <a:p>
+                <a:pPr marL="0" indent="0" algn="just">
+                  <a:buNone/>
+                </a:pPr>
+                <a:r>
+                  <a:rPr lang="ru-RU" sz="2300" dirty="0">
+                    <a:latin typeface="Times New Roman" panose="02020603050405020304" pitchFamily="18" charset="0"/>
+                    <a:cs typeface="Times New Roman" panose="02020603050405020304" pitchFamily="18" charset="0"/>
+                  </a:rPr>
+                  <a:t>При этом, линейный </a:t>
+                </a:r>
+                <a:r>
+                  <a:rPr lang="ru-RU" sz="2300" dirty="0" err="1">
+                    <a:latin typeface="Times New Roman" panose="02020603050405020304" pitchFamily="18" charset="0"/>
+                    <a:cs typeface="Times New Roman" panose="02020603050405020304" pitchFamily="18" charset="0"/>
+                  </a:rPr>
+                  <a:t>коэфф-ициент</a:t>
+                </a:r>
+                <a:r>
+                  <a:rPr lang="ru-RU" sz="2300" dirty="0">
+                    <a:latin typeface="Times New Roman" panose="02020603050405020304" pitchFamily="18" charset="0"/>
+                    <a:cs typeface="Times New Roman" panose="02020603050405020304" pitchFamily="18" charset="0"/>
+                  </a:rPr>
+                  <a:t> роста времени на сто-</a:t>
+                </a:r>
+                <a:r>
+                  <a:rPr lang="ru-RU" sz="2300" dirty="0" err="1">
+                    <a:latin typeface="Times New Roman" panose="02020603050405020304" pitchFamily="18" charset="0"/>
+                    <a:cs typeface="Times New Roman" panose="02020603050405020304" pitchFamily="18" charset="0"/>
+                  </a:rPr>
+                  <a:t>роне</a:t>
+                </a:r>
+                <a:r>
+                  <a:rPr lang="ru-RU" sz="2300" dirty="0">
+                    <a:latin typeface="Times New Roman" panose="02020603050405020304" pitchFamily="18" charset="0"/>
+                    <a:cs typeface="Times New Roman" panose="02020603050405020304" pitchFamily="18" charset="0"/>
+                  </a:rPr>
+                  <a:t> приложения в 2.427 раза больше, чем на стороне сервера.</a:t>
+                </a:r>
+              </a:p>
+            </p:txBody>
+          </p:sp>
+        </mc:Choice>
+        <mc:Fallback xmlns="">
+          <p:sp>
+            <p:nvSpPr>
+              <p:cNvPr id="3" name="Объект 2">
+                <a:extLst>
+                  <a:ext uri="{FF2B5EF4-FFF2-40B4-BE49-F238E27FC236}">
+                    <a16:creationId xmlns:a16="http://schemas.microsoft.com/office/drawing/2014/main" id="{5345FD2F-91EB-E6ED-989E-A332A8B92DAD}"/>
+                  </a:ext>
+                </a:extLst>
+              </p:cNvPr>
+              <p:cNvSpPr>
+                <a:spLocks noGrp="1" noRot="1" noChangeAspect="1" noMove="1" noResize="1" noEditPoints="1" noAdjustHandles="1" noChangeArrowheads="1" noChangeShapeType="1" noTextEdit="1"/>
+              </p:cNvSpPr>
+              <p:nvPr>
+                <p:ph idx="1"/>
+              </p:nvPr>
+            </p:nvSpPr>
+            <p:spPr>
+              <a:xfrm>
+                <a:off x="838199" y="1747025"/>
+                <a:ext cx="4298795" cy="4215548"/>
+              </a:xfrm>
+              <a:blipFill>
+                <a:blip r:embed="rId3"/>
+                <a:stretch>
+                  <a:fillRect l="-1983" t="-2026" r="-1983" b="-1158"/>
+                </a:stretch>
+              </a:blipFill>
+            </p:spPr>
+            <p:txBody>
+              <a:bodyPr/>
+              <a:lstStyle/>
+              <a:p>
+                <a:r>
+                  <a:rPr lang="ru-RU">
+                    <a:noFill/>
+                  </a:rPr>
+                  <a:t> </a:t>
+                </a:r>
+              </a:p>
+            </p:txBody>
+          </p:sp>
+        </mc:Fallback>
+      </mc:AlternateContent>
+      <p:pic>
+        <p:nvPicPr>
+          <p:cNvPr id="6" name="Рисунок 5">
+            <a:extLst>
+              <a:ext uri="{FF2B5EF4-FFF2-40B4-BE49-F238E27FC236}">
+                <a16:creationId xmlns:a16="http://schemas.microsoft.com/office/drawing/2014/main" id="{162D7227-AA95-114F-31BE-F64037C750F6}"/>
+              </a:ext>
+            </a:extLst>
+          </p:cNvPr>
+          <p:cNvPicPr>
+            <a:picLocks noChangeAspect="1"/>
+          </p:cNvPicPr>
+          <p:nvPr/>
+        </p:nvPicPr>
+        <p:blipFill>
+          <a:blip r:embed="rId4"/>
+          <a:stretch>
+            <a:fillRect/>
+          </a:stretch>
+        </p:blipFill>
+        <p:spPr>
+          <a:xfrm>
+            <a:off x="5255229" y="1423781"/>
+            <a:ext cx="6773220" cy="3238952"/>
+          </a:xfrm>
+          <a:prstGeom prst="rect">
+            <a:avLst/>
+          </a:prstGeom>
+        </p:spPr>
+      </p:pic>
+      <p:pic>
+        <p:nvPicPr>
+          <p:cNvPr id="8" name="Рисунок 7">
+            <a:extLst>
+              <a:ext uri="{FF2B5EF4-FFF2-40B4-BE49-F238E27FC236}">
+                <a16:creationId xmlns:a16="http://schemas.microsoft.com/office/drawing/2014/main" id="{95D87B05-35E8-51AB-CFAA-46F36C5033A8}"/>
+              </a:ext>
+            </a:extLst>
+          </p:cNvPr>
+          <p:cNvPicPr>
+            <a:picLocks noChangeAspect="1"/>
+          </p:cNvPicPr>
+          <p:nvPr/>
+        </p:nvPicPr>
+        <p:blipFill>
+          <a:blip r:embed="rId5"/>
+          <a:stretch>
+            <a:fillRect/>
+          </a:stretch>
+        </p:blipFill>
+        <p:spPr>
+          <a:xfrm>
+            <a:off x="5339371" y="4750418"/>
+            <a:ext cx="6762117" cy="1070520"/>
+          </a:xfrm>
+          <a:prstGeom prst="rect">
+            <a:avLst/>
+          </a:prstGeom>
+        </p:spPr>
+      </p:pic>
+      <p:sp>
+        <p:nvSpPr>
+          <p:cNvPr id="9" name="Номер слайда 8">
+            <a:extLst>
+              <a:ext uri="{FF2B5EF4-FFF2-40B4-BE49-F238E27FC236}">
+                <a16:creationId xmlns:a16="http://schemas.microsoft.com/office/drawing/2014/main" id="{241A0365-4C7F-3DEE-7AFD-2F51AF8D63C4}"/>
+              </a:ext>
+            </a:extLst>
+          </p:cNvPr>
+          <p:cNvSpPr>
+            <a:spLocks noGrp="1"/>
+          </p:cNvSpPr>
+          <p:nvPr>
+            <p:ph type="sldNum" sz="quarter" idx="12"/>
           </p:nvPr>
         </p:nvSpPr>
         <p:spPr/>
@@ -6238,6 +6700,169 @@
           <a:bodyPr/>
           <a:lstStyle/>
           <a:p>
+            <a:fld id="{9F75ED48-FB93-4D27-9D40-6DF4DFA3F996}" type="slidenum">
+              <a:rPr lang="ru-RU" smtClean="0"/>
+              <a:t>15</a:t>
+            </a:fld>
+            <a:endParaRPr lang="ru-RU"/>
+          </a:p>
+        </p:txBody>
+      </p:sp>
+      <p:sp>
+        <p:nvSpPr>
+          <p:cNvPr id="4" name="Прямоугольник 3">
+            <a:extLst>
+              <a:ext uri="{FF2B5EF4-FFF2-40B4-BE49-F238E27FC236}">
+                <a16:creationId xmlns:a16="http://schemas.microsoft.com/office/drawing/2014/main" id="{1C2DA4C5-2A64-AC65-CD77-5750CADC9EB1}"/>
+              </a:ext>
+            </a:extLst>
+          </p:cNvPr>
+          <p:cNvSpPr/>
+          <p:nvPr/>
+        </p:nvSpPr>
+        <p:spPr>
+          <a:xfrm>
+            <a:off x="9770533" y="4844226"/>
+            <a:ext cx="1040554" cy="353919"/>
+          </a:xfrm>
+          <a:prstGeom prst="rect">
+            <a:avLst/>
+          </a:prstGeom>
+          <a:noFill/>
+          <a:ln w="28575">
+            <a:solidFill>
+              <a:srgbClr val="FF0000"/>
+            </a:solidFill>
+          </a:ln>
+        </p:spPr>
+        <p:style>
+          <a:lnRef idx="2">
+            <a:schemeClr val="accent1">
+              <a:shade val="15000"/>
+            </a:schemeClr>
+          </a:lnRef>
+          <a:fillRef idx="1">
+            <a:schemeClr val="accent1"/>
+          </a:fillRef>
+          <a:effectRef idx="0">
+            <a:schemeClr val="accent1"/>
+          </a:effectRef>
+          <a:fontRef idx="minor">
+            <a:schemeClr val="lt1"/>
+          </a:fontRef>
+        </p:style>
+        <p:txBody>
+          <a:bodyPr rtlCol="0" anchor="ctr"/>
+          <a:lstStyle/>
+          <a:p>
+            <a:pPr algn="ctr"/>
+            <a:endParaRPr lang="ru-RU"/>
+          </a:p>
+        </p:txBody>
+      </p:sp>
+      <p:sp>
+        <p:nvSpPr>
+          <p:cNvPr id="5" name="Прямоугольник 4">
+            <a:extLst>
+              <a:ext uri="{FF2B5EF4-FFF2-40B4-BE49-F238E27FC236}">
+                <a16:creationId xmlns:a16="http://schemas.microsoft.com/office/drawing/2014/main" id="{AC8ADE20-EFC1-1CA3-6DA3-B8B4E2AEC2BA}"/>
+              </a:ext>
+            </a:extLst>
+          </p:cNvPr>
+          <p:cNvSpPr/>
+          <p:nvPr/>
+        </p:nvSpPr>
+        <p:spPr>
+          <a:xfrm>
+            <a:off x="9682480" y="5424334"/>
+            <a:ext cx="1040554" cy="353919"/>
+          </a:xfrm>
+          <a:prstGeom prst="rect">
+            <a:avLst/>
+          </a:prstGeom>
+          <a:noFill/>
+          <a:ln w="28575">
+            <a:solidFill>
+              <a:srgbClr val="FF0000"/>
+            </a:solidFill>
+          </a:ln>
+        </p:spPr>
+        <p:style>
+          <a:lnRef idx="2">
+            <a:schemeClr val="accent1">
+              <a:shade val="15000"/>
+            </a:schemeClr>
+          </a:lnRef>
+          <a:fillRef idx="1">
+            <a:schemeClr val="accent1"/>
+          </a:fillRef>
+          <a:effectRef idx="0">
+            <a:schemeClr val="accent1"/>
+          </a:effectRef>
+          <a:fontRef idx="minor">
+            <a:schemeClr val="lt1"/>
+          </a:fontRef>
+        </p:style>
+        <p:txBody>
+          <a:bodyPr rtlCol="0" anchor="ctr"/>
+          <a:lstStyle/>
+          <a:p>
+            <a:pPr algn="ctr"/>
+            <a:endParaRPr lang="ru-RU"/>
+          </a:p>
+        </p:txBody>
+      </p:sp>
+    </p:spTree>
+    <p:extLst>
+      <p:ext uri="{BB962C8B-B14F-4D97-AF65-F5344CB8AC3E}">
+        <p14:creationId xmlns:p14="http://schemas.microsoft.com/office/powerpoint/2010/main" val="3120709960"/>
+      </p:ext>
+    </p:extLst>
+  </p:cSld>
+  <p:clrMapOvr>
+    <a:masterClrMapping/>
+  </p:clrMapOvr>
+</p:sld>
+</file>
+
+<file path=ppt/slides/slide16.xml><?xml version="1.0" encoding="utf-8"?>
+<p:sld xmlns:a="http://schemas.openxmlformats.org/drawingml/2006/main" xmlns:r="http://schemas.openxmlformats.org/officeDocument/2006/relationships" xmlns:p="http://schemas.openxmlformats.org/presentationml/2006/main">
+  <p:cSld>
+    <p:spTree>
+      <p:nvGrpSpPr>
+        <p:cNvPr id="1" name=""/>
+        <p:cNvGrpSpPr/>
+        <p:nvPr/>
+      </p:nvGrpSpPr>
+      <p:grpSpPr>
+        <a:xfrm>
+          <a:off x="0" y="0"/>
+          <a:ext cx="0" cy="0"/>
+          <a:chOff x="0" y="0"/>
+          <a:chExt cx="0" cy="0"/>
+        </a:xfrm>
+      </p:grpSpPr>
+      <p:sp>
+        <p:nvSpPr>
+          <p:cNvPr id="2" name="Заголовок 1">
+            <a:extLst>
+              <a:ext uri="{FF2B5EF4-FFF2-40B4-BE49-F238E27FC236}">
+                <a16:creationId xmlns:a16="http://schemas.microsoft.com/office/drawing/2014/main" id="{60150C86-AC50-9758-34D5-04EBE207519F}"/>
+              </a:ext>
+            </a:extLst>
+          </p:cNvPr>
+          <p:cNvSpPr>
+            <a:spLocks noGrp="1"/>
+          </p:cNvSpPr>
+          <p:nvPr>
+            <p:ph type="title"/>
+          </p:nvPr>
+        </p:nvSpPr>
+        <p:spPr/>
+        <p:txBody>
+          <a:bodyPr/>
+          <a:lstStyle/>
+          <a:p>
             <a:r>
               <a:rPr lang="ru-RU" dirty="0">
                 <a:latin typeface="Times New Roman" panose="02020603050405020304" pitchFamily="18" charset="0"/>
@@ -6268,7 +6893,7 @@
         <p:spPr/>
         <p:txBody>
           <a:bodyPr>
-            <a:normAutofit fontScale="92500" lnSpcReduction="20000"/>
+            <a:normAutofit fontScale="85000" lnSpcReduction="20000"/>
           </a:bodyPr>
           <a:lstStyle/>
           <a:p>
@@ -6404,7 +7029,7 @@
                 <a:latin typeface="Times New Roman" panose="02020603050405020304" pitchFamily="18" charset="0"/>
                 <a:cs typeface="Times New Roman" panose="02020603050405020304" pitchFamily="18" charset="0"/>
               </a:rPr>
-              <a:t>описаны методы тестирования разработанного функционала, разработаны тесты для проверки корректности работы приложения;</a:t>
+              <a:t>описаны методы тестирования разработанной функциональности, разработаны тесты для проверки корректности работы приложения;</a:t>
             </a:r>
           </a:p>
           <a:p>
@@ -6429,7 +7054,33 @@
                 <a:latin typeface="Times New Roman" panose="02020603050405020304" pitchFamily="18" charset="0"/>
                 <a:cs typeface="Times New Roman" panose="02020603050405020304" pitchFamily="18" charset="0"/>
               </a:rPr>
-              <a:t>Поставленные задачи выполнены. Цель работы достигнута.</a:t>
+              <a:t>Поставленные задачи выполнены. Цель работы — разработка базы данных </a:t>
+            </a:r>
+            <a:r>
+              <a:rPr lang="ru-RU" sz="2400" dirty="0" err="1">
+                <a:latin typeface="Times New Roman" panose="02020603050405020304" pitchFamily="18" charset="0"/>
+                <a:cs typeface="Times New Roman" panose="02020603050405020304" pitchFamily="18" charset="0"/>
+              </a:rPr>
+              <a:t>соревнова</a:t>
+            </a:r>
+            <a:r>
+              <a:rPr lang="ru-RU" sz="2400" dirty="0">
+                <a:latin typeface="Times New Roman" panose="02020603050405020304" pitchFamily="18" charset="0"/>
+                <a:cs typeface="Times New Roman" panose="02020603050405020304" pitchFamily="18" charset="0"/>
+              </a:rPr>
+              <a:t>-</a:t>
+            </a:r>
+          </a:p>
+          <a:p>
+            <a:pPr marL="0" indent="0">
+              <a:buNone/>
+            </a:pPr>
+            <a:r>
+              <a:rPr lang="ru-RU" sz="2400" dirty="0">
+                <a:latin typeface="Times New Roman" panose="02020603050405020304" pitchFamily="18" charset="0"/>
+                <a:cs typeface="Times New Roman" panose="02020603050405020304" pitchFamily="18" charset="0"/>
+              </a:rPr>
+              <a:t>тельной игры — была достигнута.</a:t>
             </a:r>
           </a:p>
         </p:txBody>
@@ -6457,7 +7108,7 @@
           <a:p>
             <a:fld id="{9F75ED48-FB93-4D27-9D40-6DF4DFA3F996}" type="slidenum">
               <a:rPr lang="ru-RU" smtClean="0"/>
-              <a:t>15</a:t>
+              <a:t>16</a:t>
             </a:fld>
             <a:endParaRPr lang="ru-RU"/>
           </a:p>
@@ -6476,7 +7127,7 @@
 </p:sld>
 </file>
 
-<file path=ppt/slides/slide16.xml><?xml version="1.0" encoding="utf-8"?>
+<file path=ppt/slides/slide17.xml><?xml version="1.0" encoding="utf-8"?>
 <p:sld xmlns:a="http://schemas.openxmlformats.org/drawingml/2006/main" xmlns:r="http://schemas.openxmlformats.org/officeDocument/2006/relationships" xmlns:p="http://schemas.openxmlformats.org/presentationml/2006/main">
   <p:cSld>
     <p:spTree>
@@ -6732,7 +7383,7 @@
           <a:p>
             <a:fld id="{9F75ED48-FB93-4D27-9D40-6DF4DFA3F996}" type="slidenum">
               <a:rPr lang="ru-RU" smtClean="0"/>
-              <a:t>16</a:t>
+              <a:t>17</a:t>
             </a:fld>
             <a:endParaRPr lang="ru-RU"/>
           </a:p>
@@ -6979,7 +7630,7 @@
                 <a:latin typeface="Times New Roman" panose="02020603050405020304" pitchFamily="18" charset="0"/>
                 <a:cs typeface="Times New Roman" panose="02020603050405020304" pitchFamily="18" charset="0"/>
               </a:rPr>
-              <a:t>описать методы тестирования разработанного функционала и разработать тесты для проверки корректности работы приложения;</a:t>
+              <a:t>описать методы тестирования разработанной функциональности и разработать тесты для проверки корректности работы приложения;</a:t>
             </a:r>
           </a:p>
           <a:p>
@@ -7248,10 +7899,10 @@
       </p:grpSpPr>
       <p:pic>
         <p:nvPicPr>
-          <p:cNvPr id="5" name="Рисунок 4">
-            <a:extLst>
-              <a:ext uri="{FF2B5EF4-FFF2-40B4-BE49-F238E27FC236}">
-                <a16:creationId xmlns:a16="http://schemas.microsoft.com/office/drawing/2014/main" id="{63A5D698-A322-E08D-E1A6-5FD73A5C360C}"/>
+          <p:cNvPr id="4" name="Рисунок 3">
+            <a:extLst>
+              <a:ext uri="{FF2B5EF4-FFF2-40B4-BE49-F238E27FC236}">
+                <a16:creationId xmlns:a16="http://schemas.microsoft.com/office/drawing/2014/main" id="{56965C95-C9A7-D827-8795-ED79F7FCE16C}"/>
               </a:ext>
             </a:extLst>
           </p:cNvPr>
@@ -7268,8 +7919,8 @@
         </p:blipFill>
         <p:spPr>
           <a:xfrm>
-            <a:off x="1007292" y="1289579"/>
-            <a:ext cx="10346508" cy="5203296"/>
+            <a:off x="999067" y="1212790"/>
+            <a:ext cx="9795934" cy="5326122"/>
           </a:xfrm>
           <a:prstGeom prst="rect">
             <a:avLst/>
@@ -7462,7 +8113,7 @@
           <p:nvPr>
             <p:extLst>
               <p:ext uri="{D42A27DB-BD31-4B8C-83A1-F6EECF244321}">
-                <p14:modId xmlns:p14="http://schemas.microsoft.com/office/powerpoint/2010/main" val="617381201"/>
+                <p14:modId xmlns:p14="http://schemas.microsoft.com/office/powerpoint/2010/main" val="3845303929"/>
               </p:ext>
             </p:extLst>
           </p:nvPr>
@@ -8236,7 +8887,13 @@
   <p:cSld>
     <p:spTree>
       <p:nvGrpSpPr>
-        <p:cNvPr id="1" name=""/>
+        <p:cNvPr id="1" name="">
+          <a:extLst>
+            <a:ext uri="{FF2B5EF4-FFF2-40B4-BE49-F238E27FC236}">
+              <a16:creationId xmlns:a16="http://schemas.microsoft.com/office/drawing/2014/main" id="{E27B868B-60A0-ED36-51E3-29246BCEB58B}"/>
+            </a:ext>
+          </a:extLst>
+        </p:cNvPr>
         <p:cNvGrpSpPr/>
         <p:nvPr/>
       </p:nvGrpSpPr>
@@ -8253,7 +8910,7 @@
           <p:cNvPr id="2" name="Заголовок 1">
             <a:extLst>
               <a:ext uri="{FF2B5EF4-FFF2-40B4-BE49-F238E27FC236}">
-                <a16:creationId xmlns:a16="http://schemas.microsoft.com/office/drawing/2014/main" id="{1294129D-F169-D152-03DD-9227D0701403}"/>
+                <a16:creationId xmlns:a16="http://schemas.microsoft.com/office/drawing/2014/main" id="{293A5881-39C0-4C13-F656-D9F522B09323}"/>
               </a:ext>
             </a:extLst>
           </p:cNvPr>
@@ -8270,11 +8927,11 @@
           <a:lstStyle/>
           <a:p>
             <a:r>
-              <a:rPr lang="ru-RU" sz="4400" dirty="0">
-                <a:latin typeface="Times New Roman" panose="02020603050405020304" pitchFamily="18" charset="0"/>
-                <a:cs typeface="Times New Roman" panose="02020603050405020304" pitchFamily="18" charset="0"/>
-              </a:rPr>
-              <a:t>Средства реализации</a:t>
+              <a:rPr lang="ru-RU" dirty="0">
+                <a:latin typeface="Times New Roman" panose="02020603050405020304" pitchFamily="18" charset="0"/>
+                <a:cs typeface="Times New Roman" panose="02020603050405020304" pitchFamily="18" charset="0"/>
+              </a:rPr>
+              <a:t>Анализ реляционных СУБД</a:t>
             </a:r>
             <a:endParaRPr lang="ru-RU" dirty="0"/>
           </a:p>
@@ -8282,244 +8939,10 @@
       </p:sp>
       <p:sp>
         <p:nvSpPr>
-          <p:cNvPr id="3" name="Объект 2">
-            <a:extLst>
-              <a:ext uri="{FF2B5EF4-FFF2-40B4-BE49-F238E27FC236}">
-                <a16:creationId xmlns:a16="http://schemas.microsoft.com/office/drawing/2014/main" id="{4286BC96-A488-534F-7EB9-5599428C14FE}"/>
-              </a:ext>
-            </a:extLst>
-          </p:cNvPr>
-          <p:cNvSpPr>
-            <a:spLocks noGrp="1"/>
-          </p:cNvSpPr>
-          <p:nvPr>
-            <p:ph idx="1"/>
-          </p:nvPr>
-        </p:nvSpPr>
-        <p:spPr/>
-        <p:txBody>
-          <a:bodyPr/>
-          <a:lstStyle/>
-          <a:p>
-            <a:pPr marL="457200" indent="-457200">
-              <a:buFont typeface="Liberation Sans" panose="020B0604020202020204" pitchFamily="34" charset="0"/>
-              <a:buChar char="−"/>
-            </a:pPr>
-            <a:r>
-              <a:rPr lang="ru-RU" sz="2800" dirty="0">
-                <a:latin typeface="Times New Roman" panose="02020603050405020304" pitchFamily="18" charset="0"/>
-                <a:cs typeface="Times New Roman" panose="02020603050405020304" pitchFamily="18" charset="0"/>
-              </a:rPr>
-              <a:t>СУБД</a:t>
-            </a:r>
-            <a:r>
-              <a:rPr lang="en-US" sz="2800" dirty="0">
-                <a:latin typeface="Times New Roman" panose="02020603050405020304" pitchFamily="18" charset="0"/>
-                <a:cs typeface="Times New Roman" panose="02020603050405020304" pitchFamily="18" charset="0"/>
-              </a:rPr>
-              <a:t>: PostgreSQL</a:t>
-            </a:r>
-            <a:endParaRPr lang="ru-RU" sz="2800" dirty="0">
-              <a:latin typeface="Times New Roman" panose="02020603050405020304" pitchFamily="18" charset="0"/>
-              <a:cs typeface="Times New Roman" panose="02020603050405020304" pitchFamily="18" charset="0"/>
-            </a:endParaRPr>
-          </a:p>
-          <a:p>
-            <a:pPr marL="457200" indent="-457200">
-              <a:buFont typeface="Liberation Sans" panose="020B0604020202020204" pitchFamily="34" charset="0"/>
-              <a:buChar char="−"/>
-            </a:pPr>
-            <a:r>
-              <a:rPr lang="ru-RU" sz="2800" dirty="0">
-                <a:latin typeface="Times New Roman" panose="02020603050405020304" pitchFamily="18" charset="0"/>
-                <a:cs typeface="Times New Roman" panose="02020603050405020304" pitchFamily="18" charset="0"/>
-              </a:rPr>
-              <a:t>Язык: C</a:t>
-            </a:r>
-            <a:r>
-              <a:rPr lang="en-US" sz="2800" dirty="0">
-                <a:latin typeface="Times New Roman" panose="02020603050405020304" pitchFamily="18" charset="0"/>
-                <a:cs typeface="Times New Roman" panose="02020603050405020304" pitchFamily="18" charset="0"/>
-              </a:rPr>
-              <a:t>#;</a:t>
-            </a:r>
-            <a:endParaRPr lang="ru-RU" dirty="0">
-              <a:latin typeface="Times New Roman" panose="02020603050405020304" pitchFamily="18" charset="0"/>
-              <a:cs typeface="Times New Roman" panose="02020603050405020304" pitchFamily="18" charset="0"/>
-            </a:endParaRPr>
-          </a:p>
-          <a:p>
-            <a:pPr marL="457200" indent="-457200">
-              <a:buFont typeface="Liberation Sans" panose="020B0604020202020204" pitchFamily="34" charset="0"/>
-              <a:buChar char="−"/>
-            </a:pPr>
-            <a:r>
-              <a:rPr lang="ru-RU" dirty="0">
-                <a:latin typeface="Times New Roman" panose="02020603050405020304" pitchFamily="18" charset="0"/>
-                <a:cs typeface="Times New Roman" panose="02020603050405020304" pitchFamily="18" charset="0"/>
-              </a:rPr>
-              <a:t>Фреймворк</a:t>
-            </a:r>
-            <a:r>
-              <a:rPr lang="en-US" dirty="0">
-                <a:latin typeface="Times New Roman" panose="02020603050405020304" pitchFamily="18" charset="0"/>
-                <a:cs typeface="Times New Roman" panose="02020603050405020304" pitchFamily="18" charset="0"/>
-              </a:rPr>
-              <a:t>: ASP.NET </a:t>
-            </a:r>
-            <a:r>
-              <a:rPr lang="ru-RU" dirty="0">
-                <a:latin typeface="Times New Roman" panose="02020603050405020304" pitchFamily="18" charset="0"/>
-                <a:cs typeface="Times New Roman" panose="02020603050405020304" pitchFamily="18" charset="0"/>
-              </a:rPr>
-              <a:t>8</a:t>
-            </a:r>
-            <a:r>
-              <a:rPr lang="en-US" dirty="0">
-                <a:latin typeface="Times New Roman" panose="02020603050405020304" pitchFamily="18" charset="0"/>
-                <a:cs typeface="Times New Roman" panose="02020603050405020304" pitchFamily="18" charset="0"/>
-              </a:rPr>
-              <a:t>.0</a:t>
-            </a:r>
-          </a:p>
-          <a:p>
-            <a:pPr marL="457200" indent="-457200">
-              <a:buFont typeface="Liberation Sans" panose="020B0604020202020204" pitchFamily="34" charset="0"/>
-              <a:buChar char="−"/>
-            </a:pPr>
-            <a:r>
-              <a:rPr lang="ru-RU" dirty="0">
-                <a:latin typeface="Times New Roman" panose="02020603050405020304" pitchFamily="18" charset="0"/>
-                <a:cs typeface="Times New Roman" panose="02020603050405020304" pitchFamily="18" charset="0"/>
-              </a:rPr>
-              <a:t>Сторонние библиотеки</a:t>
-            </a:r>
-            <a:r>
-              <a:rPr lang="en-US" dirty="0">
-                <a:latin typeface="Times New Roman" panose="02020603050405020304" pitchFamily="18" charset="0"/>
-                <a:cs typeface="Times New Roman" panose="02020603050405020304" pitchFamily="18" charset="0"/>
-              </a:rPr>
-              <a:t>:</a:t>
-            </a:r>
-            <a:endParaRPr lang="ru-RU" dirty="0">
-              <a:latin typeface="Times New Roman" panose="02020603050405020304" pitchFamily="18" charset="0"/>
-              <a:cs typeface="Times New Roman" panose="02020603050405020304" pitchFamily="18" charset="0"/>
-            </a:endParaRPr>
-          </a:p>
-          <a:p>
-            <a:pPr marL="914400" lvl="1" indent="-457200">
-              <a:buFont typeface="Liberation Sans" panose="020B0604020202020204" pitchFamily="34" charset="0"/>
-              <a:buChar char="−"/>
-            </a:pPr>
-            <a:r>
-              <a:rPr lang="en-US" dirty="0">
-                <a:latin typeface="Times New Roman" panose="02020603050405020304" pitchFamily="18" charset="0"/>
-                <a:cs typeface="Times New Roman" panose="02020603050405020304" pitchFamily="18" charset="0"/>
-              </a:rPr>
-              <a:t>Quartz.NET</a:t>
-            </a:r>
-            <a:r>
-              <a:rPr lang="ru-RU" dirty="0">
-                <a:latin typeface="Times New Roman" panose="02020603050405020304" pitchFamily="18" charset="0"/>
-                <a:cs typeface="Times New Roman" panose="02020603050405020304" pitchFamily="18" charset="0"/>
-              </a:rPr>
-              <a:t> для хранения и выполнения отложенных задач </a:t>
-            </a:r>
-          </a:p>
-          <a:p>
-            <a:pPr marL="914400" lvl="1" indent="-457200">
-              <a:buFont typeface="Liberation Sans" panose="020B0604020202020204" pitchFamily="34" charset="0"/>
-              <a:buChar char="−"/>
-            </a:pPr>
-            <a:r>
-              <a:rPr lang="en-US" dirty="0">
-                <a:latin typeface="Times New Roman" panose="02020603050405020304" pitchFamily="18" charset="0"/>
-                <a:cs typeface="Times New Roman" panose="02020603050405020304" pitchFamily="18" charset="0"/>
-              </a:rPr>
-              <a:t>Magick.NET</a:t>
-            </a:r>
-            <a:r>
-              <a:rPr lang="ru-RU" dirty="0">
-                <a:latin typeface="Times New Roman" panose="02020603050405020304" pitchFamily="18" charset="0"/>
-                <a:cs typeface="Times New Roman" panose="02020603050405020304" pitchFamily="18" charset="0"/>
-              </a:rPr>
-              <a:t> для обработки изображений</a:t>
-            </a:r>
-            <a:endParaRPr lang="en-US" dirty="0">
-              <a:latin typeface="Times New Roman" panose="02020603050405020304" pitchFamily="18" charset="0"/>
-              <a:cs typeface="Times New Roman" panose="02020603050405020304" pitchFamily="18" charset="0"/>
-            </a:endParaRPr>
-          </a:p>
-          <a:p>
-            <a:pPr marL="914400" lvl="1" indent="-457200">
-              <a:buFont typeface="Liberation Sans" panose="020B0604020202020204" pitchFamily="34" charset="0"/>
-              <a:buChar char="−"/>
-            </a:pPr>
-            <a:r>
-              <a:rPr lang="en-US" dirty="0">
-                <a:latin typeface="Times New Roman" panose="02020603050405020304" pitchFamily="18" charset="0"/>
-                <a:cs typeface="Times New Roman" panose="02020603050405020304" pitchFamily="18" charset="0"/>
-              </a:rPr>
-              <a:t>Entity Framework Core</a:t>
-            </a:r>
-            <a:r>
-              <a:rPr lang="ru-RU" dirty="0">
-                <a:latin typeface="Times New Roman" panose="02020603050405020304" pitchFamily="18" charset="0"/>
-                <a:cs typeface="Times New Roman" panose="02020603050405020304" pitchFamily="18" charset="0"/>
-              </a:rPr>
-              <a:t> в качестве </a:t>
-            </a:r>
-            <a:r>
-              <a:rPr lang="en-US" dirty="0">
-                <a:latin typeface="Times New Roman" panose="02020603050405020304" pitchFamily="18" charset="0"/>
-                <a:cs typeface="Times New Roman" panose="02020603050405020304" pitchFamily="18" charset="0"/>
-              </a:rPr>
-              <a:t>ORM</a:t>
-            </a:r>
-            <a:endParaRPr lang="ru-RU" dirty="0">
-              <a:latin typeface="Times New Roman" panose="02020603050405020304" pitchFamily="18" charset="0"/>
-              <a:cs typeface="Times New Roman" panose="02020603050405020304" pitchFamily="18" charset="0"/>
-            </a:endParaRPr>
-          </a:p>
-          <a:p>
-            <a:pPr marL="457200" indent="-457200">
-              <a:buFont typeface="Liberation Sans" panose="020B0604020202020204" pitchFamily="34" charset="0"/>
-              <a:buChar char="−"/>
-            </a:pPr>
-            <a:r>
-              <a:rPr lang="ru-RU" sz="2800" dirty="0">
-                <a:latin typeface="Times New Roman" panose="02020603050405020304" pitchFamily="18" charset="0"/>
-                <a:cs typeface="Times New Roman" panose="02020603050405020304" pitchFamily="18" charset="0"/>
-              </a:rPr>
-              <a:t>Среда разработки: </a:t>
-            </a:r>
-            <a:r>
-              <a:rPr lang="en-US" sz="2800" dirty="0">
-                <a:latin typeface="Times New Roman" panose="02020603050405020304" pitchFamily="18" charset="0"/>
-                <a:cs typeface="Times New Roman" panose="02020603050405020304" pitchFamily="18" charset="0"/>
-              </a:rPr>
-              <a:t>Microsoft Visual Studio</a:t>
-            </a:r>
-            <a:r>
-              <a:rPr lang="en-US" dirty="0">
-                <a:latin typeface="Times New Roman" panose="02020603050405020304" pitchFamily="18" charset="0"/>
-                <a:cs typeface="Times New Roman" panose="02020603050405020304" pitchFamily="18" charset="0"/>
-              </a:rPr>
-              <a:t>.</a:t>
-            </a:r>
-            <a:endParaRPr lang="ru-RU" sz="2800" dirty="0">
-              <a:latin typeface="Times New Roman" panose="02020603050405020304" pitchFamily="18" charset="0"/>
-              <a:cs typeface="Times New Roman" panose="02020603050405020304" pitchFamily="18" charset="0"/>
-            </a:endParaRPr>
-          </a:p>
-        </p:txBody>
-      </p:sp>
-      <p:sp>
-        <p:nvSpPr>
           <p:cNvPr id="4" name="Номер слайда 3">
             <a:extLst>
               <a:ext uri="{FF2B5EF4-FFF2-40B4-BE49-F238E27FC236}">
-                <a16:creationId xmlns:a16="http://schemas.microsoft.com/office/drawing/2014/main" id="{DB845D22-575F-FAA2-4894-3A79966D1551}"/>
+                <a16:creationId xmlns:a16="http://schemas.microsoft.com/office/drawing/2014/main" id="{A1AA815D-EA37-359C-E923-78D3BA4CD5E5}"/>
               </a:ext>
             </a:extLst>
           </p:cNvPr>
@@ -8543,10 +8966,782 @@
           </a:p>
         </p:txBody>
       </p:sp>
+      <p:graphicFrame>
+        <p:nvGraphicFramePr>
+          <p:cNvPr id="7" name="Таблица 6">
+            <a:extLst>
+              <a:ext uri="{FF2B5EF4-FFF2-40B4-BE49-F238E27FC236}">
+                <a16:creationId xmlns:a16="http://schemas.microsoft.com/office/drawing/2014/main" id="{2434748F-AE7A-F63D-D5CB-0A3A3A4D6B61}"/>
+              </a:ext>
+            </a:extLst>
+          </p:cNvPr>
+          <p:cNvGraphicFramePr>
+            <a:graphicFrameLocks noGrp="1"/>
+          </p:cNvGraphicFramePr>
+          <p:nvPr>
+            <p:extLst>
+              <p:ext uri="{D42A27DB-BD31-4B8C-83A1-F6EECF244321}">
+                <p14:modId xmlns:p14="http://schemas.microsoft.com/office/powerpoint/2010/main" val="890645409"/>
+              </p:ext>
+            </p:extLst>
+          </p:nvPr>
+        </p:nvGraphicFramePr>
+        <p:xfrm>
+          <a:off x="1261532" y="1614488"/>
+          <a:ext cx="9406466" cy="4406317"/>
+        </p:xfrm>
+        <a:graphic>
+          <a:graphicData uri="http://schemas.openxmlformats.org/drawingml/2006/table">
+            <a:tbl>
+              <a:tblPr firstRow="1" bandRow="1">
+                <a:tableStyleId>{5940675A-B579-460E-94D1-54222C63F5DA}</a:tableStyleId>
+              </a:tblPr>
+              <a:tblGrid>
+                <a:gridCol w="2766087">
+                  <a:extLst>
+                    <a:ext uri="{9D8B030D-6E8A-4147-A177-3AD203B41FA5}">
+                      <a16:colId xmlns:a16="http://schemas.microsoft.com/office/drawing/2014/main" val="1307928213"/>
+                    </a:ext>
+                  </a:extLst>
+                </a:gridCol>
+                <a:gridCol w="1399514">
+                  <a:extLst>
+                    <a:ext uri="{9D8B030D-6E8A-4147-A177-3AD203B41FA5}">
+                      <a16:colId xmlns:a16="http://schemas.microsoft.com/office/drawing/2014/main" val="2253008031"/>
+                    </a:ext>
+                  </a:extLst>
+                </a:gridCol>
+                <a:gridCol w="1771627">
+                  <a:extLst>
+                    <a:ext uri="{9D8B030D-6E8A-4147-A177-3AD203B41FA5}">
+                      <a16:colId xmlns:a16="http://schemas.microsoft.com/office/drawing/2014/main" val="4019632428"/>
+                    </a:ext>
+                  </a:extLst>
+                </a:gridCol>
+                <a:gridCol w="1725107">
+                  <a:extLst>
+                    <a:ext uri="{9D8B030D-6E8A-4147-A177-3AD203B41FA5}">
+                      <a16:colId xmlns:a16="http://schemas.microsoft.com/office/drawing/2014/main" val="3796163886"/>
+                    </a:ext>
+                  </a:extLst>
+                </a:gridCol>
+                <a:gridCol w="1744131">
+                  <a:extLst>
+                    <a:ext uri="{9D8B030D-6E8A-4147-A177-3AD203B41FA5}">
+                      <a16:colId xmlns:a16="http://schemas.microsoft.com/office/drawing/2014/main" val="506650305"/>
+                    </a:ext>
+                  </a:extLst>
+                </a:gridCol>
+              </a:tblGrid>
+              <a:tr h="783367">
+                <a:tc>
+                  <a:txBody>
+                    <a:bodyPr/>
+                    <a:lstStyle/>
+                    <a:p>
+                      <a:r>
+                        <a:rPr lang="ru-RU" sz="2400" dirty="0">
+                          <a:latin typeface="Times New Roman" panose="02020603050405020304" pitchFamily="18" charset="0"/>
+                          <a:cs typeface="Times New Roman" panose="02020603050405020304" pitchFamily="18" charset="0"/>
+                        </a:rPr>
+                        <a:t>Критерии</a:t>
+                      </a:r>
+                    </a:p>
+                  </a:txBody>
+                  <a:tcPr/>
+                </a:tc>
+                <a:tc>
+                  <a:txBody>
+                    <a:bodyPr/>
+                    <a:lstStyle/>
+                    <a:p>
+                      <a:r>
+                        <a:rPr lang="en-US" sz="2400" dirty="0">
+                          <a:latin typeface="Times New Roman" panose="02020603050405020304" pitchFamily="18" charset="0"/>
+                          <a:cs typeface="Times New Roman" panose="02020603050405020304" pitchFamily="18" charset="0"/>
+                        </a:rPr>
+                        <a:t>SQLite</a:t>
+                      </a:r>
+                      <a:endParaRPr lang="ru-RU" sz="2400" dirty="0">
+                        <a:latin typeface="Times New Roman" panose="02020603050405020304" pitchFamily="18" charset="0"/>
+                        <a:cs typeface="Times New Roman" panose="02020603050405020304" pitchFamily="18" charset="0"/>
+                      </a:endParaRPr>
+                    </a:p>
+                  </a:txBody>
+                  <a:tcPr/>
+                </a:tc>
+                <a:tc>
+                  <a:txBody>
+                    <a:bodyPr/>
+                    <a:lstStyle/>
+                    <a:p>
+                      <a:r>
+                        <a:rPr lang="en-US" sz="2400" dirty="0">
+                          <a:latin typeface="Times New Roman" panose="02020603050405020304" pitchFamily="18" charset="0"/>
+                          <a:cs typeface="Times New Roman" panose="02020603050405020304" pitchFamily="18" charset="0"/>
+                        </a:rPr>
+                        <a:t>Microsoft</a:t>
+                      </a:r>
+                    </a:p>
+                    <a:p>
+                      <a:r>
+                        <a:rPr lang="en-US" sz="2400" dirty="0">
+                          <a:latin typeface="Times New Roman" panose="02020603050405020304" pitchFamily="18" charset="0"/>
+                          <a:cs typeface="Times New Roman" panose="02020603050405020304" pitchFamily="18" charset="0"/>
+                        </a:rPr>
+                        <a:t>SQL Server</a:t>
+                      </a:r>
+                      <a:endParaRPr lang="ru-RU" sz="2400" dirty="0">
+                        <a:latin typeface="Times New Roman" panose="02020603050405020304" pitchFamily="18" charset="0"/>
+                        <a:cs typeface="Times New Roman" panose="02020603050405020304" pitchFamily="18" charset="0"/>
+                      </a:endParaRPr>
+                    </a:p>
+                  </a:txBody>
+                  <a:tcPr/>
+                </a:tc>
+                <a:tc>
+                  <a:txBody>
+                    <a:bodyPr/>
+                    <a:lstStyle/>
+                    <a:p>
+                      <a:r>
+                        <a:rPr lang="en-US" sz="2400" dirty="0">
+                          <a:latin typeface="Times New Roman" panose="02020603050405020304" pitchFamily="18" charset="0"/>
+                          <a:cs typeface="Times New Roman" panose="02020603050405020304" pitchFamily="18" charset="0"/>
+                        </a:rPr>
+                        <a:t>Oracle Database</a:t>
+                      </a:r>
+                      <a:endParaRPr lang="ru-RU" sz="2400" dirty="0">
+                        <a:latin typeface="Times New Roman" panose="02020603050405020304" pitchFamily="18" charset="0"/>
+                        <a:cs typeface="Times New Roman" panose="02020603050405020304" pitchFamily="18" charset="0"/>
+                      </a:endParaRPr>
+                    </a:p>
+                  </a:txBody>
+                  <a:tcPr/>
+                </a:tc>
+                <a:tc>
+                  <a:txBody>
+                    <a:bodyPr/>
+                    <a:lstStyle/>
+                    <a:p>
+                      <a:r>
+                        <a:rPr lang="en-US" sz="2400" dirty="0">
+                          <a:latin typeface="Times New Roman" panose="02020603050405020304" pitchFamily="18" charset="0"/>
+                          <a:cs typeface="Times New Roman" panose="02020603050405020304" pitchFamily="18" charset="0"/>
+                        </a:rPr>
+                        <a:t>PostgreSQL</a:t>
+                      </a:r>
+                      <a:endParaRPr lang="ru-RU" sz="2400" dirty="0">
+                        <a:latin typeface="Times New Roman" panose="02020603050405020304" pitchFamily="18" charset="0"/>
+                        <a:cs typeface="Times New Roman" panose="02020603050405020304" pitchFamily="18" charset="0"/>
+                      </a:endParaRPr>
+                    </a:p>
+                  </a:txBody>
+                  <a:tcPr>
+                    <a:solidFill>
+                      <a:schemeClr val="accent6">
+                        <a:lumMod val="20000"/>
+                        <a:lumOff val="80000"/>
+                      </a:schemeClr>
+                    </a:solidFill>
+                  </a:tcPr>
+                </a:tc>
+                <a:extLst>
+                  <a:ext uri="{0D108BD9-81ED-4DB2-BD59-A6C34878D82A}">
+                    <a16:rowId xmlns:a16="http://schemas.microsoft.com/office/drawing/2014/main" val="539708537"/>
+                  </a:ext>
+                </a:extLst>
+              </a:tr>
+              <a:tr h="903966">
+                <a:tc>
+                  <a:txBody>
+                    <a:bodyPr/>
+                    <a:lstStyle/>
+                    <a:p>
+                      <a:r>
+                        <a:rPr lang="ru-RU" dirty="0">
+                          <a:latin typeface="Times New Roman" panose="02020603050405020304" pitchFamily="18" charset="0"/>
+                          <a:cs typeface="Times New Roman" panose="02020603050405020304" pitchFamily="18" charset="0"/>
+                        </a:rPr>
+                        <a:t>Поддержка проверки регулярных выражений</a:t>
+                      </a:r>
+                    </a:p>
+                  </a:txBody>
+                  <a:tcPr/>
+                </a:tc>
+                <a:tc>
+                  <a:txBody>
+                    <a:bodyPr/>
+                    <a:lstStyle/>
+                    <a:p>
+                      <a:pPr marL="0" marR="0" lvl="0" indent="0" algn="ctr" defTabSz="914400" rtl="0" eaLnBrk="1" fontAlgn="auto" latinLnBrk="0" hangingPunct="1">
+                        <a:lnSpc>
+                          <a:spcPct val="100000"/>
+                        </a:lnSpc>
+                        <a:spcBef>
+                          <a:spcPts val="0"/>
+                        </a:spcBef>
+                        <a:spcAft>
+                          <a:spcPts val="0"/>
+                        </a:spcAft>
+                        <a:buClrTx/>
+                        <a:buSzTx/>
+                        <a:buFontTx/>
+                        <a:buNone/>
+                        <a:tabLst/>
+                        <a:defRPr/>
+                      </a:pPr>
+                      <a:r>
+                        <a:rPr lang="ru-RU" sz="2400" b="1" dirty="0">
+                          <a:latin typeface="Times New Roman" panose="02020603050405020304" pitchFamily="18" charset="0"/>
+                          <a:cs typeface="Times New Roman" panose="02020603050405020304" pitchFamily="18" charset="0"/>
+                        </a:rPr>
+                        <a:t>–</a:t>
+                      </a:r>
+                    </a:p>
+                    <a:p>
+                      <a:pPr algn="ctr"/>
+                      <a:endParaRPr lang="ru-RU" sz="2400" b="1" dirty="0">
+                        <a:latin typeface="Times New Roman" panose="02020603050405020304" pitchFamily="18" charset="0"/>
+                        <a:cs typeface="Times New Roman" panose="02020603050405020304" pitchFamily="18" charset="0"/>
+                      </a:endParaRPr>
+                    </a:p>
+                  </a:txBody>
+                  <a:tcPr/>
+                </a:tc>
+                <a:tc>
+                  <a:txBody>
+                    <a:bodyPr/>
+                    <a:lstStyle/>
+                    <a:p>
+                      <a:pPr marL="0" marR="0" lvl="0" indent="0" algn="ctr" defTabSz="914400" rtl="0" eaLnBrk="1" fontAlgn="auto" latinLnBrk="0" hangingPunct="1">
+                        <a:lnSpc>
+                          <a:spcPct val="100000"/>
+                        </a:lnSpc>
+                        <a:spcBef>
+                          <a:spcPts val="0"/>
+                        </a:spcBef>
+                        <a:spcAft>
+                          <a:spcPts val="0"/>
+                        </a:spcAft>
+                        <a:buClrTx/>
+                        <a:buSzTx/>
+                        <a:buFontTx/>
+                        <a:buNone/>
+                        <a:tabLst/>
+                        <a:defRPr/>
+                      </a:pPr>
+                      <a:r>
+                        <a:rPr lang="ru-RU" sz="2400" b="1" dirty="0">
+                          <a:latin typeface="Times New Roman" panose="02020603050405020304" pitchFamily="18" charset="0"/>
+                          <a:cs typeface="Times New Roman" panose="02020603050405020304" pitchFamily="18" charset="0"/>
+                        </a:rPr>
+                        <a:t>–</a:t>
+                      </a:r>
+                    </a:p>
+                    <a:p>
+                      <a:pPr algn="ctr"/>
+                      <a:endParaRPr lang="ru-RU" sz="2400" b="1" dirty="0">
+                        <a:latin typeface="Times New Roman" panose="02020603050405020304" pitchFamily="18" charset="0"/>
+                        <a:cs typeface="Times New Roman" panose="02020603050405020304" pitchFamily="18" charset="0"/>
+                      </a:endParaRPr>
+                    </a:p>
+                  </a:txBody>
+                  <a:tcPr/>
+                </a:tc>
+                <a:tc>
+                  <a:txBody>
+                    <a:bodyPr/>
+                    <a:lstStyle/>
+                    <a:p>
+                      <a:pPr algn="ctr"/>
+                      <a:r>
+                        <a:rPr lang="en-US" sz="2400" b="1" dirty="0">
+                          <a:latin typeface="Times New Roman" panose="02020603050405020304" pitchFamily="18" charset="0"/>
+                          <a:cs typeface="Times New Roman" panose="02020603050405020304" pitchFamily="18" charset="0"/>
+                        </a:rPr>
+                        <a:t>+</a:t>
+                      </a:r>
+                      <a:endParaRPr lang="ru-RU" sz="2400" b="1" dirty="0">
+                        <a:latin typeface="Times New Roman" panose="02020603050405020304" pitchFamily="18" charset="0"/>
+                        <a:cs typeface="Times New Roman" panose="02020603050405020304" pitchFamily="18" charset="0"/>
+                      </a:endParaRPr>
+                    </a:p>
+                  </a:txBody>
+                  <a:tcPr/>
+                </a:tc>
+                <a:tc>
+                  <a:txBody>
+                    <a:bodyPr/>
+                    <a:lstStyle/>
+                    <a:p>
+                      <a:pPr algn="ctr"/>
+                      <a:r>
+                        <a:rPr lang="en-US" sz="2400" b="1" dirty="0">
+                          <a:latin typeface="Times New Roman" panose="02020603050405020304" pitchFamily="18" charset="0"/>
+                          <a:cs typeface="Times New Roman" panose="02020603050405020304" pitchFamily="18" charset="0"/>
+                        </a:rPr>
+                        <a:t>+</a:t>
+                      </a:r>
+                      <a:endParaRPr lang="ru-RU" sz="2400" b="1" dirty="0">
+                        <a:latin typeface="Times New Roman" panose="02020603050405020304" pitchFamily="18" charset="0"/>
+                        <a:cs typeface="Times New Roman" panose="02020603050405020304" pitchFamily="18" charset="0"/>
+                      </a:endParaRPr>
+                    </a:p>
+                  </a:txBody>
+                  <a:tcPr>
+                    <a:solidFill>
+                      <a:schemeClr val="accent6">
+                        <a:lumMod val="20000"/>
+                        <a:lumOff val="80000"/>
+                      </a:schemeClr>
+                    </a:solidFill>
+                  </a:tcPr>
+                </a:tc>
+                <a:extLst>
+                  <a:ext uri="{0D108BD9-81ED-4DB2-BD59-A6C34878D82A}">
+                    <a16:rowId xmlns:a16="http://schemas.microsoft.com/office/drawing/2014/main" val="3986946151"/>
+                  </a:ext>
+                </a:extLst>
+              </a:tr>
+              <a:tr h="881422">
+                <a:tc>
+                  <a:txBody>
+                    <a:bodyPr/>
+                    <a:lstStyle/>
+                    <a:p>
+                      <a:r>
+                        <a:rPr lang="ru-RU" dirty="0">
+                          <a:latin typeface="Times New Roman" panose="02020603050405020304" pitchFamily="18" charset="0"/>
+                          <a:cs typeface="Times New Roman" panose="02020603050405020304" pitchFamily="18" charset="0"/>
+                        </a:rPr>
+                        <a:t>Возможность создания перечисляемого типа</a:t>
+                      </a:r>
+                    </a:p>
+                  </a:txBody>
+                  <a:tcPr/>
+                </a:tc>
+                <a:tc>
+                  <a:txBody>
+                    <a:bodyPr/>
+                    <a:lstStyle/>
+                    <a:p>
+                      <a:pPr marL="0" marR="0" lvl="0" indent="0" algn="ctr" defTabSz="914400" rtl="0" eaLnBrk="1" fontAlgn="auto" latinLnBrk="0" hangingPunct="1">
+                        <a:lnSpc>
+                          <a:spcPct val="100000"/>
+                        </a:lnSpc>
+                        <a:spcBef>
+                          <a:spcPts val="0"/>
+                        </a:spcBef>
+                        <a:spcAft>
+                          <a:spcPts val="0"/>
+                        </a:spcAft>
+                        <a:buClrTx/>
+                        <a:buSzTx/>
+                        <a:buFontTx/>
+                        <a:buNone/>
+                        <a:tabLst/>
+                        <a:defRPr/>
+                      </a:pPr>
+                      <a:r>
+                        <a:rPr lang="ru-RU" sz="2400" b="1" dirty="0">
+                          <a:latin typeface="Times New Roman" panose="02020603050405020304" pitchFamily="18" charset="0"/>
+                          <a:cs typeface="Times New Roman" panose="02020603050405020304" pitchFamily="18" charset="0"/>
+                        </a:rPr>
+                        <a:t>–</a:t>
+                      </a:r>
+                    </a:p>
+                    <a:p>
+                      <a:pPr algn="ctr"/>
+                      <a:endParaRPr lang="ru-RU" sz="2400" b="1" dirty="0">
+                        <a:latin typeface="Times New Roman" panose="02020603050405020304" pitchFamily="18" charset="0"/>
+                        <a:cs typeface="Times New Roman" panose="02020603050405020304" pitchFamily="18" charset="0"/>
+                      </a:endParaRPr>
+                    </a:p>
+                  </a:txBody>
+                  <a:tcPr/>
+                </a:tc>
+                <a:tc>
+                  <a:txBody>
+                    <a:bodyPr/>
+                    <a:lstStyle/>
+                    <a:p>
+                      <a:pPr marL="0" marR="0" lvl="0" indent="0" algn="ctr" defTabSz="914400" rtl="0" eaLnBrk="1" fontAlgn="auto" latinLnBrk="0" hangingPunct="1">
+                        <a:lnSpc>
+                          <a:spcPct val="100000"/>
+                        </a:lnSpc>
+                        <a:spcBef>
+                          <a:spcPts val="0"/>
+                        </a:spcBef>
+                        <a:spcAft>
+                          <a:spcPts val="0"/>
+                        </a:spcAft>
+                        <a:buClrTx/>
+                        <a:buSzTx/>
+                        <a:buFontTx/>
+                        <a:buNone/>
+                        <a:tabLst/>
+                        <a:defRPr/>
+                      </a:pPr>
+                      <a:r>
+                        <a:rPr lang="ru-RU" sz="2400" b="1" dirty="0">
+                          <a:latin typeface="Times New Roman" panose="02020603050405020304" pitchFamily="18" charset="0"/>
+                          <a:cs typeface="Times New Roman" panose="02020603050405020304" pitchFamily="18" charset="0"/>
+                        </a:rPr>
+                        <a:t>–</a:t>
+                      </a:r>
+                    </a:p>
+                    <a:p>
+                      <a:pPr algn="ctr"/>
+                      <a:endParaRPr lang="ru-RU" sz="2400" b="1" dirty="0">
+                        <a:latin typeface="Times New Roman" panose="02020603050405020304" pitchFamily="18" charset="0"/>
+                        <a:cs typeface="Times New Roman" panose="02020603050405020304" pitchFamily="18" charset="0"/>
+                      </a:endParaRPr>
+                    </a:p>
+                  </a:txBody>
+                  <a:tcPr/>
+                </a:tc>
+                <a:tc>
+                  <a:txBody>
+                    <a:bodyPr/>
+                    <a:lstStyle/>
+                    <a:p>
+                      <a:pPr algn="ctr"/>
+                      <a:r>
+                        <a:rPr lang="en-US" sz="2400" b="1" dirty="0">
+                          <a:latin typeface="Times New Roman" panose="02020603050405020304" pitchFamily="18" charset="0"/>
+                          <a:cs typeface="Times New Roman" panose="02020603050405020304" pitchFamily="18" charset="0"/>
+                        </a:rPr>
+                        <a:t>+</a:t>
+                      </a:r>
+                      <a:endParaRPr lang="ru-RU" sz="2400" b="1" dirty="0">
+                        <a:latin typeface="Times New Roman" panose="02020603050405020304" pitchFamily="18" charset="0"/>
+                        <a:cs typeface="Times New Roman" panose="02020603050405020304" pitchFamily="18" charset="0"/>
+                      </a:endParaRPr>
+                    </a:p>
+                  </a:txBody>
+                  <a:tcPr/>
+                </a:tc>
+                <a:tc>
+                  <a:txBody>
+                    <a:bodyPr/>
+                    <a:lstStyle/>
+                    <a:p>
+                      <a:pPr algn="ctr"/>
+                      <a:r>
+                        <a:rPr lang="en-US" sz="2400" b="1" dirty="0">
+                          <a:latin typeface="Times New Roman" panose="02020603050405020304" pitchFamily="18" charset="0"/>
+                          <a:cs typeface="Times New Roman" panose="02020603050405020304" pitchFamily="18" charset="0"/>
+                        </a:rPr>
+                        <a:t>+</a:t>
+                      </a:r>
+                      <a:endParaRPr lang="ru-RU" sz="2400" b="1" dirty="0">
+                        <a:latin typeface="Times New Roman" panose="02020603050405020304" pitchFamily="18" charset="0"/>
+                        <a:cs typeface="Times New Roman" panose="02020603050405020304" pitchFamily="18" charset="0"/>
+                      </a:endParaRPr>
+                    </a:p>
+                  </a:txBody>
+                  <a:tcPr>
+                    <a:solidFill>
+                      <a:schemeClr val="accent6">
+                        <a:lumMod val="20000"/>
+                        <a:lumOff val="80000"/>
+                      </a:schemeClr>
+                    </a:solidFill>
+                  </a:tcPr>
+                </a:tc>
+                <a:extLst>
+                  <a:ext uri="{0D108BD9-81ED-4DB2-BD59-A6C34878D82A}">
+                    <a16:rowId xmlns:a16="http://schemas.microsoft.com/office/drawing/2014/main" val="3044166014"/>
+                  </a:ext>
+                </a:extLst>
+              </a:tr>
+              <a:tr h="883569">
+                <a:tc>
+                  <a:txBody>
+                    <a:bodyPr/>
+                    <a:lstStyle/>
+                    <a:p>
+                      <a:r>
+                        <a:rPr lang="ru-RU" dirty="0">
+                          <a:latin typeface="Times New Roman" panose="02020603050405020304" pitchFamily="18" charset="0"/>
+                          <a:cs typeface="Times New Roman" panose="02020603050405020304" pitchFamily="18" charset="0"/>
+                        </a:rPr>
+                        <a:t>Открытость исходного кода</a:t>
+                      </a:r>
+                    </a:p>
+                  </a:txBody>
+                  <a:tcPr/>
+                </a:tc>
+                <a:tc>
+                  <a:txBody>
+                    <a:bodyPr/>
+                    <a:lstStyle/>
+                    <a:p>
+                      <a:pPr algn="ctr"/>
+                      <a:r>
+                        <a:rPr lang="en-US" sz="2400" b="1" dirty="0">
+                          <a:latin typeface="Times New Roman" panose="02020603050405020304" pitchFamily="18" charset="0"/>
+                          <a:cs typeface="Times New Roman" panose="02020603050405020304" pitchFamily="18" charset="0"/>
+                        </a:rPr>
+                        <a:t>+</a:t>
+                      </a:r>
+                      <a:endParaRPr lang="ru-RU" sz="2400" b="1" dirty="0">
+                        <a:latin typeface="Times New Roman" panose="02020603050405020304" pitchFamily="18" charset="0"/>
+                        <a:cs typeface="Times New Roman" panose="02020603050405020304" pitchFamily="18" charset="0"/>
+                      </a:endParaRPr>
+                    </a:p>
+                  </a:txBody>
+                  <a:tcPr/>
+                </a:tc>
+                <a:tc>
+                  <a:txBody>
+                    <a:bodyPr/>
+                    <a:lstStyle/>
+                    <a:p>
+                      <a:pPr marL="0" marR="0" lvl="0" indent="0" algn="ctr" defTabSz="914400" rtl="0" eaLnBrk="1" fontAlgn="auto" latinLnBrk="0" hangingPunct="1">
+                        <a:lnSpc>
+                          <a:spcPct val="100000"/>
+                        </a:lnSpc>
+                        <a:spcBef>
+                          <a:spcPts val="0"/>
+                        </a:spcBef>
+                        <a:spcAft>
+                          <a:spcPts val="0"/>
+                        </a:spcAft>
+                        <a:buClrTx/>
+                        <a:buSzTx/>
+                        <a:buFontTx/>
+                        <a:buNone/>
+                        <a:tabLst/>
+                        <a:defRPr/>
+                      </a:pPr>
+                      <a:r>
+                        <a:rPr lang="ru-RU" sz="2400" b="1" dirty="0">
+                          <a:latin typeface="Times New Roman" panose="02020603050405020304" pitchFamily="18" charset="0"/>
+                          <a:cs typeface="Times New Roman" panose="02020603050405020304" pitchFamily="18" charset="0"/>
+                        </a:rPr>
+                        <a:t>–</a:t>
+                      </a:r>
+                    </a:p>
+                    <a:p>
+                      <a:pPr algn="ctr"/>
+                      <a:endParaRPr lang="ru-RU" sz="2400" b="1" dirty="0">
+                        <a:latin typeface="Times New Roman" panose="02020603050405020304" pitchFamily="18" charset="0"/>
+                        <a:cs typeface="Times New Roman" panose="02020603050405020304" pitchFamily="18" charset="0"/>
+                      </a:endParaRPr>
+                    </a:p>
+                  </a:txBody>
+                  <a:tcPr/>
+                </a:tc>
+                <a:tc>
+                  <a:txBody>
+                    <a:bodyPr/>
+                    <a:lstStyle/>
+                    <a:p>
+                      <a:pPr marL="0" marR="0" lvl="0" indent="0" algn="ctr" defTabSz="914400" rtl="0" eaLnBrk="1" fontAlgn="auto" latinLnBrk="0" hangingPunct="1">
+                        <a:lnSpc>
+                          <a:spcPct val="100000"/>
+                        </a:lnSpc>
+                        <a:spcBef>
+                          <a:spcPts val="0"/>
+                        </a:spcBef>
+                        <a:spcAft>
+                          <a:spcPts val="0"/>
+                        </a:spcAft>
+                        <a:buClrTx/>
+                        <a:buSzTx/>
+                        <a:buFontTx/>
+                        <a:buNone/>
+                        <a:tabLst/>
+                        <a:defRPr/>
+                      </a:pPr>
+                      <a:r>
+                        <a:rPr lang="ru-RU" sz="2400" b="1" dirty="0">
+                          <a:latin typeface="Times New Roman" panose="02020603050405020304" pitchFamily="18" charset="0"/>
+                          <a:cs typeface="Times New Roman" panose="02020603050405020304" pitchFamily="18" charset="0"/>
+                        </a:rPr>
+                        <a:t>–</a:t>
+                      </a:r>
+                    </a:p>
+                  </a:txBody>
+                  <a:tcPr/>
+                </a:tc>
+                <a:tc>
+                  <a:txBody>
+                    <a:bodyPr/>
+                    <a:lstStyle/>
+                    <a:p>
+                      <a:pPr algn="ctr"/>
+                      <a:r>
+                        <a:rPr lang="en-US" sz="2400" b="1" dirty="0">
+                          <a:latin typeface="Times New Roman" panose="02020603050405020304" pitchFamily="18" charset="0"/>
+                          <a:cs typeface="Times New Roman" panose="02020603050405020304" pitchFamily="18" charset="0"/>
+                        </a:rPr>
+                        <a:t>+</a:t>
+                      </a:r>
+                      <a:endParaRPr lang="ru-RU" sz="2400" b="1" dirty="0">
+                        <a:latin typeface="Times New Roman" panose="02020603050405020304" pitchFamily="18" charset="0"/>
+                        <a:cs typeface="Times New Roman" panose="02020603050405020304" pitchFamily="18" charset="0"/>
+                      </a:endParaRPr>
+                    </a:p>
+                  </a:txBody>
+                  <a:tcPr>
+                    <a:solidFill>
+                      <a:schemeClr val="accent6">
+                        <a:lumMod val="20000"/>
+                        <a:lumOff val="80000"/>
+                      </a:schemeClr>
+                    </a:solidFill>
+                  </a:tcPr>
+                </a:tc>
+                <a:extLst>
+                  <a:ext uri="{0D108BD9-81ED-4DB2-BD59-A6C34878D82A}">
+                    <a16:rowId xmlns:a16="http://schemas.microsoft.com/office/drawing/2014/main" val="2579086937"/>
+                  </a:ext>
+                </a:extLst>
+              </a:tr>
+              <a:tr h="888937">
+                <a:tc>
+                  <a:txBody>
+                    <a:bodyPr/>
+                    <a:lstStyle/>
+                    <a:p>
+                      <a:r>
+                        <a:rPr lang="ru-RU" dirty="0">
+                          <a:latin typeface="Times New Roman" panose="02020603050405020304" pitchFamily="18" charset="0"/>
+                          <a:cs typeface="Times New Roman" panose="02020603050405020304" pitchFamily="18" charset="0"/>
+                        </a:rPr>
+                        <a:t>Возможность обработки ошибок в хранимых процедурах</a:t>
+                      </a:r>
+                    </a:p>
+                  </a:txBody>
+                  <a:tcPr/>
+                </a:tc>
+                <a:tc>
+                  <a:txBody>
+                    <a:bodyPr/>
+                    <a:lstStyle/>
+                    <a:p>
+                      <a:pPr marL="0" marR="0" lvl="0" indent="0" algn="ctr" defTabSz="914400" rtl="0" eaLnBrk="1" fontAlgn="auto" latinLnBrk="0" hangingPunct="1">
+                        <a:lnSpc>
+                          <a:spcPct val="100000"/>
+                        </a:lnSpc>
+                        <a:spcBef>
+                          <a:spcPts val="0"/>
+                        </a:spcBef>
+                        <a:spcAft>
+                          <a:spcPts val="0"/>
+                        </a:spcAft>
+                        <a:buClrTx/>
+                        <a:buSzTx/>
+                        <a:buFontTx/>
+                        <a:buNone/>
+                        <a:tabLst/>
+                        <a:defRPr/>
+                      </a:pPr>
+                      <a:r>
+                        <a:rPr lang="ru-RU" sz="2400" b="1" dirty="0">
+                          <a:latin typeface="Times New Roman" panose="02020603050405020304" pitchFamily="18" charset="0"/>
+                          <a:cs typeface="Times New Roman" panose="02020603050405020304" pitchFamily="18" charset="0"/>
+                        </a:rPr>
+                        <a:t>–</a:t>
+                      </a:r>
+                    </a:p>
+                    <a:p>
+                      <a:pPr algn="ctr"/>
+                      <a:endParaRPr lang="ru-RU" sz="2400" b="1" dirty="0">
+                        <a:latin typeface="Times New Roman" panose="02020603050405020304" pitchFamily="18" charset="0"/>
+                        <a:cs typeface="Times New Roman" panose="02020603050405020304" pitchFamily="18" charset="0"/>
+                      </a:endParaRPr>
+                    </a:p>
+                  </a:txBody>
+                  <a:tcPr/>
+                </a:tc>
+                <a:tc>
+                  <a:txBody>
+                    <a:bodyPr/>
+                    <a:lstStyle/>
+                    <a:p>
+                      <a:pPr algn="ctr"/>
+                      <a:r>
+                        <a:rPr lang="en-US" sz="2400" b="1" dirty="0">
+                          <a:latin typeface="Times New Roman" panose="02020603050405020304" pitchFamily="18" charset="0"/>
+                          <a:cs typeface="Times New Roman" panose="02020603050405020304" pitchFamily="18" charset="0"/>
+                        </a:rPr>
+                        <a:t>+</a:t>
+                      </a:r>
+                      <a:endParaRPr lang="ru-RU" sz="2400" b="1" dirty="0">
+                        <a:latin typeface="Times New Roman" panose="02020603050405020304" pitchFamily="18" charset="0"/>
+                        <a:cs typeface="Times New Roman" panose="02020603050405020304" pitchFamily="18" charset="0"/>
+                      </a:endParaRPr>
+                    </a:p>
+                  </a:txBody>
+                  <a:tcPr/>
+                </a:tc>
+                <a:tc>
+                  <a:txBody>
+                    <a:bodyPr/>
+                    <a:lstStyle/>
+                    <a:p>
+                      <a:pPr algn="ctr"/>
+                      <a:r>
+                        <a:rPr lang="en-US" sz="2400" b="1" dirty="0">
+                          <a:latin typeface="Times New Roman" panose="02020603050405020304" pitchFamily="18" charset="0"/>
+                          <a:cs typeface="Times New Roman" panose="02020603050405020304" pitchFamily="18" charset="0"/>
+                        </a:rPr>
+                        <a:t>+</a:t>
+                      </a:r>
+                      <a:endParaRPr lang="ru-RU" sz="2400" b="1" dirty="0">
+                        <a:latin typeface="Times New Roman" panose="02020603050405020304" pitchFamily="18" charset="0"/>
+                        <a:cs typeface="Times New Roman" panose="02020603050405020304" pitchFamily="18" charset="0"/>
+                      </a:endParaRPr>
+                    </a:p>
+                  </a:txBody>
+                  <a:tcPr/>
+                </a:tc>
+                <a:tc>
+                  <a:txBody>
+                    <a:bodyPr/>
+                    <a:lstStyle/>
+                    <a:p>
+                      <a:pPr algn="ctr"/>
+                      <a:r>
+                        <a:rPr lang="en-US" sz="2400" b="1" dirty="0">
+                          <a:latin typeface="Times New Roman" panose="02020603050405020304" pitchFamily="18" charset="0"/>
+                          <a:cs typeface="Times New Roman" panose="02020603050405020304" pitchFamily="18" charset="0"/>
+                        </a:rPr>
+                        <a:t>+</a:t>
+                      </a:r>
+                      <a:endParaRPr lang="ru-RU" sz="2400" b="1" dirty="0">
+                        <a:latin typeface="Times New Roman" panose="02020603050405020304" pitchFamily="18" charset="0"/>
+                        <a:cs typeface="Times New Roman" panose="02020603050405020304" pitchFamily="18" charset="0"/>
+                      </a:endParaRPr>
+                    </a:p>
+                  </a:txBody>
+                  <a:tcPr>
+                    <a:solidFill>
+                      <a:schemeClr val="accent6">
+                        <a:lumMod val="20000"/>
+                        <a:lumOff val="80000"/>
+                      </a:schemeClr>
+                    </a:solidFill>
+                  </a:tcPr>
+                </a:tc>
+                <a:extLst>
+                  <a:ext uri="{0D108BD9-81ED-4DB2-BD59-A6C34878D82A}">
+                    <a16:rowId xmlns:a16="http://schemas.microsoft.com/office/drawing/2014/main" val="2088648265"/>
+                  </a:ext>
+                </a:extLst>
+              </a:tr>
+            </a:tbl>
+          </a:graphicData>
+        </a:graphic>
+      </p:graphicFrame>
     </p:spTree>
     <p:extLst>
       <p:ext uri="{BB962C8B-B14F-4D97-AF65-F5344CB8AC3E}">
-        <p14:creationId xmlns:p14="http://schemas.microsoft.com/office/powerpoint/2010/main" val="2359330613"/>
+        <p14:creationId xmlns:p14="http://schemas.microsoft.com/office/powerpoint/2010/main" val="2209706716"/>
       </p:ext>
     </p:extLst>
   </p:cSld>

</xml_diff>

<commit_message>
Tweaked report a bit!
</commit_message>
<xml_diff>
--- a/docs/presentation.pptx
+++ b/docs/presentation.pptx
@@ -5,26 +5,25 @@
     <p:sldMasterId id="2147483648" r:id="rId1"/>
   </p:sldMasterIdLst>
   <p:notesMasterIdLst>
-    <p:notesMasterId r:id="rId19"/>
+    <p:notesMasterId r:id="rId18"/>
   </p:notesMasterIdLst>
   <p:sldIdLst>
     <p:sldId id="256" r:id="rId2"/>
-    <p:sldId id="257" r:id="rId3"/>
-    <p:sldId id="280" r:id="rId4"/>
+    <p:sldId id="280" r:id="rId3"/>
+    <p:sldId id="286" r:id="rId4"/>
     <p:sldId id="275" r:id="rId5"/>
-    <p:sldId id="282" r:id="rId6"/>
-    <p:sldId id="277" r:id="rId7"/>
-    <p:sldId id="274" r:id="rId8"/>
-    <p:sldId id="276" r:id="rId9"/>
-    <p:sldId id="284" r:id="rId10"/>
-    <p:sldId id="273" r:id="rId11"/>
-    <p:sldId id="283" r:id="rId12"/>
-    <p:sldId id="281" r:id="rId13"/>
-    <p:sldId id="263" r:id="rId14"/>
-    <p:sldId id="268" r:id="rId15"/>
-    <p:sldId id="265" r:id="rId16"/>
-    <p:sldId id="259" r:id="rId17"/>
-    <p:sldId id="279" r:id="rId18"/>
+    <p:sldId id="277" r:id="rId6"/>
+    <p:sldId id="274" r:id="rId7"/>
+    <p:sldId id="276" r:id="rId8"/>
+    <p:sldId id="284" r:id="rId9"/>
+    <p:sldId id="273" r:id="rId10"/>
+    <p:sldId id="283" r:id="rId11"/>
+    <p:sldId id="281" r:id="rId12"/>
+    <p:sldId id="263" r:id="rId13"/>
+    <p:sldId id="268" r:id="rId14"/>
+    <p:sldId id="265" r:id="rId15"/>
+    <p:sldId id="259" r:id="rId16"/>
+    <p:sldId id="279" r:id="rId17"/>
   </p:sldIdLst>
   <p:sldSz cx="12192000" cy="6858000"/>
   <p:notesSz cx="6858000" cy="9144000"/>
@@ -143,6 +142,174 @@
 </p:cmAuthorLst>
 </file>
 
+<file path=ppt/revisionInfo.xml><?xml version="1.0" encoding="utf-8"?>
+<p1510:revInfo xmlns:a="http://schemas.openxmlformats.org/drawingml/2006/main" xmlns:r="http://schemas.openxmlformats.org/officeDocument/2006/relationships" xmlns:p1510="http://schemas.microsoft.com/office/powerpoint/2015/10/main">
+  <p1510:revLst>
+    <p1510:client id="{4BC0ABBF-456B-4472-B495-7EB550D5A902}" v="574" dt="2025-05-25T15:10:21.529"/>
+    <p1510:client id="{7041E5E5-EE3C-44A3-9787-64179E90252B}" v="11" dt="2025-05-25T15:18:21.379"/>
+  </p1510:revLst>
+</p1510:revInfo>
+</file>
+
+<file path=ppt/changesInfos/changesInfo1.xml><?xml version="1.0" encoding="utf-8"?>
+<pc:chgInfo xmlns:a="http://schemas.openxmlformats.org/drawingml/2006/main" xmlns:r="http://schemas.openxmlformats.org/officeDocument/2006/relationships" xmlns:ac="http://schemas.microsoft.com/office/drawing/2013/main/command" xmlns:pc="http://schemas.microsoft.com/office/powerpoint/2013/main/command">
+  <pc:docChgLst>
+    <pc:chgData name="Прошин Илья" userId="60ada7c1f26a7b85" providerId="Windows Live" clId="Web-{4BC0ABBF-456B-4472-B495-7EB550D5A902}"/>
+    <pc:docChg chg="addSld delSld modSld sldOrd">
+      <pc:chgData name="Прошин Илья" userId="60ada7c1f26a7b85" providerId="Windows Live" clId="Web-{4BC0ABBF-456B-4472-B495-7EB550D5A902}" dt="2025-05-25T15:10:21.529" v="553" actId="20577"/>
+      <pc:docMkLst>
+        <pc:docMk/>
+      </pc:docMkLst>
+      <pc:sldChg chg="del">
+        <pc:chgData name="Прошин Илья" userId="60ada7c1f26a7b85" providerId="Windows Live" clId="Web-{4BC0ABBF-456B-4472-B495-7EB550D5A902}" dt="2025-05-25T14:50:30.376" v="43"/>
+        <pc:sldMkLst>
+          <pc:docMk/>
+          <pc:sldMk cId="2896526663" sldId="257"/>
+        </pc:sldMkLst>
+      </pc:sldChg>
+      <pc:sldChg chg="addSp delSp modSp">
+        <pc:chgData name="Прошин Илья" userId="60ada7c1f26a7b85" providerId="Windows Live" clId="Web-{4BC0ABBF-456B-4472-B495-7EB550D5A902}" dt="2025-05-25T14:53:20.976" v="121" actId="20577"/>
+        <pc:sldMkLst>
+          <pc:docMk/>
+          <pc:sldMk cId="4190043490" sldId="277"/>
+        </pc:sldMkLst>
+        <pc:spChg chg="add mod">
+          <ac:chgData name="Прошин Илья" userId="60ada7c1f26a7b85" providerId="Windows Live" clId="Web-{4BC0ABBF-456B-4472-B495-7EB550D5A902}" dt="2025-05-25T14:53:20.976" v="121" actId="20577"/>
+          <ac:spMkLst>
+            <pc:docMk/>
+            <pc:sldMk cId="4190043490" sldId="277"/>
+            <ac:spMk id="4" creationId="{F5E630B3-D887-9F42-6565-C01B070442BC}"/>
+          </ac:spMkLst>
+        </pc:spChg>
+        <pc:picChg chg="del mod">
+          <ac:chgData name="Прошин Илья" userId="60ada7c1f26a7b85" providerId="Windows Live" clId="Web-{4BC0ABBF-456B-4472-B495-7EB550D5A902}" dt="2025-05-25T14:52:33.615" v="76"/>
+          <ac:picMkLst>
+            <pc:docMk/>
+            <pc:sldMk cId="4190043490" sldId="277"/>
+            <ac:picMk id="6" creationId="{651DCA9C-1738-5F6D-4C2D-5355DE525AC7}"/>
+          </ac:picMkLst>
+        </pc:picChg>
+        <pc:picChg chg="add mod">
+          <ac:chgData name="Прошин Илья" userId="60ada7c1f26a7b85" providerId="Windows Live" clId="Web-{4BC0ABBF-456B-4472-B495-7EB550D5A902}" dt="2025-05-25T14:53:00.881" v="81" actId="1076"/>
+          <ac:picMkLst>
+            <pc:docMk/>
+            <pc:sldMk cId="4190043490" sldId="277"/>
+            <ac:picMk id="7" creationId="{DB8E660A-5147-C1FA-3BD9-5664A3DAEDFD}"/>
+          </ac:picMkLst>
+        </pc:picChg>
+      </pc:sldChg>
+      <pc:sldChg chg="modSp">
+        <pc:chgData name="Прошин Илья" userId="60ada7c1f26a7b85" providerId="Windows Live" clId="Web-{4BC0ABBF-456B-4472-B495-7EB550D5A902}" dt="2025-05-25T15:10:21.529" v="553" actId="20577"/>
+        <pc:sldMkLst>
+          <pc:docMk/>
+          <pc:sldMk cId="3170820330" sldId="280"/>
+        </pc:sldMkLst>
+        <pc:spChg chg="mod">
+          <ac:chgData name="Прошин Илья" userId="60ada7c1f26a7b85" providerId="Windows Live" clId="Web-{4BC0ABBF-456B-4472-B495-7EB550D5A902}" dt="2025-05-25T15:10:21.529" v="553" actId="20577"/>
+          <ac:spMkLst>
+            <pc:docMk/>
+            <pc:sldMk cId="3170820330" sldId="280"/>
+            <ac:spMk id="3" creationId="{AF83107B-6B63-2332-749B-C61A7EA10A89}"/>
+          </ac:spMkLst>
+        </pc:spChg>
+      </pc:sldChg>
+      <pc:sldChg chg="del">
+        <pc:chgData name="Прошин Илья" userId="60ada7c1f26a7b85" providerId="Windows Live" clId="Web-{4BC0ABBF-456B-4472-B495-7EB550D5A902}" dt="2025-05-25T14:53:29.382" v="122"/>
+        <pc:sldMkLst>
+          <pc:docMk/>
+          <pc:sldMk cId="2691422830" sldId="282"/>
+        </pc:sldMkLst>
+      </pc:sldChg>
+      <pc:sldChg chg="modSp add del ord replId">
+        <pc:chgData name="Прошин Илья" userId="60ada7c1f26a7b85" providerId="Windows Live" clId="Web-{4BC0ABBF-456B-4472-B495-7EB550D5A902}" dt="2025-05-25T14:50:40.626" v="56"/>
+        <pc:sldMkLst>
+          <pc:docMk/>
+          <pc:sldMk cId="3188777065" sldId="285"/>
+        </pc:sldMkLst>
+        <pc:spChg chg="mod">
+          <ac:chgData name="Прошин Илья" userId="60ada7c1f26a7b85" providerId="Windows Live" clId="Web-{4BC0ABBF-456B-4472-B495-7EB550D5A902}" dt="2025-05-25T14:50:09.688" v="41" actId="20577"/>
+          <ac:spMkLst>
+            <pc:docMk/>
+            <pc:sldMk cId="3188777065" sldId="285"/>
+            <ac:spMk id="2" creationId="{DADB2B01-56B0-EBA7-AE2E-2BD428468591}"/>
+          </ac:spMkLst>
+        </pc:spChg>
+      </pc:sldChg>
+      <pc:sldChg chg="modSp add del replId">
+        <pc:chgData name="Прошин Илья" userId="60ada7c1f26a7b85" providerId="Windows Live" clId="Web-{4BC0ABBF-456B-4472-B495-7EB550D5A902}" dt="2025-05-25T14:49:53.968" v="25"/>
+        <pc:sldMkLst>
+          <pc:docMk/>
+          <pc:sldMk cId="3687091355" sldId="285"/>
+        </pc:sldMkLst>
+        <pc:spChg chg="mod">
+          <ac:chgData name="Прошин Илья" userId="60ada7c1f26a7b85" providerId="Windows Live" clId="Web-{4BC0ABBF-456B-4472-B495-7EB550D5A902}" dt="2025-05-25T14:49:28.655" v="14" actId="20577"/>
+          <ac:spMkLst>
+            <pc:docMk/>
+            <pc:sldMk cId="3687091355" sldId="285"/>
+            <ac:spMk id="2" creationId="{8B1CF3AC-A514-EF53-C207-506236F36F26}"/>
+          </ac:spMkLst>
+        </pc:spChg>
+        <pc:graphicFrameChg chg="mod modGraphic">
+          <ac:chgData name="Прошин Илья" userId="60ada7c1f26a7b85" providerId="Windows Live" clId="Web-{4BC0ABBF-456B-4472-B495-7EB550D5A902}" dt="2025-05-25T14:49:38.108" v="24"/>
+          <ac:graphicFrameMkLst>
+            <pc:docMk/>
+            <pc:sldMk cId="3687091355" sldId="285"/>
+            <ac:graphicFrameMk id="3" creationId="{473C7967-4CAD-E057-62C5-70C774D05833}"/>
+          </ac:graphicFrameMkLst>
+        </pc:graphicFrameChg>
+      </pc:sldChg>
+      <pc:sldChg chg="modSp add ord replId">
+        <pc:chgData name="Прошин Илья" userId="60ada7c1f26a7b85" providerId="Windows Live" clId="Web-{4BC0ABBF-456B-4472-B495-7EB550D5A902}" dt="2025-05-25T14:59:00.316" v="442"/>
+        <pc:sldMkLst>
+          <pc:docMk/>
+          <pc:sldMk cId="1297527811" sldId="286"/>
+        </pc:sldMkLst>
+        <pc:spChg chg="mod">
+          <ac:chgData name="Прошин Илья" userId="60ada7c1f26a7b85" providerId="Windows Live" clId="Web-{4BC0ABBF-456B-4472-B495-7EB550D5A902}" dt="2025-05-25T14:50:38.486" v="55" actId="20577"/>
+          <ac:spMkLst>
+            <pc:docMk/>
+            <pc:sldMk cId="1297527811" sldId="286"/>
+            <ac:spMk id="2" creationId="{320C03E9-4032-F4B7-1782-7BD2E1F3A295}"/>
+          </ac:spMkLst>
+        </pc:spChg>
+        <pc:graphicFrameChg chg="mod modGraphic">
+          <ac:chgData name="Прошин Илья" userId="60ada7c1f26a7b85" providerId="Windows Live" clId="Web-{4BC0ABBF-456B-4472-B495-7EB550D5A902}" dt="2025-05-25T14:59:00.316" v="442"/>
+          <ac:graphicFrameMkLst>
+            <pc:docMk/>
+            <pc:sldMk cId="1297527811" sldId="286"/>
+            <ac:graphicFrameMk id="7" creationId="{6AF2A19C-FAF2-EF29-50E0-0F9598B5B757}"/>
+          </ac:graphicFrameMkLst>
+        </pc:graphicFrameChg>
+      </pc:sldChg>
+    </pc:docChg>
+  </pc:docChgLst>
+  <pc:docChgLst>
+    <pc:chgData name="Прошин Илья" userId="60ada7c1f26a7b85" providerId="Windows Live" clId="Web-{7041E5E5-EE3C-44A3-9787-64179E90252B}"/>
+    <pc:docChg chg="modSld">
+      <pc:chgData name="Прошин Илья" userId="60ada7c1f26a7b85" providerId="Windows Live" clId="Web-{7041E5E5-EE3C-44A3-9787-64179E90252B}" dt="2025-05-25T15:18:21.379" v="10" actId="20577"/>
+      <pc:docMkLst>
+        <pc:docMk/>
+      </pc:docMkLst>
+      <pc:sldChg chg="modSp">
+        <pc:chgData name="Прошин Илья" userId="60ada7c1f26a7b85" providerId="Windows Live" clId="Web-{7041E5E5-EE3C-44A3-9787-64179E90252B}" dt="2025-05-25T15:18:21.379" v="10" actId="20577"/>
+        <pc:sldMkLst>
+          <pc:docMk/>
+          <pc:sldMk cId="1603582799" sldId="281"/>
+        </pc:sldMkLst>
+        <pc:spChg chg="mod">
+          <ac:chgData name="Прошин Илья" userId="60ada7c1f26a7b85" providerId="Windows Live" clId="Web-{7041E5E5-EE3C-44A3-9787-64179E90252B}" dt="2025-05-25T15:18:21.379" v="10" actId="20577"/>
+          <ac:spMkLst>
+            <pc:docMk/>
+            <pc:sldMk cId="1603582799" sldId="281"/>
+            <ac:spMk id="5" creationId="{A4B8ACC1-5964-CBDC-73EF-B393800B07CE}"/>
+          </ac:spMkLst>
+        </pc:spChg>
+      </pc:sldChg>
+    </pc:docChg>
+  </pc:docChgLst>
+</pc:chgInfo>
+</file>
+
 <file path=ppt/notesMasters/notesMaster1.xml><?xml version="1.0" encoding="utf-8"?>
 <p:notesMaster xmlns:a="http://schemas.openxmlformats.org/drawingml/2006/main" xmlns:r="http://schemas.openxmlformats.org/officeDocument/2006/relationships" xmlns:p="http://schemas.openxmlformats.org/presentationml/2006/main">
   <p:cSld>
@@ -225,7 +392,7 @@
           <a:p>
             <a:fld id="{7BC6DE02-9070-4391-A9E5-20FBA5D71A5D}" type="datetimeFigureOut">
               <a:rPr lang="ru-RU" smtClean="0"/>
-              <a:t>24.05.2025</a:t>
+              <a:t>25.05.2025</a:t>
             </a:fld>
             <a:endParaRPr lang="ru-RU"/>
           </a:p>
@@ -557,7 +724,7 @@
           <a:p>
             <a:fld id="{BC0E1A58-9EB9-4B1E-BEA5-AC525CF5DADF}" type="slidenum">
               <a:rPr lang="ru-RU" smtClean="0"/>
-              <a:t>13</a:t>
+              <a:t>12</a:t>
             </a:fld>
             <a:endParaRPr lang="ru-RU"/>
           </a:p>
@@ -641,7 +808,7 @@
           <a:p>
             <a:fld id="{BC0E1A58-9EB9-4B1E-BEA5-AC525CF5DADF}" type="slidenum">
               <a:rPr lang="ru-RU" smtClean="0"/>
-              <a:t>14</a:t>
+              <a:t>13</a:t>
             </a:fld>
             <a:endParaRPr lang="ru-RU"/>
           </a:p>
@@ -725,7 +892,7 @@
           <a:p>
             <a:fld id="{BC0E1A58-9EB9-4B1E-BEA5-AC525CF5DADF}" type="slidenum">
               <a:rPr lang="ru-RU" smtClean="0"/>
-              <a:t>15</a:t>
+              <a:t>14</a:t>
             </a:fld>
             <a:endParaRPr lang="ru-RU"/>
           </a:p>
@@ -833,7 +1000,7 @@
           <a:p>
             <a:fld id="{BC0E1A58-9EB9-4B1E-BEA5-AC525CF5DADF}" type="slidenum">
               <a:rPr lang="ru-RU" smtClean="0"/>
-              <a:t>17</a:t>
+              <a:t>16</a:t>
             </a:fld>
             <a:endParaRPr lang="ru-RU"/>
           </a:p>
@@ -999,7 +1166,7 @@
           <a:p>
             <a:fld id="{A1439A60-659B-42DB-BB0F-7ED87733A23E}" type="datetime1">
               <a:rPr lang="ru-RU" smtClean="0"/>
-              <a:t>24.05.2025</a:t>
+              <a:t>25.05.2025</a:t>
             </a:fld>
             <a:endParaRPr lang="ru-RU"/>
           </a:p>
@@ -1197,7 +1364,7 @@
           <a:p>
             <a:fld id="{D61B71B4-54FB-40B8-90DD-279781B0C38D}" type="datetime1">
               <a:rPr lang="ru-RU" smtClean="0"/>
-              <a:t>24.05.2025</a:t>
+              <a:t>25.05.2025</a:t>
             </a:fld>
             <a:endParaRPr lang="ru-RU"/>
           </a:p>
@@ -1405,7 +1572,7 @@
           <a:p>
             <a:fld id="{2D090295-5DD3-4456-8BDB-FA7FF8949F97}" type="datetime1">
               <a:rPr lang="ru-RU" smtClean="0"/>
-              <a:t>24.05.2025</a:t>
+              <a:t>25.05.2025</a:t>
             </a:fld>
             <a:endParaRPr lang="ru-RU"/>
           </a:p>
@@ -1603,7 +1770,7 @@
           <a:p>
             <a:fld id="{D7B5F5C0-A8AD-4E24-BFA5-3353364AFE30}" type="datetime1">
               <a:rPr lang="ru-RU" smtClean="0"/>
-              <a:t>24.05.2025</a:t>
+              <a:t>25.05.2025</a:t>
             </a:fld>
             <a:endParaRPr lang="ru-RU"/>
           </a:p>
@@ -1886,7 +2053,7 @@
           <a:p>
             <a:fld id="{6A2AEECD-1031-4CBC-A778-E91CBA3F92A4}" type="datetime1">
               <a:rPr lang="ru-RU" smtClean="0"/>
-              <a:t>24.05.2025</a:t>
+              <a:t>25.05.2025</a:t>
             </a:fld>
             <a:endParaRPr lang="ru-RU"/>
           </a:p>
@@ -2151,7 +2318,7 @@
           <a:p>
             <a:fld id="{8E5B82EB-9FE1-42D5-8640-685632266EB2}" type="datetime1">
               <a:rPr lang="ru-RU" smtClean="0"/>
-              <a:t>24.05.2025</a:t>
+              <a:t>25.05.2025</a:t>
             </a:fld>
             <a:endParaRPr lang="ru-RU"/>
           </a:p>
@@ -2563,7 +2730,7 @@
           <a:p>
             <a:fld id="{A33273D1-BF9D-4402-A07A-C11263F81ACA}" type="datetime1">
               <a:rPr lang="ru-RU" smtClean="0"/>
-              <a:t>24.05.2025</a:t>
+              <a:t>25.05.2025</a:t>
             </a:fld>
             <a:endParaRPr lang="ru-RU"/>
           </a:p>
@@ -2704,7 +2871,7 @@
           <a:p>
             <a:fld id="{C10D7C68-AD43-4338-B6C7-4798ABAED37C}" type="datetime1">
               <a:rPr lang="ru-RU" smtClean="0"/>
-              <a:t>24.05.2025</a:t>
+              <a:t>25.05.2025</a:t>
             </a:fld>
             <a:endParaRPr lang="ru-RU"/>
           </a:p>
@@ -2817,7 +2984,7 @@
           <a:p>
             <a:fld id="{04A09544-4DCC-4E50-BBA1-0EB924E42FB5}" type="datetime1">
               <a:rPr lang="ru-RU" smtClean="0"/>
-              <a:t>24.05.2025</a:t>
+              <a:t>25.05.2025</a:t>
             </a:fld>
             <a:endParaRPr lang="ru-RU"/>
           </a:p>
@@ -3128,7 +3295,7 @@
           <a:p>
             <a:fld id="{B44A15D2-7284-412E-B86C-C8BE76838BC3}" type="datetime1">
               <a:rPr lang="ru-RU" smtClean="0"/>
-              <a:t>24.05.2025</a:t>
+              <a:t>25.05.2025</a:t>
             </a:fld>
             <a:endParaRPr lang="ru-RU"/>
           </a:p>
@@ -3416,7 +3583,7 @@
           <a:p>
             <a:fld id="{4A4A6565-B229-48CB-B9AB-84026305D07B}" type="datetime1">
               <a:rPr lang="ru-RU" smtClean="0"/>
-              <a:t>24.05.2025</a:t>
+              <a:t>25.05.2025</a:t>
             </a:fld>
             <a:endParaRPr lang="ru-RU"/>
           </a:p>
@@ -3657,7 +3824,7 @@
           <a:p>
             <a:fld id="{BBCA45A3-F3B4-42F8-B88D-1485C0862389}" type="datetime1">
               <a:rPr lang="ru-RU" smtClean="0"/>
-              <a:t>24.05.2025</a:t>
+              <a:t>25.05.2025</a:t>
             </a:fld>
             <a:endParaRPr lang="ru-RU"/>
           </a:p>
@@ -4740,331 +4907,6 @@
   <p:cSld>
     <p:spTree>
       <p:nvGrpSpPr>
-        <p:cNvPr id="1" name=""/>
-        <p:cNvGrpSpPr/>
-        <p:nvPr/>
-      </p:nvGrpSpPr>
-      <p:grpSpPr>
-        <a:xfrm>
-          <a:off x="0" y="0"/>
-          <a:ext cx="0" cy="0"/>
-          <a:chOff x="0" y="0"/>
-          <a:chExt cx="0" cy="0"/>
-        </a:xfrm>
-      </p:grpSpPr>
-      <p:sp>
-        <p:nvSpPr>
-          <p:cNvPr id="2" name="Заголовок 1">
-            <a:extLst>
-              <a:ext uri="{FF2B5EF4-FFF2-40B4-BE49-F238E27FC236}">
-                <a16:creationId xmlns:a16="http://schemas.microsoft.com/office/drawing/2014/main" id="{1294129D-F169-D152-03DD-9227D0701403}"/>
-              </a:ext>
-            </a:extLst>
-          </p:cNvPr>
-          <p:cNvSpPr>
-            <a:spLocks noGrp="1"/>
-          </p:cNvSpPr>
-          <p:nvPr>
-            <p:ph type="title"/>
-          </p:nvPr>
-        </p:nvSpPr>
-        <p:spPr/>
-        <p:txBody>
-          <a:bodyPr/>
-          <a:lstStyle/>
-          <a:p>
-            <a:r>
-              <a:rPr lang="ru-RU" sz="4400" dirty="0">
-                <a:latin typeface="Times New Roman" panose="02020603050405020304" pitchFamily="18" charset="0"/>
-                <a:cs typeface="Times New Roman" panose="02020603050405020304" pitchFamily="18" charset="0"/>
-              </a:rPr>
-              <a:t>Средства реализации</a:t>
-            </a:r>
-            <a:endParaRPr lang="ru-RU" dirty="0"/>
-          </a:p>
-        </p:txBody>
-      </p:sp>
-      <p:sp>
-        <p:nvSpPr>
-          <p:cNvPr id="3" name="Объект 2">
-            <a:extLst>
-              <a:ext uri="{FF2B5EF4-FFF2-40B4-BE49-F238E27FC236}">
-                <a16:creationId xmlns:a16="http://schemas.microsoft.com/office/drawing/2014/main" id="{4286BC96-A488-534F-7EB9-5599428C14FE}"/>
-              </a:ext>
-            </a:extLst>
-          </p:cNvPr>
-          <p:cNvSpPr>
-            <a:spLocks noGrp="1"/>
-          </p:cNvSpPr>
-          <p:nvPr>
-            <p:ph idx="1"/>
-          </p:nvPr>
-        </p:nvSpPr>
-        <p:spPr/>
-        <p:txBody>
-          <a:bodyPr/>
-          <a:lstStyle/>
-          <a:p>
-            <a:pPr marL="457200" indent="-457200">
-              <a:buFont typeface="Liberation Sans" panose="020B0604020202020204" pitchFamily="34" charset="0"/>
-              <a:buChar char="−"/>
-            </a:pPr>
-            <a:r>
-              <a:rPr lang="ru-RU" sz="2800" dirty="0">
-                <a:latin typeface="Times New Roman" panose="02020603050405020304" pitchFamily="18" charset="0"/>
-                <a:cs typeface="Times New Roman" panose="02020603050405020304" pitchFamily="18" charset="0"/>
-              </a:rPr>
-              <a:t>СУБД</a:t>
-            </a:r>
-            <a:r>
-              <a:rPr lang="en-US" sz="2800" dirty="0">
-                <a:latin typeface="Times New Roman" panose="02020603050405020304" pitchFamily="18" charset="0"/>
-                <a:cs typeface="Times New Roman" panose="02020603050405020304" pitchFamily="18" charset="0"/>
-              </a:rPr>
-              <a:t>: PostgreSQL</a:t>
-            </a:r>
-            <a:endParaRPr lang="ru-RU" sz="2800" dirty="0">
-              <a:latin typeface="Times New Roman" panose="02020603050405020304" pitchFamily="18" charset="0"/>
-              <a:cs typeface="Times New Roman" panose="02020603050405020304" pitchFamily="18" charset="0"/>
-            </a:endParaRPr>
-          </a:p>
-          <a:p>
-            <a:pPr marL="457200" indent="-457200">
-              <a:buFont typeface="Liberation Sans" panose="020B0604020202020204" pitchFamily="34" charset="0"/>
-              <a:buChar char="−"/>
-            </a:pPr>
-            <a:r>
-              <a:rPr lang="ru-RU" sz="2800" dirty="0">
-                <a:latin typeface="Times New Roman" panose="02020603050405020304" pitchFamily="18" charset="0"/>
-                <a:cs typeface="Times New Roman" panose="02020603050405020304" pitchFamily="18" charset="0"/>
-              </a:rPr>
-              <a:t>Язык: C</a:t>
-            </a:r>
-            <a:r>
-              <a:rPr lang="en-US" sz="2800" dirty="0">
-                <a:latin typeface="Times New Roman" panose="02020603050405020304" pitchFamily="18" charset="0"/>
-                <a:cs typeface="Times New Roman" panose="02020603050405020304" pitchFamily="18" charset="0"/>
-              </a:rPr>
-              <a:t>#;</a:t>
-            </a:r>
-            <a:endParaRPr lang="ru-RU" dirty="0">
-              <a:latin typeface="Times New Roman" panose="02020603050405020304" pitchFamily="18" charset="0"/>
-              <a:cs typeface="Times New Roman" panose="02020603050405020304" pitchFamily="18" charset="0"/>
-            </a:endParaRPr>
-          </a:p>
-          <a:p>
-            <a:pPr marL="457200" indent="-457200">
-              <a:buFont typeface="Liberation Sans" panose="020B0604020202020204" pitchFamily="34" charset="0"/>
-              <a:buChar char="−"/>
-            </a:pPr>
-            <a:r>
-              <a:rPr lang="ru-RU" dirty="0">
-                <a:latin typeface="Times New Roman" panose="02020603050405020304" pitchFamily="18" charset="0"/>
-                <a:cs typeface="Times New Roman" panose="02020603050405020304" pitchFamily="18" charset="0"/>
-              </a:rPr>
-              <a:t>Фреймворк</a:t>
-            </a:r>
-            <a:r>
-              <a:rPr lang="en-US" dirty="0">
-                <a:latin typeface="Times New Roman" panose="02020603050405020304" pitchFamily="18" charset="0"/>
-                <a:cs typeface="Times New Roman" panose="02020603050405020304" pitchFamily="18" charset="0"/>
-              </a:rPr>
-              <a:t>: ASP.NET </a:t>
-            </a:r>
-            <a:r>
-              <a:rPr lang="ru-RU" dirty="0">
-                <a:latin typeface="Times New Roman" panose="02020603050405020304" pitchFamily="18" charset="0"/>
-                <a:cs typeface="Times New Roman" panose="02020603050405020304" pitchFamily="18" charset="0"/>
-              </a:rPr>
-              <a:t>8</a:t>
-            </a:r>
-            <a:r>
-              <a:rPr lang="en-US" dirty="0">
-                <a:latin typeface="Times New Roman" panose="02020603050405020304" pitchFamily="18" charset="0"/>
-                <a:cs typeface="Times New Roman" panose="02020603050405020304" pitchFamily="18" charset="0"/>
-              </a:rPr>
-              <a:t>.0</a:t>
-            </a:r>
-          </a:p>
-          <a:p>
-            <a:pPr marL="457200" indent="-457200">
-              <a:buFont typeface="Liberation Sans" panose="020B0604020202020204" pitchFamily="34" charset="0"/>
-              <a:buChar char="−"/>
-            </a:pPr>
-            <a:r>
-              <a:rPr lang="ru-RU" dirty="0">
-                <a:latin typeface="Times New Roman" panose="02020603050405020304" pitchFamily="18" charset="0"/>
-                <a:cs typeface="Times New Roman" panose="02020603050405020304" pitchFamily="18" charset="0"/>
-              </a:rPr>
-              <a:t>Сторонние библиотеки</a:t>
-            </a:r>
-            <a:r>
-              <a:rPr lang="en-US" dirty="0">
-                <a:latin typeface="Times New Roman" panose="02020603050405020304" pitchFamily="18" charset="0"/>
-                <a:cs typeface="Times New Roman" panose="02020603050405020304" pitchFamily="18" charset="0"/>
-              </a:rPr>
-              <a:t>:</a:t>
-            </a:r>
-            <a:endParaRPr lang="ru-RU" dirty="0">
-              <a:latin typeface="Times New Roman" panose="02020603050405020304" pitchFamily="18" charset="0"/>
-              <a:cs typeface="Times New Roman" panose="02020603050405020304" pitchFamily="18" charset="0"/>
-            </a:endParaRPr>
-          </a:p>
-          <a:p>
-            <a:pPr marL="914400" lvl="1" indent="-457200">
-              <a:buFont typeface="Liberation Sans" panose="020B0604020202020204" pitchFamily="34" charset="0"/>
-              <a:buChar char="−"/>
-            </a:pPr>
-            <a:r>
-              <a:rPr lang="en-US" dirty="0">
-                <a:latin typeface="Times New Roman" panose="02020603050405020304" pitchFamily="18" charset="0"/>
-                <a:cs typeface="Times New Roman" panose="02020603050405020304" pitchFamily="18" charset="0"/>
-              </a:rPr>
-              <a:t>Quartz.NET</a:t>
-            </a:r>
-            <a:r>
-              <a:rPr lang="ru-RU" dirty="0">
-                <a:latin typeface="Times New Roman" panose="02020603050405020304" pitchFamily="18" charset="0"/>
-                <a:cs typeface="Times New Roman" panose="02020603050405020304" pitchFamily="18" charset="0"/>
-              </a:rPr>
-              <a:t> для хранения и выполнения отложенных задач </a:t>
-            </a:r>
-          </a:p>
-          <a:p>
-            <a:pPr marL="914400" lvl="1" indent="-457200">
-              <a:buFont typeface="Liberation Sans" panose="020B0604020202020204" pitchFamily="34" charset="0"/>
-              <a:buChar char="−"/>
-            </a:pPr>
-            <a:r>
-              <a:rPr lang="en-US" dirty="0">
-                <a:latin typeface="Times New Roman" panose="02020603050405020304" pitchFamily="18" charset="0"/>
-                <a:cs typeface="Times New Roman" panose="02020603050405020304" pitchFamily="18" charset="0"/>
-              </a:rPr>
-              <a:t>Magick.NET</a:t>
-            </a:r>
-            <a:r>
-              <a:rPr lang="ru-RU" dirty="0">
-                <a:latin typeface="Times New Roman" panose="02020603050405020304" pitchFamily="18" charset="0"/>
-                <a:cs typeface="Times New Roman" panose="02020603050405020304" pitchFamily="18" charset="0"/>
-              </a:rPr>
-              <a:t> для обработки изображений</a:t>
-            </a:r>
-            <a:endParaRPr lang="en-US" dirty="0">
-              <a:latin typeface="Times New Roman" panose="02020603050405020304" pitchFamily="18" charset="0"/>
-              <a:cs typeface="Times New Roman" panose="02020603050405020304" pitchFamily="18" charset="0"/>
-            </a:endParaRPr>
-          </a:p>
-          <a:p>
-            <a:pPr marL="914400" lvl="1" indent="-457200">
-              <a:buFont typeface="Liberation Sans" panose="020B0604020202020204" pitchFamily="34" charset="0"/>
-              <a:buChar char="−"/>
-            </a:pPr>
-            <a:r>
-              <a:rPr lang="en-US" dirty="0">
-                <a:latin typeface="Times New Roman" panose="02020603050405020304" pitchFamily="18" charset="0"/>
-                <a:cs typeface="Times New Roman" panose="02020603050405020304" pitchFamily="18" charset="0"/>
-              </a:rPr>
-              <a:t>Entity Framework Core</a:t>
-            </a:r>
-            <a:r>
-              <a:rPr lang="ru-RU" dirty="0">
-                <a:latin typeface="Times New Roman" panose="02020603050405020304" pitchFamily="18" charset="0"/>
-                <a:cs typeface="Times New Roman" panose="02020603050405020304" pitchFamily="18" charset="0"/>
-              </a:rPr>
-              <a:t> в качестве </a:t>
-            </a:r>
-            <a:r>
-              <a:rPr lang="en-US" dirty="0">
-                <a:latin typeface="Times New Roman" panose="02020603050405020304" pitchFamily="18" charset="0"/>
-                <a:cs typeface="Times New Roman" panose="02020603050405020304" pitchFamily="18" charset="0"/>
-              </a:rPr>
-              <a:t>ORM</a:t>
-            </a:r>
-            <a:endParaRPr lang="ru-RU" dirty="0">
-              <a:latin typeface="Times New Roman" panose="02020603050405020304" pitchFamily="18" charset="0"/>
-              <a:cs typeface="Times New Roman" panose="02020603050405020304" pitchFamily="18" charset="0"/>
-            </a:endParaRPr>
-          </a:p>
-          <a:p>
-            <a:pPr marL="457200" indent="-457200">
-              <a:buFont typeface="Liberation Sans" panose="020B0604020202020204" pitchFamily="34" charset="0"/>
-              <a:buChar char="−"/>
-            </a:pPr>
-            <a:r>
-              <a:rPr lang="ru-RU" sz="2800" dirty="0">
-                <a:latin typeface="Times New Roman" panose="02020603050405020304" pitchFamily="18" charset="0"/>
-                <a:cs typeface="Times New Roman" panose="02020603050405020304" pitchFamily="18" charset="0"/>
-              </a:rPr>
-              <a:t>Среда разработки: </a:t>
-            </a:r>
-            <a:r>
-              <a:rPr lang="en-US" sz="2800" dirty="0">
-                <a:latin typeface="Times New Roman" panose="02020603050405020304" pitchFamily="18" charset="0"/>
-                <a:cs typeface="Times New Roman" panose="02020603050405020304" pitchFamily="18" charset="0"/>
-              </a:rPr>
-              <a:t>Microsoft Visual Studio</a:t>
-            </a:r>
-            <a:r>
-              <a:rPr lang="en-US" dirty="0">
-                <a:latin typeface="Times New Roman" panose="02020603050405020304" pitchFamily="18" charset="0"/>
-                <a:cs typeface="Times New Roman" panose="02020603050405020304" pitchFamily="18" charset="0"/>
-              </a:rPr>
-              <a:t>.</a:t>
-            </a:r>
-            <a:endParaRPr lang="ru-RU" sz="2800" dirty="0">
-              <a:latin typeface="Times New Roman" panose="02020603050405020304" pitchFamily="18" charset="0"/>
-              <a:cs typeface="Times New Roman" panose="02020603050405020304" pitchFamily="18" charset="0"/>
-            </a:endParaRPr>
-          </a:p>
-        </p:txBody>
-      </p:sp>
-      <p:sp>
-        <p:nvSpPr>
-          <p:cNvPr id="4" name="Номер слайда 3">
-            <a:extLst>
-              <a:ext uri="{FF2B5EF4-FFF2-40B4-BE49-F238E27FC236}">
-                <a16:creationId xmlns:a16="http://schemas.microsoft.com/office/drawing/2014/main" id="{DB845D22-575F-FAA2-4894-3A79966D1551}"/>
-              </a:ext>
-            </a:extLst>
-          </p:cNvPr>
-          <p:cNvSpPr>
-            <a:spLocks noGrp="1"/>
-          </p:cNvSpPr>
-          <p:nvPr>
-            <p:ph type="sldNum" sz="quarter" idx="12"/>
-          </p:nvPr>
-        </p:nvSpPr>
-        <p:spPr/>
-        <p:txBody>
-          <a:bodyPr/>
-          <a:lstStyle/>
-          <a:p>
-            <a:fld id="{9F75ED48-FB93-4D27-9D40-6DF4DFA3F996}" type="slidenum">
-              <a:rPr lang="ru-RU" smtClean="0"/>
-              <a:t>10</a:t>
-            </a:fld>
-            <a:endParaRPr lang="ru-RU"/>
-          </a:p>
-        </p:txBody>
-      </p:sp>
-    </p:spTree>
-    <p:extLst>
-      <p:ext uri="{BB962C8B-B14F-4D97-AF65-F5344CB8AC3E}">
-        <p14:creationId xmlns:p14="http://schemas.microsoft.com/office/powerpoint/2010/main" val="2359330613"/>
-      </p:ext>
-    </p:extLst>
-  </p:cSld>
-  <p:clrMapOvr>
-    <a:masterClrMapping/>
-  </p:clrMapOvr>
-</p:sld>
-</file>
-
-<file path=ppt/slides/slide11.xml><?xml version="1.0" encoding="utf-8"?>
-<p:sld xmlns:a="http://schemas.openxmlformats.org/drawingml/2006/main" xmlns:r="http://schemas.openxmlformats.org/officeDocument/2006/relationships" xmlns:p="http://schemas.openxmlformats.org/presentationml/2006/main">
-  <p:cSld>
-    <p:spTree>
-      <p:nvGrpSpPr>
         <p:cNvPr id="1" name="">
           <a:extLst>
             <a:ext uri="{FF2B5EF4-FFF2-40B4-BE49-F238E27FC236}">
@@ -5170,7 +5012,7 @@
           <a:p>
             <a:fld id="{9F75ED48-FB93-4D27-9D40-6DF4DFA3F996}" type="slidenum">
               <a:rPr lang="ru-RU" smtClean="0"/>
-              <a:t>11</a:t>
+              <a:t>10</a:t>
             </a:fld>
             <a:endParaRPr lang="ru-RU"/>
           </a:p>
@@ -5189,7 +5031,7 @@
 </p:sld>
 </file>
 
-<file path=ppt/slides/slide12.xml><?xml version="1.0" encoding="utf-8"?>
+<file path=ppt/slides/slide11.xml><?xml version="1.0" encoding="utf-8"?>
 <p:sld xmlns:a="http://schemas.openxmlformats.org/drawingml/2006/main" xmlns:r="http://schemas.openxmlformats.org/officeDocument/2006/relationships" xmlns:p="http://schemas.openxmlformats.org/presentationml/2006/main">
   <p:cSld>
     <p:spTree>
@@ -5269,7 +5111,7 @@
           <a:p>
             <a:fld id="{9F75ED48-FB93-4D27-9D40-6DF4DFA3F996}" type="slidenum">
               <a:rPr lang="ru-RU" smtClean="0"/>
-              <a:t>12</a:t>
+              <a:t>11</a:t>
             </a:fld>
             <a:endParaRPr lang="ru-RU"/>
           </a:p>
@@ -5298,7 +5140,9 @@
           </a:xfrm>
         </p:spPr>
         <p:txBody>
-          <a:bodyPr/>
+          <a:bodyPr vert="horz" lIns="91440" tIns="45720" rIns="91440" bIns="45720" rtlCol="0" anchor="t">
+            <a:normAutofit/>
+          </a:bodyPr>
           <a:lstStyle/>
           <a:p>
             <a:pPr>
@@ -5307,29 +5151,29 @@
             </a:pPr>
             <a:r>
               <a:rPr lang="ru-RU" sz="2300" dirty="0">
-                <a:latin typeface="Times New Roman" panose="02020603050405020304" pitchFamily="18" charset="0"/>
-                <a:cs typeface="Times New Roman" panose="02020603050405020304" pitchFamily="18" charset="0"/>
+                <a:latin typeface="Times New Roman"/>
+                <a:cs typeface="Times New Roman"/>
               </a:rPr>
               <a:t>1</a:t>
             </a:r>
             <a:r>
               <a:rPr lang="en-US" sz="2300" dirty="0">
-                <a:latin typeface="Times New Roman" panose="02020603050405020304" pitchFamily="18" charset="0"/>
-                <a:cs typeface="Times New Roman" panose="02020603050405020304" pitchFamily="18" charset="0"/>
+                <a:latin typeface="Times New Roman"/>
+                <a:cs typeface="Times New Roman"/>
               </a:rPr>
               <a:t>24</a:t>
             </a:r>
             <a:r>
               <a:rPr lang="ru-RU" sz="2300" dirty="0">
-                <a:latin typeface="Times New Roman" panose="02020603050405020304" pitchFamily="18" charset="0"/>
-                <a:cs typeface="Times New Roman" panose="02020603050405020304" pitchFamily="18" charset="0"/>
+                <a:latin typeface="Times New Roman"/>
+                <a:cs typeface="Times New Roman"/>
               </a:rPr>
               <a:t> интеграционных теста для слоя базы данных</a:t>
             </a:r>
             <a:r>
               <a:rPr lang="en-US" sz="2300" dirty="0">
-                <a:latin typeface="Times New Roman" panose="02020603050405020304" pitchFamily="18" charset="0"/>
-                <a:cs typeface="Times New Roman" panose="02020603050405020304" pitchFamily="18" charset="0"/>
+                <a:latin typeface="Times New Roman"/>
+                <a:cs typeface="Times New Roman"/>
               </a:rPr>
               <a:t>; </a:t>
             </a:r>
@@ -5341,35 +5185,35 @@
             </a:br>
             <a:r>
               <a:rPr lang="ru-RU" sz="2300" dirty="0">
-                <a:latin typeface="Times New Roman" panose="02020603050405020304" pitchFamily="18" charset="0"/>
-                <a:cs typeface="Times New Roman" panose="02020603050405020304" pitchFamily="18" charset="0"/>
+                <a:latin typeface="Times New Roman"/>
+                <a:cs typeface="Times New Roman"/>
               </a:rPr>
               <a:t>покрытие кода </a:t>
             </a:r>
             <a:r>
               <a:rPr lang="ru-RU" sz="2000" dirty="0">
-                <a:latin typeface="Times New Roman" panose="02020603050405020304" pitchFamily="18" charset="0"/>
-                <a:cs typeface="Times New Roman" panose="02020603050405020304" pitchFamily="18" charset="0"/>
+                <a:latin typeface="Times New Roman"/>
+                <a:cs typeface="Times New Roman"/>
               </a:rPr>
               <a:t>‒ </a:t>
             </a:r>
             <a:r>
               <a:rPr lang="ru-RU" sz="2300" dirty="0">
-                <a:latin typeface="Times New Roman" panose="02020603050405020304" pitchFamily="18" charset="0"/>
-                <a:cs typeface="Times New Roman" panose="02020603050405020304" pitchFamily="18" charset="0"/>
-              </a:rPr>
-              <a:t>79.42</a:t>
+                <a:latin typeface="Times New Roman"/>
+                <a:cs typeface="Times New Roman"/>
+              </a:rPr>
+              <a:t>80.4</a:t>
             </a:r>
             <a:r>
               <a:rPr lang="en-US" sz="2300" dirty="0">
-                <a:latin typeface="Times New Roman" panose="02020603050405020304" pitchFamily="18" charset="0"/>
-                <a:cs typeface="Times New Roman" panose="02020603050405020304" pitchFamily="18" charset="0"/>
+                <a:latin typeface="Times New Roman"/>
+                <a:cs typeface="Times New Roman"/>
               </a:rPr>
               <a:t>%</a:t>
             </a:r>
             <a:endParaRPr lang="ru-RU" sz="2300" dirty="0">
-              <a:latin typeface="Times New Roman" panose="02020603050405020304" pitchFamily="18" charset="0"/>
-              <a:cs typeface="Times New Roman" panose="02020603050405020304" pitchFamily="18" charset="0"/>
+              <a:latin typeface="Times New Roman"/>
+              <a:cs typeface="Times New Roman"/>
             </a:endParaRPr>
           </a:p>
           <a:p>
@@ -5530,7 +5374,7 @@
 </p:sld>
 </file>
 
-<file path=ppt/slides/slide13.xml><?xml version="1.0" encoding="utf-8"?>
+<file path=ppt/slides/slide12.xml><?xml version="1.0" encoding="utf-8"?>
 <p:sld xmlns:a="http://schemas.openxmlformats.org/drawingml/2006/main" xmlns:r="http://schemas.openxmlformats.org/officeDocument/2006/relationships" xmlns:p="http://schemas.openxmlformats.org/presentationml/2006/main">
   <p:cSld>
     <p:spTree>
@@ -5604,7 +5448,7 @@
           <a:p>
             <a:fld id="{9F75ED48-FB93-4D27-9D40-6DF4DFA3F996}" type="slidenum">
               <a:rPr lang="ru-RU" smtClean="0"/>
-              <a:t>13</a:t>
+              <a:t>12</a:t>
             </a:fld>
             <a:endParaRPr lang="ru-RU"/>
           </a:p>
@@ -5821,7 +5665,7 @@
 </p:sld>
 </file>
 
-<file path=ppt/slides/slide14.xml><?xml version="1.0" encoding="utf-8"?>
+<file path=ppt/slides/slide13.xml><?xml version="1.0" encoding="utf-8"?>
 <p:sld xmlns:a="http://schemas.openxmlformats.org/drawingml/2006/main" xmlns:r="http://schemas.openxmlformats.org/officeDocument/2006/relationships" xmlns:p="http://schemas.openxmlformats.org/presentationml/2006/main">
   <p:cSld>
     <p:spTree>
@@ -6264,7 +6108,7 @@
           <a:p>
             <a:fld id="{9F75ED48-FB93-4D27-9D40-6DF4DFA3F996}" type="slidenum">
               <a:rPr lang="ru-RU" smtClean="0"/>
-              <a:t>14</a:t>
+              <a:t>13</a:t>
             </a:fld>
             <a:endParaRPr lang="ru-RU"/>
           </a:p>
@@ -6283,7 +6127,7 @@
 </p:sld>
 </file>
 
-<file path=ppt/slides/slide15.xml><?xml version="1.0" encoding="utf-8"?>
+<file path=ppt/slides/slide14.xml><?xml version="1.0" encoding="utf-8"?>
 <p:sld xmlns:a="http://schemas.openxmlformats.org/drawingml/2006/main" xmlns:r="http://schemas.openxmlformats.org/officeDocument/2006/relationships" xmlns:p="http://schemas.openxmlformats.org/presentationml/2006/main">
   <p:cSld>
     <p:spTree>
@@ -6702,7 +6546,7 @@
           <a:p>
             <a:fld id="{9F75ED48-FB93-4D27-9D40-6DF4DFA3F996}" type="slidenum">
               <a:rPr lang="ru-RU" smtClean="0"/>
-              <a:t>15</a:t>
+              <a:t>14</a:t>
             </a:fld>
             <a:endParaRPr lang="ru-RU"/>
           </a:p>
@@ -6825,7 +6669,7 @@
 </p:sld>
 </file>
 
-<file path=ppt/slides/slide16.xml><?xml version="1.0" encoding="utf-8"?>
+<file path=ppt/slides/slide15.xml><?xml version="1.0" encoding="utf-8"?>
 <p:sld xmlns:a="http://schemas.openxmlformats.org/drawingml/2006/main" xmlns:r="http://schemas.openxmlformats.org/officeDocument/2006/relationships" xmlns:p="http://schemas.openxmlformats.org/presentationml/2006/main">
   <p:cSld>
     <p:spTree>
@@ -7108,7 +6952,7 @@
           <a:p>
             <a:fld id="{9F75ED48-FB93-4D27-9D40-6DF4DFA3F996}" type="slidenum">
               <a:rPr lang="ru-RU" smtClean="0"/>
-              <a:t>16</a:t>
+              <a:t>15</a:t>
             </a:fld>
             <a:endParaRPr lang="ru-RU"/>
           </a:p>
@@ -7127,7 +6971,7 @@
 </p:sld>
 </file>
 
-<file path=ppt/slides/slide17.xml><?xml version="1.0" encoding="utf-8"?>
+<file path=ppt/slides/slide16.xml><?xml version="1.0" encoding="utf-8"?>
 <p:sld xmlns:a="http://schemas.openxmlformats.org/drawingml/2006/main" xmlns:r="http://schemas.openxmlformats.org/officeDocument/2006/relationships" xmlns:p="http://schemas.openxmlformats.org/presentationml/2006/main">
   <p:cSld>
     <p:spTree>
@@ -7383,7 +7227,7 @@
           <a:p>
             <a:fld id="{9F75ED48-FB93-4D27-9D40-6DF4DFA3F996}" type="slidenum">
               <a:rPr lang="ru-RU" smtClean="0"/>
-              <a:t>17</a:t>
+              <a:t>16</a:t>
             </a:fld>
             <a:endParaRPr lang="ru-RU"/>
           </a:p>
@@ -7403,294 +7247,6 @@
 </file>
 
 <file path=ppt/slides/slide2.xml><?xml version="1.0" encoding="utf-8"?>
-<p:sld xmlns:a="http://schemas.openxmlformats.org/drawingml/2006/main" xmlns:r="http://schemas.openxmlformats.org/officeDocument/2006/relationships" xmlns:p="http://schemas.openxmlformats.org/presentationml/2006/main">
-  <p:cSld>
-    <p:spTree>
-      <p:nvGrpSpPr>
-        <p:cNvPr id="1" name=""/>
-        <p:cNvGrpSpPr/>
-        <p:nvPr/>
-      </p:nvGrpSpPr>
-      <p:grpSpPr>
-        <a:xfrm>
-          <a:off x="0" y="0"/>
-          <a:ext cx="0" cy="0"/>
-          <a:chOff x="0" y="0"/>
-          <a:chExt cx="0" cy="0"/>
-        </a:xfrm>
-      </p:grpSpPr>
-      <p:sp>
-        <p:nvSpPr>
-          <p:cNvPr id="2" name="Заголовок 1">
-            <a:extLst>
-              <a:ext uri="{FF2B5EF4-FFF2-40B4-BE49-F238E27FC236}">
-                <a16:creationId xmlns:a16="http://schemas.microsoft.com/office/drawing/2014/main" id="{6CCA95AF-23C1-C33D-A65E-156166E1CCBE}"/>
-              </a:ext>
-            </a:extLst>
-          </p:cNvPr>
-          <p:cNvSpPr>
-            <a:spLocks noGrp="1"/>
-          </p:cNvSpPr>
-          <p:nvPr>
-            <p:ph type="title"/>
-          </p:nvPr>
-        </p:nvSpPr>
-        <p:spPr/>
-        <p:txBody>
-          <a:bodyPr>
-            <a:normAutofit/>
-          </a:bodyPr>
-          <a:lstStyle/>
-          <a:p>
-            <a:r>
-              <a:rPr lang="ru-RU" dirty="0">
-                <a:latin typeface="Times New Roman" panose="02020603050405020304" pitchFamily="18" charset="0"/>
-                <a:ea typeface="+mn-ea"/>
-                <a:cs typeface="Times New Roman" panose="02020603050405020304" pitchFamily="18" charset="0"/>
-              </a:rPr>
-              <a:t>Постановка задачи</a:t>
-            </a:r>
-          </a:p>
-        </p:txBody>
-      </p:sp>
-      <p:sp>
-        <p:nvSpPr>
-          <p:cNvPr id="3" name="Объект 2">
-            <a:extLst>
-              <a:ext uri="{FF2B5EF4-FFF2-40B4-BE49-F238E27FC236}">
-                <a16:creationId xmlns:a16="http://schemas.microsoft.com/office/drawing/2014/main" id="{06A1AA8B-FD86-2AC7-884D-FF691B71B74E}"/>
-              </a:ext>
-            </a:extLst>
-          </p:cNvPr>
-          <p:cNvSpPr>
-            <a:spLocks noGrp="1"/>
-          </p:cNvSpPr>
-          <p:nvPr>
-            <p:ph idx="1"/>
-          </p:nvPr>
-        </p:nvSpPr>
-        <p:spPr/>
-        <p:txBody>
-          <a:bodyPr>
-            <a:normAutofit fontScale="92500" lnSpcReduction="20000"/>
-          </a:bodyPr>
-          <a:lstStyle/>
-          <a:p>
-            <a:pPr marL="0" indent="0" algn="just">
-              <a:buNone/>
-            </a:pPr>
-            <a:r>
-              <a:rPr lang="ru-RU" sz="2400" dirty="0">
-                <a:latin typeface="Times New Roman" panose="02020603050405020304" pitchFamily="18" charset="0"/>
-                <a:cs typeface="Times New Roman" panose="02020603050405020304" pitchFamily="18" charset="0"/>
-              </a:rPr>
-              <a:t>Целью курсовой работы является разработка базы данных соревновательной игры.</a:t>
-            </a:r>
-          </a:p>
-          <a:p>
-            <a:pPr marL="0" indent="0" algn="just">
-              <a:buNone/>
-            </a:pPr>
-            <a:r>
-              <a:rPr lang="ru-RU" sz="2400" dirty="0">
-                <a:latin typeface="Times New Roman" panose="02020603050405020304" pitchFamily="18" charset="0"/>
-                <a:cs typeface="Times New Roman" panose="02020603050405020304" pitchFamily="18" charset="0"/>
-              </a:rPr>
-              <a:t>Для достижения поставленной цели необходимо решить следующие задачи:</a:t>
-            </a:r>
-          </a:p>
-          <a:p>
-            <a:pPr algn="just">
-              <a:lnSpc>
-                <a:spcPct val="110000"/>
-              </a:lnSpc>
-              <a:buFont typeface="Times New Roman" panose="02020603050405020304" pitchFamily="18" charset="0"/>
-              <a:buChar char="‒"/>
-            </a:pPr>
-            <a:r>
-              <a:rPr lang="ru-RU" sz="2400" dirty="0">
-                <a:latin typeface="Times New Roman" panose="02020603050405020304" pitchFamily="18" charset="0"/>
-                <a:cs typeface="Times New Roman" panose="02020603050405020304" pitchFamily="18" charset="0"/>
-              </a:rPr>
-              <a:t>формализовать соревновательную игру</a:t>
-            </a:r>
-            <a:r>
-              <a:rPr lang="en-US" sz="2400" dirty="0">
-                <a:latin typeface="Times New Roman" panose="02020603050405020304" pitchFamily="18" charset="0"/>
-                <a:cs typeface="Times New Roman" panose="02020603050405020304" pitchFamily="18" charset="0"/>
-              </a:rPr>
-              <a:t>, </a:t>
-            </a:r>
-            <a:r>
-              <a:rPr lang="ru-RU" sz="2400" dirty="0">
-                <a:latin typeface="Times New Roman" panose="02020603050405020304" pitchFamily="18" charset="0"/>
-                <a:cs typeface="Times New Roman" panose="02020603050405020304" pitchFamily="18" charset="0"/>
-              </a:rPr>
-              <a:t>провести анализ существующих решений</a:t>
-            </a:r>
-            <a:r>
-              <a:rPr lang="en-US" sz="2400" dirty="0">
-                <a:latin typeface="Times New Roman" panose="02020603050405020304" pitchFamily="18" charset="0"/>
-                <a:cs typeface="Times New Roman" panose="02020603050405020304" pitchFamily="18" charset="0"/>
-              </a:rPr>
-              <a:t>;</a:t>
-            </a:r>
-          </a:p>
-          <a:p>
-            <a:pPr algn="just">
-              <a:lnSpc>
-                <a:spcPct val="110000"/>
-              </a:lnSpc>
-              <a:buFont typeface="Times New Roman" panose="02020603050405020304" pitchFamily="18" charset="0"/>
-              <a:buChar char="‒"/>
-            </a:pPr>
-            <a:r>
-              <a:rPr lang="ru-RU" sz="2400" dirty="0">
-                <a:latin typeface="Times New Roman" panose="02020603050405020304" pitchFamily="18" charset="0"/>
-                <a:cs typeface="Times New Roman" panose="02020603050405020304" pitchFamily="18" charset="0"/>
-              </a:rPr>
-              <a:t>формализовать сущности базы данных</a:t>
-            </a:r>
-            <a:r>
-              <a:rPr lang="en-US" sz="2400" dirty="0">
-                <a:latin typeface="Times New Roman" panose="02020603050405020304" pitchFamily="18" charset="0"/>
-                <a:cs typeface="Times New Roman" panose="02020603050405020304" pitchFamily="18" charset="0"/>
-              </a:rPr>
-              <a:t>, </a:t>
-            </a:r>
-            <a:r>
-              <a:rPr lang="ru-RU" sz="2400" dirty="0">
-                <a:latin typeface="Times New Roman" panose="02020603050405020304" pitchFamily="18" charset="0"/>
-                <a:cs typeface="Times New Roman" panose="02020603050405020304" pitchFamily="18" charset="0"/>
-              </a:rPr>
-              <a:t>спроектировать архитектуру базы данных и</a:t>
-            </a:r>
-            <a:r>
-              <a:rPr lang="en-US" sz="2400" dirty="0">
-                <a:latin typeface="Times New Roman" panose="02020603050405020304" pitchFamily="18" charset="0"/>
-                <a:cs typeface="Times New Roman" panose="02020603050405020304" pitchFamily="18" charset="0"/>
-              </a:rPr>
-              <a:t> </a:t>
-            </a:r>
-            <a:r>
-              <a:rPr lang="ru-RU" sz="2400" dirty="0">
-                <a:latin typeface="Times New Roman" panose="02020603050405020304" pitchFamily="18" charset="0"/>
-                <a:cs typeface="Times New Roman" panose="02020603050405020304" pitchFamily="18" charset="0"/>
-              </a:rPr>
-              <a:t>ограничения целостности;</a:t>
-            </a:r>
-          </a:p>
-          <a:p>
-            <a:pPr algn="just">
-              <a:buFont typeface="Times New Roman" panose="02020603050405020304" pitchFamily="18" charset="0"/>
-              <a:buChar char="‒"/>
-            </a:pPr>
-            <a:r>
-              <a:rPr lang="ru-RU" sz="2400" dirty="0">
-                <a:latin typeface="Times New Roman" panose="02020603050405020304" pitchFamily="18" charset="0"/>
-                <a:cs typeface="Times New Roman" panose="02020603050405020304" pitchFamily="18" charset="0"/>
-              </a:rPr>
-              <a:t>спроектировать процедуру выдачи наград;</a:t>
-            </a:r>
-          </a:p>
-          <a:p>
-            <a:pPr algn="just">
-              <a:buFont typeface="Times New Roman" panose="02020603050405020304" pitchFamily="18" charset="0"/>
-              <a:buChar char="‒"/>
-            </a:pPr>
-            <a:r>
-              <a:rPr lang="ru-RU" sz="2400" dirty="0">
-                <a:latin typeface="Times New Roman" panose="02020603050405020304" pitchFamily="18" charset="0"/>
-                <a:cs typeface="Times New Roman" panose="02020603050405020304" pitchFamily="18" charset="0"/>
-              </a:rPr>
-              <a:t>описать интерфейс доступа к базе данных; выбрать средства реализации базы данных и приложения;</a:t>
-            </a:r>
-            <a:r>
-              <a:rPr lang="en-US" sz="2400" dirty="0">
-                <a:latin typeface="Times New Roman" panose="02020603050405020304" pitchFamily="18" charset="0"/>
-                <a:cs typeface="Times New Roman" panose="02020603050405020304" pitchFamily="18" charset="0"/>
-              </a:rPr>
-              <a:t> </a:t>
-            </a:r>
-            <a:r>
-              <a:rPr lang="ru-RU" sz="2400" dirty="0">
-                <a:latin typeface="Times New Roman" panose="02020603050405020304" pitchFamily="18" charset="0"/>
-                <a:cs typeface="Times New Roman" panose="02020603050405020304" pitchFamily="18" charset="0"/>
-              </a:rPr>
-              <a:t>реализовать базу данных и приложение;</a:t>
-            </a:r>
-          </a:p>
-          <a:p>
-            <a:pPr algn="just">
-              <a:buFont typeface="Times New Roman" panose="02020603050405020304" pitchFamily="18" charset="0"/>
-              <a:buChar char="‒"/>
-            </a:pPr>
-            <a:r>
-              <a:rPr lang="ru-RU" sz="2400" dirty="0">
-                <a:latin typeface="Times New Roman" panose="02020603050405020304" pitchFamily="18" charset="0"/>
-                <a:cs typeface="Times New Roman" panose="02020603050405020304" pitchFamily="18" charset="0"/>
-              </a:rPr>
-              <a:t>описать методы тестирования разработанной функциональности и разработать тесты для проверки корректности работы приложения;</a:t>
-            </a:r>
-          </a:p>
-          <a:p>
-            <a:pPr algn="just">
-              <a:buFont typeface="Times New Roman" panose="02020603050405020304" pitchFamily="18" charset="0"/>
-              <a:buChar char="‒"/>
-            </a:pPr>
-            <a:r>
-              <a:rPr lang="ru-RU" sz="2400" dirty="0">
-                <a:latin typeface="Times New Roman" panose="02020603050405020304" pitchFamily="18" charset="0"/>
-                <a:cs typeface="Times New Roman" panose="02020603050405020304" pitchFamily="18" charset="0"/>
-              </a:rPr>
-              <a:t>исследовать зависимость времени выдачи наград от количества вознаграждаемых игроков в двух случаях: при помощи хранимой процедуры и при помощи обычных запросов.</a:t>
-            </a:r>
-          </a:p>
-        </p:txBody>
-      </p:sp>
-      <p:sp>
-        <p:nvSpPr>
-          <p:cNvPr id="4" name="Номер слайда 3">
-            <a:extLst>
-              <a:ext uri="{FF2B5EF4-FFF2-40B4-BE49-F238E27FC236}">
-                <a16:creationId xmlns:a16="http://schemas.microsoft.com/office/drawing/2014/main" id="{E053D0B0-6141-248F-A07C-7E7CC66FF8CA}"/>
-              </a:ext>
-            </a:extLst>
-          </p:cNvPr>
-          <p:cNvSpPr>
-            <a:spLocks noGrp="1"/>
-          </p:cNvSpPr>
-          <p:nvPr>
-            <p:ph type="sldNum" sz="quarter" idx="12"/>
-          </p:nvPr>
-        </p:nvSpPr>
-        <p:spPr/>
-        <p:txBody>
-          <a:bodyPr/>
-          <a:lstStyle/>
-          <a:p>
-            <a:fld id="{9F75ED48-FB93-4D27-9D40-6DF4DFA3F996}" type="slidenum">
-              <a:rPr lang="ru-RU" smtClean="0"/>
-              <a:t>2</a:t>
-            </a:fld>
-            <a:endParaRPr lang="ru-RU" dirty="0"/>
-          </a:p>
-        </p:txBody>
-      </p:sp>
-    </p:spTree>
-    <p:extLst>
-      <p:ext uri="{BB962C8B-B14F-4D97-AF65-F5344CB8AC3E}">
-        <p14:creationId xmlns:p14="http://schemas.microsoft.com/office/powerpoint/2010/main" val="2896526663"/>
-      </p:ext>
-    </p:extLst>
-  </p:cSld>
-  <p:clrMapOvr>
-    <a:masterClrMapping/>
-  </p:clrMapOvr>
-</p:sld>
-</file>
-
-<file path=ppt/slides/slide3.xml><?xml version="1.0" encoding="utf-8"?>
 <p:sld xmlns:a="http://schemas.openxmlformats.org/drawingml/2006/main" xmlns:r="http://schemas.openxmlformats.org/officeDocument/2006/relationships" xmlns:p="http://schemas.openxmlformats.org/presentationml/2006/main">
   <p:cSld>
     <p:spTree>
@@ -7765,7 +7321,7 @@
         </p:nvSpPr>
         <p:spPr/>
         <p:txBody>
-          <a:bodyPr>
+          <a:bodyPr vert="horz" lIns="91440" tIns="45720" rIns="91440" bIns="45720" rtlCol="0" anchor="t">
             <a:normAutofit/>
           </a:bodyPr>
           <a:lstStyle/>
@@ -7824,10 +7380,17 @@
             </a:pPr>
             <a:r>
               <a:rPr lang="ru-RU" sz="2400" dirty="0">
-                <a:latin typeface="Times New Roman" panose="02020603050405020304" pitchFamily="18" charset="0"/>
-                <a:cs typeface="Times New Roman" panose="02020603050405020304" pitchFamily="18" charset="0"/>
-              </a:rPr>
-              <a:t>Пользователям по истечению срока проведения должны автоматически выдаваться награды за занятое место в таблице лидеров.</a:t>
+                <a:latin typeface="Times New Roman"/>
+                <a:cs typeface="Times New Roman"/>
+              </a:rPr>
+              <a:t>Пользователи участвуют в соревнованиях, отправляя свой результат в виде целого числа. По истечению срока проведения должны автоматически выдаваться награды за занятое место в таблице лидеров, которые настроил </a:t>
+            </a:r>
+            <a:r>
+              <a:rPr lang="ru-RU" sz="2400">
+                <a:latin typeface="Times New Roman"/>
+                <a:cs typeface="Times New Roman"/>
+              </a:rPr>
+              <a:t>администратор.</a:t>
             </a:r>
           </a:p>
         </p:txBody>
@@ -7838,6 +7401,102 @@
             <a:extLst>
               <a:ext uri="{FF2B5EF4-FFF2-40B4-BE49-F238E27FC236}">
                 <a16:creationId xmlns:a16="http://schemas.microsoft.com/office/drawing/2014/main" id="{F9FEDD3E-3E3E-D059-C3CB-600531290309}"/>
+              </a:ext>
+            </a:extLst>
+          </p:cNvPr>
+          <p:cNvSpPr>
+            <a:spLocks noGrp="1"/>
+          </p:cNvSpPr>
+          <p:nvPr>
+            <p:ph type="sldNum" sz="quarter" idx="12"/>
+          </p:nvPr>
+        </p:nvSpPr>
+        <p:spPr/>
+        <p:txBody>
+          <a:bodyPr/>
+          <a:lstStyle/>
+          <a:p>
+            <a:fld id="{9F75ED48-FB93-4D27-9D40-6DF4DFA3F996}" type="slidenum">
+              <a:rPr lang="ru-RU" smtClean="0"/>
+              <a:t>2</a:t>
+            </a:fld>
+            <a:endParaRPr lang="ru-RU" dirty="0"/>
+          </a:p>
+        </p:txBody>
+      </p:sp>
+    </p:spTree>
+    <p:extLst>
+      <p:ext uri="{BB962C8B-B14F-4D97-AF65-F5344CB8AC3E}">
+        <p14:creationId xmlns:p14="http://schemas.microsoft.com/office/powerpoint/2010/main" val="3170820330"/>
+      </p:ext>
+    </p:extLst>
+  </p:cSld>
+  <p:clrMapOvr>
+    <a:masterClrMapping/>
+  </p:clrMapOvr>
+</p:sld>
+</file>
+
+<file path=ppt/slides/slide3.xml><?xml version="1.0" encoding="utf-8"?>
+<p:sld xmlns:a="http://schemas.openxmlformats.org/drawingml/2006/main" xmlns:r="http://schemas.openxmlformats.org/officeDocument/2006/relationships" xmlns:p="http://schemas.openxmlformats.org/presentationml/2006/main">
+  <p:cSld>
+    <p:spTree>
+      <p:nvGrpSpPr>
+        <p:cNvPr id="1" name="">
+          <a:extLst>
+            <a:ext uri="{FF2B5EF4-FFF2-40B4-BE49-F238E27FC236}">
+              <a16:creationId xmlns:a16="http://schemas.microsoft.com/office/drawing/2014/main" id="{3A520EA1-348A-FCEF-67E0-3D5535A417A1}"/>
+            </a:ext>
+          </a:extLst>
+        </p:cNvPr>
+        <p:cNvGrpSpPr/>
+        <p:nvPr/>
+      </p:nvGrpSpPr>
+      <p:grpSpPr>
+        <a:xfrm>
+          <a:off x="0" y="0"/>
+          <a:ext cx="0" cy="0"/>
+          <a:chOff x="0" y="0"/>
+          <a:chExt cx="0" cy="0"/>
+        </a:xfrm>
+      </p:grpSpPr>
+      <p:sp>
+        <p:nvSpPr>
+          <p:cNvPr id="2" name="Заголовок 1">
+            <a:extLst>
+              <a:ext uri="{FF2B5EF4-FFF2-40B4-BE49-F238E27FC236}">
+                <a16:creationId xmlns:a16="http://schemas.microsoft.com/office/drawing/2014/main" id="{320C03E9-4032-F4B7-1782-7BD2E1F3A295}"/>
+              </a:ext>
+            </a:extLst>
+          </p:cNvPr>
+          <p:cNvSpPr>
+            <a:spLocks noGrp="1"/>
+          </p:cNvSpPr>
+          <p:nvPr>
+            <p:ph type="title"/>
+          </p:nvPr>
+        </p:nvSpPr>
+        <p:spPr/>
+        <p:txBody>
+          <a:bodyPr/>
+          <a:lstStyle/>
+          <a:p>
+            <a:r>
+              <a:rPr lang="ru-RU" dirty="0">
+                <a:latin typeface="Times New Roman"/>
+                <a:cs typeface="Times New Roman"/>
+              </a:rPr>
+              <a:t>Анализ моделей баз данных</a:t>
+            </a:r>
+          </a:p>
+        </p:txBody>
+      </p:sp>
+      <p:sp>
+        <p:nvSpPr>
+          <p:cNvPr id="4" name="Номер слайда 3">
+            <a:extLst>
+              <a:ext uri="{FF2B5EF4-FFF2-40B4-BE49-F238E27FC236}">
+                <a16:creationId xmlns:a16="http://schemas.microsoft.com/office/drawing/2014/main" id="{571E63CD-58BF-286B-30FD-266729362DCE}"/>
               </a:ext>
             </a:extLst>
           </p:cNvPr>
@@ -7857,14 +7516,692 @@
               <a:rPr lang="ru-RU" smtClean="0"/>
               <a:t>3</a:t>
             </a:fld>
-            <a:endParaRPr lang="ru-RU" dirty="0"/>
-          </a:p>
-        </p:txBody>
-      </p:sp>
+            <a:endParaRPr lang="ru-RU"/>
+          </a:p>
+        </p:txBody>
+      </p:sp>
+      <p:graphicFrame>
+        <p:nvGraphicFramePr>
+          <p:cNvPr id="7" name="Таблица 6">
+            <a:extLst>
+              <a:ext uri="{FF2B5EF4-FFF2-40B4-BE49-F238E27FC236}">
+                <a16:creationId xmlns:a16="http://schemas.microsoft.com/office/drawing/2014/main" id="{6AF2A19C-FAF2-EF29-50E0-0F9598B5B757}"/>
+              </a:ext>
+            </a:extLst>
+          </p:cNvPr>
+          <p:cNvGraphicFramePr>
+            <a:graphicFrameLocks noGrp="1"/>
+          </p:cNvGraphicFramePr>
+          <p:nvPr>
+            <p:extLst>
+              <p:ext uri="{D42A27DB-BD31-4B8C-83A1-F6EECF244321}">
+                <p14:modId xmlns:p14="http://schemas.microsoft.com/office/powerpoint/2010/main" val="4127085282"/>
+              </p:ext>
+            </p:extLst>
+          </p:nvPr>
+        </p:nvGraphicFramePr>
+        <p:xfrm>
+          <a:off x="1261532" y="1614488"/>
+          <a:ext cx="9406460" cy="3516133"/>
+        </p:xfrm>
+        <a:graphic>
+          <a:graphicData uri="http://schemas.openxmlformats.org/drawingml/2006/table">
+            <a:tbl>
+              <a:tblPr firstRow="1" bandRow="1">
+                <a:tableStyleId>{5940675A-B579-460E-94D1-54222C63F5DA}</a:tableStyleId>
+              </a:tblPr>
+              <a:tblGrid>
+                <a:gridCol w="2506868">
+                  <a:extLst>
+                    <a:ext uri="{9D8B030D-6E8A-4147-A177-3AD203B41FA5}">
+                      <a16:colId xmlns:a16="http://schemas.microsoft.com/office/drawing/2014/main" val="1307928213"/>
+                    </a:ext>
+                  </a:extLst>
+                </a:gridCol>
+                <a:gridCol w="1658730">
+                  <a:extLst>
+                    <a:ext uri="{9D8B030D-6E8A-4147-A177-3AD203B41FA5}">
+                      <a16:colId xmlns:a16="http://schemas.microsoft.com/office/drawing/2014/main" val="2253008031"/>
+                    </a:ext>
+                  </a:extLst>
+                </a:gridCol>
+                <a:gridCol w="1771626">
+                  <a:extLst>
+                    <a:ext uri="{9D8B030D-6E8A-4147-A177-3AD203B41FA5}">
+                      <a16:colId xmlns:a16="http://schemas.microsoft.com/office/drawing/2014/main" val="4019632428"/>
+                    </a:ext>
+                  </a:extLst>
+                </a:gridCol>
+                <a:gridCol w="1579217">
+                  <a:extLst>
+                    <a:ext uri="{9D8B030D-6E8A-4147-A177-3AD203B41FA5}">
+                      <a16:colId xmlns:a16="http://schemas.microsoft.com/office/drawing/2014/main" val="3796163886"/>
+                    </a:ext>
+                  </a:extLst>
+                </a:gridCol>
+                <a:gridCol w="1890019">
+                  <a:extLst>
+                    <a:ext uri="{9D8B030D-6E8A-4147-A177-3AD203B41FA5}">
+                      <a16:colId xmlns:a16="http://schemas.microsoft.com/office/drawing/2014/main" val="506650305"/>
+                    </a:ext>
+                  </a:extLst>
+                </a:gridCol>
+              </a:tblGrid>
+              <a:tr h="783367">
+                <a:tc>
+                  <a:txBody>
+                    <a:bodyPr/>
+                    <a:lstStyle/>
+                    <a:p>
+                      <a:r>
+                        <a:rPr lang="ru-RU" sz="1800" kern="1200" dirty="0">
+                          <a:solidFill>
+                            <a:schemeClr val="tx1"/>
+                          </a:solidFill>
+                          <a:latin typeface="Times New Roman"/>
+                          <a:ea typeface="+mn-ea"/>
+                          <a:cs typeface="Times New Roman"/>
+                        </a:rPr>
+                        <a:t>Критерии</a:t>
+                      </a:r>
+                    </a:p>
+                  </a:txBody>
+                  <a:tcPr/>
+                </a:tc>
+                <a:tc>
+                  <a:txBody>
+                    <a:bodyPr/>
+                    <a:lstStyle/>
+                    <a:p>
+                      <a:r>
+                        <a:rPr lang="en-US" sz="1800" kern="1200" err="1">
+                          <a:solidFill>
+                            <a:schemeClr val="tx1"/>
+                          </a:solidFill>
+                          <a:latin typeface="Times New Roman"/>
+                          <a:ea typeface="+mn-ea"/>
+                          <a:cs typeface="Times New Roman"/>
+                        </a:rPr>
+                        <a:t>Иерархическая</a:t>
+                      </a:r>
+                      <a:endParaRPr lang="en-US" sz="1800" kern="1200" dirty="0" err="1">
+                        <a:solidFill>
+                          <a:schemeClr val="tx1"/>
+                        </a:solidFill>
+                        <a:latin typeface="Times New Roman"/>
+                        <a:ea typeface="+mn-ea"/>
+                        <a:cs typeface="Times New Roman"/>
+                      </a:endParaRPr>
+                    </a:p>
+                  </a:txBody>
+                  <a:tcPr/>
+                </a:tc>
+                <a:tc>
+                  <a:txBody>
+                    <a:bodyPr/>
+                    <a:lstStyle/>
+                    <a:p>
+                      <a:pPr lvl="0">
+                        <a:buNone/>
+                      </a:pPr>
+                      <a:r>
+                        <a:rPr lang="en-US" sz="1800" kern="1200" err="1">
+                          <a:solidFill>
+                            <a:schemeClr val="tx1"/>
+                          </a:solidFill>
+                          <a:latin typeface="Times New Roman"/>
+                          <a:ea typeface="+mn-ea"/>
+                          <a:cs typeface="Times New Roman"/>
+                        </a:rPr>
+                        <a:t>Сетевая</a:t>
+                      </a:r>
+                      <a:endParaRPr lang="ru-RU" sz="1800" kern="1200" err="1">
+                        <a:solidFill>
+                          <a:schemeClr val="tx1"/>
+                        </a:solidFill>
+                        <a:latin typeface="Times New Roman"/>
+                        <a:ea typeface="+mn-ea"/>
+                        <a:cs typeface="Times New Roman"/>
+                      </a:endParaRPr>
+                    </a:p>
+                  </a:txBody>
+                  <a:tcPr/>
+                </a:tc>
+                <a:tc>
+                  <a:txBody>
+                    <a:bodyPr/>
+                    <a:lstStyle/>
+                    <a:p>
+                      <a:r>
+                        <a:rPr lang="en-US" sz="1800" kern="1200" err="1">
+                          <a:solidFill>
+                            <a:schemeClr val="tx1"/>
+                          </a:solidFill>
+                          <a:latin typeface="Times New Roman"/>
+                          <a:ea typeface="+mn-ea"/>
+                          <a:cs typeface="Times New Roman"/>
+                        </a:rPr>
+                        <a:t>Реляционная</a:t>
+                      </a:r>
+                    </a:p>
+                  </a:txBody>
+                  <a:tcPr>
+                    <a:solidFill>
+                      <a:schemeClr val="accent6">
+                        <a:lumMod val="20000"/>
+                        <a:lumOff val="80000"/>
+                      </a:schemeClr>
+                    </a:solidFill>
+                  </a:tcPr>
+                </a:tc>
+                <a:tc>
+                  <a:txBody>
+                    <a:bodyPr/>
+                    <a:lstStyle/>
+                    <a:p>
+                      <a:r>
+                        <a:rPr lang="en-US" sz="1800" kern="1200" err="1">
+                          <a:solidFill>
+                            <a:schemeClr val="tx1"/>
+                          </a:solidFill>
+                          <a:latin typeface="Times New Roman"/>
+                          <a:ea typeface="+mn-ea"/>
+                          <a:cs typeface="Times New Roman"/>
+                        </a:rPr>
+                        <a:t>Документо-ориентированная</a:t>
+                      </a:r>
+                      <a:endParaRPr lang="en-US" sz="1800" kern="1200" dirty="0" err="1">
+                        <a:solidFill>
+                          <a:schemeClr val="tx1"/>
+                        </a:solidFill>
+                        <a:latin typeface="Times New Roman"/>
+                        <a:ea typeface="+mn-ea"/>
+                        <a:cs typeface="Times New Roman"/>
+                      </a:endParaRPr>
+                    </a:p>
+                  </a:txBody>
+                  <a:tcPr>
+                    <a:solidFill>
+                      <a:schemeClr val="bg1"/>
+                    </a:solidFill>
+                  </a:tcPr>
+                </a:tc>
+                <a:extLst>
+                  <a:ext uri="{0D108BD9-81ED-4DB2-BD59-A6C34878D82A}">
+                    <a16:rowId xmlns:a16="http://schemas.microsoft.com/office/drawing/2014/main" val="539708537"/>
+                  </a:ext>
+                </a:extLst>
+              </a:tr>
+              <a:tr h="903966">
+                <a:tc>
+                  <a:txBody>
+                    <a:bodyPr/>
+                    <a:lstStyle/>
+                    <a:p>
+                      <a:r>
+                        <a:rPr lang="ru-RU" dirty="0">
+                          <a:latin typeface="Times New Roman"/>
+                          <a:cs typeface="Times New Roman"/>
+                        </a:rPr>
+                        <a:t>Физическая независимость данных</a:t>
+                      </a:r>
+                    </a:p>
+                  </a:txBody>
+                  <a:tcPr/>
+                </a:tc>
+                <a:tc>
+                  <a:txBody>
+                    <a:bodyPr/>
+                    <a:lstStyle/>
+                    <a:p>
+                      <a:pPr marL="0" marR="0" lvl="0" indent="0" algn="ctr" defTabSz="914400" rtl="0" eaLnBrk="1" fontAlgn="auto" latinLnBrk="0" hangingPunct="1">
+                        <a:lnSpc>
+                          <a:spcPct val="100000"/>
+                        </a:lnSpc>
+                        <a:spcBef>
+                          <a:spcPts val="0"/>
+                        </a:spcBef>
+                        <a:spcAft>
+                          <a:spcPts val="0"/>
+                        </a:spcAft>
+                        <a:buClrTx/>
+                        <a:buSzTx/>
+                        <a:buFontTx/>
+                        <a:buNone/>
+                        <a:tabLst/>
+                        <a:defRPr/>
+                      </a:pPr>
+                      <a:r>
+                        <a:rPr lang="ru-RU" sz="2400" b="1" dirty="0">
+                          <a:latin typeface="Times New Roman" panose="02020603050405020304" pitchFamily="18" charset="0"/>
+                          <a:cs typeface="Times New Roman" panose="02020603050405020304" pitchFamily="18" charset="0"/>
+                        </a:rPr>
+                        <a:t>–</a:t>
+                      </a:r>
+                    </a:p>
+                    <a:p>
+                      <a:pPr algn="ctr"/>
+                      <a:endParaRPr lang="ru-RU" sz="2400" b="1" dirty="0">
+                        <a:latin typeface="Times New Roman" panose="02020603050405020304" pitchFamily="18" charset="0"/>
+                        <a:cs typeface="Times New Roman" panose="02020603050405020304" pitchFamily="18" charset="0"/>
+                      </a:endParaRPr>
+                    </a:p>
+                  </a:txBody>
+                  <a:tcPr/>
+                </a:tc>
+                <a:tc>
+                  <a:txBody>
+                    <a:bodyPr/>
+                    <a:lstStyle/>
+                    <a:p>
+                      <a:pPr marL="0" marR="0" lvl="0" indent="0" algn="ctr" defTabSz="914400" rtl="0" eaLnBrk="1" fontAlgn="auto" latinLnBrk="0" hangingPunct="1">
+                        <a:lnSpc>
+                          <a:spcPct val="100000"/>
+                        </a:lnSpc>
+                        <a:spcBef>
+                          <a:spcPts val="0"/>
+                        </a:spcBef>
+                        <a:spcAft>
+                          <a:spcPts val="0"/>
+                        </a:spcAft>
+                        <a:buClrTx/>
+                        <a:buSzTx/>
+                        <a:buFontTx/>
+                        <a:buNone/>
+                        <a:tabLst/>
+                        <a:defRPr/>
+                      </a:pPr>
+                      <a:r>
+                        <a:rPr lang="ru-RU" sz="2400" b="1" dirty="0">
+                          <a:latin typeface="Times New Roman" panose="02020603050405020304" pitchFamily="18" charset="0"/>
+                          <a:cs typeface="Times New Roman" panose="02020603050405020304" pitchFamily="18" charset="0"/>
+                        </a:rPr>
+                        <a:t>–</a:t>
+                      </a:r>
+                    </a:p>
+                    <a:p>
+                      <a:pPr algn="ctr"/>
+                      <a:endParaRPr lang="ru-RU" sz="2400" b="1" dirty="0">
+                        <a:latin typeface="Times New Roman" panose="02020603050405020304" pitchFamily="18" charset="0"/>
+                        <a:cs typeface="Times New Roman" panose="02020603050405020304" pitchFamily="18" charset="0"/>
+                      </a:endParaRPr>
+                    </a:p>
+                  </a:txBody>
+                  <a:tcPr/>
+                </a:tc>
+                <a:tc>
+                  <a:txBody>
+                    <a:bodyPr/>
+                    <a:lstStyle/>
+                    <a:p>
+                      <a:pPr algn="ctr"/>
+                      <a:r>
+                        <a:rPr lang="en-US" sz="2400" b="1" dirty="0">
+                          <a:latin typeface="Times New Roman" panose="02020603050405020304" pitchFamily="18" charset="0"/>
+                          <a:cs typeface="Times New Roman" panose="02020603050405020304" pitchFamily="18" charset="0"/>
+                        </a:rPr>
+                        <a:t>+</a:t>
+                      </a:r>
+                      <a:endParaRPr lang="ru-RU" sz="2400" b="1" dirty="0">
+                        <a:latin typeface="Times New Roman" panose="02020603050405020304" pitchFamily="18" charset="0"/>
+                        <a:cs typeface="Times New Roman" panose="02020603050405020304" pitchFamily="18" charset="0"/>
+                      </a:endParaRPr>
+                    </a:p>
+                  </a:txBody>
+                  <a:tcPr>
+                    <a:solidFill>
+                      <a:schemeClr val="accent6">
+                        <a:lumMod val="20000"/>
+                        <a:lumOff val="80000"/>
+                      </a:schemeClr>
+                    </a:solidFill>
+                  </a:tcPr>
+                </a:tc>
+                <a:tc>
+                  <a:txBody>
+                    <a:bodyPr/>
+                    <a:lstStyle/>
+                    <a:p>
+                      <a:pPr algn="ctr"/>
+                      <a:r>
+                        <a:rPr lang="en-US" sz="2400" b="1" dirty="0">
+                          <a:latin typeface="Times New Roman" panose="02020603050405020304" pitchFamily="18" charset="0"/>
+                          <a:cs typeface="Times New Roman" panose="02020603050405020304" pitchFamily="18" charset="0"/>
+                        </a:rPr>
+                        <a:t>+</a:t>
+                      </a:r>
+                      <a:endParaRPr lang="ru-RU" sz="2400" b="1" dirty="0">
+                        <a:latin typeface="Times New Roman" panose="02020603050405020304" pitchFamily="18" charset="0"/>
+                        <a:cs typeface="Times New Roman" panose="02020603050405020304" pitchFamily="18" charset="0"/>
+                      </a:endParaRPr>
+                    </a:p>
+                  </a:txBody>
+                  <a:tcPr>
+                    <a:solidFill>
+                      <a:schemeClr val="bg1"/>
+                    </a:solidFill>
+                  </a:tcPr>
+                </a:tc>
+                <a:extLst>
+                  <a:ext uri="{0D108BD9-81ED-4DB2-BD59-A6C34878D82A}">
+                    <a16:rowId xmlns:a16="http://schemas.microsoft.com/office/drawing/2014/main" val="3986946151"/>
+                  </a:ext>
+                </a:extLst>
+              </a:tr>
+              <a:tr h="881422">
+                <a:tc>
+                  <a:txBody>
+                    <a:bodyPr/>
+                    <a:lstStyle/>
+                    <a:p>
+                      <a:r>
+                        <a:rPr lang="ru-RU" dirty="0">
+                          <a:latin typeface="Times New Roman"/>
+                          <a:cs typeface="Times New Roman"/>
+                        </a:rPr>
+                        <a:t>Возможность создания отношения "многие ко многим"</a:t>
+                      </a:r>
+                    </a:p>
+                  </a:txBody>
+                  <a:tcPr/>
+                </a:tc>
+                <a:tc>
+                  <a:txBody>
+                    <a:bodyPr/>
+                    <a:lstStyle/>
+                    <a:p>
+                      <a:pPr marL="0" marR="0" lvl="0" indent="0" algn="ctr" defTabSz="914400" rtl="0" eaLnBrk="1" fontAlgn="auto" latinLnBrk="0" hangingPunct="1">
+                        <a:lnSpc>
+                          <a:spcPct val="100000"/>
+                        </a:lnSpc>
+                        <a:spcBef>
+                          <a:spcPts val="0"/>
+                        </a:spcBef>
+                        <a:spcAft>
+                          <a:spcPts val="0"/>
+                        </a:spcAft>
+                        <a:buClrTx/>
+                        <a:buSzTx/>
+                        <a:buFontTx/>
+                        <a:buNone/>
+                        <a:tabLst/>
+                        <a:defRPr/>
+                      </a:pPr>
+                      <a:r>
+                        <a:rPr lang="ru-RU" sz="2400" b="1" dirty="0">
+                          <a:latin typeface="Times New Roman" panose="02020603050405020304" pitchFamily="18" charset="0"/>
+                          <a:cs typeface="Times New Roman" panose="02020603050405020304" pitchFamily="18" charset="0"/>
+                        </a:rPr>
+                        <a:t>–</a:t>
+                      </a:r>
+                    </a:p>
+                    <a:p>
+                      <a:pPr algn="ctr"/>
+                      <a:endParaRPr lang="ru-RU" sz="2400" b="1" dirty="0">
+                        <a:latin typeface="Times New Roman" panose="02020603050405020304" pitchFamily="18" charset="0"/>
+                        <a:cs typeface="Times New Roman" panose="02020603050405020304" pitchFamily="18" charset="0"/>
+                      </a:endParaRPr>
+                    </a:p>
+                  </a:txBody>
+                  <a:tcPr/>
+                </a:tc>
+                <a:tc>
+                  <a:txBody>
+                    <a:bodyPr/>
+                    <a:lstStyle/>
+                    <a:p>
+                      <a:pPr marL="0" marR="0" lvl="0" indent="0" algn="ctr" defTabSz="914400" rtl="0" eaLnBrk="1" fontAlgn="auto" latinLnBrk="0" hangingPunct="1">
+                        <a:lnSpc>
+                          <a:spcPct val="100000"/>
+                        </a:lnSpc>
+                        <a:spcBef>
+                          <a:spcPts val="0"/>
+                        </a:spcBef>
+                        <a:spcAft>
+                          <a:spcPts val="0"/>
+                        </a:spcAft>
+                        <a:buClrTx/>
+                        <a:buSzTx/>
+                        <a:buFontTx/>
+                        <a:buNone/>
+                        <a:tabLst/>
+                        <a:defRPr/>
+                      </a:pPr>
+                      <a:r>
+                        <a:rPr lang="ru-RU" sz="2400" b="1" dirty="0">
+                          <a:latin typeface="Times New Roman" panose="02020603050405020304" pitchFamily="18" charset="0"/>
+                          <a:cs typeface="Times New Roman" panose="02020603050405020304" pitchFamily="18" charset="0"/>
+                        </a:rPr>
+                        <a:t>–</a:t>
+                      </a:r>
+                    </a:p>
+                    <a:p>
+                      <a:pPr algn="ctr"/>
+                      <a:endParaRPr lang="ru-RU" sz="2400" b="1" dirty="0">
+                        <a:latin typeface="Times New Roman" panose="02020603050405020304" pitchFamily="18" charset="0"/>
+                        <a:cs typeface="Times New Roman" panose="02020603050405020304" pitchFamily="18" charset="0"/>
+                      </a:endParaRPr>
+                    </a:p>
+                  </a:txBody>
+                  <a:tcPr/>
+                </a:tc>
+                <a:tc>
+                  <a:txBody>
+                    <a:bodyPr/>
+                    <a:lstStyle/>
+                    <a:p>
+                      <a:pPr algn="ctr"/>
+                      <a:r>
+                        <a:rPr lang="en-US" sz="2400" b="1" dirty="0">
+                          <a:latin typeface="Times New Roman" panose="02020603050405020304" pitchFamily="18" charset="0"/>
+                          <a:cs typeface="Times New Roman" panose="02020603050405020304" pitchFamily="18" charset="0"/>
+                        </a:rPr>
+                        <a:t>+</a:t>
+                      </a:r>
+                      <a:endParaRPr lang="ru-RU" sz="2400" b="1" dirty="0">
+                        <a:latin typeface="Times New Roman" panose="02020603050405020304" pitchFamily="18" charset="0"/>
+                        <a:cs typeface="Times New Roman" panose="02020603050405020304" pitchFamily="18" charset="0"/>
+                      </a:endParaRPr>
+                    </a:p>
+                  </a:txBody>
+                  <a:tcPr>
+                    <a:solidFill>
+                      <a:schemeClr val="accent6">
+                        <a:lumMod val="20000"/>
+                        <a:lumOff val="80000"/>
+                      </a:schemeClr>
+                    </a:solidFill>
+                  </a:tcPr>
+                </a:tc>
+                <a:tc>
+                  <a:txBody>
+                    <a:bodyPr/>
+                    <a:lstStyle/>
+                    <a:p>
+                      <a:pPr algn="ctr"/>
+                      <a:r>
+                        <a:rPr lang="en-US" sz="2400" b="1" dirty="0">
+                          <a:latin typeface="Times New Roman" panose="02020603050405020304" pitchFamily="18" charset="0"/>
+                          <a:cs typeface="Times New Roman" panose="02020603050405020304" pitchFamily="18" charset="0"/>
+                        </a:rPr>
+                        <a:t>+</a:t>
+                      </a:r>
+                      <a:endParaRPr lang="ru-RU" sz="2400" b="1" dirty="0">
+                        <a:latin typeface="Times New Roman" panose="02020603050405020304" pitchFamily="18" charset="0"/>
+                        <a:cs typeface="Times New Roman" panose="02020603050405020304" pitchFamily="18" charset="0"/>
+                      </a:endParaRPr>
+                    </a:p>
+                  </a:txBody>
+                  <a:tcPr>
+                    <a:solidFill>
+                      <a:schemeClr val="bg1"/>
+                    </a:solidFill>
+                  </a:tcPr>
+                </a:tc>
+                <a:extLst>
+                  <a:ext uri="{0D108BD9-81ED-4DB2-BD59-A6C34878D82A}">
+                    <a16:rowId xmlns:a16="http://schemas.microsoft.com/office/drawing/2014/main" val="3044166014"/>
+                  </a:ext>
+                </a:extLst>
+              </a:tr>
+              <a:tr h="883569">
+                <a:tc>
+                  <a:txBody>
+                    <a:bodyPr/>
+                    <a:lstStyle/>
+                    <a:p>
+                      <a:r>
+                        <a:rPr lang="ru-RU" dirty="0">
+                          <a:latin typeface="Times New Roman"/>
+                          <a:cs typeface="Times New Roman"/>
+                        </a:rPr>
+                        <a:t>Поддержка целостности и корректности данных</a:t>
+                      </a:r>
+                    </a:p>
+                  </a:txBody>
+                  <a:tcPr/>
+                </a:tc>
+                <a:tc>
+                  <a:txBody>
+                    <a:bodyPr/>
+                    <a:lstStyle/>
+                    <a:p>
+                      <a:pPr algn="ctr"/>
+                      <a:r>
+                        <a:rPr lang="en-US" sz="2400" b="1" dirty="0">
+                          <a:latin typeface="Times New Roman" panose="02020603050405020304" pitchFamily="18" charset="0"/>
+                          <a:cs typeface="Times New Roman" panose="02020603050405020304" pitchFamily="18" charset="0"/>
+                        </a:rPr>
+                        <a:t>+</a:t>
+                      </a:r>
+                      <a:endParaRPr lang="ru-RU" sz="2400" b="1" dirty="0">
+                        <a:latin typeface="Times New Roman" panose="02020603050405020304" pitchFamily="18" charset="0"/>
+                        <a:cs typeface="Times New Roman" panose="02020603050405020304" pitchFamily="18" charset="0"/>
+                      </a:endParaRPr>
+                    </a:p>
+                  </a:txBody>
+                  <a:tcPr/>
+                </a:tc>
+                <a:tc>
+                  <a:txBody>
+                    <a:bodyPr/>
+                    <a:lstStyle/>
+                    <a:p>
+                      <a:pPr marL="0" marR="0" lvl="0" indent="0" algn="ctr" defTabSz="914400" rtl="0" eaLnBrk="1" fontAlgn="auto" latinLnBrk="0" hangingPunct="1">
+                        <a:lnSpc>
+                          <a:spcPct val="100000"/>
+                        </a:lnSpc>
+                        <a:spcBef>
+                          <a:spcPts val="0"/>
+                        </a:spcBef>
+                        <a:spcAft>
+                          <a:spcPts val="0"/>
+                        </a:spcAft>
+                        <a:buClrTx/>
+                        <a:buSzTx/>
+                        <a:buFontTx/>
+                        <a:buNone/>
+                        <a:tabLst/>
+                        <a:defRPr/>
+                      </a:pPr>
+                      <a:r>
+                        <a:rPr lang="ru-RU" sz="2400" b="1" dirty="0">
+                          <a:latin typeface="Times New Roman"/>
+                          <a:cs typeface="Times New Roman"/>
+                        </a:rPr>
+                        <a:t>+</a:t>
+                      </a:r>
+                    </a:p>
+                    <a:p>
+                      <a:pPr algn="ctr"/>
+                      <a:endParaRPr lang="ru-RU" sz="2400" b="1" dirty="0">
+                        <a:latin typeface="Times New Roman" panose="02020603050405020304" pitchFamily="18" charset="0"/>
+                        <a:cs typeface="Times New Roman" panose="02020603050405020304" pitchFamily="18" charset="0"/>
+                      </a:endParaRPr>
+                    </a:p>
+                  </a:txBody>
+                  <a:tcPr/>
+                </a:tc>
+                <a:tc>
+                  <a:txBody>
+                    <a:bodyPr/>
+                    <a:lstStyle/>
+                    <a:p>
+                      <a:pPr marL="0" marR="0" lvl="0" indent="0" algn="ctr" defTabSz="914400" rtl="0" eaLnBrk="1" fontAlgn="auto" latinLnBrk="0" hangingPunct="1">
+                        <a:lnSpc>
+                          <a:spcPct val="100000"/>
+                        </a:lnSpc>
+                        <a:spcBef>
+                          <a:spcPts val="0"/>
+                        </a:spcBef>
+                        <a:spcAft>
+                          <a:spcPts val="0"/>
+                        </a:spcAft>
+                        <a:buClrTx/>
+                        <a:buSzTx/>
+                        <a:buFontTx/>
+                        <a:buNone/>
+                        <a:tabLst/>
+                        <a:defRPr/>
+                      </a:pPr>
+                      <a:r>
+                        <a:rPr lang="ru-RU" sz="2400" b="1" dirty="0">
+                          <a:latin typeface="Times New Roman"/>
+                          <a:cs typeface="Times New Roman"/>
+                        </a:rPr>
+                        <a:t>+</a:t>
+                      </a:r>
+                    </a:p>
+                  </a:txBody>
+                  <a:tcPr>
+                    <a:solidFill>
+                      <a:schemeClr val="accent6">
+                        <a:lumMod val="20000"/>
+                        <a:lumOff val="80000"/>
+                      </a:schemeClr>
+                    </a:solidFill>
+                  </a:tcPr>
+                </a:tc>
+                <a:tc>
+                  <a:txBody>
+                    <a:bodyPr/>
+                    <a:lstStyle/>
+                    <a:p>
+                      <a:pPr lvl="0" algn="ctr">
+                        <a:buNone/>
+                      </a:pPr>
+                      <a:r>
+                        <a:rPr lang="ru-RU" sz="2400" b="1" i="0" u="none" strike="noStrike" noProof="0" dirty="0">
+                          <a:solidFill>
+                            <a:srgbClr val="000000"/>
+                          </a:solidFill>
+                          <a:latin typeface="Times New Roman"/>
+                        </a:rPr>
+                        <a:t>–</a:t>
+                      </a:r>
+                      <a:endParaRPr lang="ru-RU" dirty="0"/>
+                    </a:p>
+                  </a:txBody>
+                  <a:tcPr>
+                    <a:solidFill>
+                      <a:schemeClr val="bg1"/>
+                    </a:solidFill>
+                  </a:tcPr>
+                </a:tc>
+                <a:extLst>
+                  <a:ext uri="{0D108BD9-81ED-4DB2-BD59-A6C34878D82A}">
+                    <a16:rowId xmlns:a16="http://schemas.microsoft.com/office/drawing/2014/main" val="2579086937"/>
+                  </a:ext>
+                </a:extLst>
+              </a:tr>
+            </a:tbl>
+          </a:graphicData>
+        </a:graphic>
+      </p:graphicFrame>
     </p:spTree>
     <p:extLst>
       <p:ext uri="{BB962C8B-B14F-4D97-AF65-F5344CB8AC3E}">
-        <p14:creationId xmlns:p14="http://schemas.microsoft.com/office/powerpoint/2010/main" val="3170820330"/>
+        <p14:creationId xmlns:p14="http://schemas.microsoft.com/office/powerpoint/2010/main" val="1297527811"/>
       </p:ext>
     </p:extLst>
   </p:cSld>
@@ -8017,405 +8354,6 @@
 <file path=ppt/slides/slide5.xml><?xml version="1.0" encoding="utf-8"?>
 <p:sld xmlns:a="http://schemas.openxmlformats.org/drawingml/2006/main" xmlns:r="http://schemas.openxmlformats.org/officeDocument/2006/relationships" xmlns:p="http://schemas.openxmlformats.org/presentationml/2006/main">
   <p:cSld>
-    <p:spTree>
-      <p:nvGrpSpPr>
-        <p:cNvPr id="1" name="">
-          <a:extLst>
-            <a:ext uri="{FF2B5EF4-FFF2-40B4-BE49-F238E27FC236}">
-              <a16:creationId xmlns:a16="http://schemas.microsoft.com/office/drawing/2014/main" id="{14A46940-1958-6896-83DC-00DE70AF7E1E}"/>
-            </a:ext>
-          </a:extLst>
-        </p:cNvPr>
-        <p:cNvGrpSpPr/>
-        <p:nvPr/>
-      </p:nvGrpSpPr>
-      <p:grpSpPr>
-        <a:xfrm>
-          <a:off x="0" y="0"/>
-          <a:ext cx="0" cy="0"/>
-          <a:chOff x="0" y="0"/>
-          <a:chExt cx="0" cy="0"/>
-        </a:xfrm>
-      </p:grpSpPr>
-      <p:sp>
-        <p:nvSpPr>
-          <p:cNvPr id="2" name="Заголовок 1">
-            <a:extLst>
-              <a:ext uri="{FF2B5EF4-FFF2-40B4-BE49-F238E27FC236}">
-                <a16:creationId xmlns:a16="http://schemas.microsoft.com/office/drawing/2014/main" id="{12ECE4A4-A4DB-C27D-E985-3CEDE034C318}"/>
-              </a:ext>
-            </a:extLst>
-          </p:cNvPr>
-          <p:cNvSpPr>
-            <a:spLocks noGrp="1"/>
-          </p:cNvSpPr>
-          <p:nvPr>
-            <p:ph type="title"/>
-          </p:nvPr>
-        </p:nvSpPr>
-        <p:spPr/>
-        <p:txBody>
-          <a:bodyPr/>
-          <a:lstStyle/>
-          <a:p>
-            <a:r>
-              <a:rPr lang="ru-RU" dirty="0">
-                <a:latin typeface="Times New Roman" panose="02020603050405020304" pitchFamily="18" charset="0"/>
-                <a:ea typeface="+mn-ea"/>
-                <a:cs typeface="Times New Roman" panose="02020603050405020304" pitchFamily="18" charset="0"/>
-              </a:rPr>
-              <a:t>Пользователи</a:t>
-            </a:r>
-          </a:p>
-        </p:txBody>
-      </p:sp>
-      <p:sp>
-        <p:nvSpPr>
-          <p:cNvPr id="9" name="Номер слайда 8">
-            <a:extLst>
-              <a:ext uri="{FF2B5EF4-FFF2-40B4-BE49-F238E27FC236}">
-                <a16:creationId xmlns:a16="http://schemas.microsoft.com/office/drawing/2014/main" id="{F8546B9D-1A29-36D0-9385-6F750300AE44}"/>
-              </a:ext>
-            </a:extLst>
-          </p:cNvPr>
-          <p:cNvSpPr>
-            <a:spLocks noGrp="1"/>
-          </p:cNvSpPr>
-          <p:nvPr>
-            <p:ph type="sldNum" sz="quarter" idx="12"/>
-          </p:nvPr>
-        </p:nvSpPr>
-        <p:spPr/>
-        <p:txBody>
-          <a:bodyPr/>
-          <a:lstStyle/>
-          <a:p>
-            <a:fld id="{9F75ED48-FB93-4D27-9D40-6DF4DFA3F996}" type="slidenum">
-              <a:rPr lang="ru-RU" smtClean="0"/>
-              <a:t>5</a:t>
-            </a:fld>
-            <a:endParaRPr lang="ru-RU"/>
-          </a:p>
-        </p:txBody>
-      </p:sp>
-      <p:graphicFrame>
-        <p:nvGraphicFramePr>
-          <p:cNvPr id="3" name="Таблица 2">
-            <a:extLst>
-              <a:ext uri="{FF2B5EF4-FFF2-40B4-BE49-F238E27FC236}">
-                <a16:creationId xmlns:a16="http://schemas.microsoft.com/office/drawing/2014/main" id="{6E5B5614-D6CD-5433-7E65-C7C447B0C998}"/>
-              </a:ext>
-            </a:extLst>
-          </p:cNvPr>
-          <p:cNvGraphicFramePr>
-            <a:graphicFrameLocks noGrp="1"/>
-          </p:cNvGraphicFramePr>
-          <p:nvPr>
-            <p:extLst>
-              <p:ext uri="{D42A27DB-BD31-4B8C-83A1-F6EECF244321}">
-                <p14:modId xmlns:p14="http://schemas.microsoft.com/office/powerpoint/2010/main" val="3845303929"/>
-              </p:ext>
-            </p:extLst>
-          </p:nvPr>
-        </p:nvGraphicFramePr>
-        <p:xfrm>
-          <a:off x="1339850" y="1516740"/>
-          <a:ext cx="9379522" cy="4452322"/>
-        </p:xfrm>
-        <a:graphic>
-          <a:graphicData uri="http://schemas.openxmlformats.org/drawingml/2006/table">
-            <a:tbl>
-              <a:tblPr firstRow="1" bandRow="1">
-                <a:tableStyleId>{5940675A-B579-460E-94D1-54222C63F5DA}</a:tableStyleId>
-              </a:tblPr>
-              <a:tblGrid>
-                <a:gridCol w="1772222">
-                  <a:extLst>
-                    <a:ext uri="{9D8B030D-6E8A-4147-A177-3AD203B41FA5}">
-                      <a16:colId xmlns:a16="http://schemas.microsoft.com/office/drawing/2014/main" val="3263402578"/>
-                    </a:ext>
-                  </a:extLst>
-                </a:gridCol>
-                <a:gridCol w="7607300">
-                  <a:extLst>
-                    <a:ext uri="{9D8B030D-6E8A-4147-A177-3AD203B41FA5}">
-                      <a16:colId xmlns:a16="http://schemas.microsoft.com/office/drawing/2014/main" val="3382176481"/>
-                    </a:ext>
-                  </a:extLst>
-                </a:gridCol>
-              </a:tblGrid>
-              <a:tr h="475131">
-                <a:tc>
-                  <a:txBody>
-                    <a:bodyPr/>
-                    <a:lstStyle/>
-                    <a:p>
-                      <a:r>
-                        <a:rPr lang="ru-RU" sz="1800" kern="1200" dirty="0">
-                          <a:solidFill>
-                            <a:schemeClr val="tx1"/>
-                          </a:solidFill>
-                          <a:latin typeface="Times New Roman" panose="02020603050405020304" pitchFamily="18" charset="0"/>
-                          <a:ea typeface="+mn-ea"/>
-                          <a:cs typeface="Times New Roman" panose="02020603050405020304" pitchFamily="18" charset="0"/>
-                        </a:rPr>
-                        <a:t>Категория</a:t>
-                      </a:r>
-                    </a:p>
-                  </a:txBody>
-                  <a:tcPr/>
-                </a:tc>
-                <a:tc>
-                  <a:txBody>
-                    <a:bodyPr/>
-                    <a:lstStyle/>
-                    <a:p>
-                      <a:r>
-                        <a:rPr lang="ru-RU" sz="1800" kern="1200" dirty="0">
-                          <a:solidFill>
-                            <a:schemeClr val="tx1"/>
-                          </a:solidFill>
-                          <a:latin typeface="Times New Roman" panose="02020603050405020304" pitchFamily="18" charset="0"/>
-                          <a:ea typeface="+mn-ea"/>
-                          <a:cs typeface="Times New Roman" panose="02020603050405020304" pitchFamily="18" charset="0"/>
-                        </a:rPr>
-                        <a:t>Возможности</a:t>
-                      </a:r>
-                    </a:p>
-                  </a:txBody>
-                  <a:tcPr/>
-                </a:tc>
-                <a:extLst>
-                  <a:ext uri="{0D108BD9-81ED-4DB2-BD59-A6C34878D82A}">
-                    <a16:rowId xmlns:a16="http://schemas.microsoft.com/office/drawing/2014/main" val="2170366178"/>
-                  </a:ext>
-                </a:extLst>
-              </a:tr>
-              <a:tr h="865629">
-                <a:tc>
-                  <a:txBody>
-                    <a:bodyPr/>
-                    <a:lstStyle/>
-                    <a:p>
-                      <a:r>
-                        <a:rPr lang="ru-RU" sz="1800" kern="1200" dirty="0">
-                          <a:solidFill>
-                            <a:schemeClr val="tx1"/>
-                          </a:solidFill>
-                          <a:latin typeface="Times New Roman" panose="02020603050405020304" pitchFamily="18" charset="0"/>
-                          <a:ea typeface="+mn-ea"/>
-                          <a:cs typeface="Times New Roman" panose="02020603050405020304" pitchFamily="18" charset="0"/>
-                        </a:rPr>
-                        <a:t>Все пользователи</a:t>
-                      </a:r>
-                    </a:p>
-                  </a:txBody>
-                  <a:tcPr/>
-                </a:tc>
-                <a:tc>
-                  <a:txBody>
-                    <a:bodyPr/>
-                    <a:lstStyle/>
-                    <a:p>
-                      <a:pPr marL="0" marR="0" lvl="0" indent="0" algn="l" defTabSz="914400" rtl="0" eaLnBrk="1" fontAlgn="auto" latinLnBrk="0" hangingPunct="1">
-                        <a:lnSpc>
-                          <a:spcPct val="100000"/>
-                        </a:lnSpc>
-                        <a:spcBef>
-                          <a:spcPts val="0"/>
-                        </a:spcBef>
-                        <a:spcAft>
-                          <a:spcPts val="0"/>
-                        </a:spcAft>
-                        <a:buClrTx/>
-                        <a:buSzTx/>
-                        <a:buFontTx/>
-                        <a:buNone/>
-                        <a:tabLst/>
-                        <a:defRPr/>
-                      </a:pPr>
-                      <a:r>
-                        <a:rPr lang="ru-RU" sz="1800" kern="1200" dirty="0">
-                          <a:solidFill>
-                            <a:schemeClr val="tx1"/>
-                          </a:solidFill>
-                          <a:latin typeface="Times New Roman" panose="02020603050405020304" pitchFamily="18" charset="0"/>
-                          <a:ea typeface="+mn-ea"/>
-                          <a:cs typeface="Times New Roman" panose="02020603050405020304" pitchFamily="18" charset="0"/>
-                        </a:rPr>
-                        <a:t>Просматривать профили игроков, таблицы лидеров соревнования, а также собственно соревнований.</a:t>
-                      </a:r>
-                    </a:p>
-                  </a:txBody>
-                  <a:tcPr/>
-                </a:tc>
-                <a:extLst>
-                  <a:ext uri="{0D108BD9-81ED-4DB2-BD59-A6C34878D82A}">
-                    <a16:rowId xmlns:a16="http://schemas.microsoft.com/office/drawing/2014/main" val="1521722516"/>
-                  </a:ext>
-                </a:extLst>
-              </a:tr>
-              <a:tr h="1100342">
-                <a:tc>
-                  <a:txBody>
-                    <a:bodyPr/>
-                    <a:lstStyle/>
-                    <a:p>
-                      <a:r>
-                        <a:rPr lang="ru-RU" sz="1800" kern="1200" dirty="0">
-                          <a:solidFill>
-                            <a:schemeClr val="tx1"/>
-                          </a:solidFill>
-                          <a:latin typeface="Times New Roman" panose="02020603050405020304" pitchFamily="18" charset="0"/>
-                          <a:ea typeface="+mn-ea"/>
-                          <a:cs typeface="Times New Roman" panose="02020603050405020304" pitchFamily="18" charset="0"/>
-                        </a:rPr>
-                        <a:t>Гость</a:t>
-                      </a:r>
-                    </a:p>
-                  </a:txBody>
-                  <a:tcPr/>
-                </a:tc>
-                <a:tc>
-                  <a:txBody>
-                    <a:bodyPr/>
-                    <a:lstStyle/>
-                    <a:p>
-                      <a:r>
-                        <a:rPr lang="ru-RU" sz="1800" kern="1200" dirty="0">
-                          <a:solidFill>
-                            <a:schemeClr val="tx1"/>
-                          </a:solidFill>
-                          <a:latin typeface="Times New Roman" panose="02020603050405020304" pitchFamily="18" charset="0"/>
-                          <a:ea typeface="+mn-ea"/>
-                          <a:cs typeface="Times New Roman" panose="02020603050405020304" pitchFamily="18" charset="0"/>
-                        </a:rPr>
-                        <a:t>Авторизация и создания аккаунта. При авторизации гость может стать игроком или администратором.</a:t>
-                      </a:r>
-                    </a:p>
-                  </a:txBody>
-                  <a:tcPr/>
-                </a:tc>
-                <a:extLst>
-                  <a:ext uri="{0D108BD9-81ED-4DB2-BD59-A6C34878D82A}">
-                    <a16:rowId xmlns:a16="http://schemas.microsoft.com/office/drawing/2014/main" val="3739291872"/>
-                  </a:ext>
-                </a:extLst>
-              </a:tr>
-              <a:tr h="1005610">
-                <a:tc>
-                  <a:txBody>
-                    <a:bodyPr/>
-                    <a:lstStyle/>
-                    <a:p>
-                      <a:r>
-                        <a:rPr lang="ru-RU" sz="1800" kern="1200" dirty="0">
-                          <a:solidFill>
-                            <a:schemeClr val="tx1"/>
-                          </a:solidFill>
-                          <a:latin typeface="Times New Roman" panose="02020603050405020304" pitchFamily="18" charset="0"/>
-                          <a:ea typeface="+mn-ea"/>
-                          <a:cs typeface="Times New Roman" panose="02020603050405020304" pitchFamily="18" charset="0"/>
-                        </a:rPr>
-                        <a:t>Игрок</a:t>
-                      </a:r>
-                    </a:p>
-                  </a:txBody>
-                  <a:tcPr/>
-                </a:tc>
-                <a:tc>
-                  <a:txBody>
-                    <a:bodyPr/>
-                    <a:lstStyle/>
-                    <a:p>
-                      <a:r>
-                        <a:rPr lang="ru-RU" sz="1800" kern="1200" dirty="0">
-                          <a:solidFill>
-                            <a:schemeClr val="tx1"/>
-                          </a:solidFill>
-                          <a:latin typeface="Times New Roman" panose="02020603050405020304" pitchFamily="18" charset="0"/>
-                          <a:ea typeface="+mn-ea"/>
-                          <a:cs typeface="Times New Roman" panose="02020603050405020304" pitchFamily="18" charset="0"/>
-                        </a:rPr>
-                        <a:t>Просматривать свои награды, редактировать свой профиль, а также участвовать в соревнованиях.</a:t>
-                      </a:r>
-                    </a:p>
-                  </a:txBody>
-                  <a:tcPr/>
-                </a:tc>
-                <a:extLst>
-                  <a:ext uri="{0D108BD9-81ED-4DB2-BD59-A6C34878D82A}">
-                    <a16:rowId xmlns:a16="http://schemas.microsoft.com/office/drawing/2014/main" val="3828747503"/>
-                  </a:ext>
-                </a:extLst>
-              </a:tr>
-              <a:tr h="1005610">
-                <a:tc>
-                  <a:txBody>
-                    <a:bodyPr/>
-                    <a:lstStyle/>
-                    <a:p>
-                      <a:r>
-                        <a:rPr lang="ru-RU" sz="1800" kern="1200" dirty="0">
-                          <a:solidFill>
-                            <a:schemeClr val="tx1"/>
-                          </a:solidFill>
-                          <a:latin typeface="Times New Roman" panose="02020603050405020304" pitchFamily="18" charset="0"/>
-                          <a:ea typeface="+mn-ea"/>
-                          <a:cs typeface="Times New Roman" panose="02020603050405020304" pitchFamily="18" charset="0"/>
-                        </a:rPr>
-                        <a:t>Администратор</a:t>
-                      </a:r>
-                    </a:p>
-                  </a:txBody>
-                  <a:tcPr/>
-                </a:tc>
-                <a:tc>
-                  <a:txBody>
-                    <a:bodyPr/>
-                    <a:lstStyle/>
-                    <a:p>
-                      <a:r>
-                        <a:rPr lang="ru-RU" sz="1800" kern="1200" dirty="0">
-                          <a:solidFill>
-                            <a:schemeClr val="tx1"/>
-                          </a:solidFill>
-                          <a:latin typeface="Times New Roman" panose="02020603050405020304" pitchFamily="18" charset="0"/>
-                          <a:ea typeface="+mn-ea"/>
-                          <a:cs typeface="Times New Roman" panose="02020603050405020304" pitchFamily="18" charset="0"/>
-                        </a:rPr>
-                        <a:t>Назначать и отзывать награды игрока; создавать и редактировать соревнования (сроки, уровни); отзывать нежелательные результаты, удаляя их; создавать и редактировать типы наград.</a:t>
-                      </a:r>
-                    </a:p>
-                  </a:txBody>
-                  <a:tcPr/>
-                </a:tc>
-                <a:extLst>
-                  <a:ext uri="{0D108BD9-81ED-4DB2-BD59-A6C34878D82A}">
-                    <a16:rowId xmlns:a16="http://schemas.microsoft.com/office/drawing/2014/main" val="540651199"/>
-                  </a:ext>
-                </a:extLst>
-              </a:tr>
-            </a:tbl>
-          </a:graphicData>
-        </a:graphic>
-      </p:graphicFrame>
-    </p:spTree>
-    <p:extLst>
-      <p:ext uri="{BB962C8B-B14F-4D97-AF65-F5344CB8AC3E}">
-        <p14:creationId xmlns:p14="http://schemas.microsoft.com/office/powerpoint/2010/main" val="2691422830"/>
-      </p:ext>
-    </p:extLst>
-  </p:cSld>
-  <p:clrMapOvr>
-    <a:masterClrMapping/>
-  </p:clrMapOvr>
-</p:sld>
-</file>
-
-<file path=ppt/slides/slide6.xml><?xml version="1.0" encoding="utf-8"?>
-<p:sld xmlns:a="http://schemas.openxmlformats.org/drawingml/2006/main" xmlns:r="http://schemas.openxmlformats.org/officeDocument/2006/relationships" xmlns:p="http://schemas.openxmlformats.org/presentationml/2006/main">
-  <p:cSld>
     <p:bg>
       <p:bgRef idx="1001">
         <a:schemeClr val="bg1"/>
@@ -8441,12 +8379,211 @@
           <a:chExt cx="0" cy="0"/>
         </a:xfrm>
       </p:grpSpPr>
+      <p:sp>
+        <p:nvSpPr>
+          <p:cNvPr id="2" name="Заголовок 1">
+            <a:extLst>
+              <a:ext uri="{FF2B5EF4-FFF2-40B4-BE49-F238E27FC236}">
+                <a16:creationId xmlns:a16="http://schemas.microsoft.com/office/drawing/2014/main" id="{954E512C-01F0-A9BE-567C-F9835F7BEA47}"/>
+              </a:ext>
+            </a:extLst>
+          </p:cNvPr>
+          <p:cNvSpPr>
+            <a:spLocks noGrp="1"/>
+          </p:cNvSpPr>
+          <p:nvPr>
+            <p:ph type="title"/>
+          </p:nvPr>
+        </p:nvSpPr>
+        <p:spPr/>
+        <p:txBody>
+          <a:bodyPr>
+            <a:normAutofit/>
+          </a:bodyPr>
+          <a:lstStyle/>
+          <a:p>
+            <a:r>
+              <a:rPr lang="ru-RU" dirty="0">
+                <a:latin typeface="Times New Roman" panose="02020603050405020304" pitchFamily="18" charset="0"/>
+                <a:ea typeface="+mn-ea"/>
+                <a:cs typeface="Times New Roman" panose="02020603050405020304" pitchFamily="18" charset="0"/>
+              </a:rPr>
+              <a:t>Диаграмма вариантов использования</a:t>
+            </a:r>
+          </a:p>
+        </p:txBody>
+      </p:sp>
+      <p:sp>
+        <p:nvSpPr>
+          <p:cNvPr id="5" name="Номер слайда 4">
+            <a:extLst>
+              <a:ext uri="{FF2B5EF4-FFF2-40B4-BE49-F238E27FC236}">
+                <a16:creationId xmlns:a16="http://schemas.microsoft.com/office/drawing/2014/main" id="{D7B7C799-BEDA-6123-DDA1-82D0CA067A7A}"/>
+              </a:ext>
+            </a:extLst>
+          </p:cNvPr>
+          <p:cNvSpPr>
+            <a:spLocks noGrp="1"/>
+          </p:cNvSpPr>
+          <p:nvPr>
+            <p:ph type="sldNum" sz="quarter" idx="12"/>
+          </p:nvPr>
+        </p:nvSpPr>
+        <p:spPr/>
+        <p:txBody>
+          <a:bodyPr/>
+          <a:lstStyle/>
+          <a:p>
+            <a:fld id="{9F75ED48-FB93-4D27-9D40-6DF4DFA3F996}" type="slidenum">
+              <a:rPr lang="ru-RU" smtClean="0"/>
+              <a:t>5</a:t>
+            </a:fld>
+            <a:endParaRPr lang="ru-RU"/>
+          </a:p>
+        </p:txBody>
+      </p:sp>
+      <p:sp>
+        <p:nvSpPr>
+          <p:cNvPr id="4" name="Объект 2">
+            <a:extLst>
+              <a:ext uri="{FF2B5EF4-FFF2-40B4-BE49-F238E27FC236}">
+                <a16:creationId xmlns:a16="http://schemas.microsoft.com/office/drawing/2014/main" id="{F5E630B3-D887-9F42-6565-C01B070442BC}"/>
+              </a:ext>
+            </a:extLst>
+          </p:cNvPr>
+          <p:cNvSpPr>
+            <a:spLocks noGrp="1"/>
+          </p:cNvSpPr>
+          <p:nvPr>
+            <p:ph idx="1"/>
+          </p:nvPr>
+        </p:nvSpPr>
+        <p:spPr>
+          <a:xfrm>
+            <a:off x="838200" y="1825625"/>
+            <a:ext cx="10515600" cy="4351338"/>
+          </a:xfrm>
+        </p:spPr>
+        <p:txBody>
+          <a:bodyPr vert="horz" lIns="91440" tIns="45720" rIns="91440" bIns="45720" rtlCol="0" anchor="t">
+            <a:normAutofit/>
+          </a:bodyPr>
+          <a:lstStyle/>
+          <a:p>
+            <a:pPr marL="0" indent="0">
+              <a:buNone/>
+            </a:pPr>
+            <a:r>
+              <a:rPr lang="en-US" dirty="0" err="1">
+                <a:latin typeface="Times New Roman"/>
+                <a:cs typeface="Times New Roman"/>
+              </a:rPr>
+              <a:t>Выделены</a:t>
+            </a:r>
+            <a:r>
+              <a:rPr lang="en-US" dirty="0">
+                <a:latin typeface="Times New Roman"/>
+                <a:cs typeface="Times New Roman"/>
+              </a:rPr>
+              <a:t> </a:t>
+            </a:r>
+            <a:r>
+              <a:rPr lang="en-US" dirty="0" err="1">
+                <a:latin typeface="Times New Roman"/>
+                <a:cs typeface="Times New Roman"/>
+              </a:rPr>
+              <a:t>следующие</a:t>
+            </a:r>
+            <a:br>
+              <a:rPr lang="en-US" dirty="0">
+                <a:latin typeface="Times New Roman"/>
+                <a:cs typeface="Times New Roman"/>
+              </a:rPr>
+            </a:br>
+            <a:r>
+              <a:rPr lang="en-US" dirty="0" err="1">
+                <a:latin typeface="Times New Roman"/>
+                <a:cs typeface="Times New Roman"/>
+              </a:rPr>
+              <a:t>категории</a:t>
+            </a:r>
+            <a:r>
+              <a:rPr lang="en-US" dirty="0">
+                <a:latin typeface="Times New Roman"/>
+                <a:cs typeface="Times New Roman"/>
+              </a:rPr>
+              <a:t> </a:t>
+            </a:r>
+            <a:r>
+              <a:rPr lang="en-US" dirty="0" err="1">
+                <a:latin typeface="Times New Roman"/>
+                <a:cs typeface="Times New Roman"/>
+              </a:rPr>
+              <a:t>пользователей</a:t>
+            </a:r>
+            <a:r>
+              <a:rPr lang="en-US" dirty="0">
+                <a:latin typeface="Times New Roman"/>
+                <a:cs typeface="Times New Roman"/>
+              </a:rPr>
+              <a:t>:</a:t>
+            </a:r>
+          </a:p>
+          <a:p>
+            <a:pPr marL="457200" indent="-457200">
+              <a:buFont typeface="Liberation Sans" panose="020B0604020202020204" pitchFamily="34" charset="0"/>
+              <a:buChar char="−"/>
+            </a:pPr>
+            <a:r>
+              <a:rPr lang="en-US" dirty="0" err="1">
+                <a:latin typeface="Times New Roman"/>
+                <a:cs typeface="Times New Roman"/>
+              </a:rPr>
+              <a:t>Гость</a:t>
+            </a:r>
+          </a:p>
+          <a:p>
+            <a:pPr marL="457200" indent="-457200">
+              <a:buFont typeface="Liberation Sans" panose="020B0604020202020204" pitchFamily="34" charset="0"/>
+              <a:buChar char="−"/>
+            </a:pPr>
+            <a:r>
+              <a:rPr lang="en-US" dirty="0" err="1">
+                <a:latin typeface="Times New Roman"/>
+                <a:cs typeface="Times New Roman"/>
+              </a:rPr>
+              <a:t>Игрок</a:t>
+            </a:r>
+            <a:endParaRPr lang="en-US" dirty="0">
+              <a:latin typeface="Times New Roman"/>
+              <a:cs typeface="Times New Roman"/>
+            </a:endParaRPr>
+          </a:p>
+          <a:p>
+            <a:pPr marL="457200" indent="-457200">
+              <a:buFont typeface="Liberation Sans" panose="020B0604020202020204" pitchFamily="34" charset="0"/>
+              <a:buChar char="−"/>
+            </a:pPr>
+            <a:r>
+              <a:rPr lang="en-US" dirty="0" err="1">
+                <a:latin typeface="Times New Roman"/>
+                <a:cs typeface="Times New Roman"/>
+              </a:rPr>
+              <a:t>Админинстратор</a:t>
+            </a:r>
+            <a:endParaRPr lang="en-US" dirty="0" err="1">
+              <a:latin typeface="Times New Roman" panose="02020603050405020304" pitchFamily="18" charset="0"/>
+              <a:cs typeface="Times New Roman" panose="02020603050405020304" pitchFamily="18" charset="0"/>
+            </a:endParaRPr>
+          </a:p>
+        </p:txBody>
+      </p:sp>
       <p:pic>
         <p:nvPicPr>
-          <p:cNvPr id="6" name="Рисунок 5">
-            <a:extLst>
-              <a:ext uri="{FF2B5EF4-FFF2-40B4-BE49-F238E27FC236}">
-                <a16:creationId xmlns:a16="http://schemas.microsoft.com/office/drawing/2014/main" id="{651DCA9C-1738-5F6D-4C2D-5355DE525AC7}"/>
+          <p:cNvPr id="7" name="Рисунок 6" descr="Изображение выглядит как текст, диаграмма, Шрифт, карта&#10;&#10;Содержимое, созданное искусственным интеллектом, может быть неверным.">
+            <a:extLst>
+              <a:ext uri="{FF2B5EF4-FFF2-40B4-BE49-F238E27FC236}">
+                <a16:creationId xmlns:a16="http://schemas.microsoft.com/office/drawing/2014/main" id="{DB8E660A-5147-C1FA-3BD9-5664A3DAEDFD}"/>
               </a:ext>
             </a:extLst>
           </p:cNvPr>
@@ -8463,77 +8600,14 @@
         </p:blipFill>
         <p:spPr>
           <a:xfrm>
-            <a:off x="1821820" y="1097741"/>
-            <a:ext cx="8320924" cy="5559833"/>
+            <a:off x="4862724" y="1443383"/>
+            <a:ext cx="6150658" cy="5094577"/>
           </a:xfrm>
           <a:prstGeom prst="rect">
             <a:avLst/>
           </a:prstGeom>
         </p:spPr>
       </p:pic>
-      <p:sp>
-        <p:nvSpPr>
-          <p:cNvPr id="2" name="Заголовок 1">
-            <a:extLst>
-              <a:ext uri="{FF2B5EF4-FFF2-40B4-BE49-F238E27FC236}">
-                <a16:creationId xmlns:a16="http://schemas.microsoft.com/office/drawing/2014/main" id="{954E512C-01F0-A9BE-567C-F9835F7BEA47}"/>
-              </a:ext>
-            </a:extLst>
-          </p:cNvPr>
-          <p:cNvSpPr>
-            <a:spLocks noGrp="1"/>
-          </p:cNvSpPr>
-          <p:nvPr>
-            <p:ph type="title"/>
-          </p:nvPr>
-        </p:nvSpPr>
-        <p:spPr/>
-        <p:txBody>
-          <a:bodyPr>
-            <a:normAutofit/>
-          </a:bodyPr>
-          <a:lstStyle/>
-          <a:p>
-            <a:r>
-              <a:rPr lang="ru-RU" dirty="0">
-                <a:latin typeface="Times New Roman" panose="02020603050405020304" pitchFamily="18" charset="0"/>
-                <a:ea typeface="+mn-ea"/>
-                <a:cs typeface="Times New Roman" panose="02020603050405020304" pitchFamily="18" charset="0"/>
-              </a:rPr>
-              <a:t>Диаграмма вариантов использования</a:t>
-            </a:r>
-          </a:p>
-        </p:txBody>
-      </p:sp>
-      <p:sp>
-        <p:nvSpPr>
-          <p:cNvPr id="5" name="Номер слайда 4">
-            <a:extLst>
-              <a:ext uri="{FF2B5EF4-FFF2-40B4-BE49-F238E27FC236}">
-                <a16:creationId xmlns:a16="http://schemas.microsoft.com/office/drawing/2014/main" id="{D7B7C799-BEDA-6123-DDA1-82D0CA067A7A}"/>
-              </a:ext>
-            </a:extLst>
-          </p:cNvPr>
-          <p:cNvSpPr>
-            <a:spLocks noGrp="1"/>
-          </p:cNvSpPr>
-          <p:nvPr>
-            <p:ph type="sldNum" sz="quarter" idx="12"/>
-          </p:nvPr>
-        </p:nvSpPr>
-        <p:spPr/>
-        <p:txBody>
-          <a:bodyPr/>
-          <a:lstStyle/>
-          <a:p>
-            <a:fld id="{9F75ED48-FB93-4D27-9D40-6DF4DFA3F996}" type="slidenum">
-              <a:rPr lang="ru-RU" smtClean="0"/>
-              <a:t>6</a:t>
-            </a:fld>
-            <a:endParaRPr lang="ru-RU"/>
-          </a:p>
-        </p:txBody>
-      </p:sp>
     </p:spTree>
     <p:extLst>
       <p:ext uri="{BB962C8B-B14F-4D97-AF65-F5344CB8AC3E}">
@@ -8547,7 +8621,7 @@
 </p:sld>
 </file>
 
-<file path=ppt/slides/slide7.xml><?xml version="1.0" encoding="utf-8"?>
+<file path=ppt/slides/slide6.xml><?xml version="1.0" encoding="utf-8"?>
 <p:sld xmlns:a="http://schemas.openxmlformats.org/drawingml/2006/main" xmlns:r="http://schemas.openxmlformats.org/officeDocument/2006/relationships" xmlns:p="http://schemas.openxmlformats.org/presentationml/2006/main">
   <p:cSld>
     <p:spTree>
@@ -8646,7 +8720,7 @@
           <a:p>
             <a:fld id="{9F75ED48-FB93-4D27-9D40-6DF4DFA3F996}" type="slidenum">
               <a:rPr lang="ru-RU" smtClean="0"/>
-              <a:t>7</a:t>
+              <a:t>6</a:t>
             </a:fld>
             <a:endParaRPr lang="ru-RU"/>
           </a:p>
@@ -8695,7 +8769,7 @@
 </p:sld>
 </file>
 
-<file path=ppt/slides/slide8.xml><?xml version="1.0" encoding="utf-8"?>
+<file path=ppt/slides/slide7.xml><?xml version="1.0" encoding="utf-8"?>
 <p:sld xmlns:a="http://schemas.openxmlformats.org/drawingml/2006/main" xmlns:r="http://schemas.openxmlformats.org/officeDocument/2006/relationships" xmlns:p="http://schemas.openxmlformats.org/presentationml/2006/main">
   <p:cSld>
     <p:spTree>
@@ -8863,7 +8937,7 @@
           <a:p>
             <a:fld id="{9F75ED48-FB93-4D27-9D40-6DF4DFA3F996}" type="slidenum">
               <a:rPr lang="ru-RU" smtClean="0"/>
-              <a:t>8</a:t>
+              <a:t>7</a:t>
             </a:fld>
             <a:endParaRPr lang="ru-RU"/>
           </a:p>
@@ -8882,7 +8956,7 @@
 </p:sld>
 </file>
 
-<file path=ppt/slides/slide9.xml><?xml version="1.0" encoding="utf-8"?>
+<file path=ppt/slides/slide8.xml><?xml version="1.0" encoding="utf-8"?>
 <p:sld xmlns:a="http://schemas.openxmlformats.org/drawingml/2006/main" xmlns:r="http://schemas.openxmlformats.org/officeDocument/2006/relationships" xmlns:p="http://schemas.openxmlformats.org/presentationml/2006/main">
   <p:cSld>
     <p:spTree>
@@ -8960,7 +9034,7 @@
           <a:p>
             <a:fld id="{9F75ED48-FB93-4D27-9D40-6DF4DFA3F996}" type="slidenum">
               <a:rPr lang="ru-RU" smtClean="0"/>
-              <a:t>9</a:t>
+              <a:t>8</a:t>
             </a:fld>
             <a:endParaRPr lang="ru-RU"/>
           </a:p>
@@ -9751,6 +9825,331 @@
 </p:sld>
 </file>
 
+<file path=ppt/slides/slide9.xml><?xml version="1.0" encoding="utf-8"?>
+<p:sld xmlns:a="http://schemas.openxmlformats.org/drawingml/2006/main" xmlns:r="http://schemas.openxmlformats.org/officeDocument/2006/relationships" xmlns:p="http://schemas.openxmlformats.org/presentationml/2006/main">
+  <p:cSld>
+    <p:spTree>
+      <p:nvGrpSpPr>
+        <p:cNvPr id="1" name=""/>
+        <p:cNvGrpSpPr/>
+        <p:nvPr/>
+      </p:nvGrpSpPr>
+      <p:grpSpPr>
+        <a:xfrm>
+          <a:off x="0" y="0"/>
+          <a:ext cx="0" cy="0"/>
+          <a:chOff x="0" y="0"/>
+          <a:chExt cx="0" cy="0"/>
+        </a:xfrm>
+      </p:grpSpPr>
+      <p:sp>
+        <p:nvSpPr>
+          <p:cNvPr id="2" name="Заголовок 1">
+            <a:extLst>
+              <a:ext uri="{FF2B5EF4-FFF2-40B4-BE49-F238E27FC236}">
+                <a16:creationId xmlns:a16="http://schemas.microsoft.com/office/drawing/2014/main" id="{1294129D-F169-D152-03DD-9227D0701403}"/>
+              </a:ext>
+            </a:extLst>
+          </p:cNvPr>
+          <p:cNvSpPr>
+            <a:spLocks noGrp="1"/>
+          </p:cNvSpPr>
+          <p:nvPr>
+            <p:ph type="title"/>
+          </p:nvPr>
+        </p:nvSpPr>
+        <p:spPr/>
+        <p:txBody>
+          <a:bodyPr/>
+          <a:lstStyle/>
+          <a:p>
+            <a:r>
+              <a:rPr lang="ru-RU" sz="4400" dirty="0">
+                <a:latin typeface="Times New Roman" panose="02020603050405020304" pitchFamily="18" charset="0"/>
+                <a:cs typeface="Times New Roman" panose="02020603050405020304" pitchFamily="18" charset="0"/>
+              </a:rPr>
+              <a:t>Средства реализации</a:t>
+            </a:r>
+            <a:endParaRPr lang="ru-RU" dirty="0"/>
+          </a:p>
+        </p:txBody>
+      </p:sp>
+      <p:sp>
+        <p:nvSpPr>
+          <p:cNvPr id="3" name="Объект 2">
+            <a:extLst>
+              <a:ext uri="{FF2B5EF4-FFF2-40B4-BE49-F238E27FC236}">
+                <a16:creationId xmlns:a16="http://schemas.microsoft.com/office/drawing/2014/main" id="{4286BC96-A488-534F-7EB9-5599428C14FE}"/>
+              </a:ext>
+            </a:extLst>
+          </p:cNvPr>
+          <p:cNvSpPr>
+            <a:spLocks noGrp="1"/>
+          </p:cNvSpPr>
+          <p:nvPr>
+            <p:ph idx="1"/>
+          </p:nvPr>
+        </p:nvSpPr>
+        <p:spPr/>
+        <p:txBody>
+          <a:bodyPr/>
+          <a:lstStyle/>
+          <a:p>
+            <a:pPr marL="457200" indent="-457200">
+              <a:buFont typeface="Liberation Sans" panose="020B0604020202020204" pitchFamily="34" charset="0"/>
+              <a:buChar char="−"/>
+            </a:pPr>
+            <a:r>
+              <a:rPr lang="ru-RU" sz="2800" dirty="0">
+                <a:latin typeface="Times New Roman" panose="02020603050405020304" pitchFamily="18" charset="0"/>
+                <a:cs typeface="Times New Roman" panose="02020603050405020304" pitchFamily="18" charset="0"/>
+              </a:rPr>
+              <a:t>СУБД</a:t>
+            </a:r>
+            <a:r>
+              <a:rPr lang="en-US" sz="2800" dirty="0">
+                <a:latin typeface="Times New Roman" panose="02020603050405020304" pitchFamily="18" charset="0"/>
+                <a:cs typeface="Times New Roman" panose="02020603050405020304" pitchFamily="18" charset="0"/>
+              </a:rPr>
+              <a:t>: PostgreSQL</a:t>
+            </a:r>
+            <a:endParaRPr lang="ru-RU" sz="2800" dirty="0">
+              <a:latin typeface="Times New Roman" panose="02020603050405020304" pitchFamily="18" charset="0"/>
+              <a:cs typeface="Times New Roman" panose="02020603050405020304" pitchFamily="18" charset="0"/>
+            </a:endParaRPr>
+          </a:p>
+          <a:p>
+            <a:pPr marL="457200" indent="-457200">
+              <a:buFont typeface="Liberation Sans" panose="020B0604020202020204" pitchFamily="34" charset="0"/>
+              <a:buChar char="−"/>
+            </a:pPr>
+            <a:r>
+              <a:rPr lang="ru-RU" sz="2800" dirty="0">
+                <a:latin typeface="Times New Roman" panose="02020603050405020304" pitchFamily="18" charset="0"/>
+                <a:cs typeface="Times New Roman" panose="02020603050405020304" pitchFamily="18" charset="0"/>
+              </a:rPr>
+              <a:t>Язык: C</a:t>
+            </a:r>
+            <a:r>
+              <a:rPr lang="en-US" sz="2800" dirty="0">
+                <a:latin typeface="Times New Roman" panose="02020603050405020304" pitchFamily="18" charset="0"/>
+                <a:cs typeface="Times New Roman" panose="02020603050405020304" pitchFamily="18" charset="0"/>
+              </a:rPr>
+              <a:t>#;</a:t>
+            </a:r>
+            <a:endParaRPr lang="ru-RU" dirty="0">
+              <a:latin typeface="Times New Roman" panose="02020603050405020304" pitchFamily="18" charset="0"/>
+              <a:cs typeface="Times New Roman" panose="02020603050405020304" pitchFamily="18" charset="0"/>
+            </a:endParaRPr>
+          </a:p>
+          <a:p>
+            <a:pPr marL="457200" indent="-457200">
+              <a:buFont typeface="Liberation Sans" panose="020B0604020202020204" pitchFamily="34" charset="0"/>
+              <a:buChar char="−"/>
+            </a:pPr>
+            <a:r>
+              <a:rPr lang="ru-RU" dirty="0">
+                <a:latin typeface="Times New Roman" panose="02020603050405020304" pitchFamily="18" charset="0"/>
+                <a:cs typeface="Times New Roman" panose="02020603050405020304" pitchFamily="18" charset="0"/>
+              </a:rPr>
+              <a:t>Фреймворк</a:t>
+            </a:r>
+            <a:r>
+              <a:rPr lang="en-US" dirty="0">
+                <a:latin typeface="Times New Roman" panose="02020603050405020304" pitchFamily="18" charset="0"/>
+                <a:cs typeface="Times New Roman" panose="02020603050405020304" pitchFamily="18" charset="0"/>
+              </a:rPr>
+              <a:t>: ASP.NET </a:t>
+            </a:r>
+            <a:r>
+              <a:rPr lang="ru-RU" dirty="0">
+                <a:latin typeface="Times New Roman" panose="02020603050405020304" pitchFamily="18" charset="0"/>
+                <a:cs typeface="Times New Roman" panose="02020603050405020304" pitchFamily="18" charset="0"/>
+              </a:rPr>
+              <a:t>8</a:t>
+            </a:r>
+            <a:r>
+              <a:rPr lang="en-US" dirty="0">
+                <a:latin typeface="Times New Roman" panose="02020603050405020304" pitchFamily="18" charset="0"/>
+                <a:cs typeface="Times New Roman" panose="02020603050405020304" pitchFamily="18" charset="0"/>
+              </a:rPr>
+              <a:t>.0</a:t>
+            </a:r>
+          </a:p>
+          <a:p>
+            <a:pPr marL="457200" indent="-457200">
+              <a:buFont typeface="Liberation Sans" panose="020B0604020202020204" pitchFamily="34" charset="0"/>
+              <a:buChar char="−"/>
+            </a:pPr>
+            <a:r>
+              <a:rPr lang="ru-RU" dirty="0">
+                <a:latin typeface="Times New Roman" panose="02020603050405020304" pitchFamily="18" charset="0"/>
+                <a:cs typeface="Times New Roman" panose="02020603050405020304" pitchFamily="18" charset="0"/>
+              </a:rPr>
+              <a:t>Сторонние библиотеки</a:t>
+            </a:r>
+            <a:r>
+              <a:rPr lang="en-US" dirty="0">
+                <a:latin typeface="Times New Roman" panose="02020603050405020304" pitchFamily="18" charset="0"/>
+                <a:cs typeface="Times New Roman" panose="02020603050405020304" pitchFamily="18" charset="0"/>
+              </a:rPr>
+              <a:t>:</a:t>
+            </a:r>
+            <a:endParaRPr lang="ru-RU" dirty="0">
+              <a:latin typeface="Times New Roman" panose="02020603050405020304" pitchFamily="18" charset="0"/>
+              <a:cs typeface="Times New Roman" panose="02020603050405020304" pitchFamily="18" charset="0"/>
+            </a:endParaRPr>
+          </a:p>
+          <a:p>
+            <a:pPr marL="914400" lvl="1" indent="-457200">
+              <a:buFont typeface="Liberation Sans" panose="020B0604020202020204" pitchFamily="34" charset="0"/>
+              <a:buChar char="−"/>
+            </a:pPr>
+            <a:r>
+              <a:rPr lang="en-US" dirty="0">
+                <a:latin typeface="Times New Roman" panose="02020603050405020304" pitchFamily="18" charset="0"/>
+                <a:cs typeface="Times New Roman" panose="02020603050405020304" pitchFamily="18" charset="0"/>
+              </a:rPr>
+              <a:t>Quartz.NET</a:t>
+            </a:r>
+            <a:r>
+              <a:rPr lang="ru-RU" dirty="0">
+                <a:latin typeface="Times New Roman" panose="02020603050405020304" pitchFamily="18" charset="0"/>
+                <a:cs typeface="Times New Roman" panose="02020603050405020304" pitchFamily="18" charset="0"/>
+              </a:rPr>
+              <a:t> для хранения и выполнения отложенных задач </a:t>
+            </a:r>
+          </a:p>
+          <a:p>
+            <a:pPr marL="914400" lvl="1" indent="-457200">
+              <a:buFont typeface="Liberation Sans" panose="020B0604020202020204" pitchFamily="34" charset="0"/>
+              <a:buChar char="−"/>
+            </a:pPr>
+            <a:r>
+              <a:rPr lang="en-US" dirty="0">
+                <a:latin typeface="Times New Roman" panose="02020603050405020304" pitchFamily="18" charset="0"/>
+                <a:cs typeface="Times New Roman" panose="02020603050405020304" pitchFamily="18" charset="0"/>
+              </a:rPr>
+              <a:t>Magick.NET</a:t>
+            </a:r>
+            <a:r>
+              <a:rPr lang="ru-RU" dirty="0">
+                <a:latin typeface="Times New Roman" panose="02020603050405020304" pitchFamily="18" charset="0"/>
+                <a:cs typeface="Times New Roman" panose="02020603050405020304" pitchFamily="18" charset="0"/>
+              </a:rPr>
+              <a:t> для обработки изображений</a:t>
+            </a:r>
+            <a:endParaRPr lang="en-US" dirty="0">
+              <a:latin typeface="Times New Roman" panose="02020603050405020304" pitchFamily="18" charset="0"/>
+              <a:cs typeface="Times New Roman" panose="02020603050405020304" pitchFamily="18" charset="0"/>
+            </a:endParaRPr>
+          </a:p>
+          <a:p>
+            <a:pPr marL="914400" lvl="1" indent="-457200">
+              <a:buFont typeface="Liberation Sans" panose="020B0604020202020204" pitchFamily="34" charset="0"/>
+              <a:buChar char="−"/>
+            </a:pPr>
+            <a:r>
+              <a:rPr lang="en-US" dirty="0">
+                <a:latin typeface="Times New Roman" panose="02020603050405020304" pitchFamily="18" charset="0"/>
+                <a:cs typeface="Times New Roman" panose="02020603050405020304" pitchFamily="18" charset="0"/>
+              </a:rPr>
+              <a:t>Entity Framework Core</a:t>
+            </a:r>
+            <a:r>
+              <a:rPr lang="ru-RU" dirty="0">
+                <a:latin typeface="Times New Roman" panose="02020603050405020304" pitchFamily="18" charset="0"/>
+                <a:cs typeface="Times New Roman" panose="02020603050405020304" pitchFamily="18" charset="0"/>
+              </a:rPr>
+              <a:t> в качестве </a:t>
+            </a:r>
+            <a:r>
+              <a:rPr lang="en-US" dirty="0">
+                <a:latin typeface="Times New Roman" panose="02020603050405020304" pitchFamily="18" charset="0"/>
+                <a:cs typeface="Times New Roman" panose="02020603050405020304" pitchFamily="18" charset="0"/>
+              </a:rPr>
+              <a:t>ORM</a:t>
+            </a:r>
+            <a:endParaRPr lang="ru-RU" dirty="0">
+              <a:latin typeface="Times New Roman" panose="02020603050405020304" pitchFamily="18" charset="0"/>
+              <a:cs typeface="Times New Roman" panose="02020603050405020304" pitchFamily="18" charset="0"/>
+            </a:endParaRPr>
+          </a:p>
+          <a:p>
+            <a:pPr marL="457200" indent="-457200">
+              <a:buFont typeface="Liberation Sans" panose="020B0604020202020204" pitchFamily="34" charset="0"/>
+              <a:buChar char="−"/>
+            </a:pPr>
+            <a:r>
+              <a:rPr lang="ru-RU" sz="2800" dirty="0">
+                <a:latin typeface="Times New Roman" panose="02020603050405020304" pitchFamily="18" charset="0"/>
+                <a:cs typeface="Times New Roman" panose="02020603050405020304" pitchFamily="18" charset="0"/>
+              </a:rPr>
+              <a:t>Среда разработки: </a:t>
+            </a:r>
+            <a:r>
+              <a:rPr lang="en-US" sz="2800" dirty="0">
+                <a:latin typeface="Times New Roman" panose="02020603050405020304" pitchFamily="18" charset="0"/>
+                <a:cs typeface="Times New Roman" panose="02020603050405020304" pitchFamily="18" charset="0"/>
+              </a:rPr>
+              <a:t>Microsoft Visual Studio</a:t>
+            </a:r>
+            <a:r>
+              <a:rPr lang="en-US" dirty="0">
+                <a:latin typeface="Times New Roman" panose="02020603050405020304" pitchFamily="18" charset="0"/>
+                <a:cs typeface="Times New Roman" panose="02020603050405020304" pitchFamily="18" charset="0"/>
+              </a:rPr>
+              <a:t>.</a:t>
+            </a:r>
+            <a:endParaRPr lang="ru-RU" sz="2800" dirty="0">
+              <a:latin typeface="Times New Roman" panose="02020603050405020304" pitchFamily="18" charset="0"/>
+              <a:cs typeface="Times New Roman" panose="02020603050405020304" pitchFamily="18" charset="0"/>
+            </a:endParaRPr>
+          </a:p>
+        </p:txBody>
+      </p:sp>
+      <p:sp>
+        <p:nvSpPr>
+          <p:cNvPr id="4" name="Номер слайда 3">
+            <a:extLst>
+              <a:ext uri="{FF2B5EF4-FFF2-40B4-BE49-F238E27FC236}">
+                <a16:creationId xmlns:a16="http://schemas.microsoft.com/office/drawing/2014/main" id="{DB845D22-575F-FAA2-4894-3A79966D1551}"/>
+              </a:ext>
+            </a:extLst>
+          </p:cNvPr>
+          <p:cNvSpPr>
+            <a:spLocks noGrp="1"/>
+          </p:cNvSpPr>
+          <p:nvPr>
+            <p:ph type="sldNum" sz="quarter" idx="12"/>
+          </p:nvPr>
+        </p:nvSpPr>
+        <p:spPr/>
+        <p:txBody>
+          <a:bodyPr/>
+          <a:lstStyle/>
+          <a:p>
+            <a:fld id="{9F75ED48-FB93-4D27-9D40-6DF4DFA3F996}" type="slidenum">
+              <a:rPr lang="ru-RU" smtClean="0"/>
+              <a:t>9</a:t>
+            </a:fld>
+            <a:endParaRPr lang="ru-RU"/>
+          </a:p>
+        </p:txBody>
+      </p:sp>
+    </p:spTree>
+    <p:extLst>
+      <p:ext uri="{BB962C8B-B14F-4D97-AF65-F5344CB8AC3E}">
+        <p14:creationId xmlns:p14="http://schemas.microsoft.com/office/powerpoint/2010/main" val="2359330613"/>
+      </p:ext>
+    </p:extLst>
+  </p:cSld>
+  <p:clrMapOvr>
+    <a:masterClrMapping/>
+  </p:clrMapOvr>
+</p:sld>
+</file>
+
 <file path=ppt/theme/theme1.xml><?xml version="1.0" encoding="utf-8"?>
 <a:theme xmlns:a="http://schemas.openxmlformats.org/drawingml/2006/main" name="Тема Office">
   <a:themeElements>

</xml_diff>

<commit_message>
Tweaked report AGAIN :>
</commit_message>
<xml_diff>
--- a/docs/presentation.pptx
+++ b/docs/presentation.pptx
@@ -392,7 +392,7 @@
           <a:p>
             <a:fld id="{7BC6DE02-9070-4391-A9E5-20FBA5D71A5D}" type="datetimeFigureOut">
               <a:rPr lang="ru-RU" smtClean="0"/>
-              <a:t>25.05.2025</a:t>
+              <a:t>26.05.2025</a:t>
             </a:fld>
             <a:endParaRPr lang="ru-RU"/>
           </a:p>
@@ -1166,7 +1166,7 @@
           <a:p>
             <a:fld id="{A1439A60-659B-42DB-BB0F-7ED87733A23E}" type="datetime1">
               <a:rPr lang="ru-RU" smtClean="0"/>
-              <a:t>25.05.2025</a:t>
+              <a:t>26.05.2025</a:t>
             </a:fld>
             <a:endParaRPr lang="ru-RU"/>
           </a:p>
@@ -1364,7 +1364,7 @@
           <a:p>
             <a:fld id="{D61B71B4-54FB-40B8-90DD-279781B0C38D}" type="datetime1">
               <a:rPr lang="ru-RU" smtClean="0"/>
-              <a:t>25.05.2025</a:t>
+              <a:t>26.05.2025</a:t>
             </a:fld>
             <a:endParaRPr lang="ru-RU"/>
           </a:p>
@@ -1572,7 +1572,7 @@
           <a:p>
             <a:fld id="{2D090295-5DD3-4456-8BDB-FA7FF8949F97}" type="datetime1">
               <a:rPr lang="ru-RU" smtClean="0"/>
-              <a:t>25.05.2025</a:t>
+              <a:t>26.05.2025</a:t>
             </a:fld>
             <a:endParaRPr lang="ru-RU"/>
           </a:p>
@@ -1770,7 +1770,7 @@
           <a:p>
             <a:fld id="{D7B5F5C0-A8AD-4E24-BFA5-3353364AFE30}" type="datetime1">
               <a:rPr lang="ru-RU" smtClean="0"/>
-              <a:t>25.05.2025</a:t>
+              <a:t>26.05.2025</a:t>
             </a:fld>
             <a:endParaRPr lang="ru-RU"/>
           </a:p>
@@ -2053,7 +2053,7 @@
           <a:p>
             <a:fld id="{6A2AEECD-1031-4CBC-A778-E91CBA3F92A4}" type="datetime1">
               <a:rPr lang="ru-RU" smtClean="0"/>
-              <a:t>25.05.2025</a:t>
+              <a:t>26.05.2025</a:t>
             </a:fld>
             <a:endParaRPr lang="ru-RU"/>
           </a:p>
@@ -2318,7 +2318,7 @@
           <a:p>
             <a:fld id="{8E5B82EB-9FE1-42D5-8640-685632266EB2}" type="datetime1">
               <a:rPr lang="ru-RU" smtClean="0"/>
-              <a:t>25.05.2025</a:t>
+              <a:t>26.05.2025</a:t>
             </a:fld>
             <a:endParaRPr lang="ru-RU"/>
           </a:p>
@@ -2730,7 +2730,7 @@
           <a:p>
             <a:fld id="{A33273D1-BF9D-4402-A07A-C11263F81ACA}" type="datetime1">
               <a:rPr lang="ru-RU" smtClean="0"/>
-              <a:t>25.05.2025</a:t>
+              <a:t>26.05.2025</a:t>
             </a:fld>
             <a:endParaRPr lang="ru-RU"/>
           </a:p>
@@ -2871,7 +2871,7 @@
           <a:p>
             <a:fld id="{C10D7C68-AD43-4338-B6C7-4798ABAED37C}" type="datetime1">
               <a:rPr lang="ru-RU" smtClean="0"/>
-              <a:t>25.05.2025</a:t>
+              <a:t>26.05.2025</a:t>
             </a:fld>
             <a:endParaRPr lang="ru-RU"/>
           </a:p>
@@ -2984,7 +2984,7 @@
           <a:p>
             <a:fld id="{04A09544-4DCC-4E50-BBA1-0EB924E42FB5}" type="datetime1">
               <a:rPr lang="ru-RU" smtClean="0"/>
-              <a:t>25.05.2025</a:t>
+              <a:t>26.05.2025</a:t>
             </a:fld>
             <a:endParaRPr lang="ru-RU"/>
           </a:p>
@@ -3295,7 +3295,7 @@
           <a:p>
             <a:fld id="{B44A15D2-7284-412E-B86C-C8BE76838BC3}" type="datetime1">
               <a:rPr lang="ru-RU" smtClean="0"/>
-              <a:t>25.05.2025</a:t>
+              <a:t>26.05.2025</a:t>
             </a:fld>
             <a:endParaRPr lang="ru-RU"/>
           </a:p>
@@ -3583,7 +3583,7 @@
           <a:p>
             <a:fld id="{4A4A6565-B229-48CB-B9AB-84026305D07B}" type="datetime1">
               <a:rPr lang="ru-RU" smtClean="0"/>
-              <a:t>25.05.2025</a:t>
+              <a:t>26.05.2025</a:t>
             </a:fld>
             <a:endParaRPr lang="ru-RU"/>
           </a:p>
@@ -3824,7 +3824,7 @@
           <a:p>
             <a:fld id="{BBCA45A3-F3B4-42F8-B88D-1485C0862389}" type="datetime1">
               <a:rPr lang="ru-RU" smtClean="0"/>
-              <a:t>25.05.2025</a:t>
+              <a:t>26.05.2025</a:t>
             </a:fld>
             <a:endParaRPr lang="ru-RU"/>
           </a:p>
@@ -5226,7 +5226,7 @@
                 <a:latin typeface="Times New Roman" panose="02020603050405020304" pitchFamily="18" charset="0"/>
                 <a:cs typeface="Times New Roman" panose="02020603050405020304" pitchFamily="18" charset="0"/>
               </a:rPr>
-              <a:t>81 модульных тестов для слоя бизнес-логики</a:t>
+              <a:t>81 модульных тест для слоя бизнес-логики</a:t>
             </a:r>
             <a:r>
               <a:rPr lang="en-US" sz="2300" dirty="0">
@@ -5294,14 +5294,14 @@
                 <a:latin typeface="Times New Roman" panose="02020603050405020304" pitchFamily="18" charset="0"/>
                 <a:cs typeface="Times New Roman" panose="02020603050405020304" pitchFamily="18" charset="0"/>
               </a:rPr>
-              <a:t> класс отложенных действий покрыт на 100</a:t>
+              <a:t> код класса отложенных действий покрыт на 100</a:t>
             </a:r>
             <a:r>
               <a:rPr lang="en-US" sz="2300" dirty="0">
                 <a:latin typeface="Times New Roman" panose="02020603050405020304" pitchFamily="18" charset="0"/>
                 <a:cs typeface="Times New Roman" panose="02020603050405020304" pitchFamily="18" charset="0"/>
               </a:rPr>
-              <a:t>.0%</a:t>
+              <a:t>%</a:t>
             </a:r>
             <a:r>
               <a:rPr lang="ru-RU" sz="2300" dirty="0">
@@ -5319,10 +5319,10 @@
       </p:sp>
       <p:pic>
         <p:nvPicPr>
-          <p:cNvPr id="12" name="Рисунок 11">
-            <a:extLst>
-              <a:ext uri="{FF2B5EF4-FFF2-40B4-BE49-F238E27FC236}">
-                <a16:creationId xmlns:a16="http://schemas.microsoft.com/office/drawing/2014/main" id="{8C04FB1F-9A8E-D796-8569-E35B1CA3D2DB}"/>
+          <p:cNvPr id="6" name="Рисунок 5">
+            <a:extLst>
+              <a:ext uri="{FF2B5EF4-FFF2-40B4-BE49-F238E27FC236}">
+                <a16:creationId xmlns:a16="http://schemas.microsoft.com/office/drawing/2014/main" id="{E80901F1-D864-4A16-3526-377BAAFE91EF}"/>
               </a:ext>
             </a:extLst>
           </p:cNvPr>
@@ -5339,8 +5339,8 @@
         </p:blipFill>
         <p:spPr>
           <a:xfrm>
-            <a:off x="5273058" y="1690688"/>
-            <a:ext cx="6163292" cy="4275931"/>
+            <a:off x="5191346" y="1690688"/>
+            <a:ext cx="6607971" cy="3730576"/>
           </a:xfrm>
           <a:prstGeom prst="rect">
             <a:avLst/>
@@ -5511,6 +5511,34 @@
               </a:rPr>
               <a:t>Разработано 15 тестов</a:t>
             </a:r>
+            <a:r>
+              <a:rPr lang="en-US" sz="2300" dirty="0">
+                <a:latin typeface="Times New Roman" panose="02020603050405020304" pitchFamily="18" charset="0"/>
+                <a:cs typeface="Times New Roman" panose="02020603050405020304" pitchFamily="18" charset="0"/>
+              </a:rPr>
+              <a:t>; </a:t>
+            </a:r>
+            <a:r>
+              <a:rPr lang="ru-RU" sz="2300" dirty="0">
+                <a:latin typeface="Times New Roman" panose="02020603050405020304" pitchFamily="18" charset="0"/>
+                <a:cs typeface="Times New Roman" panose="02020603050405020304" pitchFamily="18" charset="0"/>
+              </a:rPr>
+              <a:t>код класса обработки изображений покрыт на 100</a:t>
+            </a:r>
+            <a:r>
+              <a:rPr lang="en-US" sz="2300" dirty="0">
+                <a:latin typeface="Times New Roman" panose="02020603050405020304" pitchFamily="18" charset="0"/>
+                <a:cs typeface="Times New Roman" panose="02020603050405020304" pitchFamily="18" charset="0"/>
+              </a:rPr>
+              <a:t>%</a:t>
+            </a:r>
+            <a:r>
+              <a:rPr lang="ru-RU" sz="2300" dirty="0">
+                <a:latin typeface="Times New Roman" panose="02020603050405020304" pitchFamily="18" charset="0"/>
+                <a:cs typeface="Times New Roman" panose="02020603050405020304" pitchFamily="18" charset="0"/>
+              </a:rPr>
+              <a:t> </a:t>
+            </a:r>
           </a:p>
         </p:txBody>
       </p:sp>
@@ -5528,7 +5556,7 @@
         </p:nvSpPr>
         <p:spPr>
           <a:xfrm>
-            <a:off x="5482660" y="4167436"/>
+            <a:off x="5517560" y="4167436"/>
             <a:ext cx="954199" cy="673395"/>
           </a:xfrm>
           <a:prstGeom prst="rightArrow">
@@ -5586,7 +5614,7 @@
         </p:blipFill>
         <p:spPr>
           <a:xfrm>
-            <a:off x="913377" y="2831307"/>
+            <a:off x="976197" y="2831307"/>
             <a:ext cx="4435934" cy="3345656"/>
           </a:xfrm>
           <a:prstGeom prst="rect">
@@ -5630,7 +5658,7 @@
         </p:blipFill>
         <p:spPr>
           <a:xfrm>
-            <a:off x="6570209" y="3277434"/>
+            <a:off x="6563229" y="3277434"/>
             <a:ext cx="4992384" cy="2453400"/>
           </a:xfrm>
           <a:prstGeom prst="rect">
@@ -5741,7 +5769,7 @@
         <p:spPr>
           <a:xfrm>
             <a:off x="838201" y="1873405"/>
-            <a:ext cx="4975301" cy="4872834"/>
+            <a:ext cx="5257799" cy="4872834"/>
           </a:xfrm>
         </p:spPr>
         <p:txBody>
@@ -5842,7 +5870,7 @@
         </p:nvSpPr>
         <p:spPr>
           <a:xfrm>
-            <a:off x="6427317" y="1244842"/>
+            <a:off x="6545979" y="1244842"/>
             <a:ext cx="5159586" cy="865443"/>
           </a:xfrm>
           <a:prstGeom prst="rect">
@@ -6077,7 +6105,7 @@
         </p:blipFill>
         <p:spPr>
           <a:xfrm>
-            <a:off x="5969619" y="2110285"/>
+            <a:off x="6100359" y="2110285"/>
             <a:ext cx="5813502" cy="3921770"/>
           </a:xfrm>
           <a:prstGeom prst="rect">
@@ -6144,6 +6172,66 @@
           <a:chExt cx="0" cy="0"/>
         </a:xfrm>
       </p:grpSpPr>
+      <p:pic>
+        <p:nvPicPr>
+          <p:cNvPr id="8" name="Рисунок 7">
+            <a:extLst>
+              <a:ext uri="{FF2B5EF4-FFF2-40B4-BE49-F238E27FC236}">
+                <a16:creationId xmlns:a16="http://schemas.microsoft.com/office/drawing/2014/main" id="{95D87B05-35E8-51AB-CFAA-46F36C5033A8}"/>
+              </a:ext>
+            </a:extLst>
+          </p:cNvPr>
+          <p:cNvPicPr>
+            <a:picLocks noChangeAspect="1"/>
+          </p:cNvPicPr>
+          <p:nvPr/>
+        </p:nvPicPr>
+        <p:blipFill>
+          <a:blip r:embed="rId3"/>
+          <a:stretch>
+            <a:fillRect/>
+          </a:stretch>
+        </p:blipFill>
+        <p:spPr>
+          <a:xfrm>
+            <a:off x="5459008" y="4571866"/>
+            <a:ext cx="6762117" cy="1070520"/>
+          </a:xfrm>
+          <a:prstGeom prst="rect">
+            <a:avLst/>
+          </a:prstGeom>
+        </p:spPr>
+      </p:pic>
+      <p:pic>
+        <p:nvPicPr>
+          <p:cNvPr id="6" name="Рисунок 5">
+            <a:extLst>
+              <a:ext uri="{FF2B5EF4-FFF2-40B4-BE49-F238E27FC236}">
+                <a16:creationId xmlns:a16="http://schemas.microsoft.com/office/drawing/2014/main" id="{162D7227-AA95-114F-31BE-F64037C750F6}"/>
+              </a:ext>
+            </a:extLst>
+          </p:cNvPr>
+          <p:cNvPicPr>
+            <a:picLocks noChangeAspect="1"/>
+          </p:cNvPicPr>
+          <p:nvPr/>
+        </p:nvPicPr>
+        <p:blipFill>
+          <a:blip r:embed="rId4"/>
+          <a:stretch>
+            <a:fillRect/>
+          </a:stretch>
+        </p:blipFill>
+        <p:spPr>
+          <a:xfrm>
+            <a:off x="5624884" y="1449229"/>
+            <a:ext cx="6430367" cy="3075000"/>
+          </a:xfrm>
+          <a:prstGeom prst="rect">
+            <a:avLst/>
+          </a:prstGeom>
+        </p:spPr>
+      </p:pic>
       <p:sp>
         <p:nvSpPr>
           <p:cNvPr id="2" name="Заголовок 1">
@@ -6199,7 +6287,7 @@
             <p:spPr>
               <a:xfrm>
                 <a:off x="838199" y="1747025"/>
-                <a:ext cx="4298795" cy="4215548"/>
+                <a:ext cx="4786685" cy="4215548"/>
               </a:xfrm>
             </p:spPr>
             <p:txBody>
@@ -6385,35 +6473,7 @@
                     <a:latin typeface="Times New Roman" panose="02020603050405020304" pitchFamily="18" charset="0"/>
                     <a:cs typeface="Times New Roman" panose="02020603050405020304" pitchFamily="18" charset="0"/>
                   </a:rPr>
-                  <a:t>При этом, линейный </a:t>
-                </a:r>
-                <a:r>
-                  <a:rPr lang="ru-RU" sz="2300" dirty="0" err="1">
-                    <a:latin typeface="Times New Roman" panose="02020603050405020304" pitchFamily="18" charset="0"/>
-                    <a:cs typeface="Times New Roman" panose="02020603050405020304" pitchFamily="18" charset="0"/>
-                  </a:rPr>
-                  <a:t>коэфф-ициент</a:t>
-                </a:r>
-                <a:r>
-                  <a:rPr lang="ru-RU" sz="2300" dirty="0">
-                    <a:latin typeface="Times New Roman" panose="02020603050405020304" pitchFamily="18" charset="0"/>
-                    <a:cs typeface="Times New Roman" panose="02020603050405020304" pitchFamily="18" charset="0"/>
-                  </a:rPr>
-                  <a:t> роста времени на сто-</a:t>
-                </a:r>
-                <a:r>
-                  <a:rPr lang="ru-RU" sz="2300" dirty="0" err="1">
-                    <a:latin typeface="Times New Roman" panose="02020603050405020304" pitchFamily="18" charset="0"/>
-                    <a:cs typeface="Times New Roman" panose="02020603050405020304" pitchFamily="18" charset="0"/>
-                  </a:rPr>
-                  <a:t>роне</a:t>
-                </a:r>
-                <a:r>
-                  <a:rPr lang="ru-RU" sz="2300" dirty="0">
-                    <a:latin typeface="Times New Roman" panose="02020603050405020304" pitchFamily="18" charset="0"/>
-                    <a:cs typeface="Times New Roman" panose="02020603050405020304" pitchFamily="18" charset="0"/>
-                  </a:rPr>
-                  <a:t> приложения в 2.427 раза больше, чем на стороне сервера.</a:t>
+                  <a:t>При этом, линейный коэффициент роста времени на стороне приложения в 2.427 раза больше, чем на стороне сервера.</a:t>
                 </a:r>
               </a:p>
             </p:txBody>
@@ -6439,12 +6499,12 @@
             <p:spPr>
               <a:xfrm>
                 <a:off x="838199" y="1747025"/>
-                <a:ext cx="4298795" cy="4215548"/>
+                <a:ext cx="4786685" cy="4215548"/>
               </a:xfrm>
               <a:blipFill>
-                <a:blip r:embed="rId3"/>
+                <a:blip r:embed="rId5"/>
                 <a:stretch>
-                  <a:fillRect l="-1983" t="-2026" r="-1983" b="-1158"/>
+                  <a:fillRect l="-1781" t="-2026" r="-1781" b="-1158"/>
                 </a:stretch>
               </a:blipFill>
             </p:spPr>
@@ -6463,66 +6523,6 @@
           </p:sp>
         </mc:Fallback>
       </mc:AlternateContent>
-      <p:pic>
-        <p:nvPicPr>
-          <p:cNvPr id="6" name="Рисунок 5">
-            <a:extLst>
-              <a:ext uri="{FF2B5EF4-FFF2-40B4-BE49-F238E27FC236}">
-                <a16:creationId xmlns:a16="http://schemas.microsoft.com/office/drawing/2014/main" id="{162D7227-AA95-114F-31BE-F64037C750F6}"/>
-              </a:ext>
-            </a:extLst>
-          </p:cNvPr>
-          <p:cNvPicPr>
-            <a:picLocks noChangeAspect="1"/>
-          </p:cNvPicPr>
-          <p:nvPr/>
-        </p:nvPicPr>
-        <p:blipFill>
-          <a:blip r:embed="rId4"/>
-          <a:stretch>
-            <a:fillRect/>
-          </a:stretch>
-        </p:blipFill>
-        <p:spPr>
-          <a:xfrm>
-            <a:off x="5255229" y="1423781"/>
-            <a:ext cx="6773220" cy="3238952"/>
-          </a:xfrm>
-          <a:prstGeom prst="rect">
-            <a:avLst/>
-          </a:prstGeom>
-        </p:spPr>
-      </p:pic>
-      <p:pic>
-        <p:nvPicPr>
-          <p:cNvPr id="8" name="Рисунок 7">
-            <a:extLst>
-              <a:ext uri="{FF2B5EF4-FFF2-40B4-BE49-F238E27FC236}">
-                <a16:creationId xmlns:a16="http://schemas.microsoft.com/office/drawing/2014/main" id="{95D87B05-35E8-51AB-CFAA-46F36C5033A8}"/>
-              </a:ext>
-            </a:extLst>
-          </p:cNvPr>
-          <p:cNvPicPr>
-            <a:picLocks noChangeAspect="1"/>
-          </p:cNvPicPr>
-          <p:nvPr/>
-        </p:nvPicPr>
-        <p:blipFill>
-          <a:blip r:embed="rId5"/>
-          <a:stretch>
-            <a:fillRect/>
-          </a:stretch>
-        </p:blipFill>
-        <p:spPr>
-          <a:xfrm>
-            <a:off x="5339371" y="4750418"/>
-            <a:ext cx="6762117" cy="1070520"/>
-          </a:xfrm>
-          <a:prstGeom prst="rect">
-            <a:avLst/>
-          </a:prstGeom>
-        </p:spPr>
-      </p:pic>
       <p:sp>
         <p:nvSpPr>
           <p:cNvPr id="9" name="Номер слайда 8">
@@ -6566,7 +6566,7 @@
         </p:nvSpPr>
         <p:spPr>
           <a:xfrm>
-            <a:off x="9770533" y="4844226"/>
+            <a:off x="9890170" y="4665674"/>
             <a:ext cx="1040554" cy="353919"/>
           </a:xfrm>
           <a:prstGeom prst="rect">
@@ -6618,7 +6618,7 @@
         </p:nvSpPr>
         <p:spPr>
           <a:xfrm>
-            <a:off x="9682480" y="5424334"/>
+            <a:off x="9802117" y="5245782"/>
             <a:ext cx="1040554" cy="353919"/>
           </a:xfrm>
           <a:prstGeom prst="rect">
@@ -6737,7 +6737,7 @@
         <p:spPr/>
         <p:txBody>
           <a:bodyPr>
-            <a:normAutofit fontScale="85000" lnSpcReduction="20000"/>
+            <a:normAutofit fontScale="85000" lnSpcReduction="10000"/>
           </a:bodyPr>
           <a:lstStyle/>
           <a:p>
@@ -6898,33 +6898,7 @@
                 <a:latin typeface="Times New Roman" panose="02020603050405020304" pitchFamily="18" charset="0"/>
                 <a:cs typeface="Times New Roman" panose="02020603050405020304" pitchFamily="18" charset="0"/>
               </a:rPr>
-              <a:t>Поставленные задачи выполнены. Цель работы — разработка базы данных </a:t>
-            </a:r>
-            <a:r>
-              <a:rPr lang="ru-RU" sz="2400" dirty="0" err="1">
-                <a:latin typeface="Times New Roman" panose="02020603050405020304" pitchFamily="18" charset="0"/>
-                <a:cs typeface="Times New Roman" panose="02020603050405020304" pitchFamily="18" charset="0"/>
-              </a:rPr>
-              <a:t>соревнова</a:t>
-            </a:r>
-            <a:r>
-              <a:rPr lang="ru-RU" sz="2400" dirty="0">
-                <a:latin typeface="Times New Roman" panose="02020603050405020304" pitchFamily="18" charset="0"/>
-                <a:cs typeface="Times New Roman" panose="02020603050405020304" pitchFamily="18" charset="0"/>
-              </a:rPr>
-              <a:t>-</a:t>
-            </a:r>
-          </a:p>
-          <a:p>
-            <a:pPr marL="0" indent="0">
-              <a:buNone/>
-            </a:pPr>
-            <a:r>
-              <a:rPr lang="ru-RU" sz="2400" dirty="0">
-                <a:latin typeface="Times New Roman" panose="02020603050405020304" pitchFamily="18" charset="0"/>
-                <a:cs typeface="Times New Roman" panose="02020603050405020304" pitchFamily="18" charset="0"/>
-              </a:rPr>
-              <a:t>тельной игры — была достигнута.</a:t>
+              <a:t>Поставленные задачи выполнены. Цель работы — разработка базы данных соревновательной игры — была достигнута.</a:t>
             </a:r>
           </a:p>
         </p:txBody>
@@ -7383,14 +7357,7 @@
                 <a:latin typeface="Times New Roman"/>
                 <a:cs typeface="Times New Roman"/>
               </a:rPr>
-              <a:t>Пользователи участвуют в соревнованиях, отправляя свой результат в виде целого числа. По истечению срока проведения должны автоматически выдаваться награды за занятое место в таблице лидеров, которые настроил </a:t>
-            </a:r>
-            <a:r>
-              <a:rPr lang="ru-RU" sz="2400">
-                <a:latin typeface="Times New Roman"/>
-                <a:cs typeface="Times New Roman"/>
-              </a:rPr>
-              <a:t>администратор.</a:t>
+              <a:t>Пользователи участвуют в соревнованиях, отправляя свой результат в виде целого числа. По истечению срока проведения должны автоматически выдаваться награды за занятое место в таблице лидеров, которые настроил администратор.</a:t>
             </a:r>
           </a:p>
         </p:txBody>
@@ -7535,13 +7502,13 @@
           <p:nvPr>
             <p:extLst>
               <p:ext uri="{D42A27DB-BD31-4B8C-83A1-F6EECF244321}">
-                <p14:modId xmlns:p14="http://schemas.microsoft.com/office/powerpoint/2010/main" val="4127085282"/>
+                <p14:modId xmlns:p14="http://schemas.microsoft.com/office/powerpoint/2010/main" val="1098377176"/>
               </p:ext>
             </p:extLst>
           </p:nvPr>
         </p:nvGraphicFramePr>
         <p:xfrm>
-          <a:off x="1261532" y="1614488"/>
+          <a:off x="1296433" y="2054238"/>
           <a:ext cx="9406460" cy="3516133"/>
         </p:xfrm>
         <a:graphic>
@@ -7972,7 +7939,7 @@
                           <a:latin typeface="Times New Roman" panose="02020603050405020304" pitchFamily="18" charset="0"/>
                           <a:cs typeface="Times New Roman" panose="02020603050405020304" pitchFamily="18" charset="0"/>
                         </a:rPr>
-                        <a:t>–</a:t>
+                        <a:t>+</a:t>
                       </a:r>
                     </a:p>
                     <a:p>
@@ -8379,205 +8346,6 @@
           <a:chExt cx="0" cy="0"/>
         </a:xfrm>
       </p:grpSpPr>
-      <p:sp>
-        <p:nvSpPr>
-          <p:cNvPr id="2" name="Заголовок 1">
-            <a:extLst>
-              <a:ext uri="{FF2B5EF4-FFF2-40B4-BE49-F238E27FC236}">
-                <a16:creationId xmlns:a16="http://schemas.microsoft.com/office/drawing/2014/main" id="{954E512C-01F0-A9BE-567C-F9835F7BEA47}"/>
-              </a:ext>
-            </a:extLst>
-          </p:cNvPr>
-          <p:cNvSpPr>
-            <a:spLocks noGrp="1"/>
-          </p:cNvSpPr>
-          <p:nvPr>
-            <p:ph type="title"/>
-          </p:nvPr>
-        </p:nvSpPr>
-        <p:spPr/>
-        <p:txBody>
-          <a:bodyPr>
-            <a:normAutofit/>
-          </a:bodyPr>
-          <a:lstStyle/>
-          <a:p>
-            <a:r>
-              <a:rPr lang="ru-RU" dirty="0">
-                <a:latin typeface="Times New Roman" panose="02020603050405020304" pitchFamily="18" charset="0"/>
-                <a:ea typeface="+mn-ea"/>
-                <a:cs typeface="Times New Roman" panose="02020603050405020304" pitchFamily="18" charset="0"/>
-              </a:rPr>
-              <a:t>Диаграмма вариантов использования</a:t>
-            </a:r>
-          </a:p>
-        </p:txBody>
-      </p:sp>
-      <p:sp>
-        <p:nvSpPr>
-          <p:cNvPr id="5" name="Номер слайда 4">
-            <a:extLst>
-              <a:ext uri="{FF2B5EF4-FFF2-40B4-BE49-F238E27FC236}">
-                <a16:creationId xmlns:a16="http://schemas.microsoft.com/office/drawing/2014/main" id="{D7B7C799-BEDA-6123-DDA1-82D0CA067A7A}"/>
-              </a:ext>
-            </a:extLst>
-          </p:cNvPr>
-          <p:cNvSpPr>
-            <a:spLocks noGrp="1"/>
-          </p:cNvSpPr>
-          <p:nvPr>
-            <p:ph type="sldNum" sz="quarter" idx="12"/>
-          </p:nvPr>
-        </p:nvSpPr>
-        <p:spPr/>
-        <p:txBody>
-          <a:bodyPr/>
-          <a:lstStyle/>
-          <a:p>
-            <a:fld id="{9F75ED48-FB93-4D27-9D40-6DF4DFA3F996}" type="slidenum">
-              <a:rPr lang="ru-RU" smtClean="0"/>
-              <a:t>5</a:t>
-            </a:fld>
-            <a:endParaRPr lang="ru-RU"/>
-          </a:p>
-        </p:txBody>
-      </p:sp>
-      <p:sp>
-        <p:nvSpPr>
-          <p:cNvPr id="4" name="Объект 2">
-            <a:extLst>
-              <a:ext uri="{FF2B5EF4-FFF2-40B4-BE49-F238E27FC236}">
-                <a16:creationId xmlns:a16="http://schemas.microsoft.com/office/drawing/2014/main" id="{F5E630B3-D887-9F42-6565-C01B070442BC}"/>
-              </a:ext>
-            </a:extLst>
-          </p:cNvPr>
-          <p:cNvSpPr>
-            <a:spLocks noGrp="1"/>
-          </p:cNvSpPr>
-          <p:nvPr>
-            <p:ph idx="1"/>
-          </p:nvPr>
-        </p:nvSpPr>
-        <p:spPr>
-          <a:xfrm>
-            <a:off x="838200" y="1825625"/>
-            <a:ext cx="10515600" cy="4351338"/>
-          </a:xfrm>
-        </p:spPr>
-        <p:txBody>
-          <a:bodyPr vert="horz" lIns="91440" tIns="45720" rIns="91440" bIns="45720" rtlCol="0" anchor="t">
-            <a:normAutofit/>
-          </a:bodyPr>
-          <a:lstStyle/>
-          <a:p>
-            <a:pPr marL="0" indent="0">
-              <a:buNone/>
-            </a:pPr>
-            <a:r>
-              <a:rPr lang="en-US" dirty="0" err="1">
-                <a:latin typeface="Times New Roman"/>
-                <a:cs typeface="Times New Roman"/>
-              </a:rPr>
-              <a:t>Выделены</a:t>
-            </a:r>
-            <a:r>
-              <a:rPr lang="en-US" dirty="0">
-                <a:latin typeface="Times New Roman"/>
-                <a:cs typeface="Times New Roman"/>
-              </a:rPr>
-              <a:t> </a:t>
-            </a:r>
-            <a:r>
-              <a:rPr lang="en-US" dirty="0" err="1">
-                <a:latin typeface="Times New Roman"/>
-                <a:cs typeface="Times New Roman"/>
-              </a:rPr>
-              <a:t>следующие</a:t>
-            </a:r>
-            <a:br>
-              <a:rPr lang="en-US" dirty="0">
-                <a:latin typeface="Times New Roman"/>
-                <a:cs typeface="Times New Roman"/>
-              </a:rPr>
-            </a:br>
-            <a:r>
-              <a:rPr lang="en-US" dirty="0" err="1">
-                <a:latin typeface="Times New Roman"/>
-                <a:cs typeface="Times New Roman"/>
-              </a:rPr>
-              <a:t>категории</a:t>
-            </a:r>
-            <a:r>
-              <a:rPr lang="en-US" dirty="0">
-                <a:latin typeface="Times New Roman"/>
-                <a:cs typeface="Times New Roman"/>
-              </a:rPr>
-              <a:t> </a:t>
-            </a:r>
-            <a:r>
-              <a:rPr lang="en-US" dirty="0" err="1">
-                <a:latin typeface="Times New Roman"/>
-                <a:cs typeface="Times New Roman"/>
-              </a:rPr>
-              <a:t>пользователей</a:t>
-            </a:r>
-            <a:r>
-              <a:rPr lang="en-US" dirty="0">
-                <a:latin typeface="Times New Roman"/>
-                <a:cs typeface="Times New Roman"/>
-              </a:rPr>
-              <a:t>:</a:t>
-            </a:r>
-          </a:p>
-          <a:p>
-            <a:pPr marL="457200" indent="-457200">
-              <a:buFont typeface="Liberation Sans" panose="020B0604020202020204" pitchFamily="34" charset="0"/>
-              <a:buChar char="−"/>
-            </a:pPr>
-            <a:r>
-              <a:rPr lang="en-US" dirty="0" err="1">
-                <a:latin typeface="Times New Roman"/>
-                <a:cs typeface="Times New Roman"/>
-              </a:rPr>
-              <a:t>Гость</a:t>
-            </a:r>
-          </a:p>
-          <a:p>
-            <a:pPr marL="457200" indent="-457200">
-              <a:buFont typeface="Liberation Sans" panose="020B0604020202020204" pitchFamily="34" charset="0"/>
-              <a:buChar char="−"/>
-            </a:pPr>
-            <a:r>
-              <a:rPr lang="en-US" dirty="0" err="1">
-                <a:latin typeface="Times New Roman"/>
-                <a:cs typeface="Times New Roman"/>
-              </a:rPr>
-              <a:t>Игрок</a:t>
-            </a:r>
-            <a:endParaRPr lang="en-US" dirty="0">
-              <a:latin typeface="Times New Roman"/>
-              <a:cs typeface="Times New Roman"/>
-            </a:endParaRPr>
-          </a:p>
-          <a:p>
-            <a:pPr marL="457200" indent="-457200">
-              <a:buFont typeface="Liberation Sans" panose="020B0604020202020204" pitchFamily="34" charset="0"/>
-              <a:buChar char="−"/>
-            </a:pPr>
-            <a:r>
-              <a:rPr lang="en-US" dirty="0" err="1">
-                <a:latin typeface="Times New Roman"/>
-                <a:cs typeface="Times New Roman"/>
-              </a:rPr>
-              <a:t>Админинстратор</a:t>
-            </a:r>
-            <a:endParaRPr lang="en-US" dirty="0" err="1">
-              <a:latin typeface="Times New Roman" panose="02020603050405020304" pitchFamily="18" charset="0"/>
-              <a:cs typeface="Times New Roman" panose="02020603050405020304" pitchFamily="18" charset="0"/>
-            </a:endParaRPr>
-          </a:p>
-        </p:txBody>
-      </p:sp>
       <p:pic>
         <p:nvPicPr>
           <p:cNvPr id="7" name="Рисунок 6" descr="Изображение выглядит как текст, диаграмма, Шрифт, карта&#10;&#10;Содержимое, созданное искусственным интеллектом, может быть неверным.">
@@ -8600,14 +8368,251 @@
         </p:blipFill>
         <p:spPr>
           <a:xfrm>
-            <a:off x="4862724" y="1443383"/>
-            <a:ext cx="6150658" cy="5094577"/>
+            <a:off x="4411456" y="1285141"/>
+            <a:ext cx="6434402" cy="5329602"/>
           </a:xfrm>
           <a:prstGeom prst="rect">
             <a:avLst/>
           </a:prstGeom>
         </p:spPr>
       </p:pic>
+      <p:sp>
+        <p:nvSpPr>
+          <p:cNvPr id="2" name="Заголовок 1">
+            <a:extLst>
+              <a:ext uri="{FF2B5EF4-FFF2-40B4-BE49-F238E27FC236}">
+                <a16:creationId xmlns:a16="http://schemas.microsoft.com/office/drawing/2014/main" id="{954E512C-01F0-A9BE-567C-F9835F7BEA47}"/>
+              </a:ext>
+            </a:extLst>
+          </p:cNvPr>
+          <p:cNvSpPr>
+            <a:spLocks noGrp="1"/>
+          </p:cNvSpPr>
+          <p:nvPr>
+            <p:ph type="title"/>
+          </p:nvPr>
+        </p:nvSpPr>
+        <p:spPr/>
+        <p:txBody>
+          <a:bodyPr>
+            <a:normAutofit/>
+          </a:bodyPr>
+          <a:lstStyle/>
+          <a:p>
+            <a:r>
+              <a:rPr lang="ru-RU" dirty="0">
+                <a:latin typeface="Times New Roman" panose="02020603050405020304" pitchFamily="18" charset="0"/>
+                <a:ea typeface="+mn-ea"/>
+                <a:cs typeface="Times New Roman" panose="02020603050405020304" pitchFamily="18" charset="0"/>
+              </a:rPr>
+              <a:t>Диаграмма вариантов использования</a:t>
+            </a:r>
+          </a:p>
+        </p:txBody>
+      </p:sp>
+      <p:sp>
+        <p:nvSpPr>
+          <p:cNvPr id="5" name="Номер слайда 4">
+            <a:extLst>
+              <a:ext uri="{FF2B5EF4-FFF2-40B4-BE49-F238E27FC236}">
+                <a16:creationId xmlns:a16="http://schemas.microsoft.com/office/drawing/2014/main" id="{D7B7C799-BEDA-6123-DDA1-82D0CA067A7A}"/>
+              </a:ext>
+            </a:extLst>
+          </p:cNvPr>
+          <p:cNvSpPr>
+            <a:spLocks noGrp="1"/>
+          </p:cNvSpPr>
+          <p:nvPr>
+            <p:ph type="sldNum" sz="quarter" idx="12"/>
+          </p:nvPr>
+        </p:nvSpPr>
+        <p:spPr/>
+        <p:txBody>
+          <a:bodyPr/>
+          <a:lstStyle/>
+          <a:p>
+            <a:fld id="{9F75ED48-FB93-4D27-9D40-6DF4DFA3F996}" type="slidenum">
+              <a:rPr lang="ru-RU" smtClean="0"/>
+              <a:t>5</a:t>
+            </a:fld>
+            <a:endParaRPr lang="ru-RU"/>
+          </a:p>
+        </p:txBody>
+      </p:sp>
+      <p:sp>
+        <p:nvSpPr>
+          <p:cNvPr id="4" name="Объект 2">
+            <a:extLst>
+              <a:ext uri="{FF2B5EF4-FFF2-40B4-BE49-F238E27FC236}">
+                <a16:creationId xmlns:a16="http://schemas.microsoft.com/office/drawing/2014/main" id="{F5E630B3-D887-9F42-6565-C01B070442BC}"/>
+              </a:ext>
+            </a:extLst>
+          </p:cNvPr>
+          <p:cNvSpPr>
+            <a:spLocks noGrp="1"/>
+          </p:cNvSpPr>
+          <p:nvPr>
+            <p:ph idx="1"/>
+          </p:nvPr>
+        </p:nvSpPr>
+        <p:spPr>
+          <a:xfrm>
+            <a:off x="838200" y="1825625"/>
+            <a:ext cx="10515600" cy="4351338"/>
+          </a:xfrm>
+        </p:spPr>
+        <p:txBody>
+          <a:bodyPr vert="horz" lIns="91440" tIns="45720" rIns="91440" bIns="45720" rtlCol="0" anchor="t">
+            <a:normAutofit/>
+          </a:bodyPr>
+          <a:lstStyle/>
+          <a:p>
+            <a:pPr marL="0" indent="0">
+              <a:buNone/>
+            </a:pPr>
+            <a:r>
+              <a:rPr lang="en-US" dirty="0" err="1">
+                <a:latin typeface="Times New Roman"/>
+                <a:cs typeface="Times New Roman"/>
+              </a:rPr>
+              <a:t>Выделены</a:t>
+            </a:r>
+            <a:r>
+              <a:rPr lang="en-US" dirty="0">
+                <a:latin typeface="Times New Roman"/>
+                <a:cs typeface="Times New Roman"/>
+              </a:rPr>
+              <a:t> </a:t>
+            </a:r>
+            <a:r>
+              <a:rPr lang="en-US" dirty="0" err="1">
+                <a:latin typeface="Times New Roman"/>
+                <a:cs typeface="Times New Roman"/>
+              </a:rPr>
+              <a:t>следующие</a:t>
+            </a:r>
+            <a:br>
+              <a:rPr lang="en-US" dirty="0">
+                <a:latin typeface="Times New Roman"/>
+                <a:cs typeface="Times New Roman"/>
+              </a:rPr>
+            </a:br>
+            <a:r>
+              <a:rPr lang="en-US" dirty="0" err="1">
+                <a:latin typeface="Times New Roman"/>
+                <a:cs typeface="Times New Roman"/>
+              </a:rPr>
+              <a:t>категории</a:t>
+            </a:r>
+            <a:r>
+              <a:rPr lang="en-US" dirty="0">
+                <a:latin typeface="Times New Roman"/>
+                <a:cs typeface="Times New Roman"/>
+              </a:rPr>
+              <a:t> </a:t>
+            </a:r>
+            <a:r>
+              <a:rPr lang="en-US" dirty="0" err="1">
+                <a:latin typeface="Times New Roman"/>
+                <a:cs typeface="Times New Roman"/>
+              </a:rPr>
+              <a:t>пользователей</a:t>
+            </a:r>
+            <a:r>
+              <a:rPr lang="en-US" dirty="0">
+                <a:latin typeface="Times New Roman"/>
+                <a:cs typeface="Times New Roman"/>
+              </a:rPr>
+              <a:t>:</a:t>
+            </a:r>
+          </a:p>
+          <a:p>
+            <a:pPr marL="457200" indent="-457200">
+              <a:buFont typeface="Liberation Sans" panose="020B0604020202020204" pitchFamily="34" charset="0"/>
+              <a:buChar char="−"/>
+            </a:pPr>
+            <a:r>
+              <a:rPr lang="ru-RU" dirty="0">
+                <a:latin typeface="Times New Roman"/>
+                <a:cs typeface="Times New Roman"/>
+              </a:rPr>
+              <a:t>г</a:t>
+            </a:r>
+            <a:r>
+              <a:rPr lang="en-US" dirty="0" err="1">
+                <a:latin typeface="Times New Roman"/>
+                <a:cs typeface="Times New Roman"/>
+              </a:rPr>
+              <a:t>ость</a:t>
+            </a:r>
+            <a:r>
+              <a:rPr lang="en-US" dirty="0">
+                <a:latin typeface="Times New Roman"/>
+                <a:cs typeface="Times New Roman"/>
+              </a:rPr>
+              <a:t>;</a:t>
+            </a:r>
+          </a:p>
+          <a:p>
+            <a:pPr marL="457200" indent="-457200">
+              <a:buFont typeface="Liberation Sans" panose="020B0604020202020204" pitchFamily="34" charset="0"/>
+              <a:buChar char="−"/>
+            </a:pPr>
+            <a:r>
+              <a:rPr lang="ru-RU" dirty="0">
+                <a:latin typeface="Times New Roman"/>
+                <a:cs typeface="Times New Roman"/>
+              </a:rPr>
+              <a:t>и</a:t>
+            </a:r>
+            <a:r>
+              <a:rPr lang="en-US" dirty="0" err="1">
+                <a:latin typeface="Times New Roman"/>
+                <a:cs typeface="Times New Roman"/>
+              </a:rPr>
+              <a:t>грок</a:t>
+            </a:r>
+            <a:r>
+              <a:rPr lang="en-US" dirty="0">
+                <a:latin typeface="Times New Roman"/>
+                <a:cs typeface="Times New Roman"/>
+              </a:rPr>
+              <a:t>;</a:t>
+            </a:r>
+          </a:p>
+          <a:p>
+            <a:pPr marL="457200" indent="-457200">
+              <a:buFont typeface="Liberation Sans" panose="020B0604020202020204" pitchFamily="34" charset="0"/>
+              <a:buChar char="−"/>
+            </a:pPr>
+            <a:r>
+              <a:rPr lang="ru-RU" dirty="0">
+                <a:latin typeface="Times New Roman"/>
+                <a:cs typeface="Times New Roman"/>
+              </a:rPr>
+              <a:t>а</a:t>
+            </a:r>
+            <a:r>
+              <a:rPr lang="en-US" dirty="0" err="1">
+                <a:latin typeface="Times New Roman"/>
+                <a:cs typeface="Times New Roman"/>
+              </a:rPr>
+              <a:t>дмининстратор</a:t>
+            </a:r>
+            <a:r>
+              <a:rPr lang="en-US" dirty="0">
+                <a:latin typeface="Times New Roman"/>
+                <a:cs typeface="Times New Roman"/>
+              </a:rPr>
+              <a:t>.</a:t>
+            </a:r>
+            <a:endParaRPr lang="en-US" dirty="0">
+              <a:latin typeface="Times New Roman" panose="02020603050405020304" pitchFamily="18" charset="0"/>
+              <a:cs typeface="Times New Roman" panose="02020603050405020304" pitchFamily="18" charset="0"/>
+            </a:endParaRPr>
+          </a:p>
+        </p:txBody>
+      </p:sp>
     </p:spTree>
     <p:extLst>
       <p:ext uri="{BB962C8B-B14F-4D97-AF65-F5344CB8AC3E}">
@@ -8638,94 +8643,6 @@
           <a:chExt cx="0" cy="0"/>
         </a:xfrm>
       </p:grpSpPr>
-      <p:sp>
-        <p:nvSpPr>
-          <p:cNvPr id="2" name="Заголовок 1">
-            <a:extLst>
-              <a:ext uri="{FF2B5EF4-FFF2-40B4-BE49-F238E27FC236}">
-                <a16:creationId xmlns:a16="http://schemas.microsoft.com/office/drawing/2014/main" id="{BA435FC0-FBC6-BA56-4D33-5569CC18ECCD}"/>
-              </a:ext>
-            </a:extLst>
-          </p:cNvPr>
-          <p:cNvSpPr>
-            <a:spLocks noGrp="1"/>
-          </p:cNvSpPr>
-          <p:nvPr>
-            <p:ph type="title"/>
-          </p:nvPr>
-        </p:nvSpPr>
-        <p:spPr/>
-        <p:txBody>
-          <a:bodyPr>
-            <a:normAutofit/>
-          </a:bodyPr>
-          <a:lstStyle/>
-          <a:p>
-            <a:r>
-              <a:rPr lang="ru-RU" dirty="0">
-                <a:latin typeface="Times New Roman" panose="02020603050405020304" pitchFamily="18" charset="0"/>
-                <a:ea typeface="+mn-ea"/>
-                <a:cs typeface="Times New Roman" panose="02020603050405020304" pitchFamily="18" charset="0"/>
-              </a:rPr>
-              <a:t>Диаграмма БД</a:t>
-            </a:r>
-          </a:p>
-        </p:txBody>
-      </p:sp>
-      <p:sp>
-        <p:nvSpPr>
-          <p:cNvPr id="3" name="Объект 2">
-            <a:extLst>
-              <a:ext uri="{FF2B5EF4-FFF2-40B4-BE49-F238E27FC236}">
-                <a16:creationId xmlns:a16="http://schemas.microsoft.com/office/drawing/2014/main" id="{4A7390FF-BF89-A70A-5631-978CD684A236}"/>
-              </a:ext>
-            </a:extLst>
-          </p:cNvPr>
-          <p:cNvSpPr>
-            <a:spLocks noGrp="1"/>
-          </p:cNvSpPr>
-          <p:nvPr>
-            <p:ph idx="1"/>
-          </p:nvPr>
-        </p:nvSpPr>
-        <p:spPr/>
-        <p:txBody>
-          <a:bodyPr/>
-          <a:lstStyle/>
-          <a:p>
-            <a:endParaRPr lang="ru-RU" dirty="0"/>
-          </a:p>
-        </p:txBody>
-      </p:sp>
-      <p:sp>
-        <p:nvSpPr>
-          <p:cNvPr id="6" name="Номер слайда 5">
-            <a:extLst>
-              <a:ext uri="{FF2B5EF4-FFF2-40B4-BE49-F238E27FC236}">
-                <a16:creationId xmlns:a16="http://schemas.microsoft.com/office/drawing/2014/main" id="{6C39F4B4-3638-6213-C975-9B6523D7C84C}"/>
-              </a:ext>
-            </a:extLst>
-          </p:cNvPr>
-          <p:cNvSpPr>
-            <a:spLocks noGrp="1"/>
-          </p:cNvSpPr>
-          <p:nvPr>
-            <p:ph type="sldNum" sz="quarter" idx="12"/>
-          </p:nvPr>
-        </p:nvSpPr>
-        <p:spPr/>
-        <p:txBody>
-          <a:bodyPr/>
-          <a:lstStyle/>
-          <a:p>
-            <a:fld id="{9F75ED48-FB93-4D27-9D40-6DF4DFA3F996}" type="slidenum">
-              <a:rPr lang="ru-RU" smtClean="0"/>
-              <a:t>6</a:t>
-            </a:fld>
-            <a:endParaRPr lang="ru-RU"/>
-          </a:p>
-        </p:txBody>
-      </p:sp>
       <p:pic>
         <p:nvPicPr>
           <p:cNvPr id="9" name="Рисунок 8">
@@ -8748,14 +8665,102 @@
         </p:blipFill>
         <p:spPr>
           <a:xfrm>
-            <a:off x="2702040" y="1448302"/>
-            <a:ext cx="6567603" cy="5044573"/>
+            <a:off x="2658274" y="1211844"/>
+            <a:ext cx="6875451" cy="5281031"/>
           </a:xfrm>
           <a:prstGeom prst="rect">
             <a:avLst/>
           </a:prstGeom>
         </p:spPr>
       </p:pic>
+      <p:sp>
+        <p:nvSpPr>
+          <p:cNvPr id="2" name="Заголовок 1">
+            <a:extLst>
+              <a:ext uri="{FF2B5EF4-FFF2-40B4-BE49-F238E27FC236}">
+                <a16:creationId xmlns:a16="http://schemas.microsoft.com/office/drawing/2014/main" id="{BA435FC0-FBC6-BA56-4D33-5569CC18ECCD}"/>
+              </a:ext>
+            </a:extLst>
+          </p:cNvPr>
+          <p:cNvSpPr>
+            <a:spLocks noGrp="1"/>
+          </p:cNvSpPr>
+          <p:nvPr>
+            <p:ph type="title"/>
+          </p:nvPr>
+        </p:nvSpPr>
+        <p:spPr/>
+        <p:txBody>
+          <a:bodyPr>
+            <a:normAutofit/>
+          </a:bodyPr>
+          <a:lstStyle/>
+          <a:p>
+            <a:r>
+              <a:rPr lang="ru-RU" dirty="0">
+                <a:latin typeface="Times New Roman" panose="02020603050405020304" pitchFamily="18" charset="0"/>
+                <a:ea typeface="+mn-ea"/>
+                <a:cs typeface="Times New Roman" panose="02020603050405020304" pitchFamily="18" charset="0"/>
+              </a:rPr>
+              <a:t>Диаграмма БД</a:t>
+            </a:r>
+          </a:p>
+        </p:txBody>
+      </p:sp>
+      <p:sp>
+        <p:nvSpPr>
+          <p:cNvPr id="3" name="Объект 2">
+            <a:extLst>
+              <a:ext uri="{FF2B5EF4-FFF2-40B4-BE49-F238E27FC236}">
+                <a16:creationId xmlns:a16="http://schemas.microsoft.com/office/drawing/2014/main" id="{4A7390FF-BF89-A70A-5631-978CD684A236}"/>
+              </a:ext>
+            </a:extLst>
+          </p:cNvPr>
+          <p:cNvSpPr>
+            <a:spLocks noGrp="1"/>
+          </p:cNvSpPr>
+          <p:nvPr>
+            <p:ph idx="1"/>
+          </p:nvPr>
+        </p:nvSpPr>
+        <p:spPr/>
+        <p:txBody>
+          <a:bodyPr/>
+          <a:lstStyle/>
+          <a:p>
+            <a:endParaRPr lang="ru-RU" dirty="0"/>
+          </a:p>
+        </p:txBody>
+      </p:sp>
+      <p:sp>
+        <p:nvSpPr>
+          <p:cNvPr id="6" name="Номер слайда 5">
+            <a:extLst>
+              <a:ext uri="{FF2B5EF4-FFF2-40B4-BE49-F238E27FC236}">
+                <a16:creationId xmlns:a16="http://schemas.microsoft.com/office/drawing/2014/main" id="{6C39F4B4-3638-6213-C975-9B6523D7C84C}"/>
+              </a:ext>
+            </a:extLst>
+          </p:cNvPr>
+          <p:cNvSpPr>
+            <a:spLocks noGrp="1"/>
+          </p:cNvSpPr>
+          <p:nvPr>
+            <p:ph type="sldNum" sz="quarter" idx="12"/>
+          </p:nvPr>
+        </p:nvSpPr>
+        <p:spPr/>
+        <p:txBody>
+          <a:bodyPr/>
+          <a:lstStyle/>
+          <a:p>
+            <a:fld id="{9F75ED48-FB93-4D27-9D40-6DF4DFA3F996}" type="slidenum">
+              <a:rPr lang="ru-RU" smtClean="0"/>
+              <a:t>6</a:t>
+            </a:fld>
+            <a:endParaRPr lang="ru-RU"/>
+          </a:p>
+        </p:txBody>
+      </p:sp>
     </p:spTree>
     <p:extLst>
       <p:ext uri="{BB962C8B-B14F-4D97-AF65-F5344CB8AC3E}">
@@ -9055,7 +9060,7 @@
           <p:nvPr>
             <p:extLst>
               <p:ext uri="{D42A27DB-BD31-4B8C-83A1-F6EECF244321}">
-                <p14:modId xmlns:p14="http://schemas.microsoft.com/office/powerpoint/2010/main" val="890645409"/>
+                <p14:modId xmlns:p14="http://schemas.microsoft.com/office/powerpoint/2010/main" val="3430985326"/>
               </p:ext>
             </p:extLst>
           </p:nvPr>
@@ -9541,7 +9546,7 @@
                           <a:latin typeface="Times New Roman" panose="02020603050405020304" pitchFamily="18" charset="0"/>
                           <a:cs typeface="Times New Roman" panose="02020603050405020304" pitchFamily="18" charset="0"/>
                         </a:rPr>
-                        <a:t>Открытость исходного кода</a:t>
+                        <a:t>Отсутствие коммерческой лицензии</a:t>
                       </a:r>
                     </a:p>
                   </a:txBody>
@@ -9904,16 +9909,16 @@
                 <a:latin typeface="Times New Roman" panose="02020603050405020304" pitchFamily="18" charset="0"/>
                 <a:cs typeface="Times New Roman" panose="02020603050405020304" pitchFamily="18" charset="0"/>
               </a:rPr>
-              <a:t>СУБД</a:t>
+              <a:t>Язык: C</a:t>
             </a:r>
             <a:r>
               <a:rPr lang="en-US" sz="2800" dirty="0">
                 <a:latin typeface="Times New Roman" panose="02020603050405020304" pitchFamily="18" charset="0"/>
                 <a:cs typeface="Times New Roman" panose="02020603050405020304" pitchFamily="18" charset="0"/>
               </a:rPr>
-              <a:t>: PostgreSQL</a:t>
-            </a:r>
-            <a:endParaRPr lang="ru-RU" sz="2800" dirty="0">
+              <a:t>#;</a:t>
+            </a:r>
+            <a:endParaRPr lang="ru-RU" dirty="0">
               <a:latin typeface="Times New Roman" panose="02020603050405020304" pitchFamily="18" charset="0"/>
               <a:cs typeface="Times New Roman" panose="02020603050405020304" pitchFamily="18" charset="0"/>
             </a:endParaRPr>
@@ -9924,18 +9929,52 @@
               <a:buChar char="−"/>
             </a:pPr>
             <a:r>
-              <a:rPr lang="ru-RU" sz="2800" dirty="0">
-                <a:latin typeface="Times New Roman" panose="02020603050405020304" pitchFamily="18" charset="0"/>
-                <a:cs typeface="Times New Roman" panose="02020603050405020304" pitchFamily="18" charset="0"/>
-              </a:rPr>
-              <a:t>Язык: C</a:t>
-            </a:r>
-            <a:r>
-              <a:rPr lang="en-US" sz="2800" dirty="0">
-                <a:latin typeface="Times New Roman" panose="02020603050405020304" pitchFamily="18" charset="0"/>
-                <a:cs typeface="Times New Roman" panose="02020603050405020304" pitchFamily="18" charset="0"/>
-              </a:rPr>
-              <a:t>#;</a:t>
+              <a:rPr lang="ru-RU" dirty="0">
+                <a:latin typeface="Times New Roman" panose="02020603050405020304" pitchFamily="18" charset="0"/>
+                <a:cs typeface="Times New Roman" panose="02020603050405020304" pitchFamily="18" charset="0"/>
+              </a:rPr>
+              <a:t>Фреймворк</a:t>
+            </a:r>
+            <a:r>
+              <a:rPr lang="en-US" dirty="0">
+                <a:latin typeface="Times New Roman" panose="02020603050405020304" pitchFamily="18" charset="0"/>
+                <a:cs typeface="Times New Roman" panose="02020603050405020304" pitchFamily="18" charset="0"/>
+              </a:rPr>
+              <a:t>: ASP.NET </a:t>
+            </a:r>
+            <a:r>
+              <a:rPr lang="ru-RU" dirty="0">
+                <a:latin typeface="Times New Roman" panose="02020603050405020304" pitchFamily="18" charset="0"/>
+                <a:cs typeface="Times New Roman" panose="02020603050405020304" pitchFamily="18" charset="0"/>
+              </a:rPr>
+              <a:t>8</a:t>
+            </a:r>
+            <a:r>
+              <a:rPr lang="en-US" dirty="0">
+                <a:latin typeface="Times New Roman" panose="02020603050405020304" pitchFamily="18" charset="0"/>
+                <a:cs typeface="Times New Roman" panose="02020603050405020304" pitchFamily="18" charset="0"/>
+              </a:rPr>
+              <a:t>.0;</a:t>
+            </a:r>
+          </a:p>
+          <a:p>
+            <a:pPr marL="457200" indent="-457200">
+              <a:buFont typeface="Liberation Sans" panose="020B0604020202020204" pitchFamily="34" charset="0"/>
+              <a:buChar char="−"/>
+            </a:pPr>
+            <a:r>
+              <a:rPr lang="ru-RU" dirty="0">
+                <a:latin typeface="Times New Roman" panose="02020603050405020304" pitchFamily="18" charset="0"/>
+                <a:cs typeface="Times New Roman" panose="02020603050405020304" pitchFamily="18" charset="0"/>
+              </a:rPr>
+              <a:t>Сторонние библиотеки</a:t>
+            </a:r>
+            <a:r>
+              <a:rPr lang="en-US" dirty="0">
+                <a:latin typeface="Times New Roman" panose="02020603050405020304" pitchFamily="18" charset="0"/>
+                <a:cs typeface="Times New Roman" panose="02020603050405020304" pitchFamily="18" charset="0"/>
+              </a:rPr>
+              <a:t>:</a:t>
             </a:r>
             <a:endParaRPr lang="ru-RU" dirty="0">
               <a:latin typeface="Times New Roman" panose="02020603050405020304" pitchFamily="18" charset="0"/>
@@ -9943,57 +9982,30 @@
             </a:endParaRPr>
           </a:p>
           <a:p>
-            <a:pPr marL="457200" indent="-457200">
+            <a:pPr marL="914400" lvl="1" indent="-457200">
               <a:buFont typeface="Liberation Sans" panose="020B0604020202020204" pitchFamily="34" charset="0"/>
               <a:buChar char="−"/>
             </a:pPr>
             <a:r>
+              <a:rPr lang="en-US" dirty="0">
+                <a:latin typeface="Times New Roman" panose="02020603050405020304" pitchFamily="18" charset="0"/>
+                <a:cs typeface="Times New Roman" panose="02020603050405020304" pitchFamily="18" charset="0"/>
+              </a:rPr>
+              <a:t>Quartz.NET</a:t>
+            </a:r>
+            <a:r>
               <a:rPr lang="ru-RU" dirty="0">
                 <a:latin typeface="Times New Roman" panose="02020603050405020304" pitchFamily="18" charset="0"/>
                 <a:cs typeface="Times New Roman" panose="02020603050405020304" pitchFamily="18" charset="0"/>
               </a:rPr>
-              <a:t>Фреймворк</a:t>
+              <a:t> для хранения и выполнения отложенных задач </a:t>
             </a:r>
             <a:r>
               <a:rPr lang="en-US" dirty="0">
                 <a:latin typeface="Times New Roman" panose="02020603050405020304" pitchFamily="18" charset="0"/>
                 <a:cs typeface="Times New Roman" panose="02020603050405020304" pitchFamily="18" charset="0"/>
               </a:rPr>
-              <a:t>: ASP.NET </a:t>
-            </a:r>
-            <a:r>
-              <a:rPr lang="ru-RU" dirty="0">
-                <a:latin typeface="Times New Roman" panose="02020603050405020304" pitchFamily="18" charset="0"/>
-                <a:cs typeface="Times New Roman" panose="02020603050405020304" pitchFamily="18" charset="0"/>
-              </a:rPr>
-              <a:t>8</a:t>
-            </a:r>
-            <a:r>
-              <a:rPr lang="en-US" dirty="0">
-                <a:latin typeface="Times New Roman" panose="02020603050405020304" pitchFamily="18" charset="0"/>
-                <a:cs typeface="Times New Roman" panose="02020603050405020304" pitchFamily="18" charset="0"/>
-              </a:rPr>
-              <a:t>.0</a:t>
-            </a:r>
-          </a:p>
-          <a:p>
-            <a:pPr marL="457200" indent="-457200">
-              <a:buFont typeface="Liberation Sans" panose="020B0604020202020204" pitchFamily="34" charset="0"/>
-              <a:buChar char="−"/>
-            </a:pPr>
-            <a:r>
-              <a:rPr lang="ru-RU" dirty="0">
-                <a:latin typeface="Times New Roman" panose="02020603050405020304" pitchFamily="18" charset="0"/>
-                <a:cs typeface="Times New Roman" panose="02020603050405020304" pitchFamily="18" charset="0"/>
-              </a:rPr>
-              <a:t>Сторонние библиотеки</a:t>
-            </a:r>
-            <a:r>
-              <a:rPr lang="en-US" dirty="0">
-                <a:latin typeface="Times New Roman" panose="02020603050405020304" pitchFamily="18" charset="0"/>
-                <a:cs typeface="Times New Roman" panose="02020603050405020304" pitchFamily="18" charset="0"/>
-              </a:rPr>
-              <a:t>:</a:t>
+              <a:t>;</a:t>
             </a:r>
             <a:endParaRPr lang="ru-RU" dirty="0">
               <a:latin typeface="Times New Roman" panose="02020603050405020304" pitchFamily="18" charset="0"/>
@@ -10010,14 +10022,21 @@
                 <a:latin typeface="Times New Roman" panose="02020603050405020304" pitchFamily="18" charset="0"/>
                 <a:cs typeface="Times New Roman" panose="02020603050405020304" pitchFamily="18" charset="0"/>
               </a:rPr>
-              <a:t>Quartz.NET</a:t>
+              <a:t>Magick.NET</a:t>
             </a:r>
             <a:r>
               <a:rPr lang="ru-RU" dirty="0">
                 <a:latin typeface="Times New Roman" panose="02020603050405020304" pitchFamily="18" charset="0"/>
                 <a:cs typeface="Times New Roman" panose="02020603050405020304" pitchFamily="18" charset="0"/>
               </a:rPr>
-              <a:t> для хранения и выполнения отложенных задач </a:t>
+              <a:t> для обработки изображений</a:t>
+            </a:r>
+            <a:r>
+              <a:rPr lang="en-US" dirty="0">
+                <a:latin typeface="Times New Roman" panose="02020603050405020304" pitchFamily="18" charset="0"/>
+                <a:cs typeface="Times New Roman" panose="02020603050405020304" pitchFamily="18" charset="0"/>
+              </a:rPr>
+              <a:t>;</a:t>
             </a:r>
           </a:p>
           <a:p>
@@ -10030,45 +10049,21 @@
                 <a:latin typeface="Times New Roman" panose="02020603050405020304" pitchFamily="18" charset="0"/>
                 <a:cs typeface="Times New Roman" panose="02020603050405020304" pitchFamily="18" charset="0"/>
               </a:rPr>
-              <a:t>Magick.NET</a:t>
+              <a:t>Entity Framework Core</a:t>
             </a:r>
             <a:r>
               <a:rPr lang="ru-RU" dirty="0">
                 <a:latin typeface="Times New Roman" panose="02020603050405020304" pitchFamily="18" charset="0"/>
                 <a:cs typeface="Times New Roman" panose="02020603050405020304" pitchFamily="18" charset="0"/>
               </a:rPr>
-              <a:t> для обработки изображений</a:t>
-            </a:r>
-            <a:endParaRPr lang="en-US" dirty="0">
-              <a:latin typeface="Times New Roman" panose="02020603050405020304" pitchFamily="18" charset="0"/>
-              <a:cs typeface="Times New Roman" panose="02020603050405020304" pitchFamily="18" charset="0"/>
-            </a:endParaRPr>
-          </a:p>
-          <a:p>
-            <a:pPr marL="914400" lvl="1" indent="-457200">
-              <a:buFont typeface="Liberation Sans" panose="020B0604020202020204" pitchFamily="34" charset="0"/>
-              <a:buChar char="−"/>
-            </a:pPr>
+              <a:t> в качестве </a:t>
+            </a:r>
             <a:r>
               <a:rPr lang="en-US" dirty="0">
                 <a:latin typeface="Times New Roman" panose="02020603050405020304" pitchFamily="18" charset="0"/>
                 <a:cs typeface="Times New Roman" panose="02020603050405020304" pitchFamily="18" charset="0"/>
               </a:rPr>
-              <a:t>Entity Framework Core</a:t>
-            </a:r>
-            <a:r>
-              <a:rPr lang="ru-RU" dirty="0">
-                <a:latin typeface="Times New Roman" panose="02020603050405020304" pitchFamily="18" charset="0"/>
-                <a:cs typeface="Times New Roman" panose="02020603050405020304" pitchFamily="18" charset="0"/>
-              </a:rPr>
-              <a:t> в качестве </a:t>
-            </a:r>
-            <a:r>
-              <a:rPr lang="en-US" dirty="0">
-                <a:latin typeface="Times New Roman" panose="02020603050405020304" pitchFamily="18" charset="0"/>
-                <a:cs typeface="Times New Roman" panose="02020603050405020304" pitchFamily="18" charset="0"/>
-              </a:rPr>
-              <a:t>ORM</a:t>
+              <a:t>ORM.</a:t>
             </a:r>
             <a:endParaRPr lang="ru-RU" dirty="0">
               <a:latin typeface="Times New Roman" panose="02020603050405020304" pitchFamily="18" charset="0"/>

</xml_diff>

<commit_message>
Tweaked report a bit (I GUESS IT IS 98% DONE?)
</commit_message>
<xml_diff>
--- a/docs/presentation.pptx
+++ b/docs/presentation.pptx
@@ -5,25 +5,27 @@
     <p:sldMasterId id="2147483648" r:id="rId1"/>
   </p:sldMasterIdLst>
   <p:notesMasterIdLst>
-    <p:notesMasterId r:id="rId18"/>
+    <p:notesMasterId r:id="rId20"/>
   </p:notesMasterIdLst>
   <p:sldIdLst>
     <p:sldId id="256" r:id="rId2"/>
-    <p:sldId id="280" r:id="rId3"/>
-    <p:sldId id="286" r:id="rId4"/>
-    <p:sldId id="275" r:id="rId5"/>
-    <p:sldId id="277" r:id="rId6"/>
-    <p:sldId id="274" r:id="rId7"/>
-    <p:sldId id="276" r:id="rId8"/>
-    <p:sldId id="284" r:id="rId9"/>
-    <p:sldId id="273" r:id="rId10"/>
-    <p:sldId id="283" r:id="rId11"/>
-    <p:sldId id="281" r:id="rId12"/>
-    <p:sldId id="263" r:id="rId13"/>
-    <p:sldId id="268" r:id="rId14"/>
-    <p:sldId id="265" r:id="rId15"/>
-    <p:sldId id="259" r:id="rId16"/>
-    <p:sldId id="279" r:id="rId17"/>
+    <p:sldId id="288" r:id="rId3"/>
+    <p:sldId id="280" r:id="rId4"/>
+    <p:sldId id="286" r:id="rId5"/>
+    <p:sldId id="275" r:id="rId6"/>
+    <p:sldId id="277" r:id="rId7"/>
+    <p:sldId id="274" r:id="rId8"/>
+    <p:sldId id="276" r:id="rId9"/>
+    <p:sldId id="284" r:id="rId10"/>
+    <p:sldId id="273" r:id="rId11"/>
+    <p:sldId id="283" r:id="rId12"/>
+    <p:sldId id="281" r:id="rId13"/>
+    <p:sldId id="287" r:id="rId14"/>
+    <p:sldId id="263" r:id="rId15"/>
+    <p:sldId id="268" r:id="rId16"/>
+    <p:sldId id="265" r:id="rId17"/>
+    <p:sldId id="259" r:id="rId18"/>
+    <p:sldId id="279" r:id="rId19"/>
   </p:sldIdLst>
   <p:sldSz cx="12192000" cy="6858000"/>
   <p:notesSz cx="6858000" cy="9144000"/>
@@ -392,7 +394,7 @@
           <a:p>
             <a:fld id="{7BC6DE02-9070-4391-A9E5-20FBA5D71A5D}" type="datetimeFigureOut">
               <a:rPr lang="ru-RU" smtClean="0"/>
-              <a:t>26.05.2025</a:t>
+              <a:t>29.05.2025</a:t>
             </a:fld>
             <a:endParaRPr lang="ru-RU"/>
           </a:p>
@@ -724,7 +726,7 @@
           <a:p>
             <a:fld id="{BC0E1A58-9EB9-4B1E-BEA5-AC525CF5DADF}" type="slidenum">
               <a:rPr lang="ru-RU" smtClean="0"/>
-              <a:t>12</a:t>
+              <a:t>14</a:t>
             </a:fld>
             <a:endParaRPr lang="ru-RU"/>
           </a:p>
@@ -808,7 +810,7 @@
           <a:p>
             <a:fld id="{BC0E1A58-9EB9-4B1E-BEA5-AC525CF5DADF}" type="slidenum">
               <a:rPr lang="ru-RU" smtClean="0"/>
-              <a:t>13</a:t>
+              <a:t>15</a:t>
             </a:fld>
             <a:endParaRPr lang="ru-RU"/>
           </a:p>
@@ -892,7 +894,7 @@
           <a:p>
             <a:fld id="{BC0E1A58-9EB9-4B1E-BEA5-AC525CF5DADF}" type="slidenum">
               <a:rPr lang="ru-RU" smtClean="0"/>
-              <a:t>14</a:t>
+              <a:t>16</a:t>
             </a:fld>
             <a:endParaRPr lang="ru-RU"/>
           </a:p>
@@ -1000,7 +1002,7 @@
           <a:p>
             <a:fld id="{BC0E1A58-9EB9-4B1E-BEA5-AC525CF5DADF}" type="slidenum">
               <a:rPr lang="ru-RU" smtClean="0"/>
-              <a:t>16</a:t>
+              <a:t>18</a:t>
             </a:fld>
             <a:endParaRPr lang="ru-RU"/>
           </a:p>
@@ -1166,7 +1168,7 @@
           <a:p>
             <a:fld id="{A1439A60-659B-42DB-BB0F-7ED87733A23E}" type="datetime1">
               <a:rPr lang="ru-RU" smtClean="0"/>
-              <a:t>26.05.2025</a:t>
+              <a:t>29.05.2025</a:t>
             </a:fld>
             <a:endParaRPr lang="ru-RU"/>
           </a:p>
@@ -1364,7 +1366,7 @@
           <a:p>
             <a:fld id="{D61B71B4-54FB-40B8-90DD-279781B0C38D}" type="datetime1">
               <a:rPr lang="ru-RU" smtClean="0"/>
-              <a:t>26.05.2025</a:t>
+              <a:t>29.05.2025</a:t>
             </a:fld>
             <a:endParaRPr lang="ru-RU"/>
           </a:p>
@@ -1572,7 +1574,7 @@
           <a:p>
             <a:fld id="{2D090295-5DD3-4456-8BDB-FA7FF8949F97}" type="datetime1">
               <a:rPr lang="ru-RU" smtClean="0"/>
-              <a:t>26.05.2025</a:t>
+              <a:t>29.05.2025</a:t>
             </a:fld>
             <a:endParaRPr lang="ru-RU"/>
           </a:p>
@@ -1770,7 +1772,7 @@
           <a:p>
             <a:fld id="{D7B5F5C0-A8AD-4E24-BFA5-3353364AFE30}" type="datetime1">
               <a:rPr lang="ru-RU" smtClean="0"/>
-              <a:t>26.05.2025</a:t>
+              <a:t>29.05.2025</a:t>
             </a:fld>
             <a:endParaRPr lang="ru-RU"/>
           </a:p>
@@ -1823,6 +1825,9 @@
           <a:lstStyle>
             <a:lvl1pPr>
               <a:defRPr sz="2000">
+                <a:solidFill>
+                  <a:schemeClr val="tx1"/>
+                </a:solidFill>
                 <a:latin typeface="Times New Roman" panose="02020603050405020304" pitchFamily="18" charset="0"/>
                 <a:cs typeface="Times New Roman" panose="02020603050405020304" pitchFamily="18" charset="0"/>
               </a:defRPr>
@@ -2053,7 +2058,7 @@
           <a:p>
             <a:fld id="{6A2AEECD-1031-4CBC-A778-E91CBA3F92A4}" type="datetime1">
               <a:rPr lang="ru-RU" smtClean="0"/>
-              <a:t>26.05.2025</a:t>
+              <a:t>29.05.2025</a:t>
             </a:fld>
             <a:endParaRPr lang="ru-RU"/>
           </a:p>
@@ -2318,7 +2323,7 @@
           <a:p>
             <a:fld id="{8E5B82EB-9FE1-42D5-8640-685632266EB2}" type="datetime1">
               <a:rPr lang="ru-RU" smtClean="0"/>
-              <a:t>26.05.2025</a:t>
+              <a:t>29.05.2025</a:t>
             </a:fld>
             <a:endParaRPr lang="ru-RU"/>
           </a:p>
@@ -2730,7 +2735,7 @@
           <a:p>
             <a:fld id="{A33273D1-BF9D-4402-A07A-C11263F81ACA}" type="datetime1">
               <a:rPr lang="ru-RU" smtClean="0"/>
-              <a:t>26.05.2025</a:t>
+              <a:t>29.05.2025</a:t>
             </a:fld>
             <a:endParaRPr lang="ru-RU"/>
           </a:p>
@@ -2871,7 +2876,7 @@
           <a:p>
             <a:fld id="{C10D7C68-AD43-4338-B6C7-4798ABAED37C}" type="datetime1">
               <a:rPr lang="ru-RU" smtClean="0"/>
-              <a:t>26.05.2025</a:t>
+              <a:t>29.05.2025</a:t>
             </a:fld>
             <a:endParaRPr lang="ru-RU"/>
           </a:p>
@@ -2984,7 +2989,7 @@
           <a:p>
             <a:fld id="{04A09544-4DCC-4E50-BBA1-0EB924E42FB5}" type="datetime1">
               <a:rPr lang="ru-RU" smtClean="0"/>
-              <a:t>26.05.2025</a:t>
+              <a:t>29.05.2025</a:t>
             </a:fld>
             <a:endParaRPr lang="ru-RU"/>
           </a:p>
@@ -3295,7 +3300,7 @@
           <a:p>
             <a:fld id="{B44A15D2-7284-412E-B86C-C8BE76838BC3}" type="datetime1">
               <a:rPr lang="ru-RU" smtClean="0"/>
-              <a:t>26.05.2025</a:t>
+              <a:t>29.05.2025</a:t>
             </a:fld>
             <a:endParaRPr lang="ru-RU"/>
           </a:p>
@@ -3583,7 +3588,7 @@
           <a:p>
             <a:fld id="{4A4A6565-B229-48CB-B9AB-84026305D07B}" type="datetime1">
               <a:rPr lang="ru-RU" smtClean="0"/>
-              <a:t>26.05.2025</a:t>
+              <a:t>29.05.2025</a:t>
             </a:fld>
             <a:endParaRPr lang="ru-RU"/>
           </a:p>
@@ -3824,7 +3829,7 @@
           <a:p>
             <a:fld id="{BBCA45A3-F3B4-42F8-B88D-1485C0862389}" type="datetime1">
               <a:rPr lang="ru-RU" smtClean="0"/>
-              <a:t>26.05.2025</a:t>
+              <a:t>29.05.2025</a:t>
             </a:fld>
             <a:endParaRPr lang="ru-RU"/>
           </a:p>
@@ -4542,7 +4547,7 @@
                 <a:ea typeface="Noto Sans CJK SC" pitchFamily="2"/>
                 <a:cs typeface="Times New Roman" panose="02020603050405020304" pitchFamily="18" charset="0"/>
               </a:rPr>
-              <a:t>Федеральное государственное бюджетное образовательное учреждение</a:t>
+              <a:t>Федеральное государственное автономное образовательное учреждение</a:t>
             </a:r>
           </a:p>
           <a:p>
@@ -4907,6 +4912,338 @@
   <p:cSld>
     <p:spTree>
       <p:nvGrpSpPr>
+        <p:cNvPr id="1" name=""/>
+        <p:cNvGrpSpPr/>
+        <p:nvPr/>
+      </p:nvGrpSpPr>
+      <p:grpSpPr>
+        <a:xfrm>
+          <a:off x="0" y="0"/>
+          <a:ext cx="0" cy="0"/>
+          <a:chOff x="0" y="0"/>
+          <a:chExt cx="0" cy="0"/>
+        </a:xfrm>
+      </p:grpSpPr>
+      <p:sp>
+        <p:nvSpPr>
+          <p:cNvPr id="2" name="Заголовок 1">
+            <a:extLst>
+              <a:ext uri="{FF2B5EF4-FFF2-40B4-BE49-F238E27FC236}">
+                <a16:creationId xmlns:a16="http://schemas.microsoft.com/office/drawing/2014/main" id="{1294129D-F169-D152-03DD-9227D0701403}"/>
+              </a:ext>
+            </a:extLst>
+          </p:cNvPr>
+          <p:cNvSpPr>
+            <a:spLocks noGrp="1"/>
+          </p:cNvSpPr>
+          <p:nvPr>
+            <p:ph type="title"/>
+          </p:nvPr>
+        </p:nvSpPr>
+        <p:spPr/>
+        <p:txBody>
+          <a:bodyPr/>
+          <a:lstStyle/>
+          <a:p>
+            <a:r>
+              <a:rPr lang="ru-RU" sz="4400" dirty="0">
+                <a:latin typeface="Times New Roman" panose="02020603050405020304" pitchFamily="18" charset="0"/>
+                <a:cs typeface="Times New Roman" panose="02020603050405020304" pitchFamily="18" charset="0"/>
+              </a:rPr>
+              <a:t>Средства реализации</a:t>
+            </a:r>
+            <a:endParaRPr lang="ru-RU" dirty="0"/>
+          </a:p>
+        </p:txBody>
+      </p:sp>
+      <p:sp>
+        <p:nvSpPr>
+          <p:cNvPr id="3" name="Объект 2">
+            <a:extLst>
+              <a:ext uri="{FF2B5EF4-FFF2-40B4-BE49-F238E27FC236}">
+                <a16:creationId xmlns:a16="http://schemas.microsoft.com/office/drawing/2014/main" id="{4286BC96-A488-534F-7EB9-5599428C14FE}"/>
+              </a:ext>
+            </a:extLst>
+          </p:cNvPr>
+          <p:cNvSpPr>
+            <a:spLocks noGrp="1"/>
+          </p:cNvSpPr>
+          <p:nvPr>
+            <p:ph idx="1"/>
+          </p:nvPr>
+        </p:nvSpPr>
+        <p:spPr/>
+        <p:txBody>
+          <a:bodyPr/>
+          <a:lstStyle/>
+          <a:p>
+            <a:pPr marL="457200" indent="-457200">
+              <a:buFont typeface="Liberation Sans" panose="020B0604020202020204" pitchFamily="34" charset="0"/>
+              <a:buChar char="−"/>
+            </a:pPr>
+            <a:r>
+              <a:rPr lang="ru-RU" sz="2800" dirty="0">
+                <a:latin typeface="Times New Roman" panose="02020603050405020304" pitchFamily="18" charset="0"/>
+                <a:cs typeface="Times New Roman" panose="02020603050405020304" pitchFamily="18" charset="0"/>
+              </a:rPr>
+              <a:t>Язык: C</a:t>
+            </a:r>
+            <a:r>
+              <a:rPr lang="en-US" sz="2800" dirty="0">
+                <a:latin typeface="Times New Roman" panose="02020603050405020304" pitchFamily="18" charset="0"/>
+                <a:cs typeface="Times New Roman" panose="02020603050405020304" pitchFamily="18" charset="0"/>
+              </a:rPr>
+              <a:t>#;</a:t>
+            </a:r>
+            <a:endParaRPr lang="ru-RU" dirty="0">
+              <a:latin typeface="Times New Roman" panose="02020603050405020304" pitchFamily="18" charset="0"/>
+              <a:cs typeface="Times New Roman" panose="02020603050405020304" pitchFamily="18" charset="0"/>
+            </a:endParaRPr>
+          </a:p>
+          <a:p>
+            <a:pPr marL="457200" indent="-457200">
+              <a:buFont typeface="Liberation Sans" panose="020B0604020202020204" pitchFamily="34" charset="0"/>
+              <a:buChar char="−"/>
+            </a:pPr>
+            <a:r>
+              <a:rPr lang="ru-RU" dirty="0">
+                <a:latin typeface="Times New Roman" panose="02020603050405020304" pitchFamily="18" charset="0"/>
+                <a:cs typeface="Times New Roman" panose="02020603050405020304" pitchFamily="18" charset="0"/>
+              </a:rPr>
+              <a:t>Фреймворк</a:t>
+            </a:r>
+            <a:r>
+              <a:rPr lang="en-US" dirty="0">
+                <a:latin typeface="Times New Roman" panose="02020603050405020304" pitchFamily="18" charset="0"/>
+                <a:cs typeface="Times New Roman" panose="02020603050405020304" pitchFamily="18" charset="0"/>
+              </a:rPr>
+              <a:t>: ASP.NET </a:t>
+            </a:r>
+            <a:r>
+              <a:rPr lang="ru-RU" dirty="0">
+                <a:latin typeface="Times New Roman" panose="02020603050405020304" pitchFamily="18" charset="0"/>
+                <a:cs typeface="Times New Roman" panose="02020603050405020304" pitchFamily="18" charset="0"/>
+              </a:rPr>
+              <a:t>8</a:t>
+            </a:r>
+            <a:r>
+              <a:rPr lang="en-US" dirty="0">
+                <a:latin typeface="Times New Roman" panose="02020603050405020304" pitchFamily="18" charset="0"/>
+                <a:cs typeface="Times New Roman" panose="02020603050405020304" pitchFamily="18" charset="0"/>
+              </a:rPr>
+              <a:t>.0;</a:t>
+            </a:r>
+          </a:p>
+          <a:p>
+            <a:pPr marL="457200" indent="-457200">
+              <a:buFont typeface="Liberation Sans" panose="020B0604020202020204" pitchFamily="34" charset="0"/>
+              <a:buChar char="−"/>
+            </a:pPr>
+            <a:r>
+              <a:rPr lang="ru-RU" dirty="0">
+                <a:latin typeface="Times New Roman" panose="02020603050405020304" pitchFamily="18" charset="0"/>
+                <a:cs typeface="Times New Roman" panose="02020603050405020304" pitchFamily="18" charset="0"/>
+              </a:rPr>
+              <a:t>Сторонние библиотеки</a:t>
+            </a:r>
+            <a:r>
+              <a:rPr lang="en-US" dirty="0">
+                <a:latin typeface="Times New Roman" panose="02020603050405020304" pitchFamily="18" charset="0"/>
+                <a:cs typeface="Times New Roman" panose="02020603050405020304" pitchFamily="18" charset="0"/>
+              </a:rPr>
+              <a:t>:</a:t>
+            </a:r>
+            <a:endParaRPr lang="ru-RU" dirty="0">
+              <a:latin typeface="Times New Roman" panose="02020603050405020304" pitchFamily="18" charset="0"/>
+              <a:cs typeface="Times New Roman" panose="02020603050405020304" pitchFamily="18" charset="0"/>
+            </a:endParaRPr>
+          </a:p>
+          <a:p>
+            <a:pPr marL="914400" lvl="1" indent="-457200">
+              <a:buFont typeface="Liberation Sans" panose="020B0604020202020204" pitchFamily="34" charset="0"/>
+              <a:buChar char="−"/>
+            </a:pPr>
+            <a:r>
+              <a:rPr lang="en-US" dirty="0">
+                <a:latin typeface="Times New Roman" panose="02020603050405020304" pitchFamily="18" charset="0"/>
+                <a:cs typeface="Times New Roman" panose="02020603050405020304" pitchFamily="18" charset="0"/>
+              </a:rPr>
+              <a:t>Quartz.NET</a:t>
+            </a:r>
+            <a:r>
+              <a:rPr lang="ru-RU" dirty="0">
+                <a:latin typeface="Times New Roman" panose="02020603050405020304" pitchFamily="18" charset="0"/>
+                <a:cs typeface="Times New Roman" panose="02020603050405020304" pitchFamily="18" charset="0"/>
+              </a:rPr>
+              <a:t> для хранения и выполнения отложенных задач</a:t>
+            </a:r>
+            <a:r>
+              <a:rPr lang="en-US" dirty="0">
+                <a:latin typeface="Times New Roman" panose="02020603050405020304" pitchFamily="18" charset="0"/>
+                <a:cs typeface="Times New Roman" panose="02020603050405020304" pitchFamily="18" charset="0"/>
+              </a:rPr>
+              <a:t>;</a:t>
+            </a:r>
+            <a:endParaRPr lang="ru-RU" dirty="0">
+              <a:latin typeface="Times New Roman" panose="02020603050405020304" pitchFamily="18" charset="0"/>
+              <a:cs typeface="Times New Roman" panose="02020603050405020304" pitchFamily="18" charset="0"/>
+            </a:endParaRPr>
+          </a:p>
+          <a:p>
+            <a:pPr marL="914400" lvl="1" indent="-457200">
+              <a:buFont typeface="Liberation Sans" panose="020B0604020202020204" pitchFamily="34" charset="0"/>
+              <a:buChar char="−"/>
+            </a:pPr>
+            <a:r>
+              <a:rPr lang="en-US" dirty="0">
+                <a:latin typeface="Times New Roman" panose="02020603050405020304" pitchFamily="18" charset="0"/>
+                <a:cs typeface="Times New Roman" panose="02020603050405020304" pitchFamily="18" charset="0"/>
+              </a:rPr>
+              <a:t>Magick.NET</a:t>
+            </a:r>
+            <a:r>
+              <a:rPr lang="ru-RU" dirty="0">
+                <a:latin typeface="Times New Roman" panose="02020603050405020304" pitchFamily="18" charset="0"/>
+                <a:cs typeface="Times New Roman" panose="02020603050405020304" pitchFamily="18" charset="0"/>
+              </a:rPr>
+              <a:t> для обработки изображений</a:t>
+            </a:r>
+            <a:r>
+              <a:rPr lang="en-US" dirty="0">
+                <a:latin typeface="Times New Roman" panose="02020603050405020304" pitchFamily="18" charset="0"/>
+                <a:cs typeface="Times New Roman" panose="02020603050405020304" pitchFamily="18" charset="0"/>
+              </a:rPr>
+              <a:t>;</a:t>
+            </a:r>
+          </a:p>
+          <a:p>
+            <a:pPr marL="914400" lvl="1" indent="-457200">
+              <a:buFont typeface="Liberation Sans" panose="020B0604020202020204" pitchFamily="34" charset="0"/>
+              <a:buChar char="−"/>
+            </a:pPr>
+            <a:r>
+              <a:rPr lang="en-US" dirty="0">
+                <a:latin typeface="Times New Roman" panose="02020603050405020304" pitchFamily="18" charset="0"/>
+                <a:cs typeface="Times New Roman" panose="02020603050405020304" pitchFamily="18" charset="0"/>
+              </a:rPr>
+              <a:t>Entity Framework Core</a:t>
+            </a:r>
+            <a:r>
+              <a:rPr lang="ru-RU" dirty="0">
+                <a:latin typeface="Times New Roman" panose="02020603050405020304" pitchFamily="18" charset="0"/>
+                <a:cs typeface="Times New Roman" panose="02020603050405020304" pitchFamily="18" charset="0"/>
+              </a:rPr>
+              <a:t> в качестве </a:t>
+            </a:r>
+            <a:r>
+              <a:rPr lang="en-US" dirty="0">
+                <a:latin typeface="Times New Roman" panose="02020603050405020304" pitchFamily="18" charset="0"/>
+                <a:cs typeface="Times New Roman" panose="02020603050405020304" pitchFamily="18" charset="0"/>
+              </a:rPr>
+              <a:t>ORM.</a:t>
+            </a:r>
+            <a:endParaRPr lang="ru-RU" dirty="0">
+              <a:latin typeface="Times New Roman" panose="02020603050405020304" pitchFamily="18" charset="0"/>
+              <a:cs typeface="Times New Roman" panose="02020603050405020304" pitchFamily="18" charset="0"/>
+            </a:endParaRPr>
+          </a:p>
+          <a:p>
+            <a:pPr marL="457200" indent="-457200">
+              <a:buFont typeface="Liberation Sans" panose="020B0604020202020204" pitchFamily="34" charset="0"/>
+              <a:buChar char="−"/>
+            </a:pPr>
+            <a:r>
+              <a:rPr lang="ru-RU" sz="2800" dirty="0">
+                <a:latin typeface="Times New Roman" panose="02020603050405020304" pitchFamily="18" charset="0"/>
+                <a:cs typeface="Times New Roman" panose="02020603050405020304" pitchFamily="18" charset="0"/>
+              </a:rPr>
+              <a:t>Среда разработки: </a:t>
+            </a:r>
+            <a:r>
+              <a:rPr lang="en-US" sz="2800" dirty="0">
+                <a:latin typeface="Times New Roman" panose="02020603050405020304" pitchFamily="18" charset="0"/>
+                <a:cs typeface="Times New Roman" panose="02020603050405020304" pitchFamily="18" charset="0"/>
+              </a:rPr>
+              <a:t>Microsoft Visual Studio;</a:t>
+            </a:r>
+            <a:endParaRPr lang="en-US" dirty="0">
+              <a:latin typeface="Times New Roman" panose="02020603050405020304" pitchFamily="18" charset="0"/>
+              <a:cs typeface="Times New Roman" panose="02020603050405020304" pitchFamily="18" charset="0"/>
+            </a:endParaRPr>
+          </a:p>
+          <a:p>
+            <a:pPr marL="457200" indent="-457200">
+              <a:buFont typeface="Liberation Sans" panose="020B0604020202020204" pitchFamily="34" charset="0"/>
+              <a:buChar char="−"/>
+            </a:pPr>
+            <a:r>
+              <a:rPr lang="ru-RU" dirty="0">
+                <a:latin typeface="Times New Roman" panose="02020603050405020304" pitchFamily="18" charset="0"/>
+                <a:cs typeface="Times New Roman" panose="02020603050405020304" pitchFamily="18" charset="0"/>
+              </a:rPr>
+              <a:t>Упаковка и развёртывание приложения</a:t>
+            </a:r>
+            <a:r>
+              <a:rPr lang="en-US" dirty="0">
+                <a:latin typeface="Times New Roman" panose="02020603050405020304" pitchFamily="18" charset="0"/>
+                <a:cs typeface="Times New Roman" panose="02020603050405020304" pitchFamily="18" charset="0"/>
+              </a:rPr>
+              <a:t>: Docker.</a:t>
+            </a:r>
+            <a:endParaRPr lang="ru-RU" sz="2800" dirty="0">
+              <a:latin typeface="Times New Roman" panose="02020603050405020304" pitchFamily="18" charset="0"/>
+              <a:cs typeface="Times New Roman" panose="02020603050405020304" pitchFamily="18" charset="0"/>
+            </a:endParaRPr>
+          </a:p>
+        </p:txBody>
+      </p:sp>
+      <p:sp>
+        <p:nvSpPr>
+          <p:cNvPr id="4" name="Номер слайда 3">
+            <a:extLst>
+              <a:ext uri="{FF2B5EF4-FFF2-40B4-BE49-F238E27FC236}">
+                <a16:creationId xmlns:a16="http://schemas.microsoft.com/office/drawing/2014/main" id="{DB845D22-575F-FAA2-4894-3A79966D1551}"/>
+              </a:ext>
+            </a:extLst>
+          </p:cNvPr>
+          <p:cNvSpPr>
+            <a:spLocks noGrp="1"/>
+          </p:cNvSpPr>
+          <p:nvPr>
+            <p:ph type="sldNum" sz="quarter" idx="12"/>
+          </p:nvPr>
+        </p:nvSpPr>
+        <p:spPr/>
+        <p:txBody>
+          <a:bodyPr/>
+          <a:lstStyle/>
+          <a:p>
+            <a:fld id="{9F75ED48-FB93-4D27-9D40-6DF4DFA3F996}" type="slidenum">
+              <a:rPr lang="ru-RU" smtClean="0"/>
+              <a:t>10</a:t>
+            </a:fld>
+            <a:endParaRPr lang="ru-RU" dirty="0"/>
+          </a:p>
+        </p:txBody>
+      </p:sp>
+    </p:spTree>
+    <p:extLst>
+      <p:ext uri="{BB962C8B-B14F-4D97-AF65-F5344CB8AC3E}">
+        <p14:creationId xmlns:p14="http://schemas.microsoft.com/office/powerpoint/2010/main" val="2359330613"/>
+      </p:ext>
+    </p:extLst>
+  </p:cSld>
+  <p:clrMapOvr>
+    <a:masterClrMapping/>
+  </p:clrMapOvr>
+</p:sld>
+</file>
+
+<file path=ppt/slides/slide11.xml><?xml version="1.0" encoding="utf-8"?>
+<p:sld xmlns:a="http://schemas.openxmlformats.org/drawingml/2006/main" xmlns:r="http://schemas.openxmlformats.org/officeDocument/2006/relationships" xmlns:p="http://schemas.openxmlformats.org/presentationml/2006/main">
+  <p:cSld>
+    <p:spTree>
+      <p:nvGrpSpPr>
         <p:cNvPr id="1" name="">
           <a:extLst>
             <a:ext uri="{FF2B5EF4-FFF2-40B4-BE49-F238E27FC236}">
@@ -5012,7 +5349,7 @@
           <a:p>
             <a:fld id="{9F75ED48-FB93-4D27-9D40-6DF4DFA3F996}" type="slidenum">
               <a:rPr lang="ru-RU" smtClean="0"/>
-              <a:t>10</a:t>
+              <a:t>11</a:t>
             </a:fld>
             <a:endParaRPr lang="ru-RU"/>
           </a:p>
@@ -5031,7 +5368,7 @@
 </p:sld>
 </file>
 
-<file path=ppt/slides/slide11.xml><?xml version="1.0" encoding="utf-8"?>
+<file path=ppt/slides/slide12.xml><?xml version="1.0" encoding="utf-8"?>
 <p:sld xmlns:a="http://schemas.openxmlformats.org/drawingml/2006/main" xmlns:r="http://schemas.openxmlformats.org/officeDocument/2006/relationships" xmlns:p="http://schemas.openxmlformats.org/presentationml/2006/main">
   <p:cSld>
     <p:spTree>
@@ -5085,6 +5422,19 @@
               </a:rPr>
               <a:t>Тестирование</a:t>
             </a:r>
+            <a:r>
+              <a:rPr lang="en-US" dirty="0">
+                <a:latin typeface="Times New Roman" panose="02020603050405020304" pitchFamily="18" charset="0"/>
+                <a:ea typeface="+mn-ea"/>
+                <a:cs typeface="Times New Roman" panose="02020603050405020304" pitchFamily="18" charset="0"/>
+              </a:rPr>
+              <a:t> (1)</a:t>
+            </a:r>
+            <a:endParaRPr lang="ru-RU" dirty="0">
+              <a:latin typeface="Times New Roman" panose="02020603050405020304" pitchFamily="18" charset="0"/>
+              <a:ea typeface="+mn-ea"/>
+              <a:cs typeface="Times New Roman" panose="02020603050405020304" pitchFamily="18" charset="0"/>
+            </a:endParaRPr>
           </a:p>
         </p:txBody>
       </p:sp>
@@ -5111,7 +5461,7 @@
           <a:p>
             <a:fld id="{9F75ED48-FB93-4D27-9D40-6DF4DFA3F996}" type="slidenum">
               <a:rPr lang="ru-RU" smtClean="0"/>
-              <a:t>11</a:t>
+              <a:t>12</a:t>
             </a:fld>
             <a:endParaRPr lang="ru-RU"/>
           </a:p>
@@ -5374,7 +5724,358 @@
 </p:sld>
 </file>
 
-<file path=ppt/slides/slide12.xml><?xml version="1.0" encoding="utf-8"?>
+<file path=ppt/slides/slide13.xml><?xml version="1.0" encoding="utf-8"?>
+<p:sld xmlns:a="http://schemas.openxmlformats.org/drawingml/2006/main" xmlns:r="http://schemas.openxmlformats.org/officeDocument/2006/relationships" xmlns:p="http://schemas.openxmlformats.org/presentationml/2006/main">
+  <p:cSld>
+    <p:spTree>
+      <p:nvGrpSpPr>
+        <p:cNvPr id="1" name="">
+          <a:extLst>
+            <a:ext uri="{FF2B5EF4-FFF2-40B4-BE49-F238E27FC236}">
+              <a16:creationId xmlns:a16="http://schemas.microsoft.com/office/drawing/2014/main" id="{B8FCE40B-2A46-F3E7-29BB-2CF61C00B484}"/>
+            </a:ext>
+          </a:extLst>
+        </p:cNvPr>
+        <p:cNvGrpSpPr/>
+        <p:nvPr/>
+      </p:nvGrpSpPr>
+      <p:grpSpPr>
+        <a:xfrm>
+          <a:off x="0" y="0"/>
+          <a:ext cx="0" cy="0"/>
+          <a:chOff x="0" y="0"/>
+          <a:chExt cx="0" cy="0"/>
+        </a:xfrm>
+      </p:grpSpPr>
+      <p:sp>
+        <p:nvSpPr>
+          <p:cNvPr id="2" name="Заголовок 1">
+            <a:extLst>
+              <a:ext uri="{FF2B5EF4-FFF2-40B4-BE49-F238E27FC236}">
+                <a16:creationId xmlns:a16="http://schemas.microsoft.com/office/drawing/2014/main" id="{E1B763FA-BB49-65D0-2654-F8CBB3A1AEBD}"/>
+              </a:ext>
+            </a:extLst>
+          </p:cNvPr>
+          <p:cNvSpPr>
+            <a:spLocks noGrp="1"/>
+          </p:cNvSpPr>
+          <p:nvPr>
+            <p:ph type="title"/>
+          </p:nvPr>
+        </p:nvSpPr>
+        <p:spPr/>
+        <p:txBody>
+          <a:bodyPr>
+            <a:normAutofit/>
+          </a:bodyPr>
+          <a:lstStyle/>
+          <a:p>
+            <a:r>
+              <a:rPr lang="ru-RU" dirty="0">
+                <a:latin typeface="Times New Roman" panose="02020603050405020304" pitchFamily="18" charset="0"/>
+                <a:ea typeface="+mn-ea"/>
+                <a:cs typeface="Times New Roman" panose="02020603050405020304" pitchFamily="18" charset="0"/>
+              </a:rPr>
+              <a:t>Тестирование</a:t>
+            </a:r>
+            <a:r>
+              <a:rPr lang="en-US" dirty="0">
+                <a:latin typeface="Times New Roman" panose="02020603050405020304" pitchFamily="18" charset="0"/>
+                <a:ea typeface="+mn-ea"/>
+                <a:cs typeface="Times New Roman" panose="02020603050405020304" pitchFamily="18" charset="0"/>
+              </a:rPr>
+              <a:t> (2)</a:t>
+            </a:r>
+            <a:endParaRPr lang="ru-RU" dirty="0">
+              <a:latin typeface="Times New Roman" panose="02020603050405020304" pitchFamily="18" charset="0"/>
+              <a:ea typeface="+mn-ea"/>
+              <a:cs typeface="Times New Roman" panose="02020603050405020304" pitchFamily="18" charset="0"/>
+            </a:endParaRPr>
+          </a:p>
+        </p:txBody>
+      </p:sp>
+      <p:sp>
+        <p:nvSpPr>
+          <p:cNvPr id="3" name="Номер слайда 2">
+            <a:extLst>
+              <a:ext uri="{FF2B5EF4-FFF2-40B4-BE49-F238E27FC236}">
+                <a16:creationId xmlns:a16="http://schemas.microsoft.com/office/drawing/2014/main" id="{372095CC-3256-6734-499E-B9B7A6226B86}"/>
+              </a:ext>
+            </a:extLst>
+          </p:cNvPr>
+          <p:cNvSpPr>
+            <a:spLocks noGrp="1"/>
+          </p:cNvSpPr>
+          <p:nvPr>
+            <p:ph type="sldNum" sz="quarter" idx="12"/>
+          </p:nvPr>
+        </p:nvSpPr>
+        <p:spPr/>
+        <p:txBody>
+          <a:bodyPr/>
+          <a:lstStyle/>
+          <a:p>
+            <a:fld id="{9F75ED48-FB93-4D27-9D40-6DF4DFA3F996}" type="slidenum">
+              <a:rPr lang="ru-RU" smtClean="0"/>
+              <a:t>13</a:t>
+            </a:fld>
+            <a:endParaRPr lang="ru-RU"/>
+          </a:p>
+        </p:txBody>
+      </p:sp>
+      <p:sp>
+        <p:nvSpPr>
+          <p:cNvPr id="5" name="Объект 4">
+            <a:extLst>
+              <a:ext uri="{FF2B5EF4-FFF2-40B4-BE49-F238E27FC236}">
+                <a16:creationId xmlns:a16="http://schemas.microsoft.com/office/drawing/2014/main" id="{963BCA10-3E92-8F7C-B7A4-3251661AAC0D}"/>
+              </a:ext>
+            </a:extLst>
+          </p:cNvPr>
+          <p:cNvSpPr>
+            <a:spLocks noGrp="1"/>
+          </p:cNvSpPr>
+          <p:nvPr>
+            <p:ph idx="1"/>
+          </p:nvPr>
+        </p:nvSpPr>
+        <p:spPr>
+          <a:xfrm>
+            <a:off x="838200" y="1825625"/>
+            <a:ext cx="10515600" cy="4351338"/>
+          </a:xfrm>
+        </p:spPr>
+        <p:txBody>
+          <a:bodyPr vert="horz" lIns="91440" tIns="45720" rIns="91440" bIns="45720" rtlCol="0" anchor="t">
+            <a:normAutofit fontScale="92500" lnSpcReduction="20000"/>
+          </a:bodyPr>
+          <a:lstStyle/>
+          <a:p>
+            <a:pPr marL="0" indent="0">
+              <a:buNone/>
+            </a:pPr>
+            <a:r>
+              <a:rPr lang="ru-RU" sz="2300" dirty="0">
+                <a:latin typeface="Times New Roman" panose="02020603050405020304" pitchFamily="18" charset="0"/>
+                <a:cs typeface="Times New Roman" panose="02020603050405020304" pitchFamily="18" charset="0"/>
+              </a:rPr>
+              <a:t>Для тестирования хранимой процедуры составлены 17 интеграционных тестов по следующим классам эквивалентности</a:t>
+            </a:r>
+            <a:r>
+              <a:rPr lang="en-US" sz="2300" dirty="0">
+                <a:latin typeface="Times New Roman" panose="02020603050405020304" pitchFamily="18" charset="0"/>
+                <a:cs typeface="Times New Roman" panose="02020603050405020304" pitchFamily="18" charset="0"/>
+              </a:rPr>
+              <a:t>:</a:t>
+            </a:r>
+          </a:p>
+          <a:p>
+            <a:pPr>
+              <a:buFont typeface="Times New Roman" panose="02020603050405020304" pitchFamily="18" charset="0"/>
+              <a:buChar char="–"/>
+            </a:pPr>
+            <a:r>
+              <a:rPr lang="ru-RU" sz="2300" dirty="0">
+                <a:latin typeface="Times New Roman" panose="02020603050405020304" pitchFamily="18" charset="0"/>
+                <a:cs typeface="Times New Roman" panose="02020603050405020304" pitchFamily="18" charset="0"/>
+              </a:rPr>
+              <a:t>по корректности данных</a:t>
+            </a:r>
+            <a:r>
+              <a:rPr lang="en-US" sz="2300" dirty="0">
+                <a:latin typeface="Times New Roman" panose="02020603050405020304" pitchFamily="18" charset="0"/>
+                <a:cs typeface="Times New Roman" panose="02020603050405020304" pitchFamily="18" charset="0"/>
+              </a:rPr>
+              <a:t>:</a:t>
+            </a:r>
+            <a:endParaRPr lang="ru-RU" sz="2300" dirty="0">
+              <a:latin typeface="Times New Roman" panose="02020603050405020304" pitchFamily="18" charset="0"/>
+              <a:cs typeface="Times New Roman" panose="02020603050405020304" pitchFamily="18" charset="0"/>
+            </a:endParaRPr>
+          </a:p>
+          <a:p>
+            <a:pPr lvl="1">
+              <a:buFont typeface="Times New Roman" panose="02020603050405020304" pitchFamily="18" charset="0"/>
+              <a:buChar char="–"/>
+            </a:pPr>
+            <a:r>
+              <a:rPr lang="ru-RU" sz="1900" dirty="0">
+                <a:latin typeface="Times New Roman" panose="02020603050405020304" pitchFamily="18" charset="0"/>
+                <a:cs typeface="Times New Roman" panose="02020603050405020304" pitchFamily="18" charset="0"/>
+              </a:rPr>
+              <a:t>соревнования не существует</a:t>
+            </a:r>
+            <a:r>
+              <a:rPr lang="en-US" sz="1900" dirty="0">
+                <a:latin typeface="Times New Roman" panose="02020603050405020304" pitchFamily="18" charset="0"/>
+                <a:cs typeface="Times New Roman" panose="02020603050405020304" pitchFamily="18" charset="0"/>
+              </a:rPr>
+              <a:t>;</a:t>
+            </a:r>
+          </a:p>
+          <a:p>
+            <a:pPr lvl="1">
+              <a:buFont typeface="Times New Roman" panose="02020603050405020304" pitchFamily="18" charset="0"/>
+              <a:buChar char="–"/>
+            </a:pPr>
+            <a:r>
+              <a:rPr lang="ru-RU" sz="1900" dirty="0">
+                <a:latin typeface="Times New Roman" panose="02020603050405020304" pitchFamily="18" charset="0"/>
+                <a:cs typeface="Times New Roman" panose="02020603050405020304" pitchFamily="18" charset="0"/>
+              </a:rPr>
+              <a:t>соревнование существует, но оно уже завершено;</a:t>
+            </a:r>
+          </a:p>
+          <a:p>
+            <a:pPr lvl="1">
+              <a:buFont typeface="Times New Roman" panose="02020603050405020304" pitchFamily="18" charset="0"/>
+              <a:buChar char="–"/>
+            </a:pPr>
+            <a:r>
+              <a:rPr lang="ru-RU" sz="1900" dirty="0">
+                <a:latin typeface="Times New Roman" panose="02020603050405020304" pitchFamily="18" charset="0"/>
+                <a:cs typeface="Times New Roman" panose="02020603050405020304" pitchFamily="18" charset="0"/>
+              </a:rPr>
+              <a:t>соревнование существует и ещё не завершено.</a:t>
+            </a:r>
+          </a:p>
+          <a:p>
+            <a:pPr>
+              <a:buFont typeface="Times New Roman" panose="02020603050405020304" pitchFamily="18" charset="0"/>
+              <a:buChar char="–"/>
+            </a:pPr>
+            <a:r>
+              <a:rPr lang="ru-RU" sz="2300" dirty="0">
+                <a:latin typeface="Times New Roman" panose="02020603050405020304" pitchFamily="18" charset="0"/>
+                <a:cs typeface="Times New Roman" panose="02020603050405020304" pitchFamily="18" charset="0"/>
+              </a:rPr>
+              <a:t>по критериям выдаваемых наград:</a:t>
+            </a:r>
+          </a:p>
+          <a:p>
+            <a:pPr lvl="1">
+              <a:buFont typeface="Times New Roman" panose="02020603050405020304" pitchFamily="18" charset="0"/>
+              <a:buChar char="–"/>
+            </a:pPr>
+            <a:r>
+              <a:rPr lang="ru-RU" sz="1900" dirty="0">
+                <a:latin typeface="Times New Roman" panose="02020603050405020304" pitchFamily="18" charset="0"/>
+                <a:cs typeface="Times New Roman" panose="02020603050405020304" pitchFamily="18" charset="0"/>
+              </a:rPr>
+              <a:t>соревнование не имеет выдаваемых наград;</a:t>
+            </a:r>
+          </a:p>
+          <a:p>
+            <a:pPr lvl="1">
+              <a:buFont typeface="Times New Roman" panose="02020603050405020304" pitchFamily="18" charset="0"/>
+              <a:buChar char="–"/>
+            </a:pPr>
+            <a:r>
+              <a:rPr lang="ru-RU" sz="1900" dirty="0">
+                <a:latin typeface="Times New Roman" panose="02020603050405020304" pitchFamily="18" charset="0"/>
+                <a:cs typeface="Times New Roman" panose="02020603050405020304" pitchFamily="18" charset="0"/>
+              </a:rPr>
+              <a:t>соревнование имеет выдаваемые награды по месту;</a:t>
+            </a:r>
+          </a:p>
+          <a:p>
+            <a:pPr lvl="1">
+              <a:buFont typeface="Times New Roman" panose="02020603050405020304" pitchFamily="18" charset="0"/>
+              <a:buChar char="–"/>
+            </a:pPr>
+            <a:r>
+              <a:rPr lang="ru-RU" sz="1900" dirty="0">
+                <a:latin typeface="Times New Roman" panose="02020603050405020304" pitchFamily="18" charset="0"/>
+                <a:cs typeface="Times New Roman" panose="02020603050405020304" pitchFamily="18" charset="0"/>
+              </a:rPr>
+              <a:t>соревнование имеет выдаваемые награды по рангу;</a:t>
+            </a:r>
+          </a:p>
+          <a:p>
+            <a:pPr lvl="1">
+              <a:buFont typeface="Times New Roman" panose="02020603050405020304" pitchFamily="18" charset="0"/>
+              <a:buChar char="–"/>
+            </a:pPr>
+            <a:r>
+              <a:rPr lang="ru-RU" sz="1900" dirty="0">
+                <a:latin typeface="Times New Roman" panose="02020603050405020304" pitchFamily="18" charset="0"/>
+                <a:cs typeface="Times New Roman" panose="02020603050405020304" pitchFamily="18" charset="0"/>
+              </a:rPr>
+              <a:t>соревнование имеет выдаваемые награды различных критериев.</a:t>
+            </a:r>
+          </a:p>
+          <a:p>
+            <a:pPr>
+              <a:buFont typeface="Times New Roman" panose="02020603050405020304" pitchFamily="18" charset="0"/>
+              <a:buChar char="–"/>
+            </a:pPr>
+            <a:r>
+              <a:rPr lang="ru-RU" sz="2300" dirty="0">
+                <a:latin typeface="Times New Roman" panose="02020603050405020304" pitchFamily="18" charset="0"/>
+                <a:cs typeface="Times New Roman" panose="02020603050405020304" pitchFamily="18" charset="0"/>
+              </a:rPr>
+              <a:t>по заявкам соревнования:</a:t>
+            </a:r>
+          </a:p>
+          <a:p>
+            <a:pPr lvl="1">
+              <a:buFont typeface="Times New Roman" panose="02020603050405020304" pitchFamily="18" charset="0"/>
+              <a:buChar char="–"/>
+            </a:pPr>
+            <a:r>
+              <a:rPr lang="ru-RU" sz="1900" dirty="0">
+                <a:latin typeface="Times New Roman" panose="02020603050405020304" pitchFamily="18" charset="0"/>
+                <a:cs typeface="Times New Roman" panose="02020603050405020304" pitchFamily="18" charset="0"/>
+              </a:rPr>
+              <a:t>в соревновании никто не участвовал;</a:t>
+            </a:r>
+          </a:p>
+          <a:p>
+            <a:pPr lvl="1">
+              <a:buFont typeface="Times New Roman" panose="02020603050405020304" pitchFamily="18" charset="0"/>
+              <a:buChar char="–"/>
+            </a:pPr>
+            <a:r>
+              <a:rPr lang="ru-RU" sz="1900" dirty="0">
+                <a:latin typeface="Times New Roman" panose="02020603050405020304" pitchFamily="18" charset="0"/>
+                <a:cs typeface="Times New Roman" panose="02020603050405020304" pitchFamily="18" charset="0"/>
+              </a:rPr>
+              <a:t>в соревновании все заявки имеют различные результаты;</a:t>
+            </a:r>
+          </a:p>
+          <a:p>
+            <a:pPr lvl="1">
+              <a:buFont typeface="Times New Roman" panose="02020603050405020304" pitchFamily="18" charset="0"/>
+              <a:buChar char="–"/>
+            </a:pPr>
+            <a:r>
+              <a:rPr lang="ru-RU" sz="1900" dirty="0">
+                <a:latin typeface="Times New Roman" panose="02020603050405020304" pitchFamily="18" charset="0"/>
+                <a:cs typeface="Times New Roman" panose="02020603050405020304" pitchFamily="18" charset="0"/>
+              </a:rPr>
+              <a:t>в соревновании присутствуют заявки с одинаковыми результатами, но разными временами последнего обновления.</a:t>
+            </a:r>
+            <a:endParaRPr lang="en-US" sz="1900" dirty="0">
+              <a:latin typeface="Times New Roman" panose="02020603050405020304" pitchFamily="18" charset="0"/>
+              <a:cs typeface="Times New Roman" panose="02020603050405020304" pitchFamily="18" charset="0"/>
+            </a:endParaRPr>
+          </a:p>
+        </p:txBody>
+      </p:sp>
+    </p:spTree>
+    <p:extLst>
+      <p:ext uri="{BB962C8B-B14F-4D97-AF65-F5344CB8AC3E}">
+        <p14:creationId xmlns:p14="http://schemas.microsoft.com/office/powerpoint/2010/main" val="1352690803"/>
+      </p:ext>
+    </p:extLst>
+  </p:cSld>
+  <p:clrMapOvr>
+    <a:masterClrMapping/>
+  </p:clrMapOvr>
+</p:sld>
+</file>
+
+<file path=ppt/slides/slide14.xml><?xml version="1.0" encoding="utf-8"?>
 <p:sld xmlns:a="http://schemas.openxmlformats.org/drawingml/2006/main" xmlns:r="http://schemas.openxmlformats.org/officeDocument/2006/relationships" xmlns:p="http://schemas.openxmlformats.org/presentationml/2006/main">
   <p:cSld>
     <p:spTree>
@@ -5422,6 +6123,19 @@
               </a:rPr>
               <a:t>Тестирование</a:t>
             </a:r>
+            <a:r>
+              <a:rPr lang="en-US" dirty="0">
+                <a:latin typeface="Times New Roman" panose="02020603050405020304" pitchFamily="18" charset="0"/>
+                <a:ea typeface="+mn-ea"/>
+                <a:cs typeface="Times New Roman" panose="02020603050405020304" pitchFamily="18" charset="0"/>
+              </a:rPr>
+              <a:t> (3)</a:t>
+            </a:r>
+            <a:endParaRPr lang="ru-RU" dirty="0">
+              <a:latin typeface="Times New Roman" panose="02020603050405020304" pitchFamily="18" charset="0"/>
+              <a:ea typeface="+mn-ea"/>
+              <a:cs typeface="Times New Roman" panose="02020603050405020304" pitchFamily="18" charset="0"/>
+            </a:endParaRPr>
           </a:p>
         </p:txBody>
       </p:sp>
@@ -5448,7 +6162,7 @@
           <a:p>
             <a:fld id="{9F75ED48-FB93-4D27-9D40-6DF4DFA3F996}" type="slidenum">
               <a:rPr lang="ru-RU" smtClean="0"/>
-              <a:t>12</a:t>
+              <a:t>14</a:t>
             </a:fld>
             <a:endParaRPr lang="ru-RU"/>
           </a:p>
@@ -5693,7 +6407,7 @@
 </p:sld>
 </file>
 
-<file path=ppt/slides/slide13.xml><?xml version="1.0" encoding="utf-8"?>
+<file path=ppt/slides/slide15.xml><?xml version="1.0" encoding="utf-8"?>
 <p:sld xmlns:a="http://schemas.openxmlformats.org/drawingml/2006/main" xmlns:r="http://schemas.openxmlformats.org/officeDocument/2006/relationships" xmlns:p="http://schemas.openxmlformats.org/presentationml/2006/main">
   <p:cSld>
     <p:spTree>
@@ -5716,6 +6430,36 @@
           <a:chExt cx="0" cy="0"/>
         </a:xfrm>
       </p:grpSpPr>
+      <p:pic>
+        <p:nvPicPr>
+          <p:cNvPr id="7" name="Рисунок 6">
+            <a:extLst>
+              <a:ext uri="{FF2B5EF4-FFF2-40B4-BE49-F238E27FC236}">
+                <a16:creationId xmlns:a16="http://schemas.microsoft.com/office/drawing/2014/main" id="{6F7CC0E5-0F99-73FC-059B-E88483FC5644}"/>
+              </a:ext>
+            </a:extLst>
+          </p:cNvPr>
+          <p:cNvPicPr>
+            <a:picLocks noChangeAspect="1"/>
+          </p:cNvPicPr>
+          <p:nvPr/>
+        </p:nvPicPr>
+        <p:blipFill>
+          <a:blip r:embed="rId3"/>
+          <a:stretch>
+            <a:fillRect/>
+          </a:stretch>
+        </p:blipFill>
+        <p:spPr>
+          <a:xfrm>
+            <a:off x="6114612" y="2043406"/>
+            <a:ext cx="6065818" cy="4221289"/>
+          </a:xfrm>
+          <a:prstGeom prst="rect">
+            <a:avLst/>
+          </a:prstGeom>
+        </p:spPr>
+      </p:pic>
       <p:sp>
         <p:nvSpPr>
           <p:cNvPr id="2" name="Заголовок 1">
@@ -5745,7 +6489,7 @@
                 <a:ea typeface="+mn-ea"/>
                 <a:cs typeface="Times New Roman" panose="02020603050405020304" pitchFamily="18" charset="0"/>
               </a:rPr>
-              <a:t>Исследование</a:t>
+              <a:t>Исследование (1)</a:t>
             </a:r>
           </a:p>
         </p:txBody>
@@ -5786,7 +6530,7 @@
                 <a:latin typeface="Times New Roman" panose="02020603050405020304" pitchFamily="18" charset="0"/>
                 <a:cs typeface="Times New Roman" panose="02020603050405020304" pitchFamily="18" charset="0"/>
               </a:rPr>
-              <a:t>Цель исследования ‒ сравнить зависимость времени выдачи наград от количества вознаграждаемых игроков в двух случаях: при помощи хранимой процедуры и при помощи обычных запросов.</a:t>
+              <a:t>Цель исследования ‒ сравнить зависимость времени выдачи наград от количества вознаграждаемых игроков в двух случаях: при помощи хранимой процедуры (на стороне базы данных) и при помощи обычных запросов (на стороне приложения).</a:t>
             </a:r>
           </a:p>
           <a:p>
@@ -6084,35 +6828,6 @@
           </a:p>
         </p:txBody>
       </p:sp>
-      <p:pic>
-        <p:nvPicPr>
-          <p:cNvPr id="6" name="Рисунок 5">
-            <a:extLst>
-              <a:ext uri="{FF2B5EF4-FFF2-40B4-BE49-F238E27FC236}">
-                <a16:creationId xmlns:a16="http://schemas.microsoft.com/office/drawing/2014/main" id="{2F2A832E-233B-8718-B951-FB4B560C3A70}"/>
-              </a:ext>
-            </a:extLst>
-          </p:cNvPr>
-          <p:cNvPicPr>
-            <a:picLocks noChangeAspect="1"/>
-          </p:cNvPicPr>
-          <p:nvPr/>
-        </p:nvPicPr>
-        <p:blipFill>
-          <a:blip r:embed="rId3"/>
-          <a:srcRect l="4524" t="6411" r="2381"/>
-          <a:stretch/>
-        </p:blipFill>
-        <p:spPr>
-          <a:xfrm>
-            <a:off x="6100359" y="2110285"/>
-            <a:ext cx="5813502" cy="3921770"/>
-          </a:xfrm>
-          <a:prstGeom prst="rect">
-            <a:avLst/>
-          </a:prstGeom>
-        </p:spPr>
-      </p:pic>
       <p:sp>
         <p:nvSpPr>
           <p:cNvPr id="8" name="Номер слайда 7">
@@ -6136,7 +6851,7 @@
           <a:p>
             <a:fld id="{9F75ED48-FB93-4D27-9D40-6DF4DFA3F996}" type="slidenum">
               <a:rPr lang="ru-RU" smtClean="0"/>
-              <a:t>13</a:t>
+              <a:t>15</a:t>
             </a:fld>
             <a:endParaRPr lang="ru-RU"/>
           </a:p>
@@ -6155,7 +6870,7 @@
 </p:sld>
 </file>
 
-<file path=ppt/slides/slide14.xml><?xml version="1.0" encoding="utf-8"?>
+<file path=ppt/slides/slide16.xml><?xml version="1.0" encoding="utf-8"?>
 <p:sld xmlns:a="http://schemas.openxmlformats.org/drawingml/2006/main" xmlns:r="http://schemas.openxmlformats.org/officeDocument/2006/relationships" xmlns:p="http://schemas.openxmlformats.org/presentationml/2006/main">
   <p:cSld>
     <p:spTree>
@@ -6194,7 +6909,7 @@
         </p:blipFill>
         <p:spPr>
           <a:xfrm>
-            <a:off x="5459008" y="4571866"/>
+            <a:off x="5459008" y="4934833"/>
             <a:ext cx="6762117" cy="1070520"/>
           </a:xfrm>
           <a:prstGeom prst="rect">
@@ -6224,7 +6939,7 @@
         </p:blipFill>
         <p:spPr>
           <a:xfrm>
-            <a:off x="5624884" y="1449229"/>
+            <a:off x="5624884" y="1812196"/>
             <a:ext cx="6430367" cy="3075000"/>
           </a:xfrm>
           <a:prstGeom prst="rect">
@@ -6261,13 +6976,13 @@
                 <a:ea typeface="+mn-ea"/>
                 <a:cs typeface="Times New Roman" panose="02020603050405020304" pitchFamily="18" charset="0"/>
               </a:rPr>
-              <a:t>Исследование</a:t>
-            </a:r>
-          </a:p>
-        </p:txBody>
-      </p:sp>
-      <mc:AlternateContent xmlns:mc="http://schemas.openxmlformats.org/markup-compatibility/2006" xmlns:a14="http://schemas.microsoft.com/office/drawing/2010/main">
-        <mc:Choice Requires="a14">
+              <a:t>Исследование (2)</a:t>
+            </a:r>
+          </a:p>
+        </p:txBody>
+      </p:sp>
+      <mc:AlternateContent xmlns:mc="http://schemas.openxmlformats.org/markup-compatibility/2006">
+        <mc:Choice xmlns:a14="http://schemas.microsoft.com/office/drawing/2010/main" Requires="a14">
           <p:sp>
             <p:nvSpPr>
               <p:cNvPr id="3" name="Объект 2">
@@ -6461,7 +7176,7 @@
                     <a:latin typeface="Times New Roman" panose="02020603050405020304" pitchFamily="18" charset="0"/>
                     <a:cs typeface="Times New Roman" panose="02020603050405020304" pitchFamily="18" charset="0"/>
                   </a:rPr>
-                  <a:t>По результатам исследования, время работы на стороне СУБД меньше, чем время работы на стороне приложения. </a:t>
+                  <a:t>По результатам исследования, время работы на стороне базы данных меньше, чем время работы на стороне приложения. </a:t>
                 </a:r>
               </a:p>
               <a:p>
@@ -6479,7 +7194,7 @@
             </p:txBody>
           </p:sp>
         </mc:Choice>
-        <mc:Fallback xmlns="">
+        <mc:Fallback>
           <p:sp>
             <p:nvSpPr>
               <p:cNvPr id="3" name="Объект 2">
@@ -6546,7 +7261,7 @@
           <a:p>
             <a:fld id="{9F75ED48-FB93-4D27-9D40-6DF4DFA3F996}" type="slidenum">
               <a:rPr lang="ru-RU" smtClean="0"/>
-              <a:t>14</a:t>
+              <a:t>16</a:t>
             </a:fld>
             <a:endParaRPr lang="ru-RU"/>
           </a:p>
@@ -6566,7 +7281,7 @@
         </p:nvSpPr>
         <p:spPr>
           <a:xfrm>
-            <a:off x="9890170" y="4665674"/>
+            <a:off x="9890170" y="5028641"/>
             <a:ext cx="1040554" cy="353919"/>
           </a:xfrm>
           <a:prstGeom prst="rect">
@@ -6618,7 +7333,7 @@
         </p:nvSpPr>
         <p:spPr>
           <a:xfrm>
-            <a:off x="9802117" y="5245782"/>
+            <a:off x="9802117" y="5608749"/>
             <a:ext cx="1040554" cy="353919"/>
           </a:xfrm>
           <a:prstGeom prst="rect">
@@ -6669,7 +7384,7 @@
 </p:sld>
 </file>
 
-<file path=ppt/slides/slide15.xml><?xml version="1.0" encoding="utf-8"?>
+<file path=ppt/slides/slide17.xml><?xml version="1.0" encoding="utf-8"?>
 <p:sld xmlns:a="http://schemas.openxmlformats.org/drawingml/2006/main" xmlns:r="http://schemas.openxmlformats.org/officeDocument/2006/relationships" xmlns:p="http://schemas.openxmlformats.org/presentationml/2006/main">
   <p:cSld>
     <p:spTree>
@@ -6737,7 +7452,7 @@
         <p:spPr/>
         <p:txBody>
           <a:bodyPr>
-            <a:normAutofit fontScale="85000" lnSpcReduction="10000"/>
+            <a:normAutofit fontScale="92500" lnSpcReduction="20000"/>
           </a:bodyPr>
           <a:lstStyle/>
           <a:p>
@@ -6749,7 +7464,7 @@
                 <a:latin typeface="Times New Roman" panose="02020603050405020304" pitchFamily="18" charset="0"/>
                 <a:cs typeface="Times New Roman" panose="02020603050405020304" pitchFamily="18" charset="0"/>
               </a:rPr>
-              <a:t>Были выполнены следующие задачи:</a:t>
+              <a:t>Решены все задачи:</a:t>
             </a:r>
           </a:p>
           <a:p>
@@ -6898,7 +7613,7 @@
                 <a:latin typeface="Times New Roman" panose="02020603050405020304" pitchFamily="18" charset="0"/>
                 <a:cs typeface="Times New Roman" panose="02020603050405020304" pitchFamily="18" charset="0"/>
               </a:rPr>
-              <a:t>Поставленные задачи выполнены. Цель работы — разработка базы данных соревновательной игры — была достигнута.</a:t>
+              <a:t>Цель работы — разработка базы данных соревновательной игры — была достигнута.</a:t>
             </a:r>
           </a:p>
         </p:txBody>
@@ -6926,7 +7641,7 @@
           <a:p>
             <a:fld id="{9F75ED48-FB93-4D27-9D40-6DF4DFA3F996}" type="slidenum">
               <a:rPr lang="ru-RU" smtClean="0"/>
-              <a:t>15</a:t>
+              <a:t>17</a:t>
             </a:fld>
             <a:endParaRPr lang="ru-RU"/>
           </a:p>
@@ -6945,7 +7660,7 @@
 </p:sld>
 </file>
 
-<file path=ppt/slides/slide16.xml><?xml version="1.0" encoding="utf-8"?>
+<file path=ppt/slides/slide18.xml><?xml version="1.0" encoding="utf-8"?>
 <p:sld xmlns:a="http://schemas.openxmlformats.org/drawingml/2006/main" xmlns:r="http://schemas.openxmlformats.org/officeDocument/2006/relationships" xmlns:p="http://schemas.openxmlformats.org/presentationml/2006/main">
   <p:cSld>
     <p:spTree>
@@ -7201,7 +7916,7 @@
           <a:p>
             <a:fld id="{9F75ED48-FB93-4D27-9D40-6DF4DFA3F996}" type="slidenum">
               <a:rPr lang="ru-RU" smtClean="0"/>
-              <a:t>16</a:t>
+              <a:t>18</a:t>
             </a:fld>
             <a:endParaRPr lang="ru-RU"/>
           </a:p>
@@ -7221,6 +7936,240 @@
 </file>
 
 <file path=ppt/slides/slide2.xml><?xml version="1.0" encoding="utf-8"?>
+<p:sld xmlns:a="http://schemas.openxmlformats.org/drawingml/2006/main" xmlns:r="http://schemas.openxmlformats.org/officeDocument/2006/relationships" xmlns:p="http://schemas.openxmlformats.org/presentationml/2006/main">
+  <p:cSld>
+    <p:spTree>
+      <p:nvGrpSpPr>
+        <p:cNvPr id="1" name="">
+          <a:extLst>
+            <a:ext uri="{FF2B5EF4-FFF2-40B4-BE49-F238E27FC236}">
+              <a16:creationId xmlns:a16="http://schemas.microsoft.com/office/drawing/2014/main" id="{C6122FAC-2770-80CF-5E8F-529457849169}"/>
+            </a:ext>
+          </a:extLst>
+        </p:cNvPr>
+        <p:cNvGrpSpPr/>
+        <p:nvPr/>
+      </p:nvGrpSpPr>
+      <p:grpSpPr>
+        <a:xfrm>
+          <a:off x="0" y="0"/>
+          <a:ext cx="0" cy="0"/>
+          <a:chOff x="0" y="0"/>
+          <a:chExt cx="0" cy="0"/>
+        </a:xfrm>
+      </p:grpSpPr>
+      <p:sp>
+        <p:nvSpPr>
+          <p:cNvPr id="2" name="Заголовок 1">
+            <a:extLst>
+              <a:ext uri="{FF2B5EF4-FFF2-40B4-BE49-F238E27FC236}">
+                <a16:creationId xmlns:a16="http://schemas.microsoft.com/office/drawing/2014/main" id="{5349190D-A61E-29CA-F77F-74C88A2FDC60}"/>
+              </a:ext>
+            </a:extLst>
+          </p:cNvPr>
+          <p:cNvSpPr>
+            <a:spLocks noGrp="1"/>
+          </p:cNvSpPr>
+          <p:nvPr>
+            <p:ph type="title"/>
+          </p:nvPr>
+        </p:nvSpPr>
+        <p:spPr/>
+        <p:txBody>
+          <a:bodyPr/>
+          <a:lstStyle/>
+          <a:p>
+            <a:r>
+              <a:rPr lang="ru-RU" dirty="0">
+                <a:latin typeface="Times New Roman" panose="02020603050405020304" pitchFamily="18" charset="0"/>
+                <a:ea typeface="+mn-ea"/>
+                <a:cs typeface="Times New Roman" panose="02020603050405020304" pitchFamily="18" charset="0"/>
+              </a:rPr>
+              <a:t>Цель работы</a:t>
+            </a:r>
+          </a:p>
+        </p:txBody>
+      </p:sp>
+      <p:sp>
+        <p:nvSpPr>
+          <p:cNvPr id="3" name="Объект 2">
+            <a:extLst>
+              <a:ext uri="{FF2B5EF4-FFF2-40B4-BE49-F238E27FC236}">
+                <a16:creationId xmlns:a16="http://schemas.microsoft.com/office/drawing/2014/main" id="{59E8E531-D5EF-C4C0-A177-66FC965BE924}"/>
+              </a:ext>
+            </a:extLst>
+          </p:cNvPr>
+          <p:cNvSpPr>
+            <a:spLocks noGrp="1"/>
+          </p:cNvSpPr>
+          <p:nvPr>
+            <p:ph idx="1"/>
+          </p:nvPr>
+        </p:nvSpPr>
+        <p:spPr/>
+        <p:txBody>
+          <a:bodyPr>
+            <a:normAutofit fontScale="92500" lnSpcReduction="20000"/>
+          </a:bodyPr>
+          <a:lstStyle/>
+          <a:p>
+            <a:pPr marL="0" indent="0">
+              <a:buNone/>
+            </a:pPr>
+            <a:r>
+              <a:rPr lang="ru-RU" sz="2400" dirty="0">
+                <a:latin typeface="Times New Roman" panose="02020603050405020304" pitchFamily="18" charset="0"/>
+                <a:cs typeface="Times New Roman" panose="02020603050405020304" pitchFamily="18" charset="0"/>
+              </a:rPr>
+              <a:t>Целью курсовой работы является разработка базы данных соревновательной игры.</a:t>
+            </a:r>
+          </a:p>
+          <a:p>
+            <a:pPr marL="0" indent="0">
+              <a:buNone/>
+            </a:pPr>
+            <a:r>
+              <a:rPr lang="ru-RU" sz="2400" dirty="0">
+                <a:latin typeface="Times New Roman" panose="02020603050405020304" pitchFamily="18" charset="0"/>
+                <a:cs typeface="Times New Roman" panose="02020603050405020304" pitchFamily="18" charset="0"/>
+              </a:rPr>
+              <a:t>Для достижения поставленной цели необходимо решить следующие задачи:</a:t>
+            </a:r>
+          </a:p>
+          <a:p>
+            <a:pPr>
+              <a:buFont typeface="Times New Roman" panose="02020603050405020304" pitchFamily="18" charset="0"/>
+              <a:buChar char="‒"/>
+            </a:pPr>
+            <a:r>
+              <a:rPr lang="ru-RU" sz="2400" dirty="0">
+                <a:latin typeface="Times New Roman" panose="02020603050405020304" pitchFamily="18" charset="0"/>
+                <a:cs typeface="Times New Roman" panose="02020603050405020304" pitchFamily="18" charset="0"/>
+              </a:rPr>
+              <a:t>формализовать соревновательную игру, провести анализ существующих решений;</a:t>
+            </a:r>
+          </a:p>
+          <a:p>
+            <a:pPr>
+              <a:buFont typeface="Times New Roman" panose="02020603050405020304" pitchFamily="18" charset="0"/>
+              <a:buChar char="‒"/>
+            </a:pPr>
+            <a:r>
+              <a:rPr lang="ru-RU" sz="2400" dirty="0">
+                <a:latin typeface="Times New Roman" panose="02020603050405020304" pitchFamily="18" charset="0"/>
+                <a:cs typeface="Times New Roman" panose="02020603050405020304" pitchFamily="18" charset="0"/>
+              </a:rPr>
+              <a:t>формализовать сущности базы данных, спроектировать архитектуру базы данных и ограничения целостности;</a:t>
+            </a:r>
+          </a:p>
+          <a:p>
+            <a:pPr>
+              <a:buFont typeface="Times New Roman" panose="02020603050405020304" pitchFamily="18" charset="0"/>
+              <a:buChar char="‒"/>
+            </a:pPr>
+            <a:r>
+              <a:rPr lang="ru-RU" sz="2400" dirty="0">
+                <a:latin typeface="Times New Roman" panose="02020603050405020304" pitchFamily="18" charset="0"/>
+                <a:cs typeface="Times New Roman" panose="02020603050405020304" pitchFamily="18" charset="0"/>
+              </a:rPr>
+              <a:t>спроектировать процедуру выдачи наград;</a:t>
+            </a:r>
+          </a:p>
+          <a:p>
+            <a:pPr>
+              <a:buFont typeface="Times New Roman" panose="02020603050405020304" pitchFamily="18" charset="0"/>
+              <a:buChar char="‒"/>
+            </a:pPr>
+            <a:r>
+              <a:rPr lang="ru-RU" sz="2400" dirty="0">
+                <a:latin typeface="Times New Roman" panose="02020603050405020304" pitchFamily="18" charset="0"/>
+                <a:cs typeface="Times New Roman" panose="02020603050405020304" pitchFamily="18" charset="0"/>
+              </a:rPr>
+              <a:t>описать интерфейс доступа к базе данных; выбрать средства реализации базы данных и приложения; реализовать базу данных и приложение;</a:t>
+            </a:r>
+          </a:p>
+          <a:p>
+            <a:pPr>
+              <a:buFont typeface="Times New Roman" panose="02020603050405020304" pitchFamily="18" charset="0"/>
+              <a:buChar char="‒"/>
+            </a:pPr>
+            <a:r>
+              <a:rPr lang="ru-RU" sz="2400" dirty="0">
+                <a:latin typeface="Times New Roman" panose="02020603050405020304" pitchFamily="18" charset="0"/>
+                <a:cs typeface="Times New Roman" panose="02020603050405020304" pitchFamily="18" charset="0"/>
+              </a:rPr>
+              <a:t>описать методы тестирования разработанной функциональности и разработать тесты для проверки корректности работы приложения;</a:t>
+            </a:r>
+          </a:p>
+          <a:p>
+            <a:pPr>
+              <a:buFont typeface="Times New Roman" panose="02020603050405020304" pitchFamily="18" charset="0"/>
+              <a:buChar char="‒"/>
+            </a:pPr>
+            <a:r>
+              <a:rPr lang="ru-RU" sz="2400" dirty="0">
+                <a:latin typeface="Times New Roman" panose="02020603050405020304" pitchFamily="18" charset="0"/>
+                <a:cs typeface="Times New Roman" panose="02020603050405020304" pitchFamily="18" charset="0"/>
+              </a:rPr>
+              <a:t> исследовать зависимость времени выдачи наград от количества вознаграждаемых игроков в двух случаях: при помощи хранимой процедуры и при помощи обычных запросов</a:t>
+            </a:r>
+            <a:r>
+              <a:rPr lang="en-US" sz="2400" dirty="0">
+                <a:latin typeface="Times New Roman" panose="02020603050405020304" pitchFamily="18" charset="0"/>
+                <a:cs typeface="Times New Roman" panose="02020603050405020304" pitchFamily="18" charset="0"/>
+              </a:rPr>
+              <a:t>.</a:t>
+            </a:r>
+            <a:endParaRPr lang="ru-RU" sz="2400" dirty="0">
+              <a:latin typeface="Times New Roman" panose="02020603050405020304" pitchFamily="18" charset="0"/>
+              <a:cs typeface="Times New Roman" panose="02020603050405020304" pitchFamily="18" charset="0"/>
+            </a:endParaRPr>
+          </a:p>
+        </p:txBody>
+      </p:sp>
+      <p:sp>
+        <p:nvSpPr>
+          <p:cNvPr id="4" name="Номер слайда 3">
+            <a:extLst>
+              <a:ext uri="{FF2B5EF4-FFF2-40B4-BE49-F238E27FC236}">
+                <a16:creationId xmlns:a16="http://schemas.microsoft.com/office/drawing/2014/main" id="{077699ED-FCF8-39B2-5066-F7D39CC3A516}"/>
+              </a:ext>
+            </a:extLst>
+          </p:cNvPr>
+          <p:cNvSpPr>
+            <a:spLocks noGrp="1"/>
+          </p:cNvSpPr>
+          <p:nvPr>
+            <p:ph type="sldNum" sz="quarter" idx="12"/>
+          </p:nvPr>
+        </p:nvSpPr>
+        <p:spPr/>
+        <p:txBody>
+          <a:bodyPr/>
+          <a:lstStyle/>
+          <a:p>
+            <a:fld id="{9F75ED48-FB93-4D27-9D40-6DF4DFA3F996}" type="slidenum">
+              <a:rPr lang="ru-RU" smtClean="0"/>
+              <a:t>2</a:t>
+            </a:fld>
+            <a:endParaRPr lang="ru-RU"/>
+          </a:p>
+        </p:txBody>
+      </p:sp>
+    </p:spTree>
+    <p:extLst>
+      <p:ext uri="{BB962C8B-B14F-4D97-AF65-F5344CB8AC3E}">
+        <p14:creationId xmlns:p14="http://schemas.microsoft.com/office/powerpoint/2010/main" val="2223728607"/>
+      </p:ext>
+    </p:extLst>
+  </p:cSld>
+  <p:clrMapOvr>
+    <a:masterClrMapping/>
+  </p:clrMapOvr>
+</p:sld>
+</file>
+
+<file path=ppt/slides/slide3.xml><?xml version="1.0" encoding="utf-8"?>
 <p:sld xmlns:a="http://schemas.openxmlformats.org/drawingml/2006/main" xmlns:r="http://schemas.openxmlformats.org/officeDocument/2006/relationships" xmlns:p="http://schemas.openxmlformats.org/presentationml/2006/main">
   <p:cSld>
     <p:spTree>
@@ -7385,7 +8334,7 @@
           <a:p>
             <a:fld id="{9F75ED48-FB93-4D27-9D40-6DF4DFA3F996}" type="slidenum">
               <a:rPr lang="ru-RU" smtClean="0"/>
-              <a:t>2</a:t>
+              <a:t>3</a:t>
             </a:fld>
             <a:endParaRPr lang="ru-RU" dirty="0"/>
           </a:p>
@@ -7404,7 +8353,7 @@
 </p:sld>
 </file>
 
-<file path=ppt/slides/slide3.xml><?xml version="1.0" encoding="utf-8"?>
+<file path=ppt/slides/slide4.xml><?xml version="1.0" encoding="utf-8"?>
 <p:sld xmlns:a="http://schemas.openxmlformats.org/drawingml/2006/main" xmlns:r="http://schemas.openxmlformats.org/officeDocument/2006/relationships" xmlns:p="http://schemas.openxmlformats.org/presentationml/2006/main">
   <p:cSld>
     <p:spTree>
@@ -7481,7 +8430,7 @@
           <a:p>
             <a:fld id="{9F75ED48-FB93-4D27-9D40-6DF4DFA3F996}" type="slidenum">
               <a:rPr lang="ru-RU" smtClean="0"/>
-              <a:t>3</a:t>
+              <a:t>4</a:t>
             </a:fld>
             <a:endParaRPr lang="ru-RU"/>
           </a:p>
@@ -7581,7 +8530,7 @@
                     <a:lstStyle/>
                     <a:p>
                       <a:r>
-                        <a:rPr lang="en-US" sz="1800" kern="1200" err="1">
+                        <a:rPr lang="en-US" sz="1800" kern="1200" dirty="0" err="1">
                           <a:solidFill>
                             <a:schemeClr val="tx1"/>
                           </a:solidFill>
@@ -7591,7 +8540,7 @@
                         </a:rPr>
                         <a:t>Иерархическая</a:t>
                       </a:r>
-                      <a:endParaRPr lang="en-US" sz="1800" kern="1200" dirty="0" err="1">
+                      <a:endParaRPr lang="en-US" sz="1800" kern="1200" dirty="0">
                         <a:solidFill>
                           <a:schemeClr val="tx1"/>
                         </a:solidFill>
@@ -7612,7 +8561,7 @@
                         <a:buNone/>
                       </a:pPr>
                       <a:r>
-                        <a:rPr lang="en-US" sz="1800" kern="1200" err="1">
+                        <a:rPr lang="en-US" sz="1800" kern="1200" dirty="0" err="1">
                           <a:solidFill>
                             <a:schemeClr val="tx1"/>
                           </a:solidFill>
@@ -7622,7 +8571,7 @@
                         </a:rPr>
                         <a:t>Сетевая</a:t>
                       </a:r>
-                      <a:endParaRPr lang="ru-RU" sz="1800" kern="1200" err="1">
+                      <a:endParaRPr lang="ru-RU" sz="1800" kern="1200" dirty="0">
                         <a:solidFill>
                           <a:schemeClr val="tx1"/>
                         </a:solidFill>
@@ -7667,7 +8616,7 @@
                     <a:lstStyle/>
                     <a:p>
                       <a:r>
-                        <a:rPr lang="en-US" sz="1800" kern="1200" err="1">
+                        <a:rPr lang="en-US" sz="1800" kern="1200" dirty="0" err="1">
                           <a:solidFill>
                             <a:schemeClr val="tx1"/>
                           </a:solidFill>
@@ -7677,7 +8626,7 @@
                         </a:rPr>
                         <a:t>Документо-ориентированная</a:t>
                       </a:r>
-                      <a:endParaRPr lang="en-US" sz="1800" kern="1200" dirty="0" err="1">
+                      <a:endParaRPr lang="en-US" sz="1800" kern="1200" dirty="0">
                         <a:solidFill>
                           <a:schemeClr val="tx1"/>
                         </a:solidFill>
@@ -8178,7 +9127,7 @@
 </p:sld>
 </file>
 
-<file path=ppt/slides/slide4.xml><?xml version="1.0" encoding="utf-8"?>
+<file path=ppt/slides/slide5.xml><?xml version="1.0" encoding="utf-8"?>
 <p:sld xmlns:a="http://schemas.openxmlformats.org/drawingml/2006/main" xmlns:r="http://schemas.openxmlformats.org/officeDocument/2006/relationships" xmlns:p="http://schemas.openxmlformats.org/presentationml/2006/main">
   <p:cSld>
     <p:spTree>
@@ -8299,7 +9248,7 @@
           <a:p>
             <a:fld id="{9F75ED48-FB93-4D27-9D40-6DF4DFA3F996}" type="slidenum">
               <a:rPr lang="ru-RU" smtClean="0"/>
-              <a:t>4</a:t>
+              <a:t>5</a:t>
             </a:fld>
             <a:endParaRPr lang="ru-RU"/>
           </a:p>
@@ -8318,7 +9267,7 @@
 </p:sld>
 </file>
 
-<file path=ppt/slides/slide5.xml><?xml version="1.0" encoding="utf-8"?>
+<file path=ppt/slides/slide6.xml><?xml version="1.0" encoding="utf-8"?>
 <p:sld xmlns:a="http://schemas.openxmlformats.org/drawingml/2006/main" xmlns:r="http://schemas.openxmlformats.org/officeDocument/2006/relationships" xmlns:p="http://schemas.openxmlformats.org/presentationml/2006/main">
   <p:cSld>
     <p:bg>
@@ -8433,7 +9382,7 @@
           <a:p>
             <a:fld id="{9F75ED48-FB93-4D27-9D40-6DF4DFA3F996}" type="slidenum">
               <a:rPr lang="ru-RU" smtClean="0"/>
-              <a:t>5</a:t>
+              <a:t>6</a:t>
             </a:fld>
             <a:endParaRPr lang="ru-RU"/>
           </a:p>
@@ -8626,7 +9575,7 @@
 </p:sld>
 </file>
 
-<file path=ppt/slides/slide6.xml><?xml version="1.0" encoding="utf-8"?>
+<file path=ppt/slides/slide7.xml><?xml version="1.0" encoding="utf-8"?>
 <p:sld xmlns:a="http://schemas.openxmlformats.org/drawingml/2006/main" xmlns:r="http://schemas.openxmlformats.org/officeDocument/2006/relationships" xmlns:p="http://schemas.openxmlformats.org/presentationml/2006/main">
   <p:cSld>
     <p:spTree>
@@ -8665,8 +9614,8 @@
         </p:blipFill>
         <p:spPr>
           <a:xfrm>
-            <a:off x="2658274" y="1211844"/>
-            <a:ext cx="6875451" cy="5281031"/>
+            <a:off x="3432490" y="454557"/>
+            <a:ext cx="7921310" cy="6084355"/>
           </a:xfrm>
           <a:prstGeom prst="rect">
             <a:avLst/>
@@ -8755,7 +9704,7 @@
           <a:p>
             <a:fld id="{9F75ED48-FB93-4D27-9D40-6DF4DFA3F996}" type="slidenum">
               <a:rPr lang="ru-RU" smtClean="0"/>
-              <a:t>6</a:t>
+              <a:t>7</a:t>
             </a:fld>
             <a:endParaRPr lang="ru-RU"/>
           </a:p>
@@ -8774,7 +9723,7 @@
 </p:sld>
 </file>
 
-<file path=ppt/slides/slide7.xml><?xml version="1.0" encoding="utf-8"?>
+<file path=ppt/slides/slide8.xml><?xml version="1.0" encoding="utf-8"?>
 <p:sld xmlns:a="http://schemas.openxmlformats.org/drawingml/2006/main" xmlns:r="http://schemas.openxmlformats.org/officeDocument/2006/relationships" xmlns:p="http://schemas.openxmlformats.org/presentationml/2006/main">
   <p:cSld>
     <p:spTree>
@@ -8852,8 +9801,8 @@
         </p:blipFill>
         <p:spPr>
           <a:xfrm>
-            <a:off x="7524346" y="1536699"/>
-            <a:ext cx="4602441" cy="5213879"/>
+            <a:off x="7524346" y="1483763"/>
+            <a:ext cx="4667654" cy="5287756"/>
           </a:xfrm>
           <a:prstGeom prst="rect">
             <a:avLst/>
@@ -8882,8 +9831,8 @@
         </p:blipFill>
         <p:spPr>
           <a:xfrm>
-            <a:off x="136741" y="1536699"/>
-            <a:ext cx="4218627" cy="5274733"/>
+            <a:off x="115801" y="1335655"/>
+            <a:ext cx="4379418" cy="5475777"/>
           </a:xfrm>
           <a:prstGeom prst="rect">
             <a:avLst/>
@@ -8911,8 +9860,8 @@
         </p:blipFill>
         <p:spPr>
           <a:xfrm>
-            <a:off x="4323578" y="1559982"/>
-            <a:ext cx="3513056" cy="5167312"/>
+            <a:off x="4312859" y="1559981"/>
+            <a:ext cx="3544715" cy="5213879"/>
           </a:xfrm>
           <a:prstGeom prst="rect">
             <a:avLst/>
@@ -8942,7 +9891,7 @@
           <a:p>
             <a:fld id="{9F75ED48-FB93-4D27-9D40-6DF4DFA3F996}" type="slidenum">
               <a:rPr lang="ru-RU" smtClean="0"/>
-              <a:t>7</a:t>
+              <a:t>8</a:t>
             </a:fld>
             <a:endParaRPr lang="ru-RU"/>
           </a:p>
@@ -8961,7 +9910,7 @@
 </p:sld>
 </file>
 
-<file path=ppt/slides/slide8.xml><?xml version="1.0" encoding="utf-8"?>
+<file path=ppt/slides/slide9.xml><?xml version="1.0" encoding="utf-8"?>
 <p:sld xmlns:a="http://schemas.openxmlformats.org/drawingml/2006/main" xmlns:r="http://schemas.openxmlformats.org/officeDocument/2006/relationships" xmlns:p="http://schemas.openxmlformats.org/presentationml/2006/main">
   <p:cSld>
     <p:spTree>
@@ -9039,7 +9988,7 @@
           <a:p>
             <a:fld id="{9F75ED48-FB93-4D27-9D40-6DF4DFA3F996}" type="slidenum">
               <a:rPr lang="ru-RU" smtClean="0"/>
-              <a:t>8</a:t>
+              <a:t>9</a:t>
             </a:fld>
             <a:endParaRPr lang="ru-RU"/>
           </a:p>
@@ -9830,321 +10779,6 @@
 </p:sld>
 </file>
 
-<file path=ppt/slides/slide9.xml><?xml version="1.0" encoding="utf-8"?>
-<p:sld xmlns:a="http://schemas.openxmlformats.org/drawingml/2006/main" xmlns:r="http://schemas.openxmlformats.org/officeDocument/2006/relationships" xmlns:p="http://schemas.openxmlformats.org/presentationml/2006/main">
-  <p:cSld>
-    <p:spTree>
-      <p:nvGrpSpPr>
-        <p:cNvPr id="1" name=""/>
-        <p:cNvGrpSpPr/>
-        <p:nvPr/>
-      </p:nvGrpSpPr>
-      <p:grpSpPr>
-        <a:xfrm>
-          <a:off x="0" y="0"/>
-          <a:ext cx="0" cy="0"/>
-          <a:chOff x="0" y="0"/>
-          <a:chExt cx="0" cy="0"/>
-        </a:xfrm>
-      </p:grpSpPr>
-      <p:sp>
-        <p:nvSpPr>
-          <p:cNvPr id="2" name="Заголовок 1">
-            <a:extLst>
-              <a:ext uri="{FF2B5EF4-FFF2-40B4-BE49-F238E27FC236}">
-                <a16:creationId xmlns:a16="http://schemas.microsoft.com/office/drawing/2014/main" id="{1294129D-F169-D152-03DD-9227D0701403}"/>
-              </a:ext>
-            </a:extLst>
-          </p:cNvPr>
-          <p:cNvSpPr>
-            <a:spLocks noGrp="1"/>
-          </p:cNvSpPr>
-          <p:nvPr>
-            <p:ph type="title"/>
-          </p:nvPr>
-        </p:nvSpPr>
-        <p:spPr/>
-        <p:txBody>
-          <a:bodyPr/>
-          <a:lstStyle/>
-          <a:p>
-            <a:r>
-              <a:rPr lang="ru-RU" sz="4400" dirty="0">
-                <a:latin typeface="Times New Roman" panose="02020603050405020304" pitchFamily="18" charset="0"/>
-                <a:cs typeface="Times New Roman" panose="02020603050405020304" pitchFamily="18" charset="0"/>
-              </a:rPr>
-              <a:t>Средства реализации</a:t>
-            </a:r>
-            <a:endParaRPr lang="ru-RU" dirty="0"/>
-          </a:p>
-        </p:txBody>
-      </p:sp>
-      <p:sp>
-        <p:nvSpPr>
-          <p:cNvPr id="3" name="Объект 2">
-            <a:extLst>
-              <a:ext uri="{FF2B5EF4-FFF2-40B4-BE49-F238E27FC236}">
-                <a16:creationId xmlns:a16="http://schemas.microsoft.com/office/drawing/2014/main" id="{4286BC96-A488-534F-7EB9-5599428C14FE}"/>
-              </a:ext>
-            </a:extLst>
-          </p:cNvPr>
-          <p:cNvSpPr>
-            <a:spLocks noGrp="1"/>
-          </p:cNvSpPr>
-          <p:nvPr>
-            <p:ph idx="1"/>
-          </p:nvPr>
-        </p:nvSpPr>
-        <p:spPr/>
-        <p:txBody>
-          <a:bodyPr/>
-          <a:lstStyle/>
-          <a:p>
-            <a:pPr marL="457200" indent="-457200">
-              <a:buFont typeface="Liberation Sans" panose="020B0604020202020204" pitchFamily="34" charset="0"/>
-              <a:buChar char="−"/>
-            </a:pPr>
-            <a:r>
-              <a:rPr lang="ru-RU" sz="2800" dirty="0">
-                <a:latin typeface="Times New Roman" panose="02020603050405020304" pitchFamily="18" charset="0"/>
-                <a:cs typeface="Times New Roman" panose="02020603050405020304" pitchFamily="18" charset="0"/>
-              </a:rPr>
-              <a:t>Язык: C</a:t>
-            </a:r>
-            <a:r>
-              <a:rPr lang="en-US" sz="2800" dirty="0">
-                <a:latin typeface="Times New Roman" panose="02020603050405020304" pitchFamily="18" charset="0"/>
-                <a:cs typeface="Times New Roman" panose="02020603050405020304" pitchFamily="18" charset="0"/>
-              </a:rPr>
-              <a:t>#;</a:t>
-            </a:r>
-            <a:endParaRPr lang="ru-RU" dirty="0">
-              <a:latin typeface="Times New Roman" panose="02020603050405020304" pitchFamily="18" charset="0"/>
-              <a:cs typeface="Times New Roman" panose="02020603050405020304" pitchFamily="18" charset="0"/>
-            </a:endParaRPr>
-          </a:p>
-          <a:p>
-            <a:pPr marL="457200" indent="-457200">
-              <a:buFont typeface="Liberation Sans" panose="020B0604020202020204" pitchFamily="34" charset="0"/>
-              <a:buChar char="−"/>
-            </a:pPr>
-            <a:r>
-              <a:rPr lang="ru-RU" dirty="0">
-                <a:latin typeface="Times New Roman" panose="02020603050405020304" pitchFamily="18" charset="0"/>
-                <a:cs typeface="Times New Roman" panose="02020603050405020304" pitchFamily="18" charset="0"/>
-              </a:rPr>
-              <a:t>Фреймворк</a:t>
-            </a:r>
-            <a:r>
-              <a:rPr lang="en-US" dirty="0">
-                <a:latin typeface="Times New Roman" panose="02020603050405020304" pitchFamily="18" charset="0"/>
-                <a:cs typeface="Times New Roman" panose="02020603050405020304" pitchFamily="18" charset="0"/>
-              </a:rPr>
-              <a:t>: ASP.NET </a:t>
-            </a:r>
-            <a:r>
-              <a:rPr lang="ru-RU" dirty="0">
-                <a:latin typeface="Times New Roman" panose="02020603050405020304" pitchFamily="18" charset="0"/>
-                <a:cs typeface="Times New Roman" panose="02020603050405020304" pitchFamily="18" charset="0"/>
-              </a:rPr>
-              <a:t>8</a:t>
-            </a:r>
-            <a:r>
-              <a:rPr lang="en-US" dirty="0">
-                <a:latin typeface="Times New Roman" panose="02020603050405020304" pitchFamily="18" charset="0"/>
-                <a:cs typeface="Times New Roman" panose="02020603050405020304" pitchFamily="18" charset="0"/>
-              </a:rPr>
-              <a:t>.0;</a:t>
-            </a:r>
-          </a:p>
-          <a:p>
-            <a:pPr marL="457200" indent="-457200">
-              <a:buFont typeface="Liberation Sans" panose="020B0604020202020204" pitchFamily="34" charset="0"/>
-              <a:buChar char="−"/>
-            </a:pPr>
-            <a:r>
-              <a:rPr lang="ru-RU" dirty="0">
-                <a:latin typeface="Times New Roman" panose="02020603050405020304" pitchFamily="18" charset="0"/>
-                <a:cs typeface="Times New Roman" panose="02020603050405020304" pitchFamily="18" charset="0"/>
-              </a:rPr>
-              <a:t>Сторонние библиотеки</a:t>
-            </a:r>
-            <a:r>
-              <a:rPr lang="en-US" dirty="0">
-                <a:latin typeface="Times New Roman" panose="02020603050405020304" pitchFamily="18" charset="0"/>
-                <a:cs typeface="Times New Roman" panose="02020603050405020304" pitchFamily="18" charset="0"/>
-              </a:rPr>
-              <a:t>:</a:t>
-            </a:r>
-            <a:endParaRPr lang="ru-RU" dirty="0">
-              <a:latin typeface="Times New Roman" panose="02020603050405020304" pitchFamily="18" charset="0"/>
-              <a:cs typeface="Times New Roman" panose="02020603050405020304" pitchFamily="18" charset="0"/>
-            </a:endParaRPr>
-          </a:p>
-          <a:p>
-            <a:pPr marL="914400" lvl="1" indent="-457200">
-              <a:buFont typeface="Liberation Sans" panose="020B0604020202020204" pitchFamily="34" charset="0"/>
-              <a:buChar char="−"/>
-            </a:pPr>
-            <a:r>
-              <a:rPr lang="en-US" dirty="0">
-                <a:latin typeface="Times New Roman" panose="02020603050405020304" pitchFamily="18" charset="0"/>
-                <a:cs typeface="Times New Roman" panose="02020603050405020304" pitchFamily="18" charset="0"/>
-              </a:rPr>
-              <a:t>Quartz.NET</a:t>
-            </a:r>
-            <a:r>
-              <a:rPr lang="ru-RU" dirty="0">
-                <a:latin typeface="Times New Roman" panose="02020603050405020304" pitchFamily="18" charset="0"/>
-                <a:cs typeface="Times New Roman" panose="02020603050405020304" pitchFamily="18" charset="0"/>
-              </a:rPr>
-              <a:t> для хранения и выполнения отложенных задач </a:t>
-            </a:r>
-            <a:r>
-              <a:rPr lang="en-US" dirty="0">
-                <a:latin typeface="Times New Roman" panose="02020603050405020304" pitchFamily="18" charset="0"/>
-                <a:cs typeface="Times New Roman" panose="02020603050405020304" pitchFamily="18" charset="0"/>
-              </a:rPr>
-              <a:t>;</a:t>
-            </a:r>
-            <a:endParaRPr lang="ru-RU" dirty="0">
-              <a:latin typeface="Times New Roman" panose="02020603050405020304" pitchFamily="18" charset="0"/>
-              <a:cs typeface="Times New Roman" panose="02020603050405020304" pitchFamily="18" charset="0"/>
-            </a:endParaRPr>
-          </a:p>
-          <a:p>
-            <a:pPr marL="914400" lvl="1" indent="-457200">
-              <a:buFont typeface="Liberation Sans" panose="020B0604020202020204" pitchFamily="34" charset="0"/>
-              <a:buChar char="−"/>
-            </a:pPr>
-            <a:r>
-              <a:rPr lang="en-US" dirty="0">
-                <a:latin typeface="Times New Roman" panose="02020603050405020304" pitchFamily="18" charset="0"/>
-                <a:cs typeface="Times New Roman" panose="02020603050405020304" pitchFamily="18" charset="0"/>
-              </a:rPr>
-              <a:t>Magick.NET</a:t>
-            </a:r>
-            <a:r>
-              <a:rPr lang="ru-RU" dirty="0">
-                <a:latin typeface="Times New Roman" panose="02020603050405020304" pitchFamily="18" charset="0"/>
-                <a:cs typeface="Times New Roman" panose="02020603050405020304" pitchFamily="18" charset="0"/>
-              </a:rPr>
-              <a:t> для обработки изображений</a:t>
-            </a:r>
-            <a:r>
-              <a:rPr lang="en-US" dirty="0">
-                <a:latin typeface="Times New Roman" panose="02020603050405020304" pitchFamily="18" charset="0"/>
-                <a:cs typeface="Times New Roman" panose="02020603050405020304" pitchFamily="18" charset="0"/>
-              </a:rPr>
-              <a:t>;</a:t>
-            </a:r>
-          </a:p>
-          <a:p>
-            <a:pPr marL="914400" lvl="1" indent="-457200">
-              <a:buFont typeface="Liberation Sans" panose="020B0604020202020204" pitchFamily="34" charset="0"/>
-              <a:buChar char="−"/>
-            </a:pPr>
-            <a:r>
-              <a:rPr lang="en-US" dirty="0">
-                <a:latin typeface="Times New Roman" panose="02020603050405020304" pitchFamily="18" charset="0"/>
-                <a:cs typeface="Times New Roman" panose="02020603050405020304" pitchFamily="18" charset="0"/>
-              </a:rPr>
-              <a:t>Entity Framework Core</a:t>
-            </a:r>
-            <a:r>
-              <a:rPr lang="ru-RU" dirty="0">
-                <a:latin typeface="Times New Roman" panose="02020603050405020304" pitchFamily="18" charset="0"/>
-                <a:cs typeface="Times New Roman" panose="02020603050405020304" pitchFamily="18" charset="0"/>
-              </a:rPr>
-              <a:t> в качестве </a:t>
-            </a:r>
-            <a:r>
-              <a:rPr lang="en-US" dirty="0">
-                <a:latin typeface="Times New Roman" panose="02020603050405020304" pitchFamily="18" charset="0"/>
-                <a:cs typeface="Times New Roman" panose="02020603050405020304" pitchFamily="18" charset="0"/>
-              </a:rPr>
-              <a:t>ORM.</a:t>
-            </a:r>
-            <a:endParaRPr lang="ru-RU" dirty="0">
-              <a:latin typeface="Times New Roman" panose="02020603050405020304" pitchFamily="18" charset="0"/>
-              <a:cs typeface="Times New Roman" panose="02020603050405020304" pitchFamily="18" charset="0"/>
-            </a:endParaRPr>
-          </a:p>
-          <a:p>
-            <a:pPr marL="457200" indent="-457200">
-              <a:buFont typeface="Liberation Sans" panose="020B0604020202020204" pitchFamily="34" charset="0"/>
-              <a:buChar char="−"/>
-            </a:pPr>
-            <a:r>
-              <a:rPr lang="ru-RU" sz="2800" dirty="0">
-                <a:latin typeface="Times New Roman" panose="02020603050405020304" pitchFamily="18" charset="0"/>
-                <a:cs typeface="Times New Roman" panose="02020603050405020304" pitchFamily="18" charset="0"/>
-              </a:rPr>
-              <a:t>Среда разработки: </a:t>
-            </a:r>
-            <a:r>
-              <a:rPr lang="en-US" sz="2800" dirty="0">
-                <a:latin typeface="Times New Roman" panose="02020603050405020304" pitchFamily="18" charset="0"/>
-                <a:cs typeface="Times New Roman" panose="02020603050405020304" pitchFamily="18" charset="0"/>
-              </a:rPr>
-              <a:t>Microsoft Visual Studio</a:t>
-            </a:r>
-            <a:r>
-              <a:rPr lang="en-US" dirty="0">
-                <a:latin typeface="Times New Roman" panose="02020603050405020304" pitchFamily="18" charset="0"/>
-                <a:cs typeface="Times New Roman" panose="02020603050405020304" pitchFamily="18" charset="0"/>
-              </a:rPr>
-              <a:t>.</a:t>
-            </a:r>
-            <a:endParaRPr lang="ru-RU" sz="2800" dirty="0">
-              <a:latin typeface="Times New Roman" panose="02020603050405020304" pitchFamily="18" charset="0"/>
-              <a:cs typeface="Times New Roman" panose="02020603050405020304" pitchFamily="18" charset="0"/>
-            </a:endParaRPr>
-          </a:p>
-        </p:txBody>
-      </p:sp>
-      <p:sp>
-        <p:nvSpPr>
-          <p:cNvPr id="4" name="Номер слайда 3">
-            <a:extLst>
-              <a:ext uri="{FF2B5EF4-FFF2-40B4-BE49-F238E27FC236}">
-                <a16:creationId xmlns:a16="http://schemas.microsoft.com/office/drawing/2014/main" id="{DB845D22-575F-FAA2-4894-3A79966D1551}"/>
-              </a:ext>
-            </a:extLst>
-          </p:cNvPr>
-          <p:cNvSpPr>
-            <a:spLocks noGrp="1"/>
-          </p:cNvSpPr>
-          <p:nvPr>
-            <p:ph type="sldNum" sz="quarter" idx="12"/>
-          </p:nvPr>
-        </p:nvSpPr>
-        <p:spPr/>
-        <p:txBody>
-          <a:bodyPr/>
-          <a:lstStyle/>
-          <a:p>
-            <a:fld id="{9F75ED48-FB93-4D27-9D40-6DF4DFA3F996}" type="slidenum">
-              <a:rPr lang="ru-RU" smtClean="0"/>
-              <a:t>9</a:t>
-            </a:fld>
-            <a:endParaRPr lang="ru-RU"/>
-          </a:p>
-        </p:txBody>
-      </p:sp>
-    </p:spTree>
-    <p:extLst>
-      <p:ext uri="{BB962C8B-B14F-4D97-AF65-F5344CB8AC3E}">
-        <p14:creationId xmlns:p14="http://schemas.microsoft.com/office/powerpoint/2010/main" val="2359330613"/>
-      </p:ext>
-    </p:extLst>
-  </p:cSld>
-  <p:clrMapOvr>
-    <a:masterClrMapping/>
-  </p:clrMapOvr>
-</p:sld>
-</file>
-
 <file path=ppt/theme/theme1.xml><?xml version="1.0" encoding="utf-8"?>
 <a:theme xmlns:a="http://schemas.openxmlformats.org/drawingml/2006/main" name="Тема Office">
   <a:themeElements>

</xml_diff>

<commit_message>
FINALIZED. PRINTED. GOD KNOWS THE REST. 100.
</commit_message>
<xml_diff>
--- a/docs/presentation.pptx
+++ b/docs/presentation.pptx
@@ -394,7 +394,7 @@
           <a:p>
             <a:fld id="{7BC6DE02-9070-4391-A9E5-20FBA5D71A5D}" type="datetimeFigureOut">
               <a:rPr lang="ru-RU" smtClean="0"/>
-              <a:t>29.05.2025</a:t>
+              <a:t>30.05.2025</a:t>
             </a:fld>
             <a:endParaRPr lang="ru-RU"/>
           </a:p>
@@ -1168,7 +1168,7 @@
           <a:p>
             <a:fld id="{A1439A60-659B-42DB-BB0F-7ED87733A23E}" type="datetime1">
               <a:rPr lang="ru-RU" smtClean="0"/>
-              <a:t>29.05.2025</a:t>
+              <a:t>30.05.2025</a:t>
             </a:fld>
             <a:endParaRPr lang="ru-RU"/>
           </a:p>
@@ -1366,7 +1366,7 @@
           <a:p>
             <a:fld id="{D61B71B4-54FB-40B8-90DD-279781B0C38D}" type="datetime1">
               <a:rPr lang="ru-RU" smtClean="0"/>
-              <a:t>29.05.2025</a:t>
+              <a:t>30.05.2025</a:t>
             </a:fld>
             <a:endParaRPr lang="ru-RU"/>
           </a:p>
@@ -1574,7 +1574,7 @@
           <a:p>
             <a:fld id="{2D090295-5DD3-4456-8BDB-FA7FF8949F97}" type="datetime1">
               <a:rPr lang="ru-RU" smtClean="0"/>
-              <a:t>29.05.2025</a:t>
+              <a:t>30.05.2025</a:t>
             </a:fld>
             <a:endParaRPr lang="ru-RU"/>
           </a:p>
@@ -1772,7 +1772,7 @@
           <a:p>
             <a:fld id="{D7B5F5C0-A8AD-4E24-BFA5-3353364AFE30}" type="datetime1">
               <a:rPr lang="ru-RU" smtClean="0"/>
-              <a:t>29.05.2025</a:t>
+              <a:t>30.05.2025</a:t>
             </a:fld>
             <a:endParaRPr lang="ru-RU"/>
           </a:p>
@@ -2058,7 +2058,7 @@
           <a:p>
             <a:fld id="{6A2AEECD-1031-4CBC-A778-E91CBA3F92A4}" type="datetime1">
               <a:rPr lang="ru-RU" smtClean="0"/>
-              <a:t>29.05.2025</a:t>
+              <a:t>30.05.2025</a:t>
             </a:fld>
             <a:endParaRPr lang="ru-RU"/>
           </a:p>
@@ -2323,7 +2323,7 @@
           <a:p>
             <a:fld id="{8E5B82EB-9FE1-42D5-8640-685632266EB2}" type="datetime1">
               <a:rPr lang="ru-RU" smtClean="0"/>
-              <a:t>29.05.2025</a:t>
+              <a:t>30.05.2025</a:t>
             </a:fld>
             <a:endParaRPr lang="ru-RU"/>
           </a:p>
@@ -2735,7 +2735,7 @@
           <a:p>
             <a:fld id="{A33273D1-BF9D-4402-A07A-C11263F81ACA}" type="datetime1">
               <a:rPr lang="ru-RU" smtClean="0"/>
-              <a:t>29.05.2025</a:t>
+              <a:t>30.05.2025</a:t>
             </a:fld>
             <a:endParaRPr lang="ru-RU"/>
           </a:p>
@@ -2876,7 +2876,7 @@
           <a:p>
             <a:fld id="{C10D7C68-AD43-4338-B6C7-4798ABAED37C}" type="datetime1">
               <a:rPr lang="ru-RU" smtClean="0"/>
-              <a:t>29.05.2025</a:t>
+              <a:t>30.05.2025</a:t>
             </a:fld>
             <a:endParaRPr lang="ru-RU"/>
           </a:p>
@@ -2989,7 +2989,7 @@
           <a:p>
             <a:fld id="{04A09544-4DCC-4E50-BBA1-0EB924E42FB5}" type="datetime1">
               <a:rPr lang="ru-RU" smtClean="0"/>
-              <a:t>29.05.2025</a:t>
+              <a:t>30.05.2025</a:t>
             </a:fld>
             <a:endParaRPr lang="ru-RU"/>
           </a:p>
@@ -3300,7 +3300,7 @@
           <a:p>
             <a:fld id="{B44A15D2-7284-412E-B86C-C8BE76838BC3}" type="datetime1">
               <a:rPr lang="ru-RU" smtClean="0"/>
-              <a:t>29.05.2025</a:t>
+              <a:t>30.05.2025</a:t>
             </a:fld>
             <a:endParaRPr lang="ru-RU"/>
           </a:p>
@@ -3588,7 +3588,7 @@
           <a:p>
             <a:fld id="{4A4A6565-B229-48CB-B9AB-84026305D07B}" type="datetime1">
               <a:rPr lang="ru-RU" smtClean="0"/>
-              <a:t>29.05.2025</a:t>
+              <a:t>30.05.2025</a:t>
             </a:fld>
             <a:endParaRPr lang="ru-RU"/>
           </a:p>
@@ -3829,7 +3829,7 @@
           <a:p>
             <a:fld id="{BBCA45A3-F3B4-42F8-B88D-1485C0862389}" type="datetime1">
               <a:rPr lang="ru-RU" smtClean="0"/>
-              <a:t>29.05.2025</a:t>
+              <a:t>30.05.2025</a:t>
             </a:fld>
             <a:endParaRPr lang="ru-RU"/>
           </a:p>
@@ -5576,7 +5576,7 @@
                 <a:latin typeface="Times New Roman" panose="02020603050405020304" pitchFamily="18" charset="0"/>
                 <a:cs typeface="Times New Roman" panose="02020603050405020304" pitchFamily="18" charset="0"/>
               </a:rPr>
-              <a:t>81 модульных тест для слоя бизнес-логики</a:t>
+              <a:t>81 модульный тест для слоя бизнес-логики</a:t>
             </a:r>
             <a:r>
               <a:rPr lang="en-US" sz="2300" dirty="0">
@@ -6887,66 +6887,6 @@
           <a:chExt cx="0" cy="0"/>
         </a:xfrm>
       </p:grpSpPr>
-      <p:pic>
-        <p:nvPicPr>
-          <p:cNvPr id="8" name="Рисунок 7">
-            <a:extLst>
-              <a:ext uri="{FF2B5EF4-FFF2-40B4-BE49-F238E27FC236}">
-                <a16:creationId xmlns:a16="http://schemas.microsoft.com/office/drawing/2014/main" id="{95D87B05-35E8-51AB-CFAA-46F36C5033A8}"/>
-              </a:ext>
-            </a:extLst>
-          </p:cNvPr>
-          <p:cNvPicPr>
-            <a:picLocks noChangeAspect="1"/>
-          </p:cNvPicPr>
-          <p:nvPr/>
-        </p:nvPicPr>
-        <p:blipFill>
-          <a:blip r:embed="rId3"/>
-          <a:stretch>
-            <a:fillRect/>
-          </a:stretch>
-        </p:blipFill>
-        <p:spPr>
-          <a:xfrm>
-            <a:off x="5459008" y="4934833"/>
-            <a:ext cx="6762117" cy="1070520"/>
-          </a:xfrm>
-          <a:prstGeom prst="rect">
-            <a:avLst/>
-          </a:prstGeom>
-        </p:spPr>
-      </p:pic>
-      <p:pic>
-        <p:nvPicPr>
-          <p:cNvPr id="6" name="Рисунок 5">
-            <a:extLst>
-              <a:ext uri="{FF2B5EF4-FFF2-40B4-BE49-F238E27FC236}">
-                <a16:creationId xmlns:a16="http://schemas.microsoft.com/office/drawing/2014/main" id="{162D7227-AA95-114F-31BE-F64037C750F6}"/>
-              </a:ext>
-            </a:extLst>
-          </p:cNvPr>
-          <p:cNvPicPr>
-            <a:picLocks noChangeAspect="1"/>
-          </p:cNvPicPr>
-          <p:nvPr/>
-        </p:nvPicPr>
-        <p:blipFill>
-          <a:blip r:embed="rId4"/>
-          <a:stretch>
-            <a:fillRect/>
-          </a:stretch>
-        </p:blipFill>
-        <p:spPr>
-          <a:xfrm>
-            <a:off x="5624884" y="1812196"/>
-            <a:ext cx="6430367" cy="3075000"/>
-          </a:xfrm>
-          <a:prstGeom prst="rect">
-            <a:avLst/>
-          </a:prstGeom>
-        </p:spPr>
-      </p:pic>
       <p:sp>
         <p:nvSpPr>
           <p:cNvPr id="2" name="Заголовок 1">
@@ -7019,7 +6959,21 @@
                     <a:latin typeface="Times New Roman" panose="02020603050405020304" pitchFamily="18" charset="0"/>
                     <a:cs typeface="Times New Roman" panose="02020603050405020304" pitchFamily="18" charset="0"/>
                   </a:rPr>
-                  <a:t>По данным исследования методом наименьших квадратов построены полиномы 3 степени</a:t>
+                  <a:t>По данным исследования методом наименьших квадратов построены полиномы </a:t>
+                </a:r>
+                <a:r>
+                  <a:rPr lang="en-US" sz="2300" dirty="0">
+                    <a:latin typeface="Times New Roman" panose="02020603050405020304" pitchFamily="18" charset="0"/>
+                    <a:cs typeface="Times New Roman" panose="02020603050405020304" pitchFamily="18" charset="0"/>
+                  </a:rPr>
+                  <a:t>1</a:t>
+                </a:r>
+                <a:r>
+                  <a:rPr lang="ru-RU" sz="2300" dirty="0">
+                    <a:latin typeface="Times New Roman" panose="02020603050405020304" pitchFamily="18" charset="0"/>
+                    <a:cs typeface="Times New Roman" panose="02020603050405020304" pitchFamily="18" charset="0"/>
+                  </a:rPr>
+                  <a:t> степени</a:t>
                 </a:r>
                 <a:r>
                   <a:rPr lang="en-US" sz="2300" dirty="0">
@@ -7188,7 +7142,21 @@
                     <a:latin typeface="Times New Roman" panose="02020603050405020304" pitchFamily="18" charset="0"/>
                     <a:cs typeface="Times New Roman" panose="02020603050405020304" pitchFamily="18" charset="0"/>
                   </a:rPr>
-                  <a:t>При этом, линейный коэффициент роста времени на стороне приложения в 2.427 раза больше, чем на стороне сервера.</a:t>
+                  <a:t>При этом, линейный коэффициент роста времени на стороне приложения в </a:t>
+                </a:r>
+                <a:r>
+                  <a:rPr lang="en-US" sz="2300" dirty="0">
+                    <a:latin typeface="Times New Roman" panose="02020603050405020304" pitchFamily="18" charset="0"/>
+                    <a:cs typeface="Times New Roman" panose="02020603050405020304" pitchFamily="18" charset="0"/>
+                  </a:rPr>
+                  <a:t>3.21</a:t>
+                </a:r>
+                <a:r>
+                  <a:rPr lang="ru-RU" sz="2300" dirty="0">
+                    <a:latin typeface="Times New Roman" panose="02020603050405020304" pitchFamily="18" charset="0"/>
+                    <a:cs typeface="Times New Roman" panose="02020603050405020304" pitchFamily="18" charset="0"/>
+                  </a:rPr>
+                  <a:t> раза больше, чем на стороне сервера.</a:t>
                 </a:r>
               </a:p>
             </p:txBody>
@@ -7217,7 +7185,7 @@
                 <a:ext cx="4786685" cy="4215548"/>
               </a:xfrm>
               <a:blipFill>
-                <a:blip r:embed="rId5"/>
+                <a:blip r:embed="rId3"/>
                 <a:stretch>
                   <a:fillRect l="-1781" t="-2026" r="-1781" b="-1158"/>
                 </a:stretch>
@@ -7267,110 +7235,94 @@
           </a:p>
         </p:txBody>
       </p:sp>
-      <p:sp>
-        <p:nvSpPr>
-          <p:cNvPr id="4" name="Прямоугольник 3">
-            <a:extLst>
-              <a:ext uri="{FF2B5EF4-FFF2-40B4-BE49-F238E27FC236}">
-                <a16:creationId xmlns:a16="http://schemas.microsoft.com/office/drawing/2014/main" id="{1C2DA4C5-2A64-AC65-CD77-5750CADC9EB1}"/>
-              </a:ext>
-            </a:extLst>
-          </p:cNvPr>
-          <p:cNvSpPr/>
+      <p:pic>
+        <p:nvPicPr>
+          <p:cNvPr id="12" name="Рисунок 11">
+            <a:extLst>
+              <a:ext uri="{FF2B5EF4-FFF2-40B4-BE49-F238E27FC236}">
+                <a16:creationId xmlns:a16="http://schemas.microsoft.com/office/drawing/2014/main" id="{77613D2E-87A5-CD0D-5F92-D9DFF53CEF5F}"/>
+              </a:ext>
+            </a:extLst>
+          </p:cNvPr>
+          <p:cNvPicPr>
+            <a:picLocks noChangeAspect="1"/>
+          </p:cNvPicPr>
           <p:nvPr/>
-        </p:nvSpPr>
+        </p:nvPicPr>
+        <p:blipFill>
+          <a:blip r:embed="rId4"/>
+          <a:stretch>
+            <a:fillRect/>
+          </a:stretch>
+        </p:blipFill>
         <p:spPr>
           <a:xfrm>
-            <a:off x="9890170" y="5028641"/>
-            <a:ext cx="1040554" cy="353919"/>
+            <a:off x="5624884" y="1747025"/>
+            <a:ext cx="6596241" cy="3150042"/>
           </a:xfrm>
           <a:prstGeom prst="rect">
             <a:avLst/>
           </a:prstGeom>
-          <a:noFill/>
-          <a:ln w="28575">
-            <a:solidFill>
-              <a:srgbClr val="FF0000"/>
-            </a:solidFill>
-          </a:ln>
         </p:spPr>
-        <p:style>
-          <a:lnRef idx="2">
-            <a:schemeClr val="accent1">
-              <a:shade val="15000"/>
-            </a:schemeClr>
-          </a:lnRef>
-          <a:fillRef idx="1">
-            <a:schemeClr val="accent1"/>
-          </a:fillRef>
-          <a:effectRef idx="0">
-            <a:schemeClr val="accent1"/>
-          </a:effectRef>
-          <a:fontRef idx="minor">
-            <a:schemeClr val="lt1"/>
-          </a:fontRef>
-        </p:style>
-        <p:txBody>
-          <a:bodyPr rtlCol="0" anchor="ctr"/>
-          <a:lstStyle/>
-          <a:p>
-            <a:pPr algn="ctr"/>
-            <a:endParaRPr lang="ru-RU"/>
-          </a:p>
-        </p:txBody>
-      </p:sp>
-      <p:sp>
-        <p:nvSpPr>
-          <p:cNvPr id="5" name="Прямоугольник 4">
-            <a:extLst>
-              <a:ext uri="{FF2B5EF4-FFF2-40B4-BE49-F238E27FC236}">
-                <a16:creationId xmlns:a16="http://schemas.microsoft.com/office/drawing/2014/main" id="{AC8ADE20-EFC1-1CA3-6DA3-B8B4E2AEC2BA}"/>
-              </a:ext>
-            </a:extLst>
-          </p:cNvPr>
-          <p:cNvSpPr/>
+      </p:pic>
+      <p:pic>
+        <p:nvPicPr>
+          <p:cNvPr id="14" name="Рисунок 13">
+            <a:extLst>
+              <a:ext uri="{FF2B5EF4-FFF2-40B4-BE49-F238E27FC236}">
+                <a16:creationId xmlns:a16="http://schemas.microsoft.com/office/drawing/2014/main" id="{1A58FD64-32D2-5D9E-2AED-57FD32E73760}"/>
+              </a:ext>
+            </a:extLst>
+          </p:cNvPr>
+          <p:cNvPicPr>
+            <a:picLocks noChangeAspect="1"/>
+          </p:cNvPicPr>
           <p:nvPr/>
-        </p:nvSpPr>
+        </p:nvPicPr>
+        <p:blipFill>
+          <a:blip r:embed="rId5"/>
+          <a:srcRect b="58018"/>
+          <a:stretch/>
+        </p:blipFill>
         <p:spPr>
           <a:xfrm>
-            <a:off x="9802117" y="5608749"/>
-            <a:ext cx="1040554" cy="353919"/>
+            <a:off x="6349901" y="4877226"/>
+            <a:ext cx="5303019" cy="782579"/>
           </a:xfrm>
           <a:prstGeom prst="rect">
             <a:avLst/>
           </a:prstGeom>
-          <a:noFill/>
-          <a:ln w="28575">
-            <a:solidFill>
-              <a:srgbClr val="FF0000"/>
-            </a:solidFill>
-          </a:ln>
         </p:spPr>
-        <p:style>
-          <a:lnRef idx="2">
-            <a:schemeClr val="accent1">
-              <a:shade val="15000"/>
-            </a:schemeClr>
-          </a:lnRef>
-          <a:fillRef idx="1">
-            <a:schemeClr val="accent1"/>
-          </a:fillRef>
-          <a:effectRef idx="0">
-            <a:schemeClr val="accent1"/>
-          </a:effectRef>
-          <a:fontRef idx="minor">
-            <a:schemeClr val="lt1"/>
-          </a:fontRef>
-        </p:style>
-        <p:txBody>
-          <a:bodyPr rtlCol="0" anchor="ctr"/>
-          <a:lstStyle/>
-          <a:p>
-            <a:pPr algn="ctr"/>
-            <a:endParaRPr lang="ru-RU"/>
-          </a:p>
-        </p:txBody>
-      </p:sp>
+      </p:pic>
+      <p:pic>
+        <p:nvPicPr>
+          <p:cNvPr id="16" name="Рисунок 15">
+            <a:extLst>
+              <a:ext uri="{FF2B5EF4-FFF2-40B4-BE49-F238E27FC236}">
+                <a16:creationId xmlns:a16="http://schemas.microsoft.com/office/drawing/2014/main" id="{B1792097-572E-9015-0008-C8322DDEFBFE}"/>
+              </a:ext>
+            </a:extLst>
+          </p:cNvPr>
+          <p:cNvPicPr>
+            <a:picLocks noChangeAspect="1"/>
+          </p:cNvPicPr>
+          <p:nvPr/>
+        </p:nvPicPr>
+        <p:blipFill>
+          <a:blip r:embed="rId5"/>
+          <a:srcRect t="50000"/>
+          <a:stretch/>
+        </p:blipFill>
+        <p:spPr>
+          <a:xfrm>
+            <a:off x="6313809" y="5437803"/>
+            <a:ext cx="5339111" cy="938389"/>
+          </a:xfrm>
+          <a:prstGeom prst="rect">
+            <a:avLst/>
+          </a:prstGeom>
+        </p:spPr>
+      </p:pic>
     </p:spTree>
     <p:extLst>
       <p:ext uri="{BB962C8B-B14F-4D97-AF65-F5344CB8AC3E}">
@@ -8111,7 +8063,7 @@
                 <a:latin typeface="Times New Roman" panose="02020603050405020304" pitchFamily="18" charset="0"/>
                 <a:cs typeface="Times New Roman" panose="02020603050405020304" pitchFamily="18" charset="0"/>
               </a:rPr>
-              <a:t> исследовать зависимость времени выдачи наград от количества вознаграждаемых игроков в двух случаях: при помощи хранимой процедуры и при помощи обычных запросов</a:t>
+              <a:t>исследовать зависимость времени выдачи наград от количества вознаграждаемых игроков в двух случаях: при помощи хранимой процедуры и при помощи обычных запросов</a:t>
             </a:r>
             <a:r>
               <a:rPr lang="en-US" sz="2400" dirty="0">
@@ -8245,7 +8197,7 @@
         <p:spPr/>
         <p:txBody>
           <a:bodyPr vert="horz" lIns="91440" tIns="45720" rIns="91440" bIns="45720" rtlCol="0" anchor="t">
-            <a:normAutofit/>
+            <a:normAutofit lnSpcReduction="10000"/>
           </a:bodyPr>
           <a:lstStyle/>
           <a:p>
@@ -8257,19 +8209,20 @@
                 <a:latin typeface="Times New Roman" panose="02020603050405020304" pitchFamily="18" charset="0"/>
                 <a:cs typeface="Times New Roman" panose="02020603050405020304" pitchFamily="18" charset="0"/>
               </a:rPr>
-              <a:t>Соревнование характеризуется сроками проведений, информацией о выдаваемых наградах. Выдаваемые награды характеризуются собственно наградой и критерием выдачи исходя из таблицы лидеров</a:t>
-            </a:r>
-            <a:r>
-              <a:rPr lang="en-US" sz="2400" dirty="0">
-                <a:latin typeface="Times New Roman" panose="02020603050405020304" pitchFamily="18" charset="0"/>
-                <a:cs typeface="Times New Roman" panose="02020603050405020304" pitchFamily="18" charset="0"/>
-              </a:rPr>
-              <a:t>:</a:t>
-            </a:r>
-            <a:endParaRPr lang="ru-RU" sz="2400" dirty="0">
-              <a:latin typeface="Times New Roman" panose="02020603050405020304" pitchFamily="18" charset="0"/>
-              <a:cs typeface="Times New Roman" panose="02020603050405020304" pitchFamily="18" charset="0"/>
-            </a:endParaRPr>
+              <a:t>Награда характеризуется названием, описанием и изображением.</a:t>
+            </a:r>
+          </a:p>
+          <a:p>
+            <a:pPr marL="0" indent="0" algn="just">
+              <a:buNone/>
+            </a:pPr>
+            <a:r>
+              <a:rPr lang="ru-RU" sz="2400" dirty="0">
+                <a:latin typeface="Times New Roman" panose="02020603050405020304" pitchFamily="18" charset="0"/>
+                <a:cs typeface="Times New Roman" panose="02020603050405020304" pitchFamily="18" charset="0"/>
+              </a:rPr>
+              <a:t>Соревнование характеризуется сроками проведений, информацией о выдаваемых наградах. Выдаваемые награды характеризуются собственно наградой и критерием выдачи исходя из таблицы лидеров. Возможны следующие критерии:</a:t>
+            </a:r>
           </a:p>
           <a:p>
             <a:pPr algn="just">
@@ -8306,7 +8259,7 @@
                 <a:latin typeface="Times New Roman"/>
                 <a:cs typeface="Times New Roman"/>
               </a:rPr>
-              <a:t>Пользователи участвуют в соревнованиях, отправляя свой результат в виде целого числа. По истечению срока проведения должны автоматически выдаваться награды за занятое место в таблице лидеров, которые настроил администратор.</a:t>
+              <a:t>Пользователи участвуют в соревнованиях, отправляя свой результат в виде целого числа. По истечению срока проведения им автоматически выдаются награды за их занятое место в таблице лидеров.</a:t>
             </a:r>
           </a:p>
         </p:txBody>
@@ -9152,10 +9105,10 @@
       </p:grpSpPr>
       <p:pic>
         <p:nvPicPr>
-          <p:cNvPr id="4" name="Рисунок 3">
-            <a:extLst>
-              <a:ext uri="{FF2B5EF4-FFF2-40B4-BE49-F238E27FC236}">
-                <a16:creationId xmlns:a16="http://schemas.microsoft.com/office/drawing/2014/main" id="{56965C95-C9A7-D827-8795-ED79F7FCE16C}"/>
+          <p:cNvPr id="7" name="Рисунок 6">
+            <a:extLst>
+              <a:ext uri="{FF2B5EF4-FFF2-40B4-BE49-F238E27FC236}">
+                <a16:creationId xmlns:a16="http://schemas.microsoft.com/office/drawing/2014/main" id="{9870DF2A-71ED-124C-079E-28876D91DAC6}"/>
               </a:ext>
             </a:extLst>
           </p:cNvPr>
@@ -9172,8 +9125,8 @@
         </p:blipFill>
         <p:spPr>
           <a:xfrm>
-            <a:off x="999067" y="1212790"/>
-            <a:ext cx="9795934" cy="5326122"/>
+            <a:off x="838200" y="1194241"/>
+            <a:ext cx="10363565" cy="5527234"/>
           </a:xfrm>
           <a:prstGeom prst="rect">
             <a:avLst/>

</xml_diff>